<commit_message>
Add some work to post
</commit_message>
<xml_diff>
--- a/posts/2023/2023-01-20-storytelling/report-exemplo.pptx
+++ b/posts/2023/2023-01-20-storytelling/report-exemplo.pptx
@@ -64,7 +64,7 @@
         <p:spPr>
           <a:xfrm>
             <a:off x="457200" y="205200"/>
-            <a:ext cx="8228520" cy="857880"/>
+            <a:ext cx="8229240" cy="858600"/>
           </a:xfrm>
           <a:prstGeom prst="rect">
             <a:avLst/>
@@ -95,7 +95,7 @@
         <p:spPr>
           <a:xfrm>
             <a:off x="457200" y="1203840"/>
-            <a:ext cx="8228880" cy="1422720"/>
+            <a:ext cx="8229240" cy="1423080"/>
           </a:xfrm>
           <a:prstGeom prst="rect">
             <a:avLst/>
@@ -124,8 +124,8 @@
         </p:nvSpPr>
         <p:spPr>
           <a:xfrm>
-            <a:off x="457200" y="2762280"/>
-            <a:ext cx="8228880" cy="1422720"/>
+            <a:off x="457200" y="2762640"/>
+            <a:ext cx="8229240" cy="1423080"/>
           </a:xfrm>
           <a:prstGeom prst="rect">
             <a:avLst/>
@@ -177,7 +177,7 @@
         <p:spPr>
           <a:xfrm>
             <a:off x="457200" y="205200"/>
-            <a:ext cx="8228520" cy="857880"/>
+            <a:ext cx="8229240" cy="858600"/>
           </a:xfrm>
           <a:prstGeom prst="rect">
             <a:avLst/>
@@ -208,7 +208,7 @@
         <p:spPr>
           <a:xfrm>
             <a:off x="457200" y="1203840"/>
-            <a:ext cx="4015440" cy="1422720"/>
+            <a:ext cx="4015800" cy="1423080"/>
           </a:xfrm>
           <a:prstGeom prst="rect">
             <a:avLst/>
@@ -237,8 +237,8 @@
         </p:nvSpPr>
         <p:spPr>
           <a:xfrm>
-            <a:off x="4673880" y="1203840"/>
-            <a:ext cx="4015440" cy="1422720"/>
+            <a:off x="4674240" y="1203840"/>
+            <a:ext cx="4015800" cy="1423080"/>
           </a:xfrm>
           <a:prstGeom prst="rect">
             <a:avLst/>
@@ -267,8 +267,8 @@
         </p:nvSpPr>
         <p:spPr>
           <a:xfrm>
-            <a:off x="457200" y="2762280"/>
-            <a:ext cx="4015440" cy="1422720"/>
+            <a:off x="457200" y="2762640"/>
+            <a:ext cx="4015800" cy="1423080"/>
           </a:xfrm>
           <a:prstGeom prst="rect">
             <a:avLst/>
@@ -297,8 +297,8 @@
         </p:nvSpPr>
         <p:spPr>
           <a:xfrm>
-            <a:off x="4673880" y="2762280"/>
-            <a:ext cx="4015440" cy="1422720"/>
+            <a:off x="4674240" y="2762640"/>
+            <a:ext cx="4015800" cy="1423080"/>
           </a:xfrm>
           <a:prstGeom prst="rect">
             <a:avLst/>
@@ -350,7 +350,7 @@
         <p:spPr>
           <a:xfrm>
             <a:off x="457200" y="205200"/>
-            <a:ext cx="8228520" cy="857880"/>
+            <a:ext cx="8229240" cy="858600"/>
           </a:xfrm>
           <a:prstGeom prst="rect">
             <a:avLst/>
@@ -381,7 +381,7 @@
         <p:spPr>
           <a:xfrm>
             <a:off x="457200" y="1203840"/>
-            <a:ext cx="2649600" cy="1422720"/>
+            <a:ext cx="2649600" cy="1423080"/>
           </a:xfrm>
           <a:prstGeom prst="rect">
             <a:avLst/>
@@ -411,7 +411,7 @@
         <p:spPr>
           <a:xfrm>
             <a:off x="3239640" y="1203840"/>
-            <a:ext cx="2649600" cy="1422720"/>
+            <a:ext cx="2649600" cy="1423080"/>
           </a:xfrm>
           <a:prstGeom prst="rect">
             <a:avLst/>
@@ -441,7 +441,7 @@
         <p:spPr>
           <a:xfrm>
             <a:off x="6022080" y="1203840"/>
-            <a:ext cx="2649600" cy="1422720"/>
+            <a:ext cx="2649600" cy="1423080"/>
           </a:xfrm>
           <a:prstGeom prst="rect">
             <a:avLst/>
@@ -470,8 +470,8 @@
         </p:nvSpPr>
         <p:spPr>
           <a:xfrm>
-            <a:off x="457200" y="2762280"/>
-            <a:ext cx="2649600" cy="1422720"/>
+            <a:off x="457200" y="2762640"/>
+            <a:ext cx="2649600" cy="1423080"/>
           </a:xfrm>
           <a:prstGeom prst="rect">
             <a:avLst/>
@@ -500,8 +500,8 @@
         </p:nvSpPr>
         <p:spPr>
           <a:xfrm>
-            <a:off x="3239640" y="2762280"/>
-            <a:ext cx="2649600" cy="1422720"/>
+            <a:off x="3239640" y="2762640"/>
+            <a:ext cx="2649600" cy="1423080"/>
           </a:xfrm>
           <a:prstGeom prst="rect">
             <a:avLst/>
@@ -530,8 +530,8 @@
         </p:nvSpPr>
         <p:spPr>
           <a:xfrm>
-            <a:off x="6022080" y="2762280"/>
-            <a:ext cx="2649600" cy="1422720"/>
+            <a:off x="6022080" y="2762640"/>
+            <a:ext cx="2649600" cy="1423080"/>
           </a:xfrm>
           <a:prstGeom prst="rect">
             <a:avLst/>
@@ -583,7 +583,7 @@
         <p:spPr>
           <a:xfrm>
             <a:off x="457200" y="205200"/>
-            <a:ext cx="8228520" cy="857880"/>
+            <a:ext cx="8229240" cy="858600"/>
           </a:xfrm>
           <a:prstGeom prst="rect">
             <a:avLst/>
@@ -614,7 +614,7 @@
         <p:spPr>
           <a:xfrm>
             <a:off x="457200" y="1203840"/>
-            <a:ext cx="8228880" cy="2983320"/>
+            <a:ext cx="8229240" cy="2983680"/>
           </a:xfrm>
           <a:prstGeom prst="rect">
             <a:avLst/>
@@ -667,7 +667,7 @@
         <p:spPr>
           <a:xfrm>
             <a:off x="457200" y="205200"/>
-            <a:ext cx="8228520" cy="857880"/>
+            <a:ext cx="8229240" cy="858600"/>
           </a:xfrm>
           <a:prstGeom prst="rect">
             <a:avLst/>
@@ -698,7 +698,7 @@
         <p:spPr>
           <a:xfrm>
             <a:off x="457200" y="1203840"/>
-            <a:ext cx="8228880" cy="2983320"/>
+            <a:ext cx="8229240" cy="2983680"/>
           </a:xfrm>
           <a:prstGeom prst="rect">
             <a:avLst/>
@@ -750,7 +750,7 @@
         <p:spPr>
           <a:xfrm>
             <a:off x="457200" y="205200"/>
-            <a:ext cx="8228520" cy="857880"/>
+            <a:ext cx="8229240" cy="858600"/>
           </a:xfrm>
           <a:prstGeom prst="rect">
             <a:avLst/>
@@ -781,7 +781,7 @@
         <p:spPr>
           <a:xfrm>
             <a:off x="457200" y="1203840"/>
-            <a:ext cx="4015440" cy="2983320"/>
+            <a:ext cx="4015800" cy="2983680"/>
           </a:xfrm>
           <a:prstGeom prst="rect">
             <a:avLst/>
@@ -810,8 +810,8 @@
         </p:nvSpPr>
         <p:spPr>
           <a:xfrm>
-            <a:off x="4673880" y="1203840"/>
-            <a:ext cx="4015440" cy="2983320"/>
+            <a:off x="4674240" y="1203840"/>
+            <a:ext cx="4015800" cy="2983680"/>
           </a:xfrm>
           <a:prstGeom prst="rect">
             <a:avLst/>
@@ -863,7 +863,7 @@
         <p:spPr>
           <a:xfrm>
             <a:off x="457200" y="205200"/>
-            <a:ext cx="8228520" cy="857880"/>
+            <a:ext cx="8229240" cy="858600"/>
           </a:xfrm>
           <a:prstGeom prst="rect">
             <a:avLst/>
@@ -916,7 +916,7 @@
         <p:spPr>
           <a:xfrm>
             <a:off x="457200" y="205200"/>
-            <a:ext cx="8228520" cy="3978000"/>
+            <a:ext cx="8229240" cy="3981240"/>
           </a:xfrm>
           <a:prstGeom prst="rect">
             <a:avLst/>
@@ -969,7 +969,7 @@
         <p:spPr>
           <a:xfrm>
             <a:off x="457200" y="205200"/>
-            <a:ext cx="8228520" cy="857880"/>
+            <a:ext cx="8229240" cy="858600"/>
           </a:xfrm>
           <a:prstGeom prst="rect">
             <a:avLst/>
@@ -1000,7 +1000,7 @@
         <p:spPr>
           <a:xfrm>
             <a:off x="457200" y="1203840"/>
-            <a:ext cx="4015440" cy="1422720"/>
+            <a:ext cx="4015800" cy="1423080"/>
           </a:xfrm>
           <a:prstGeom prst="rect">
             <a:avLst/>
@@ -1029,8 +1029,8 @@
         </p:nvSpPr>
         <p:spPr>
           <a:xfrm>
-            <a:off x="4673880" y="1203840"/>
-            <a:ext cx="4015440" cy="2983320"/>
+            <a:off x="4674240" y="1203840"/>
+            <a:ext cx="4015800" cy="2983680"/>
           </a:xfrm>
           <a:prstGeom prst="rect">
             <a:avLst/>
@@ -1059,8 +1059,8 @@
         </p:nvSpPr>
         <p:spPr>
           <a:xfrm>
-            <a:off x="457200" y="2762280"/>
-            <a:ext cx="4015440" cy="1422720"/>
+            <a:off x="457200" y="2762640"/>
+            <a:ext cx="4015800" cy="1423080"/>
           </a:xfrm>
           <a:prstGeom prst="rect">
             <a:avLst/>
@@ -1112,7 +1112,7 @@
         <p:spPr>
           <a:xfrm>
             <a:off x="457200" y="205200"/>
-            <a:ext cx="8228520" cy="857880"/>
+            <a:ext cx="8229240" cy="858600"/>
           </a:xfrm>
           <a:prstGeom prst="rect">
             <a:avLst/>
@@ -1143,7 +1143,7 @@
         <p:spPr>
           <a:xfrm>
             <a:off x="457200" y="1203840"/>
-            <a:ext cx="4015440" cy="2983320"/>
+            <a:ext cx="4015800" cy="2983680"/>
           </a:xfrm>
           <a:prstGeom prst="rect">
             <a:avLst/>
@@ -1172,8 +1172,8 @@
         </p:nvSpPr>
         <p:spPr>
           <a:xfrm>
-            <a:off x="4673880" y="1203840"/>
-            <a:ext cx="4015440" cy="1422720"/>
+            <a:off x="4674240" y="1203840"/>
+            <a:ext cx="4015800" cy="1423080"/>
           </a:xfrm>
           <a:prstGeom prst="rect">
             <a:avLst/>
@@ -1202,8 +1202,8 @@
         </p:nvSpPr>
         <p:spPr>
           <a:xfrm>
-            <a:off x="4673880" y="2762280"/>
-            <a:ext cx="4015440" cy="1422720"/>
+            <a:off x="4674240" y="2762640"/>
+            <a:ext cx="4015800" cy="1423080"/>
           </a:xfrm>
           <a:prstGeom prst="rect">
             <a:avLst/>
@@ -1255,7 +1255,7 @@
         <p:spPr>
           <a:xfrm>
             <a:off x="457200" y="205200"/>
-            <a:ext cx="8228520" cy="857880"/>
+            <a:ext cx="8229240" cy="858600"/>
           </a:xfrm>
           <a:prstGeom prst="rect">
             <a:avLst/>
@@ -1286,7 +1286,7 @@
         <p:spPr>
           <a:xfrm>
             <a:off x="457200" y="1203840"/>
-            <a:ext cx="4015440" cy="1422720"/>
+            <a:ext cx="4015800" cy="1423080"/>
           </a:xfrm>
           <a:prstGeom prst="rect">
             <a:avLst/>
@@ -1315,8 +1315,8 @@
         </p:nvSpPr>
         <p:spPr>
           <a:xfrm>
-            <a:off x="4673880" y="1203840"/>
-            <a:ext cx="4015440" cy="1422720"/>
+            <a:off x="4674240" y="1203840"/>
+            <a:ext cx="4015800" cy="1423080"/>
           </a:xfrm>
           <a:prstGeom prst="rect">
             <a:avLst/>
@@ -1345,8 +1345,8 @@
         </p:nvSpPr>
         <p:spPr>
           <a:xfrm>
-            <a:off x="457200" y="2762280"/>
-            <a:ext cx="8228880" cy="1422720"/>
+            <a:off x="457200" y="2762640"/>
+            <a:ext cx="8229240" cy="1423080"/>
           </a:xfrm>
           <a:prstGeom prst="rect">
             <a:avLst/>
@@ -1398,7 +1398,7 @@
         <p:spPr>
           <a:xfrm>
             <a:off x="457200" y="205200"/>
-            <a:ext cx="8228520" cy="857880"/>
+            <a:ext cx="8229240" cy="858600"/>
           </a:xfrm>
           <a:prstGeom prst="rect">
             <a:avLst/>
@@ -1409,13 +1409,14 @@
             <a:noAutofit/>
           </a:bodyPr>
           <a:p>
-            <a:r>
-              <a:rPr b="0" lang="pt-BR" sz="1800" spc="-1" strike="noStrike">
+            <a:pPr algn="ctr"/>
+            <a:r>
+              <a:rPr b="0" lang="pt-BR" sz="4400" spc="-1" strike="noStrike">
                 <a:latin typeface="Arial"/>
               </a:rPr>
               <a:t>Clique para editar o formato do texto do título</a:t>
             </a:r>
-            <a:endParaRPr b="0" lang="pt-BR" sz="1800" spc="-1" strike="noStrike">
+            <a:endParaRPr b="0" lang="pt-BR" sz="4400" spc="-1" strike="noStrike">
               <a:latin typeface="Arial"/>
             </a:endParaRPr>
           </a:p>
@@ -1434,7 +1435,7 @@
         <p:spPr>
           <a:xfrm>
             <a:off x="457200" y="1203840"/>
-            <a:ext cx="8228880" cy="2983320"/>
+            <a:ext cx="8229240" cy="2983680"/>
           </a:xfrm>
           <a:prstGeom prst="rect">
             <a:avLst/>
@@ -1442,7 +1443,7 @@
         </p:spPr>
         <p:txBody>
           <a:bodyPr lIns="0" rIns="0" tIns="0" bIns="0">
-            <a:normAutofit/>
+            <a:normAutofit fontScale="88000"/>
           </a:bodyPr>
           <a:p>
             <a:pPr marL="432000" indent="-324000">
@@ -1457,12 +1458,12 @@
               <a:buChar char=""/>
             </a:pPr>
             <a:r>
-              <a:rPr b="0" lang="pt-BR" sz="1800" spc="-1" strike="noStrike">
+              <a:rPr b="0" lang="pt-BR" sz="3200" spc="-1" strike="noStrike">
                 <a:latin typeface="Arial"/>
               </a:rPr>
               <a:t>Clique para editar o formato do texto da estrutura de tópicos</a:t>
             </a:r>
-            <a:endParaRPr b="0" lang="pt-BR" sz="1800" spc="-1" strike="noStrike">
+            <a:endParaRPr b="0" lang="pt-BR" sz="3200" spc="-1" strike="noStrike">
               <a:latin typeface="Arial"/>
             </a:endParaRPr>
           </a:p>
@@ -1479,12 +1480,12 @@
               <a:buChar char=""/>
             </a:pPr>
             <a:r>
-              <a:rPr b="0" lang="pt-BR" sz="1800" spc="-1" strike="noStrike">
+              <a:rPr b="0" lang="pt-BR" sz="2800" spc="-1" strike="noStrike">
                 <a:latin typeface="Arial"/>
               </a:rPr>
               <a:t>2.º nível da estrutura de tópicos</a:t>
             </a:r>
-            <a:endParaRPr b="0" lang="pt-BR" sz="1800" spc="-1" strike="noStrike">
+            <a:endParaRPr b="0" lang="pt-BR" sz="2800" spc="-1" strike="noStrike">
               <a:latin typeface="Arial"/>
             </a:endParaRPr>
           </a:p>
@@ -1501,12 +1502,12 @@
               <a:buChar char=""/>
             </a:pPr>
             <a:r>
-              <a:rPr b="0" lang="pt-BR" sz="1800" spc="-1" strike="noStrike">
+              <a:rPr b="0" lang="pt-BR" sz="2400" spc="-1" strike="noStrike">
                 <a:latin typeface="Arial"/>
               </a:rPr>
               <a:t>3.º nível da estrutura de tópicos</a:t>
             </a:r>
-            <a:endParaRPr b="0" lang="pt-BR" sz="1800" spc="-1" strike="noStrike">
+            <a:endParaRPr b="0" lang="pt-BR" sz="2400" spc="-1" strike="noStrike">
               <a:latin typeface="Arial"/>
             </a:endParaRPr>
           </a:p>
@@ -1523,12 +1524,12 @@
               <a:buChar char=""/>
             </a:pPr>
             <a:r>
-              <a:rPr b="0" lang="pt-BR" sz="1800" spc="-1" strike="noStrike">
+              <a:rPr b="0" lang="pt-BR" sz="2000" spc="-1" strike="noStrike">
                 <a:latin typeface="Arial"/>
               </a:rPr>
               <a:t>4.º nível da estrutura de tópicos</a:t>
             </a:r>
-            <a:endParaRPr b="0" lang="pt-BR" sz="1800" spc="-1" strike="noStrike">
+            <a:endParaRPr b="0" lang="pt-BR" sz="2000" spc="-1" strike="noStrike">
               <a:latin typeface="Arial"/>
             </a:endParaRPr>
           </a:p>
@@ -1545,12 +1546,12 @@
               <a:buChar char=""/>
             </a:pPr>
             <a:r>
-              <a:rPr b="0" lang="pt-BR" sz="1800" spc="-1" strike="noStrike">
+              <a:rPr b="0" lang="pt-BR" sz="2000" spc="-1" strike="noStrike">
                 <a:latin typeface="Arial"/>
               </a:rPr>
               <a:t>5.º nível da estrutura de tópicos</a:t>
             </a:r>
-            <a:endParaRPr b="0" lang="pt-BR" sz="1800" spc="-1" strike="noStrike">
+            <a:endParaRPr b="0" lang="pt-BR" sz="2000" spc="-1" strike="noStrike">
               <a:latin typeface="Arial"/>
             </a:endParaRPr>
           </a:p>
@@ -1567,12 +1568,12 @@
               <a:buChar char=""/>
             </a:pPr>
             <a:r>
-              <a:rPr b="0" lang="pt-BR" sz="1800" spc="-1" strike="noStrike">
+              <a:rPr b="0" lang="pt-BR" sz="2000" spc="-1" strike="noStrike">
                 <a:latin typeface="Arial"/>
               </a:rPr>
               <a:t>6.º nível da estrutura de tópicos</a:t>
             </a:r>
-            <a:endParaRPr b="0" lang="pt-BR" sz="1800" spc="-1" strike="noStrike">
+            <a:endParaRPr b="0" lang="pt-BR" sz="2000" spc="-1" strike="noStrike">
               <a:latin typeface="Arial"/>
             </a:endParaRPr>
           </a:p>
@@ -1589,12 +1590,12 @@
               <a:buChar char=""/>
             </a:pPr>
             <a:r>
-              <a:rPr b="0" lang="pt-BR" sz="1800" spc="-1" strike="noStrike">
+              <a:rPr b="0" lang="pt-BR" sz="2000" spc="-1" strike="noStrike">
                 <a:latin typeface="Arial"/>
               </a:rPr>
               <a:t>7.º nível da estrutura de tópicos</a:t>
             </a:r>
-            <a:endParaRPr b="0" lang="pt-BR" sz="1800" spc="-1" strike="noStrike">
+            <a:endParaRPr b="0" lang="pt-BR" sz="2000" spc="-1" strike="noStrike">
               <a:latin typeface="Arial"/>
             </a:endParaRPr>
           </a:p>
@@ -1652,7 +1653,7 @@
         <p:spPr>
           <a:xfrm>
             <a:off x="3715200" y="919800"/>
-            <a:ext cx="236160" cy="260280"/>
+            <a:ext cx="235800" cy="259920"/>
           </a:xfrm>
           <a:prstGeom prst="rect">
             <a:avLst/>
@@ -1671,7 +1672,7 @@
         <p:spPr>
           <a:xfrm>
             <a:off x="3202920" y="1189440"/>
-            <a:ext cx="1264680" cy="539640"/>
+            <a:ext cx="1264320" cy="539280"/>
           </a:xfrm>
           <a:prstGeom prst="rect">
             <a:avLst/>
@@ -1748,7 +1749,7 @@
         <p:spPr>
           <a:xfrm>
             <a:off x="1275480" y="1187280"/>
-            <a:ext cx="843840" cy="451800"/>
+            <a:ext cx="843480" cy="451440"/>
           </a:xfrm>
           <a:prstGeom prst="rect">
             <a:avLst/>
@@ -1831,7 +1832,7 @@
         <p:spPr>
           <a:xfrm>
             <a:off x="1608120" y="939240"/>
-            <a:ext cx="179640" cy="249120"/>
+            <a:ext cx="179280" cy="248760"/>
           </a:xfrm>
           <a:prstGeom prst="rect">
             <a:avLst/>
@@ -1850,7 +1851,7 @@
         <p:spPr>
           <a:xfrm>
             <a:off x="2276280" y="1191600"/>
-            <a:ext cx="923760" cy="260280"/>
+            <a:ext cx="923400" cy="259920"/>
           </a:xfrm>
           <a:prstGeom prst="rect">
             <a:avLst/>
@@ -1933,7 +1934,7 @@
         <p:spPr>
           <a:xfrm>
             <a:off x="2643840" y="851760"/>
-            <a:ext cx="342360" cy="327960"/>
+            <a:ext cx="342000" cy="327600"/>
           </a:xfrm>
           <a:prstGeom prst="rect">
             <a:avLst/>
@@ -1952,7 +1953,7 @@
         <p:spPr>
           <a:xfrm>
             <a:off x="4300200" y="1191600"/>
-            <a:ext cx="1299600" cy="511200"/>
+            <a:ext cx="1299240" cy="510840"/>
           </a:xfrm>
           <a:prstGeom prst="rect">
             <a:avLst/>
@@ -2045,7 +2046,7 @@
         <p:spPr>
           <a:xfrm>
             <a:off x="4790160" y="898560"/>
-            <a:ext cx="342360" cy="298080"/>
+            <a:ext cx="342000" cy="297720"/>
           </a:xfrm>
           <a:prstGeom prst="rect">
             <a:avLst/>
@@ -2064,7 +2065,7 @@
         <p:spPr>
           <a:xfrm>
             <a:off x="3356640" y="1523160"/>
-            <a:ext cx="923760" cy="408240"/>
+            <a:ext cx="923400" cy="407880"/>
           </a:xfrm>
           <a:prstGeom prst="rect">
             <a:avLst/>
@@ -2151,7 +2152,7 @@
         <p:spPr>
           <a:xfrm>
             <a:off x="4312080" y="1525680"/>
-            <a:ext cx="1299600" cy="408240"/>
+            <a:ext cx="1299240" cy="407880"/>
           </a:xfrm>
           <a:prstGeom prst="rect">
             <a:avLst/>
@@ -2244,7 +2245,7 @@
         <p:spPr>
           <a:xfrm>
             <a:off x="5986080" y="927360"/>
-            <a:ext cx="289800" cy="258120"/>
+            <a:ext cx="289440" cy="257760"/>
           </a:xfrm>
           <a:prstGeom prst="rect">
             <a:avLst/>
@@ -2263,7 +2264,7 @@
         <p:spPr>
           <a:xfrm>
             <a:off x="5658840" y="1190880"/>
-            <a:ext cx="961560" cy="383400"/>
+            <a:ext cx="961200" cy="383040"/>
           </a:xfrm>
           <a:prstGeom prst="rect">
             <a:avLst/>
@@ -2317,7 +2318,7 @@
         <p:spPr>
           <a:xfrm>
             <a:off x="2282760" y="1523880"/>
-            <a:ext cx="923760" cy="451800"/>
+            <a:ext cx="923400" cy="451440"/>
           </a:xfrm>
           <a:prstGeom prst="rect">
             <a:avLst/>
@@ -2404,7 +2405,7 @@
         <p:spPr>
           <a:xfrm>
             <a:off x="1327320" y="1532160"/>
-            <a:ext cx="714240" cy="451800"/>
+            <a:ext cx="713880" cy="451440"/>
           </a:xfrm>
           <a:prstGeom prst="rect">
             <a:avLst/>
@@ -2491,7 +2492,7 @@
         <p:spPr>
           <a:xfrm>
             <a:off x="5726160" y="1526400"/>
-            <a:ext cx="843840" cy="408240"/>
+            <a:ext cx="843480" cy="407880"/>
           </a:xfrm>
           <a:prstGeom prst="rect">
             <a:avLst/>
@@ -2578,7 +2579,7 @@
         <p:spPr>
           <a:xfrm>
             <a:off x="3243960" y="290520"/>
-            <a:ext cx="2512800" cy="491400"/>
+            <a:ext cx="2512440" cy="491040"/>
           </a:xfrm>
           <a:prstGeom prst="rect">
             <a:avLst/>
@@ -2632,7 +2633,7 @@
         <p:spPr>
           <a:xfrm>
             <a:off x="6982200" y="1521720"/>
-            <a:ext cx="662400" cy="480240"/>
+            <a:ext cx="662040" cy="479880"/>
           </a:xfrm>
           <a:prstGeom prst="rect">
             <a:avLst/>
@@ -2709,7 +2710,7 @@
         <p:spPr>
           <a:xfrm>
             <a:off x="6391800" y="1190880"/>
-            <a:ext cx="1742760" cy="471240"/>
+            <a:ext cx="1742400" cy="470880"/>
           </a:xfrm>
           <a:prstGeom prst="rect">
             <a:avLst/>
@@ -2792,7 +2793,7 @@
         <p:spPr>
           <a:xfrm>
             <a:off x="7130160" y="919800"/>
-            <a:ext cx="289440" cy="272160"/>
+            <a:ext cx="289080" cy="271800"/>
           </a:xfrm>
           <a:prstGeom prst="rect">
             <a:avLst/>
@@ -2811,7 +2812,7 @@
         <p:spPr>
           <a:xfrm>
             <a:off x="7935480" y="1172520"/>
-            <a:ext cx="961560" cy="327960"/>
+            <a:ext cx="961200" cy="327600"/>
           </a:xfrm>
           <a:prstGeom prst="rect">
             <a:avLst/>
@@ -2865,7 +2866,7 @@
         <p:spPr>
           <a:xfrm>
             <a:off x="8079480" y="1505160"/>
-            <a:ext cx="673200" cy="519120"/>
+            <a:ext cx="672840" cy="518760"/>
           </a:xfrm>
           <a:prstGeom prst="rect">
             <a:avLst/>
@@ -2947,8 +2948,8 @@
         </p:blipFill>
         <p:spPr>
           <a:xfrm flipH="1" rot="10800000">
-            <a:off x="8265240" y="907920"/>
-            <a:ext cx="275040" cy="260640"/>
+            <a:off x="8265240" y="908280"/>
+            <a:ext cx="274680" cy="260280"/>
           </a:xfrm>
           <a:prstGeom prst="rect">
             <a:avLst/>
@@ -2967,7 +2968,7 @@
         <p:spPr>
           <a:xfrm>
             <a:off x="264960" y="1491480"/>
-            <a:ext cx="865800" cy="305640"/>
+            <a:ext cx="865440" cy="305280"/>
           </a:xfrm>
           <a:prstGeom prst="rect">
             <a:avLst/>
@@ -3021,7 +3022,7 @@
         <p:spPr>
           <a:xfrm>
             <a:off x="496800" y="1705680"/>
-            <a:ext cx="547560" cy="261000"/>
+            <a:ext cx="547200" cy="260640"/>
           </a:xfrm>
           <a:prstGeom prst="rect">
             <a:avLst/>
@@ -3079,7 +3080,7 @@
         <p:spPr>
           <a:xfrm>
             <a:off x="478080" y="874800"/>
-            <a:ext cx="451440" cy="451800"/>
+            <a:ext cx="451080" cy="451440"/>
           </a:xfrm>
           <a:prstGeom prst="rect">
             <a:avLst/>
@@ -3104,7 +3105,7 @@
         <p:spPr>
           <a:xfrm>
             <a:off x="1459440" y="1820880"/>
-            <a:ext cx="88200" cy="88560"/>
+            <a:ext cx="87840" cy="88200"/>
           </a:xfrm>
           <a:prstGeom prst="rect">
             <a:avLst/>
@@ -3129,7 +3130,7 @@
         <p:spPr>
           <a:xfrm>
             <a:off x="2508840" y="1804680"/>
-            <a:ext cx="88200" cy="88560"/>
+            <a:ext cx="87840" cy="88200"/>
           </a:xfrm>
           <a:prstGeom prst="rect">
             <a:avLst/>
@@ -3154,7 +3155,7 @@
         <p:spPr>
           <a:xfrm>
             <a:off x="3597120" y="1797120"/>
-            <a:ext cx="92520" cy="88560"/>
+            <a:ext cx="92160" cy="88200"/>
           </a:xfrm>
           <a:prstGeom prst="rect">
             <a:avLst/>
@@ -3179,7 +3180,7 @@
         <p:spPr>
           <a:xfrm>
             <a:off x="5893560" y="1816200"/>
-            <a:ext cx="88200" cy="88560"/>
+            <a:ext cx="87840" cy="88200"/>
           </a:xfrm>
           <a:prstGeom prst="rect">
             <a:avLst/>
@@ -3204,7 +3205,7 @@
         <p:spPr>
           <a:xfrm>
             <a:off x="445680" y="1805040"/>
-            <a:ext cx="92520" cy="88560"/>
+            <a:ext cx="92160" cy="88200"/>
           </a:xfrm>
           <a:prstGeom prst="rect">
             <a:avLst/>
@@ -3229,7 +3230,7 @@
         <p:spPr>
           <a:xfrm>
             <a:off x="4745520" y="1801080"/>
-            <a:ext cx="92520" cy="88560"/>
+            <a:ext cx="92160" cy="88200"/>
           </a:xfrm>
           <a:prstGeom prst="rect">
             <a:avLst/>
@@ -3254,7 +3255,7 @@
         <p:spPr>
           <a:xfrm>
             <a:off x="8151120" y="1792080"/>
-            <a:ext cx="92520" cy="88560"/>
+            <a:ext cx="92160" cy="88200"/>
           </a:xfrm>
           <a:prstGeom prst="rect">
             <a:avLst/>
@@ -3279,7 +3280,7 @@
         <p:spPr>
           <a:xfrm>
             <a:off x="7020000" y="1800360"/>
-            <a:ext cx="92520" cy="88560"/>
+            <a:ext cx="92160" cy="88200"/>
           </a:xfrm>
           <a:prstGeom prst="rect">
             <a:avLst/>
@@ -3298,7 +3299,7 @@
         <p:spPr>
           <a:xfrm>
             <a:off x="286920" y="1260000"/>
-            <a:ext cx="843840" cy="451800"/>
+            <a:ext cx="843480" cy="451440"/>
           </a:xfrm>
           <a:prstGeom prst="rect">
             <a:avLst/>
@@ -3352,7 +3353,7 @@
         <p:spPr>
           <a:xfrm>
             <a:off x="5916600" y="4571640"/>
-            <a:ext cx="1152000" cy="349920"/>
+            <a:ext cx="1151640" cy="349560"/>
           </a:xfrm>
           <a:prstGeom prst="rect">
             <a:avLst/>
@@ -3406,7 +3407,7 @@
         <p:spPr>
           <a:xfrm>
             <a:off x="1082520" y="4528440"/>
-            <a:ext cx="5026320" cy="383400"/>
+            <a:ext cx="5025960" cy="383040"/>
           </a:xfrm>
           <a:prstGeom prst="rect">
             <a:avLst/>
@@ -3550,7 +3551,7 @@
         <p:spPr>
           <a:xfrm>
             <a:off x="359640" y="2160000"/>
-            <a:ext cx="3960360" cy="1980000"/>
+            <a:ext cx="3960000" cy="1979640"/>
           </a:xfrm>
           <a:prstGeom prst="rect">
             <a:avLst/>
@@ -3572,8 +3573,8 @@
         </p:blipFill>
         <p:spPr>
           <a:xfrm>
-            <a:off x="4859640" y="2160000"/>
-            <a:ext cx="3960360" cy="1980000"/>
+            <a:off x="4680000" y="2160000"/>
+            <a:ext cx="4104000" cy="2052000"/>
           </a:xfrm>
           <a:prstGeom prst="rect">
             <a:avLst/>

</xml_diff>

<commit_message>
Add a new slide to ppt
</commit_message>
<xml_diff>
--- a/posts/2023/2023-01-20-storytelling/report-exemplo.pptx
+++ b/posts/2023/2023-01-20-storytelling/report-exemplo.pptx
@@ -6,6 +6,7 @@
   </p:sldMasterIdLst>
   <p:sldIdLst>
     <p:sldId id="256" r:id="rId3"/>
+    <p:sldId id="257" r:id="rId4"/>
   </p:sldIdLst>
   <p:sldSz cx="9144000" cy="5145087"/>
   <p:notesSz cx="7559675" cy="10691812"/>
@@ -1653,7 +1654,7 @@
         <p:spPr>
           <a:xfrm>
             <a:off x="3715200" y="919800"/>
-            <a:ext cx="235800" cy="259920"/>
+            <a:ext cx="235440" cy="259560"/>
           </a:xfrm>
           <a:prstGeom prst="rect">
             <a:avLst/>
@@ -1672,7 +1673,7 @@
         <p:spPr>
           <a:xfrm>
             <a:off x="3202920" y="1189440"/>
-            <a:ext cx="1264320" cy="539280"/>
+            <a:ext cx="1263960" cy="538920"/>
           </a:xfrm>
           <a:prstGeom prst="rect">
             <a:avLst/>
@@ -1749,7 +1750,7 @@
         <p:spPr>
           <a:xfrm>
             <a:off x="1275480" y="1187280"/>
-            <a:ext cx="843480" cy="451440"/>
+            <a:ext cx="843120" cy="451080"/>
           </a:xfrm>
           <a:prstGeom prst="rect">
             <a:avLst/>
@@ -1832,7 +1833,7 @@
         <p:spPr>
           <a:xfrm>
             <a:off x="1608120" y="939240"/>
-            <a:ext cx="179280" cy="248760"/>
+            <a:ext cx="178920" cy="248400"/>
           </a:xfrm>
           <a:prstGeom prst="rect">
             <a:avLst/>
@@ -1851,7 +1852,7 @@
         <p:spPr>
           <a:xfrm>
             <a:off x="2276280" y="1191600"/>
-            <a:ext cx="923400" cy="259920"/>
+            <a:ext cx="923040" cy="259560"/>
           </a:xfrm>
           <a:prstGeom prst="rect">
             <a:avLst/>
@@ -1934,7 +1935,7 @@
         <p:spPr>
           <a:xfrm>
             <a:off x="2643840" y="851760"/>
-            <a:ext cx="342000" cy="327600"/>
+            <a:ext cx="341640" cy="327240"/>
           </a:xfrm>
           <a:prstGeom prst="rect">
             <a:avLst/>
@@ -1953,7 +1954,7 @@
         <p:spPr>
           <a:xfrm>
             <a:off x="4300200" y="1191600"/>
-            <a:ext cx="1299240" cy="510840"/>
+            <a:ext cx="1298880" cy="510480"/>
           </a:xfrm>
           <a:prstGeom prst="rect">
             <a:avLst/>
@@ -2046,7 +2047,7 @@
         <p:spPr>
           <a:xfrm>
             <a:off x="4790160" y="898560"/>
-            <a:ext cx="342000" cy="297720"/>
+            <a:ext cx="341640" cy="297360"/>
           </a:xfrm>
           <a:prstGeom prst="rect">
             <a:avLst/>
@@ -2065,7 +2066,7 @@
         <p:spPr>
           <a:xfrm>
             <a:off x="3356640" y="1523160"/>
-            <a:ext cx="923400" cy="407880"/>
+            <a:ext cx="923040" cy="407520"/>
           </a:xfrm>
           <a:prstGeom prst="rect">
             <a:avLst/>
@@ -2152,7 +2153,7 @@
         <p:spPr>
           <a:xfrm>
             <a:off x="4312080" y="1525680"/>
-            <a:ext cx="1299240" cy="407880"/>
+            <a:ext cx="1298880" cy="407520"/>
           </a:xfrm>
           <a:prstGeom prst="rect">
             <a:avLst/>
@@ -2245,7 +2246,7 @@
         <p:spPr>
           <a:xfrm>
             <a:off x="5986080" y="927360"/>
-            <a:ext cx="289440" cy="257760"/>
+            <a:ext cx="289080" cy="257400"/>
           </a:xfrm>
           <a:prstGeom prst="rect">
             <a:avLst/>
@@ -2264,7 +2265,7 @@
         <p:spPr>
           <a:xfrm>
             <a:off x="5658840" y="1190880"/>
-            <a:ext cx="961200" cy="383040"/>
+            <a:ext cx="960840" cy="382680"/>
           </a:xfrm>
           <a:prstGeom prst="rect">
             <a:avLst/>
@@ -2318,7 +2319,7 @@
         <p:spPr>
           <a:xfrm>
             <a:off x="2282760" y="1523880"/>
-            <a:ext cx="923400" cy="451440"/>
+            <a:ext cx="923040" cy="451080"/>
           </a:xfrm>
           <a:prstGeom prst="rect">
             <a:avLst/>
@@ -2405,7 +2406,7 @@
         <p:spPr>
           <a:xfrm>
             <a:off x="1327320" y="1532160"/>
-            <a:ext cx="713880" cy="451440"/>
+            <a:ext cx="713520" cy="451080"/>
           </a:xfrm>
           <a:prstGeom prst="rect">
             <a:avLst/>
@@ -2492,7 +2493,7 @@
         <p:spPr>
           <a:xfrm>
             <a:off x="5726160" y="1526400"/>
-            <a:ext cx="843480" cy="407880"/>
+            <a:ext cx="843120" cy="407520"/>
           </a:xfrm>
           <a:prstGeom prst="rect">
             <a:avLst/>
@@ -2579,7 +2580,7 @@
         <p:spPr>
           <a:xfrm>
             <a:off x="3243960" y="290520"/>
-            <a:ext cx="2512440" cy="491040"/>
+            <a:ext cx="2512080" cy="490680"/>
           </a:xfrm>
           <a:prstGeom prst="rect">
             <a:avLst/>
@@ -2633,7 +2634,7 @@
         <p:spPr>
           <a:xfrm>
             <a:off x="6982200" y="1521720"/>
-            <a:ext cx="662040" cy="479880"/>
+            <a:ext cx="661680" cy="479520"/>
           </a:xfrm>
           <a:prstGeom prst="rect">
             <a:avLst/>
@@ -2710,7 +2711,7 @@
         <p:spPr>
           <a:xfrm>
             <a:off x="6391800" y="1190880"/>
-            <a:ext cx="1742400" cy="470880"/>
+            <a:ext cx="1742040" cy="470520"/>
           </a:xfrm>
           <a:prstGeom prst="rect">
             <a:avLst/>
@@ -2793,7 +2794,7 @@
         <p:spPr>
           <a:xfrm>
             <a:off x="7130160" y="919800"/>
-            <a:ext cx="289080" cy="271800"/>
+            <a:ext cx="288720" cy="271440"/>
           </a:xfrm>
           <a:prstGeom prst="rect">
             <a:avLst/>
@@ -2812,7 +2813,7 @@
         <p:spPr>
           <a:xfrm>
             <a:off x="7935480" y="1172520"/>
-            <a:ext cx="961200" cy="327600"/>
+            <a:ext cx="960840" cy="327240"/>
           </a:xfrm>
           <a:prstGeom prst="rect">
             <a:avLst/>
@@ -2866,7 +2867,7 @@
         <p:spPr>
           <a:xfrm>
             <a:off x="8079480" y="1505160"/>
-            <a:ext cx="672840" cy="518760"/>
+            <a:ext cx="672480" cy="518400"/>
           </a:xfrm>
           <a:prstGeom prst="rect">
             <a:avLst/>
@@ -2948,8 +2949,8 @@
         </p:blipFill>
         <p:spPr>
           <a:xfrm flipH="1" rot="10800000">
-            <a:off x="8265240" y="908280"/>
-            <a:ext cx="274680" cy="260280"/>
+            <a:off x="8265240" y="908640"/>
+            <a:ext cx="274320" cy="259920"/>
           </a:xfrm>
           <a:prstGeom prst="rect">
             <a:avLst/>
@@ -2968,7 +2969,7 @@
         <p:spPr>
           <a:xfrm>
             <a:off x="264960" y="1491480"/>
-            <a:ext cx="865440" cy="305280"/>
+            <a:ext cx="865080" cy="304920"/>
           </a:xfrm>
           <a:prstGeom prst="rect">
             <a:avLst/>
@@ -3022,7 +3023,7 @@
         <p:spPr>
           <a:xfrm>
             <a:off x="496800" y="1705680"/>
-            <a:ext cx="547200" cy="260640"/>
+            <a:ext cx="546840" cy="260280"/>
           </a:xfrm>
           <a:prstGeom prst="rect">
             <a:avLst/>
@@ -3080,7 +3081,7 @@
         <p:spPr>
           <a:xfrm>
             <a:off x="478080" y="874800"/>
-            <a:ext cx="451080" cy="451440"/>
+            <a:ext cx="450720" cy="451080"/>
           </a:xfrm>
           <a:prstGeom prst="rect">
             <a:avLst/>
@@ -3105,7 +3106,7 @@
         <p:spPr>
           <a:xfrm>
             <a:off x="1459440" y="1820880"/>
-            <a:ext cx="87840" cy="88200"/>
+            <a:ext cx="87480" cy="87840"/>
           </a:xfrm>
           <a:prstGeom prst="rect">
             <a:avLst/>
@@ -3130,7 +3131,7 @@
         <p:spPr>
           <a:xfrm>
             <a:off x="2508840" y="1804680"/>
-            <a:ext cx="87840" cy="88200"/>
+            <a:ext cx="87480" cy="87840"/>
           </a:xfrm>
           <a:prstGeom prst="rect">
             <a:avLst/>
@@ -3155,7 +3156,7 @@
         <p:spPr>
           <a:xfrm>
             <a:off x="3597120" y="1797120"/>
-            <a:ext cx="92160" cy="88200"/>
+            <a:ext cx="91800" cy="87840"/>
           </a:xfrm>
           <a:prstGeom prst="rect">
             <a:avLst/>
@@ -3180,7 +3181,7 @@
         <p:spPr>
           <a:xfrm>
             <a:off x="5893560" y="1816200"/>
-            <a:ext cx="87840" cy="88200"/>
+            <a:ext cx="87480" cy="87840"/>
           </a:xfrm>
           <a:prstGeom prst="rect">
             <a:avLst/>
@@ -3205,7 +3206,7 @@
         <p:spPr>
           <a:xfrm>
             <a:off x="445680" y="1805040"/>
-            <a:ext cx="92160" cy="88200"/>
+            <a:ext cx="91800" cy="87840"/>
           </a:xfrm>
           <a:prstGeom prst="rect">
             <a:avLst/>
@@ -3230,7 +3231,7 @@
         <p:spPr>
           <a:xfrm>
             <a:off x="4745520" y="1801080"/>
-            <a:ext cx="92160" cy="88200"/>
+            <a:ext cx="91800" cy="87840"/>
           </a:xfrm>
           <a:prstGeom prst="rect">
             <a:avLst/>
@@ -3255,7 +3256,7 @@
         <p:spPr>
           <a:xfrm>
             <a:off x="8151120" y="1792080"/>
-            <a:ext cx="92160" cy="88200"/>
+            <a:ext cx="91800" cy="87840"/>
           </a:xfrm>
           <a:prstGeom prst="rect">
             <a:avLst/>
@@ -3280,7 +3281,7 @@
         <p:spPr>
           <a:xfrm>
             <a:off x="7020000" y="1800360"/>
-            <a:ext cx="92160" cy="88200"/>
+            <a:ext cx="91800" cy="87840"/>
           </a:xfrm>
           <a:prstGeom prst="rect">
             <a:avLst/>
@@ -3299,7 +3300,7 @@
         <p:spPr>
           <a:xfrm>
             <a:off x="286920" y="1260000"/>
-            <a:ext cx="843480" cy="451440"/>
+            <a:ext cx="843120" cy="451080"/>
           </a:xfrm>
           <a:prstGeom prst="rect">
             <a:avLst/>
@@ -3353,7 +3354,7 @@
         <p:spPr>
           <a:xfrm>
             <a:off x="5916600" y="4571640"/>
-            <a:ext cx="1151640" cy="349560"/>
+            <a:ext cx="1151280" cy="349200"/>
           </a:xfrm>
           <a:prstGeom prst="rect">
             <a:avLst/>
@@ -3407,7 +3408,7 @@
         <p:spPr>
           <a:xfrm>
             <a:off x="1082520" y="4528440"/>
-            <a:ext cx="5025960" cy="383040"/>
+            <a:ext cx="5025600" cy="382680"/>
           </a:xfrm>
           <a:prstGeom prst="rect">
             <a:avLst/>
@@ -3551,7 +3552,7 @@
         <p:spPr>
           <a:xfrm>
             <a:off x="359640" y="2160000"/>
-            <a:ext cx="3960000" cy="1979640"/>
+            <a:ext cx="3959640" cy="1979280"/>
           </a:xfrm>
           <a:prstGeom prst="rect">
             <a:avLst/>
@@ -3574,7 +3575,7 @@
         <p:spPr>
           <a:xfrm>
             <a:off x="4680000" y="2160000"/>
-            <a:ext cx="4104000" cy="2052000"/>
+            <a:ext cx="4103640" cy="2051640"/>
           </a:xfrm>
           <a:prstGeom prst="rect">
             <a:avLst/>
@@ -3584,6 +3585,1479 @@
           </a:ln>
         </p:spPr>
       </p:pic>
+    </p:spTree>
+  </p:cSld>
+  <mc:AlternateContent>
+    <mc:Choice Requires="p14">
+      <p:transition spd="slow" p14:dur="2000"/>
+    </mc:Choice>
+    <mc:Fallback>
+      <p:transition spd="slow"/>
+    </mc:Fallback>
+  </mc:AlternateContent>
+</p:sld>
+</file>
+
+<file path=ppt/slides/slide2.xml><?xml version="1.0" encoding="utf-8"?>
+<p:sld xmlns:a="http://schemas.openxmlformats.org/drawingml/2006/main" xmlns:p="http://schemas.openxmlformats.org/presentationml/2006/main" xmlns:r="http://schemas.openxmlformats.org/officeDocument/2006/relationships" xmlns:p14="http://schemas.microsoft.com/office/powerpoint/2010/main" xmlns:p15="http://schemas.microsoft.com/office/powerpoint/2012/main" xmlns:mc="http://schemas.openxmlformats.org/markup-compatibility/2006">
+  <p:cSld>
+    <p:spTree>
+      <p:nvGrpSpPr>
+        <p:cNvPr id="1" name=""/>
+        <p:cNvGrpSpPr/>
+        <p:nvPr/>
+      </p:nvGrpSpPr>
+      <p:grpSpPr>
+        <a:xfrm>
+          <a:off x="0" y="0"/>
+          <a:ext cx="0" cy="0"/>
+          <a:chOff x="0" y="0"/>
+          <a:chExt cx="0" cy="0"/>
+        </a:xfrm>
+      </p:grpSpPr>
+      <p:sp>
+        <p:nvSpPr>
+          <p:cNvPr id="76" name=""/>
+          <p:cNvSpPr txBox="1"/>
+          <p:nvPr/>
+        </p:nvSpPr>
+        <p:spPr>
+          <a:xfrm>
+            <a:off x="3420000" y="180000"/>
+            <a:ext cx="2340000" cy="506520"/>
+          </a:xfrm>
+          <a:prstGeom prst="rect">
+            <a:avLst/>
+          </a:prstGeom>
+          <a:noFill/>
+          <a:ln w="0">
+            <a:noFill/>
+          </a:ln>
+        </p:spPr>
+        <p:txBody>
+          <a:bodyPr lIns="90000" rIns="90000" tIns="45000" bIns="45000">
+            <a:noAutofit/>
+          </a:bodyPr>
+          <a:p>
+            <a:pPr algn="ctr"/>
+            <a:r>
+              <a:rPr b="0" lang="pt-BR" sz="2400" spc="-1" strike="noStrike">
+                <a:solidFill>
+                  <a:srgbClr val="222222"/>
+                </a:solidFill>
+                <a:latin typeface="Nunito Sans Black"/>
+              </a:rPr>
+              <a:t>VENDAS</a:t>
+            </a:r>
+            <a:endParaRPr b="0" lang="pt-BR" sz="2400" spc="-1" strike="noStrike">
+              <a:solidFill>
+                <a:srgbClr val="222222"/>
+              </a:solidFill>
+              <a:latin typeface="Nunito Sans Black"/>
+            </a:endParaRPr>
+          </a:p>
+        </p:txBody>
+      </p:sp>
+      <p:sp>
+        <p:nvSpPr>
+          <p:cNvPr id="77" name=""/>
+          <p:cNvSpPr txBox="1"/>
+          <p:nvPr/>
+        </p:nvSpPr>
+        <p:spPr>
+          <a:xfrm>
+            <a:off x="1080000" y="1080000"/>
+            <a:ext cx="1620000" cy="505080"/>
+          </a:xfrm>
+          <a:prstGeom prst="rect">
+            <a:avLst/>
+          </a:prstGeom>
+          <a:noFill/>
+          <a:ln w="0">
+            <a:noFill/>
+          </a:ln>
+        </p:spPr>
+        <p:txBody>
+          <a:bodyPr lIns="90000" rIns="90000" tIns="45000" bIns="45000">
+            <a:noAutofit/>
+          </a:bodyPr>
+          <a:p>
+            <a:pPr algn="ctr"/>
+            <a:r>
+              <a:rPr b="0" lang="pt-BR" sz="1200" spc="-1" strike="noStrike">
+                <a:solidFill>
+                  <a:srgbClr val="222222"/>
+                </a:solidFill>
+                <a:latin typeface="Nunito Sans"/>
+              </a:rPr>
+              <a:t>Número de propostas vendidas</a:t>
+            </a:r>
+            <a:endParaRPr b="0" lang="pt-BR" sz="1200" spc="-1" strike="noStrike">
+              <a:solidFill>
+                <a:srgbClr val="222222"/>
+              </a:solidFill>
+              <a:latin typeface="Nunito Sans"/>
+            </a:endParaRPr>
+          </a:p>
+        </p:txBody>
+      </p:sp>
+      <p:sp>
+        <p:nvSpPr>
+          <p:cNvPr id="78" name=""/>
+          <p:cNvSpPr txBox="1"/>
+          <p:nvPr/>
+        </p:nvSpPr>
+        <p:spPr>
+          <a:xfrm>
+            <a:off x="1080000" y="1585080"/>
+            <a:ext cx="1620000" cy="471240"/>
+          </a:xfrm>
+          <a:prstGeom prst="rect">
+            <a:avLst/>
+          </a:prstGeom>
+          <a:noFill/>
+          <a:ln w="0">
+            <a:noFill/>
+          </a:ln>
+        </p:spPr>
+        <p:txBody>
+          <a:bodyPr lIns="90000" rIns="90000" tIns="45000" bIns="45000">
+            <a:noAutofit/>
+          </a:bodyPr>
+          <a:p>
+            <a:pPr algn="ctr"/>
+            <a:r>
+              <a:rPr b="0" lang="pt-BR" sz="2200" spc="-1" strike="noStrike">
+                <a:solidFill>
+                  <a:srgbClr val="222222"/>
+                </a:solidFill>
+                <a:latin typeface="Nunito Sans Black"/>
+              </a:rPr>
+              <a:t>1.500</a:t>
+            </a:r>
+            <a:endParaRPr b="0" lang="pt-BR" sz="2200" spc="-1" strike="noStrike">
+              <a:solidFill>
+                <a:srgbClr val="222222"/>
+              </a:solidFill>
+              <a:latin typeface="Nunito Sans Black"/>
+            </a:endParaRPr>
+          </a:p>
+        </p:txBody>
+      </p:sp>
+      <p:sp>
+        <p:nvSpPr>
+          <p:cNvPr id="79" name=""/>
+          <p:cNvSpPr txBox="1"/>
+          <p:nvPr/>
+        </p:nvSpPr>
+        <p:spPr>
+          <a:xfrm>
+            <a:off x="1080000" y="2042280"/>
+            <a:ext cx="1620000" cy="297720"/>
+          </a:xfrm>
+          <a:prstGeom prst="rect">
+            <a:avLst/>
+          </a:prstGeom>
+          <a:noFill/>
+          <a:ln w="0">
+            <a:noFill/>
+          </a:ln>
+        </p:spPr>
+        <p:txBody>
+          <a:bodyPr lIns="90000" rIns="90000" tIns="45000" bIns="45000">
+            <a:noAutofit/>
+          </a:bodyPr>
+          <a:p>
+            <a:pPr algn="ctr"/>
+            <a:r>
+              <a:rPr b="0" lang="pt-BR" sz="1200" spc="-1" strike="noStrike">
+                <a:solidFill>
+                  <a:srgbClr val="222222"/>
+                </a:solidFill>
+                <a:latin typeface="Nunito Sans"/>
+              </a:rPr>
+              <a:t>15%</a:t>
+            </a:r>
+            <a:endParaRPr b="0" lang="pt-BR" sz="1200" spc="-1" strike="noStrike">
+              <a:solidFill>
+                <a:srgbClr val="222222"/>
+              </a:solidFill>
+              <a:latin typeface="Nunito Sans"/>
+            </a:endParaRPr>
+          </a:p>
+        </p:txBody>
+      </p:sp>
+      <p:grpSp>
+        <p:nvGrpSpPr>
+          <p:cNvPr id="80" name=""/>
+          <p:cNvGrpSpPr/>
+          <p:nvPr/>
+        </p:nvGrpSpPr>
+        <p:grpSpPr>
+          <a:xfrm>
+            <a:off x="1477800" y="2085480"/>
+            <a:ext cx="132840" cy="179280"/>
+            <a:chOff x="1477800" y="2085480"/>
+            <a:chExt cx="132840" cy="179280"/>
+          </a:xfrm>
+        </p:grpSpPr>
+        <p:sp>
+          <p:nvSpPr>
+            <p:cNvPr id="81" name=""/>
+            <p:cNvSpPr/>
+            <p:nvPr/>
+          </p:nvSpPr>
+          <p:spPr>
+            <a:xfrm>
+              <a:off x="1511280" y="2131920"/>
+              <a:ext cx="66600" cy="132840"/>
+            </a:xfrm>
+            <a:prstGeom prst="rect">
+              <a:avLst/>
+            </a:prstGeom>
+            <a:solidFill>
+              <a:srgbClr val="81d41a"/>
+            </a:solidFill>
+            <a:ln w="0">
+              <a:solidFill>
+                <a:srgbClr val="5eb91e"/>
+              </a:solidFill>
+            </a:ln>
+          </p:spPr>
+          <p:style>
+            <a:lnRef idx="0"/>
+            <a:fillRef idx="0"/>
+            <a:effectRef idx="0"/>
+            <a:fontRef idx="minor"/>
+          </p:style>
+        </p:sp>
+        <p:sp>
+          <p:nvSpPr>
+            <p:cNvPr id="82" name=""/>
+            <p:cNvSpPr/>
+            <p:nvPr/>
+          </p:nvSpPr>
+          <p:spPr>
+            <a:xfrm>
+              <a:off x="1477800" y="2085480"/>
+              <a:ext cx="132840" cy="66600"/>
+            </a:xfrm>
+            <a:custGeom>
+              <a:avLst/>
+              <a:gdLst/>
+              <a:ahLst/>
+              <a:rect l="0" t="0" r="r" b="b"/>
+              <a:pathLst>
+                <a:path w="371" h="187">
+                  <a:moveTo>
+                    <a:pt x="185" y="0"/>
+                  </a:moveTo>
+                  <a:lnTo>
+                    <a:pt x="370" y="186"/>
+                  </a:lnTo>
+                  <a:lnTo>
+                    <a:pt x="0" y="186"/>
+                  </a:lnTo>
+                  <a:lnTo>
+                    <a:pt x="185" y="0"/>
+                  </a:lnTo>
+                </a:path>
+              </a:pathLst>
+            </a:custGeom>
+            <a:solidFill>
+              <a:srgbClr val="81d41a"/>
+            </a:solidFill>
+            <a:ln w="0">
+              <a:noFill/>
+            </a:ln>
+          </p:spPr>
+          <p:style>
+            <a:lnRef idx="0"/>
+            <a:fillRef idx="0"/>
+            <a:effectRef idx="0"/>
+            <a:fontRef idx="minor"/>
+          </p:style>
+        </p:sp>
+      </p:grpSp>
+      <p:sp>
+        <p:nvSpPr>
+          <p:cNvPr id="83" name=""/>
+          <p:cNvSpPr txBox="1"/>
+          <p:nvPr/>
+        </p:nvSpPr>
+        <p:spPr>
+          <a:xfrm>
+            <a:off x="2880000" y="1296000"/>
+            <a:ext cx="1620000" cy="297720"/>
+          </a:xfrm>
+          <a:prstGeom prst="rect">
+            <a:avLst/>
+          </a:prstGeom>
+          <a:noFill/>
+          <a:ln w="0">
+            <a:noFill/>
+          </a:ln>
+        </p:spPr>
+        <p:txBody>
+          <a:bodyPr lIns="90000" rIns="90000" tIns="45000" bIns="45000">
+            <a:noAutofit/>
+          </a:bodyPr>
+          <a:p>
+            <a:pPr algn="ctr"/>
+            <a:r>
+              <a:rPr b="0" lang="pt-BR" sz="1200" spc="-1" strike="noStrike">
+                <a:solidFill>
+                  <a:srgbClr val="222222"/>
+                </a:solidFill>
+                <a:latin typeface="Nunito Sans"/>
+              </a:rPr>
+              <a:t>Valor total vendido</a:t>
+            </a:r>
+            <a:endParaRPr b="0" lang="pt-BR" sz="1200" spc="-1" strike="noStrike">
+              <a:solidFill>
+                <a:srgbClr val="222222"/>
+              </a:solidFill>
+              <a:latin typeface="Nunito Sans"/>
+            </a:endParaRPr>
+          </a:p>
+        </p:txBody>
+      </p:sp>
+      <p:sp>
+        <p:nvSpPr>
+          <p:cNvPr id="84" name=""/>
+          <p:cNvSpPr txBox="1"/>
+          <p:nvPr/>
+        </p:nvSpPr>
+        <p:spPr>
+          <a:xfrm>
+            <a:off x="2736000" y="1585080"/>
+            <a:ext cx="1800000" cy="471240"/>
+          </a:xfrm>
+          <a:prstGeom prst="rect">
+            <a:avLst/>
+          </a:prstGeom>
+          <a:noFill/>
+          <a:ln w="0">
+            <a:noFill/>
+          </a:ln>
+        </p:spPr>
+        <p:txBody>
+          <a:bodyPr lIns="90000" rIns="90000" tIns="45000" bIns="45000">
+            <a:noAutofit/>
+          </a:bodyPr>
+          <a:p>
+            <a:pPr algn="ctr"/>
+            <a:r>
+              <a:rPr b="0" lang="pt-BR" sz="2200" spc="-1" strike="noStrike">
+                <a:solidFill>
+                  <a:srgbClr val="222222"/>
+                </a:solidFill>
+                <a:latin typeface="Nunito Sans Black"/>
+              </a:rPr>
+              <a:t>R$ 20 Mil</a:t>
+            </a:r>
+            <a:endParaRPr b="0" lang="pt-BR" sz="2200" spc="-1" strike="noStrike">
+              <a:solidFill>
+                <a:srgbClr val="222222"/>
+              </a:solidFill>
+              <a:latin typeface="Nunito Sans Black"/>
+            </a:endParaRPr>
+          </a:p>
+        </p:txBody>
+      </p:sp>
+      <p:sp>
+        <p:nvSpPr>
+          <p:cNvPr id="85" name=""/>
+          <p:cNvSpPr txBox="1"/>
+          <p:nvPr/>
+        </p:nvSpPr>
+        <p:spPr>
+          <a:xfrm>
+            <a:off x="2880000" y="2042280"/>
+            <a:ext cx="1620000" cy="297720"/>
+          </a:xfrm>
+          <a:prstGeom prst="rect">
+            <a:avLst/>
+          </a:prstGeom>
+          <a:noFill/>
+          <a:ln w="0">
+            <a:noFill/>
+          </a:ln>
+        </p:spPr>
+        <p:txBody>
+          <a:bodyPr lIns="90000" rIns="90000" tIns="45000" bIns="45000">
+            <a:noAutofit/>
+          </a:bodyPr>
+          <a:p>
+            <a:pPr algn="ctr"/>
+            <a:r>
+              <a:rPr b="0" lang="pt-BR" sz="1200" spc="-1" strike="noStrike">
+                <a:solidFill>
+                  <a:srgbClr val="222222"/>
+                </a:solidFill>
+                <a:latin typeface="Nunito Sans"/>
+              </a:rPr>
+              <a:t>20%</a:t>
+            </a:r>
+            <a:endParaRPr b="0" lang="pt-BR" sz="1200" spc="-1" strike="noStrike">
+              <a:solidFill>
+                <a:srgbClr val="222222"/>
+              </a:solidFill>
+              <a:latin typeface="Nunito Sans"/>
+            </a:endParaRPr>
+          </a:p>
+        </p:txBody>
+      </p:sp>
+      <p:grpSp>
+        <p:nvGrpSpPr>
+          <p:cNvPr id="86" name=""/>
+          <p:cNvGrpSpPr/>
+          <p:nvPr/>
+        </p:nvGrpSpPr>
+        <p:grpSpPr>
+          <a:xfrm>
+            <a:off x="3277800" y="2085480"/>
+            <a:ext cx="132840" cy="179280"/>
+            <a:chOff x="3277800" y="2085480"/>
+            <a:chExt cx="132840" cy="179280"/>
+          </a:xfrm>
+        </p:grpSpPr>
+        <p:sp>
+          <p:nvSpPr>
+            <p:cNvPr id="87" name=""/>
+            <p:cNvSpPr/>
+            <p:nvPr/>
+          </p:nvSpPr>
+          <p:spPr>
+            <a:xfrm>
+              <a:off x="3311280" y="2131920"/>
+              <a:ext cx="66600" cy="132840"/>
+            </a:xfrm>
+            <a:prstGeom prst="rect">
+              <a:avLst/>
+            </a:prstGeom>
+            <a:solidFill>
+              <a:srgbClr val="81d41a"/>
+            </a:solidFill>
+            <a:ln w="0">
+              <a:solidFill>
+                <a:srgbClr val="5eb91e"/>
+              </a:solidFill>
+            </a:ln>
+          </p:spPr>
+          <p:style>
+            <a:lnRef idx="0"/>
+            <a:fillRef idx="0"/>
+            <a:effectRef idx="0"/>
+            <a:fontRef idx="minor"/>
+          </p:style>
+        </p:sp>
+        <p:sp>
+          <p:nvSpPr>
+            <p:cNvPr id="88" name=""/>
+            <p:cNvSpPr/>
+            <p:nvPr/>
+          </p:nvSpPr>
+          <p:spPr>
+            <a:xfrm>
+              <a:off x="3277800" y="2085480"/>
+              <a:ext cx="132840" cy="66600"/>
+            </a:xfrm>
+            <a:custGeom>
+              <a:avLst/>
+              <a:gdLst/>
+              <a:ahLst/>
+              <a:rect l="0" t="0" r="r" b="b"/>
+              <a:pathLst>
+                <a:path w="371" h="187">
+                  <a:moveTo>
+                    <a:pt x="185" y="0"/>
+                  </a:moveTo>
+                  <a:lnTo>
+                    <a:pt x="370" y="186"/>
+                  </a:lnTo>
+                  <a:lnTo>
+                    <a:pt x="0" y="186"/>
+                  </a:lnTo>
+                  <a:lnTo>
+                    <a:pt x="185" y="0"/>
+                  </a:lnTo>
+                </a:path>
+              </a:pathLst>
+            </a:custGeom>
+            <a:solidFill>
+              <a:srgbClr val="81d41a"/>
+            </a:solidFill>
+            <a:ln w="0">
+              <a:noFill/>
+            </a:ln>
+          </p:spPr>
+          <p:style>
+            <a:lnRef idx="0"/>
+            <a:fillRef idx="0"/>
+            <a:effectRef idx="0"/>
+            <a:fontRef idx="minor"/>
+          </p:style>
+        </p:sp>
+      </p:grpSp>
+      <p:sp>
+        <p:nvSpPr>
+          <p:cNvPr id="89" name=""/>
+          <p:cNvSpPr txBox="1"/>
+          <p:nvPr/>
+        </p:nvSpPr>
+        <p:spPr>
+          <a:xfrm>
+            <a:off x="4680000" y="1080000"/>
+            <a:ext cx="1620000" cy="505080"/>
+          </a:xfrm>
+          <a:prstGeom prst="rect">
+            <a:avLst/>
+          </a:prstGeom>
+          <a:noFill/>
+          <a:ln w="0">
+            <a:noFill/>
+          </a:ln>
+        </p:spPr>
+        <p:txBody>
+          <a:bodyPr lIns="90000" rIns="90000" tIns="45000" bIns="45000">
+            <a:noAutofit/>
+          </a:bodyPr>
+          <a:p>
+            <a:pPr algn="ctr"/>
+            <a:r>
+              <a:rPr b="0" lang="pt-BR" sz="1200" spc="-1" strike="noStrike">
+                <a:solidFill>
+                  <a:srgbClr val="222222"/>
+                </a:solidFill>
+                <a:latin typeface="Nunito Sans"/>
+              </a:rPr>
+              <a:t>Taxa de conversão geral</a:t>
+            </a:r>
+            <a:endParaRPr b="0" lang="pt-BR" sz="1200" spc="-1" strike="noStrike">
+              <a:solidFill>
+                <a:srgbClr val="222222"/>
+              </a:solidFill>
+              <a:latin typeface="Nunito Sans"/>
+            </a:endParaRPr>
+          </a:p>
+        </p:txBody>
+      </p:sp>
+      <p:sp>
+        <p:nvSpPr>
+          <p:cNvPr id="90" name=""/>
+          <p:cNvSpPr txBox="1"/>
+          <p:nvPr/>
+        </p:nvSpPr>
+        <p:spPr>
+          <a:xfrm>
+            <a:off x="4680000" y="1585080"/>
+            <a:ext cx="1620000" cy="471240"/>
+          </a:xfrm>
+          <a:prstGeom prst="rect">
+            <a:avLst/>
+          </a:prstGeom>
+          <a:noFill/>
+          <a:ln w="0">
+            <a:noFill/>
+          </a:ln>
+        </p:spPr>
+        <p:txBody>
+          <a:bodyPr lIns="90000" rIns="90000" tIns="45000" bIns="45000">
+            <a:noAutofit/>
+          </a:bodyPr>
+          <a:p>
+            <a:pPr algn="ctr"/>
+            <a:r>
+              <a:rPr b="0" lang="pt-BR" sz="2200" spc="-1" strike="noStrike">
+                <a:solidFill>
+                  <a:srgbClr val="222222"/>
+                </a:solidFill>
+                <a:latin typeface="Nunito Sans Black"/>
+              </a:rPr>
+              <a:t>60%</a:t>
+            </a:r>
+            <a:endParaRPr b="0" lang="pt-BR" sz="2200" spc="-1" strike="noStrike">
+              <a:solidFill>
+                <a:srgbClr val="222222"/>
+              </a:solidFill>
+              <a:latin typeface="Nunito Sans Black"/>
+            </a:endParaRPr>
+          </a:p>
+        </p:txBody>
+      </p:sp>
+      <p:sp>
+        <p:nvSpPr>
+          <p:cNvPr id="91" name=""/>
+          <p:cNvSpPr txBox="1"/>
+          <p:nvPr/>
+        </p:nvSpPr>
+        <p:spPr>
+          <a:xfrm>
+            <a:off x="4680000" y="2042280"/>
+            <a:ext cx="1620000" cy="297720"/>
+          </a:xfrm>
+          <a:prstGeom prst="rect">
+            <a:avLst/>
+          </a:prstGeom>
+          <a:noFill/>
+          <a:ln w="0">
+            <a:noFill/>
+          </a:ln>
+        </p:spPr>
+        <p:txBody>
+          <a:bodyPr lIns="90000" rIns="90000" tIns="45000" bIns="45000">
+            <a:noAutofit/>
+          </a:bodyPr>
+          <a:p>
+            <a:pPr algn="ctr"/>
+            <a:r>
+              <a:rPr b="0" lang="pt-BR" sz="1200" spc="-1" strike="noStrike">
+                <a:solidFill>
+                  <a:srgbClr val="222222"/>
+                </a:solidFill>
+                <a:latin typeface="Nunito Sans"/>
+              </a:rPr>
+              <a:t>15 p.p.</a:t>
+            </a:r>
+            <a:endParaRPr b="0" lang="pt-BR" sz="1200" spc="-1" strike="noStrike">
+              <a:solidFill>
+                <a:srgbClr val="222222"/>
+              </a:solidFill>
+              <a:latin typeface="Nunito Sans"/>
+            </a:endParaRPr>
+          </a:p>
+        </p:txBody>
+      </p:sp>
+      <p:grpSp>
+        <p:nvGrpSpPr>
+          <p:cNvPr id="92" name=""/>
+          <p:cNvGrpSpPr/>
+          <p:nvPr/>
+        </p:nvGrpSpPr>
+        <p:grpSpPr>
+          <a:xfrm>
+            <a:off x="5077800" y="2085480"/>
+            <a:ext cx="132840" cy="179280"/>
+            <a:chOff x="5077800" y="2085480"/>
+            <a:chExt cx="132840" cy="179280"/>
+          </a:xfrm>
+        </p:grpSpPr>
+        <p:sp>
+          <p:nvSpPr>
+            <p:cNvPr id="93" name=""/>
+            <p:cNvSpPr/>
+            <p:nvPr/>
+          </p:nvSpPr>
+          <p:spPr>
+            <a:xfrm>
+              <a:off x="5111280" y="2131920"/>
+              <a:ext cx="66600" cy="132840"/>
+            </a:xfrm>
+            <a:prstGeom prst="rect">
+              <a:avLst/>
+            </a:prstGeom>
+            <a:solidFill>
+              <a:srgbClr val="81d41a"/>
+            </a:solidFill>
+            <a:ln w="0">
+              <a:solidFill>
+                <a:srgbClr val="5eb91e"/>
+              </a:solidFill>
+            </a:ln>
+          </p:spPr>
+          <p:style>
+            <a:lnRef idx="0"/>
+            <a:fillRef idx="0"/>
+            <a:effectRef idx="0"/>
+            <a:fontRef idx="minor"/>
+          </p:style>
+        </p:sp>
+        <p:sp>
+          <p:nvSpPr>
+            <p:cNvPr id="94" name=""/>
+            <p:cNvSpPr/>
+            <p:nvPr/>
+          </p:nvSpPr>
+          <p:spPr>
+            <a:xfrm>
+              <a:off x="5077800" y="2085480"/>
+              <a:ext cx="132840" cy="66600"/>
+            </a:xfrm>
+            <a:custGeom>
+              <a:avLst/>
+              <a:gdLst/>
+              <a:ahLst/>
+              <a:rect l="0" t="0" r="r" b="b"/>
+              <a:pathLst>
+                <a:path w="371" h="187">
+                  <a:moveTo>
+                    <a:pt x="185" y="0"/>
+                  </a:moveTo>
+                  <a:lnTo>
+                    <a:pt x="370" y="186"/>
+                  </a:lnTo>
+                  <a:lnTo>
+                    <a:pt x="0" y="186"/>
+                  </a:lnTo>
+                  <a:lnTo>
+                    <a:pt x="185" y="0"/>
+                  </a:lnTo>
+                </a:path>
+              </a:pathLst>
+            </a:custGeom>
+            <a:solidFill>
+              <a:srgbClr val="81d41a"/>
+            </a:solidFill>
+            <a:ln w="0">
+              <a:noFill/>
+            </a:ln>
+          </p:spPr>
+          <p:style>
+            <a:lnRef idx="0"/>
+            <a:fillRef idx="0"/>
+            <a:effectRef idx="0"/>
+            <a:fontRef idx="minor"/>
+          </p:style>
+        </p:sp>
+      </p:grpSp>
+      <p:sp>
+        <p:nvSpPr>
+          <p:cNvPr id="95" name=""/>
+          <p:cNvSpPr txBox="1"/>
+          <p:nvPr/>
+        </p:nvSpPr>
+        <p:spPr>
+          <a:xfrm>
+            <a:off x="6480000" y="1080000"/>
+            <a:ext cx="1620000" cy="505080"/>
+          </a:xfrm>
+          <a:prstGeom prst="rect">
+            <a:avLst/>
+          </a:prstGeom>
+          <a:noFill/>
+          <a:ln w="0">
+            <a:noFill/>
+          </a:ln>
+        </p:spPr>
+        <p:txBody>
+          <a:bodyPr lIns="90000" rIns="90000" tIns="45000" bIns="45000">
+            <a:noAutofit/>
+          </a:bodyPr>
+          <a:p>
+            <a:pPr algn="ctr"/>
+            <a:r>
+              <a:rPr b="0" lang="pt-BR" sz="1200" spc="-1" strike="noStrike">
+                <a:solidFill>
+                  <a:srgbClr val="222222"/>
+                </a:solidFill>
+                <a:latin typeface="Nunito Sans"/>
+              </a:rPr>
+              <a:t>Taxa de sucesso nas chamadas de API</a:t>
+            </a:r>
+            <a:endParaRPr b="0" lang="pt-BR" sz="1200" spc="-1" strike="noStrike">
+              <a:solidFill>
+                <a:srgbClr val="222222"/>
+              </a:solidFill>
+              <a:latin typeface="Nunito Sans"/>
+            </a:endParaRPr>
+          </a:p>
+        </p:txBody>
+      </p:sp>
+      <p:sp>
+        <p:nvSpPr>
+          <p:cNvPr id="96" name=""/>
+          <p:cNvSpPr txBox="1"/>
+          <p:nvPr/>
+        </p:nvSpPr>
+        <p:spPr>
+          <a:xfrm>
+            <a:off x="6336000" y="1585080"/>
+            <a:ext cx="1800000" cy="471240"/>
+          </a:xfrm>
+          <a:prstGeom prst="rect">
+            <a:avLst/>
+          </a:prstGeom>
+          <a:noFill/>
+          <a:ln w="0">
+            <a:noFill/>
+          </a:ln>
+        </p:spPr>
+        <p:txBody>
+          <a:bodyPr lIns="90000" rIns="90000" tIns="45000" bIns="45000">
+            <a:noAutofit/>
+          </a:bodyPr>
+          <a:p>
+            <a:pPr algn="ctr"/>
+            <a:r>
+              <a:rPr b="0" lang="pt-BR" sz="2200" spc="-1" strike="noStrike">
+                <a:solidFill>
+                  <a:srgbClr val="222222"/>
+                </a:solidFill>
+                <a:latin typeface="Nunito Sans Black"/>
+              </a:rPr>
+              <a:t>90%</a:t>
+            </a:r>
+            <a:endParaRPr b="0" lang="pt-BR" sz="2200" spc="-1" strike="noStrike">
+              <a:solidFill>
+                <a:srgbClr val="222222"/>
+              </a:solidFill>
+              <a:latin typeface="Nunito Sans Black"/>
+            </a:endParaRPr>
+          </a:p>
+        </p:txBody>
+      </p:sp>
+      <p:sp>
+        <p:nvSpPr>
+          <p:cNvPr id="97" name=""/>
+          <p:cNvSpPr txBox="1"/>
+          <p:nvPr/>
+        </p:nvSpPr>
+        <p:spPr>
+          <a:xfrm>
+            <a:off x="6480000" y="2042280"/>
+            <a:ext cx="1620000" cy="297720"/>
+          </a:xfrm>
+          <a:prstGeom prst="rect">
+            <a:avLst/>
+          </a:prstGeom>
+          <a:noFill/>
+          <a:ln w="0">
+            <a:noFill/>
+          </a:ln>
+        </p:spPr>
+        <p:txBody>
+          <a:bodyPr lIns="90000" rIns="90000" tIns="45000" bIns="45000">
+            <a:noAutofit/>
+          </a:bodyPr>
+          <a:p>
+            <a:pPr algn="ctr"/>
+            <a:r>
+              <a:rPr b="0" lang="pt-BR" sz="1200" spc="-1" strike="noStrike">
+                <a:solidFill>
+                  <a:srgbClr val="222222"/>
+                </a:solidFill>
+                <a:latin typeface="Nunito Sans"/>
+              </a:rPr>
+              <a:t>40 p.p.</a:t>
+            </a:r>
+            <a:endParaRPr b="0" lang="pt-BR" sz="1200" spc="-1" strike="noStrike">
+              <a:solidFill>
+                <a:srgbClr val="222222"/>
+              </a:solidFill>
+              <a:latin typeface="Nunito Sans"/>
+            </a:endParaRPr>
+          </a:p>
+        </p:txBody>
+      </p:sp>
+      <p:grpSp>
+        <p:nvGrpSpPr>
+          <p:cNvPr id="98" name=""/>
+          <p:cNvGrpSpPr/>
+          <p:nvPr/>
+        </p:nvGrpSpPr>
+        <p:grpSpPr>
+          <a:xfrm>
+            <a:off x="6877800" y="2085480"/>
+            <a:ext cx="132840" cy="179280"/>
+            <a:chOff x="6877800" y="2085480"/>
+            <a:chExt cx="132840" cy="179280"/>
+          </a:xfrm>
+        </p:grpSpPr>
+        <p:sp>
+          <p:nvSpPr>
+            <p:cNvPr id="99" name=""/>
+            <p:cNvSpPr/>
+            <p:nvPr/>
+          </p:nvSpPr>
+          <p:spPr>
+            <a:xfrm>
+              <a:off x="6911280" y="2131920"/>
+              <a:ext cx="66600" cy="132840"/>
+            </a:xfrm>
+            <a:prstGeom prst="rect">
+              <a:avLst/>
+            </a:prstGeom>
+            <a:solidFill>
+              <a:srgbClr val="81d41a"/>
+            </a:solidFill>
+            <a:ln w="0">
+              <a:solidFill>
+                <a:srgbClr val="5eb91e"/>
+              </a:solidFill>
+            </a:ln>
+          </p:spPr>
+          <p:style>
+            <a:lnRef idx="0"/>
+            <a:fillRef idx="0"/>
+            <a:effectRef idx="0"/>
+            <a:fontRef idx="minor"/>
+          </p:style>
+        </p:sp>
+        <p:sp>
+          <p:nvSpPr>
+            <p:cNvPr id="100" name=""/>
+            <p:cNvSpPr/>
+            <p:nvPr/>
+          </p:nvSpPr>
+          <p:spPr>
+            <a:xfrm>
+              <a:off x="6877800" y="2085480"/>
+              <a:ext cx="132840" cy="66600"/>
+            </a:xfrm>
+            <a:custGeom>
+              <a:avLst/>
+              <a:gdLst/>
+              <a:ahLst/>
+              <a:rect l="0" t="0" r="r" b="b"/>
+              <a:pathLst>
+                <a:path w="371" h="187">
+                  <a:moveTo>
+                    <a:pt x="185" y="0"/>
+                  </a:moveTo>
+                  <a:lnTo>
+                    <a:pt x="370" y="186"/>
+                  </a:lnTo>
+                  <a:lnTo>
+                    <a:pt x="0" y="186"/>
+                  </a:lnTo>
+                  <a:lnTo>
+                    <a:pt x="185" y="0"/>
+                  </a:lnTo>
+                </a:path>
+              </a:pathLst>
+            </a:custGeom>
+            <a:solidFill>
+              <a:srgbClr val="81d41a"/>
+            </a:solidFill>
+            <a:ln w="0">
+              <a:noFill/>
+            </a:ln>
+          </p:spPr>
+          <p:style>
+            <a:lnRef idx="0"/>
+            <a:fillRef idx="0"/>
+            <a:effectRef idx="0"/>
+            <a:fontRef idx="minor"/>
+          </p:style>
+        </p:sp>
+      </p:grpSp>
+      <p:sp>
+        <p:nvSpPr>
+          <p:cNvPr id="101" name=""/>
+          <p:cNvSpPr txBox="1"/>
+          <p:nvPr/>
+        </p:nvSpPr>
+        <p:spPr>
+          <a:xfrm>
+            <a:off x="1548000" y="3240000"/>
+            <a:ext cx="1620000" cy="297720"/>
+          </a:xfrm>
+          <a:prstGeom prst="rect">
+            <a:avLst/>
+          </a:prstGeom>
+          <a:noFill/>
+          <a:ln w="0">
+            <a:noFill/>
+          </a:ln>
+        </p:spPr>
+        <p:txBody>
+          <a:bodyPr lIns="90000" rIns="90000" tIns="45000" bIns="45000">
+            <a:noAutofit/>
+          </a:bodyPr>
+          <a:p>
+            <a:pPr algn="ctr"/>
+            <a:r>
+              <a:rPr b="0" lang="pt-BR" sz="1200" spc="-1" strike="noStrike">
+                <a:solidFill>
+                  <a:srgbClr val="222222"/>
+                </a:solidFill>
+                <a:latin typeface="Nunito Sans"/>
+              </a:rPr>
+              <a:t>Consignado</a:t>
+            </a:r>
+            <a:endParaRPr b="0" lang="pt-BR" sz="1200" spc="-1" strike="noStrike">
+              <a:solidFill>
+                <a:srgbClr val="222222"/>
+              </a:solidFill>
+              <a:latin typeface="Nunito Sans"/>
+            </a:endParaRPr>
+          </a:p>
+        </p:txBody>
+      </p:sp>
+      <p:sp>
+        <p:nvSpPr>
+          <p:cNvPr id="102" name=""/>
+          <p:cNvSpPr txBox="1"/>
+          <p:nvPr/>
+        </p:nvSpPr>
+        <p:spPr>
+          <a:xfrm>
+            <a:off x="1404000" y="3565080"/>
+            <a:ext cx="1800000" cy="471240"/>
+          </a:xfrm>
+          <a:prstGeom prst="rect">
+            <a:avLst/>
+          </a:prstGeom>
+          <a:noFill/>
+          <a:ln w="0">
+            <a:noFill/>
+          </a:ln>
+        </p:spPr>
+        <p:txBody>
+          <a:bodyPr lIns="90000" rIns="90000" tIns="45000" bIns="45000">
+            <a:noAutofit/>
+          </a:bodyPr>
+          <a:p>
+            <a:pPr algn="ctr"/>
+            <a:r>
+              <a:rPr b="0" lang="pt-BR" sz="2200" spc="-1" strike="noStrike">
+                <a:solidFill>
+                  <a:srgbClr val="222222"/>
+                </a:solidFill>
+                <a:latin typeface="Nunito Sans Black"/>
+              </a:rPr>
+              <a:t>R$ 8 Mil</a:t>
+            </a:r>
+            <a:endParaRPr b="0" lang="pt-BR" sz="2200" spc="-1" strike="noStrike">
+              <a:solidFill>
+                <a:srgbClr val="222222"/>
+              </a:solidFill>
+              <a:latin typeface="Nunito Sans Black"/>
+            </a:endParaRPr>
+          </a:p>
+        </p:txBody>
+      </p:sp>
+      <p:sp>
+        <p:nvSpPr>
+          <p:cNvPr id="103" name=""/>
+          <p:cNvSpPr txBox="1"/>
+          <p:nvPr/>
+        </p:nvSpPr>
+        <p:spPr>
+          <a:xfrm>
+            <a:off x="1548000" y="4022280"/>
+            <a:ext cx="1620000" cy="297720"/>
+          </a:xfrm>
+          <a:prstGeom prst="rect">
+            <a:avLst/>
+          </a:prstGeom>
+          <a:noFill/>
+          <a:ln w="0">
+            <a:noFill/>
+          </a:ln>
+        </p:spPr>
+        <p:txBody>
+          <a:bodyPr lIns="90000" rIns="90000" tIns="45000" bIns="45000">
+            <a:noAutofit/>
+          </a:bodyPr>
+          <a:p>
+            <a:pPr algn="ctr"/>
+            <a:r>
+              <a:rPr b="0" lang="pt-BR" sz="1200" spc="-1" strike="noStrike">
+                <a:solidFill>
+                  <a:srgbClr val="222222"/>
+                </a:solidFill>
+                <a:latin typeface="Nunito Sans"/>
+              </a:rPr>
+              <a:t>5%</a:t>
+            </a:r>
+            <a:endParaRPr b="0" lang="pt-BR" sz="1200" spc="-1" strike="noStrike">
+              <a:solidFill>
+                <a:srgbClr val="222222"/>
+              </a:solidFill>
+              <a:latin typeface="Nunito Sans"/>
+            </a:endParaRPr>
+          </a:p>
+        </p:txBody>
+      </p:sp>
+      <p:grpSp>
+        <p:nvGrpSpPr>
+          <p:cNvPr id="104" name=""/>
+          <p:cNvGrpSpPr/>
+          <p:nvPr/>
+        </p:nvGrpSpPr>
+        <p:grpSpPr>
+          <a:xfrm>
+            <a:off x="2017800" y="4065480"/>
+            <a:ext cx="132840" cy="179280"/>
+            <a:chOff x="2017800" y="4065480"/>
+            <a:chExt cx="132840" cy="179280"/>
+          </a:xfrm>
+        </p:grpSpPr>
+        <p:sp>
+          <p:nvSpPr>
+            <p:cNvPr id="105" name=""/>
+            <p:cNvSpPr/>
+            <p:nvPr/>
+          </p:nvSpPr>
+          <p:spPr>
+            <a:xfrm flipV="1">
+              <a:off x="2051280" y="4065120"/>
+              <a:ext cx="66600" cy="132840"/>
+            </a:xfrm>
+            <a:prstGeom prst="rect">
+              <a:avLst/>
+            </a:prstGeom>
+            <a:solidFill>
+              <a:srgbClr val="fc2626"/>
+            </a:solidFill>
+            <a:ln w="0">
+              <a:solidFill>
+                <a:srgbClr val="fc2626"/>
+              </a:solidFill>
+            </a:ln>
+          </p:spPr>
+          <p:style>
+            <a:lnRef idx="0"/>
+            <a:fillRef idx="0"/>
+            <a:effectRef idx="0"/>
+            <a:fontRef idx="minor"/>
+          </p:style>
+        </p:sp>
+        <p:sp>
+          <p:nvSpPr>
+            <p:cNvPr id="106" name=""/>
+            <p:cNvSpPr/>
+            <p:nvPr/>
+          </p:nvSpPr>
+          <p:spPr>
+            <a:xfrm>
+              <a:off x="2017800" y="4177800"/>
+              <a:ext cx="132840" cy="66600"/>
+            </a:xfrm>
+            <a:custGeom>
+              <a:avLst/>
+              <a:gdLst/>
+              <a:ahLst/>
+              <a:rect l="0" t="0" r="r" b="b"/>
+              <a:pathLst>
+                <a:path w="371" h="187">
+                  <a:moveTo>
+                    <a:pt x="185" y="186"/>
+                  </a:moveTo>
+                  <a:lnTo>
+                    <a:pt x="370" y="0"/>
+                  </a:lnTo>
+                  <a:lnTo>
+                    <a:pt x="0" y="0"/>
+                  </a:lnTo>
+                  <a:lnTo>
+                    <a:pt x="185" y="186"/>
+                  </a:lnTo>
+                </a:path>
+              </a:pathLst>
+            </a:custGeom>
+            <a:solidFill>
+              <a:srgbClr val="fc2626"/>
+            </a:solidFill>
+            <a:ln w="0">
+              <a:noFill/>
+            </a:ln>
+          </p:spPr>
+          <p:style>
+            <a:lnRef idx="0"/>
+            <a:fillRef idx="0"/>
+            <a:effectRef idx="0"/>
+            <a:fontRef idx="minor"/>
+          </p:style>
+        </p:sp>
+      </p:grpSp>
+      <p:sp>
+        <p:nvSpPr>
+          <p:cNvPr id="107" name=""/>
+          <p:cNvSpPr txBox="1"/>
+          <p:nvPr/>
+        </p:nvSpPr>
+        <p:spPr>
+          <a:xfrm>
+            <a:off x="3888000" y="3060000"/>
+            <a:ext cx="1620000" cy="505080"/>
+          </a:xfrm>
+          <a:prstGeom prst="rect">
+            <a:avLst/>
+          </a:prstGeom>
+          <a:noFill/>
+          <a:ln w="0">
+            <a:noFill/>
+          </a:ln>
+        </p:spPr>
+        <p:txBody>
+          <a:bodyPr lIns="90000" rIns="90000" tIns="45000" bIns="45000">
+            <a:noAutofit/>
+          </a:bodyPr>
+          <a:p>
+            <a:pPr algn="ctr"/>
+            <a:r>
+              <a:rPr b="0" lang="pt-BR" sz="1200" spc="-1" strike="noStrike">
+                <a:solidFill>
+                  <a:srgbClr val="222222"/>
+                </a:solidFill>
+                <a:latin typeface="Nunito Sans"/>
+              </a:rPr>
+              <a:t>Com garantia</a:t>
+            </a:r>
+            <a:endParaRPr b="0" lang="pt-BR" sz="1200" spc="-1" strike="noStrike">
+              <a:solidFill>
+                <a:srgbClr val="222222"/>
+              </a:solidFill>
+              <a:latin typeface="Nunito Sans"/>
+            </a:endParaRPr>
+          </a:p>
+          <a:p>
+            <a:pPr algn="ctr"/>
+            <a:r>
+              <a:rPr b="0" lang="pt-BR" sz="1200" spc="-1" strike="noStrike">
+                <a:solidFill>
+                  <a:srgbClr val="222222"/>
+                </a:solidFill>
+                <a:latin typeface="Nunito Sans"/>
+              </a:rPr>
+              <a:t>Sobre veículos</a:t>
+            </a:r>
+            <a:endParaRPr b="0" lang="pt-BR" sz="1200" spc="-1" strike="noStrike">
+              <a:solidFill>
+                <a:srgbClr val="222222"/>
+              </a:solidFill>
+              <a:latin typeface="Nunito Sans"/>
+            </a:endParaRPr>
+          </a:p>
+        </p:txBody>
+      </p:sp>
+      <p:sp>
+        <p:nvSpPr>
+          <p:cNvPr id="108" name=""/>
+          <p:cNvSpPr txBox="1"/>
+          <p:nvPr/>
+        </p:nvSpPr>
+        <p:spPr>
+          <a:xfrm>
+            <a:off x="3744000" y="3565080"/>
+            <a:ext cx="1800000" cy="471240"/>
+          </a:xfrm>
+          <a:prstGeom prst="rect">
+            <a:avLst/>
+          </a:prstGeom>
+          <a:noFill/>
+          <a:ln w="0">
+            <a:noFill/>
+          </a:ln>
+        </p:spPr>
+        <p:txBody>
+          <a:bodyPr lIns="90000" rIns="90000" tIns="45000" bIns="45000">
+            <a:noAutofit/>
+          </a:bodyPr>
+          <a:p>
+            <a:pPr algn="ctr"/>
+            <a:r>
+              <a:rPr b="0" lang="pt-BR" sz="2200" spc="-1" strike="noStrike">
+                <a:solidFill>
+                  <a:srgbClr val="222222"/>
+                </a:solidFill>
+                <a:latin typeface="Nunito Sans Black"/>
+              </a:rPr>
+              <a:t>R$ 12 Mil</a:t>
+            </a:r>
+            <a:endParaRPr b="0" lang="pt-BR" sz="2200" spc="-1" strike="noStrike">
+              <a:solidFill>
+                <a:srgbClr val="222222"/>
+              </a:solidFill>
+              <a:latin typeface="Nunito Sans Black"/>
+            </a:endParaRPr>
+          </a:p>
+        </p:txBody>
+      </p:sp>
+      <p:sp>
+        <p:nvSpPr>
+          <p:cNvPr id="109" name=""/>
+          <p:cNvSpPr txBox="1"/>
+          <p:nvPr/>
+        </p:nvSpPr>
+        <p:spPr>
+          <a:xfrm>
+            <a:off x="3888000" y="4022280"/>
+            <a:ext cx="1620000" cy="297720"/>
+          </a:xfrm>
+          <a:prstGeom prst="rect">
+            <a:avLst/>
+          </a:prstGeom>
+          <a:noFill/>
+          <a:ln w="0">
+            <a:noFill/>
+          </a:ln>
+        </p:spPr>
+        <p:txBody>
+          <a:bodyPr lIns="90000" rIns="90000" tIns="45000" bIns="45000">
+            <a:noAutofit/>
+          </a:bodyPr>
+          <a:p>
+            <a:pPr algn="ctr"/>
+            <a:r>
+              <a:rPr b="0" lang="pt-BR" sz="1200" spc="-1" strike="noStrike">
+                <a:solidFill>
+                  <a:srgbClr val="222222"/>
+                </a:solidFill>
+                <a:latin typeface="Nunito Sans"/>
+              </a:rPr>
+              <a:t>100%</a:t>
+            </a:r>
+            <a:endParaRPr b="0" lang="pt-BR" sz="1200" spc="-1" strike="noStrike">
+              <a:solidFill>
+                <a:srgbClr val="222222"/>
+              </a:solidFill>
+              <a:latin typeface="Nunito Sans"/>
+            </a:endParaRPr>
+          </a:p>
+        </p:txBody>
+      </p:sp>
+      <p:grpSp>
+        <p:nvGrpSpPr>
+          <p:cNvPr id="110" name=""/>
+          <p:cNvGrpSpPr/>
+          <p:nvPr/>
+        </p:nvGrpSpPr>
+        <p:grpSpPr>
+          <a:xfrm>
+            <a:off x="4285800" y="4065480"/>
+            <a:ext cx="132840" cy="179280"/>
+            <a:chOff x="4285800" y="4065480"/>
+            <a:chExt cx="132840" cy="179280"/>
+          </a:xfrm>
+        </p:grpSpPr>
+        <p:sp>
+          <p:nvSpPr>
+            <p:cNvPr id="111" name=""/>
+            <p:cNvSpPr/>
+            <p:nvPr/>
+          </p:nvSpPr>
+          <p:spPr>
+            <a:xfrm>
+              <a:off x="4319280" y="4111920"/>
+              <a:ext cx="66600" cy="132840"/>
+            </a:xfrm>
+            <a:prstGeom prst="rect">
+              <a:avLst/>
+            </a:prstGeom>
+            <a:solidFill>
+              <a:srgbClr val="81d41a"/>
+            </a:solidFill>
+            <a:ln w="0">
+              <a:solidFill>
+                <a:srgbClr val="5eb91e"/>
+              </a:solidFill>
+            </a:ln>
+          </p:spPr>
+          <p:style>
+            <a:lnRef idx="0"/>
+            <a:fillRef idx="0"/>
+            <a:effectRef idx="0"/>
+            <a:fontRef idx="minor"/>
+          </p:style>
+        </p:sp>
+        <p:sp>
+          <p:nvSpPr>
+            <p:cNvPr id="112" name=""/>
+            <p:cNvSpPr/>
+            <p:nvPr/>
+          </p:nvSpPr>
+          <p:spPr>
+            <a:xfrm>
+              <a:off x="4285800" y="4065480"/>
+              <a:ext cx="132840" cy="66600"/>
+            </a:xfrm>
+            <a:custGeom>
+              <a:avLst/>
+              <a:gdLst/>
+              <a:ahLst/>
+              <a:rect l="0" t="0" r="r" b="b"/>
+              <a:pathLst>
+                <a:path w="371" h="187">
+                  <a:moveTo>
+                    <a:pt x="185" y="0"/>
+                  </a:moveTo>
+                  <a:lnTo>
+                    <a:pt x="370" y="186"/>
+                  </a:lnTo>
+                  <a:lnTo>
+                    <a:pt x="0" y="186"/>
+                  </a:lnTo>
+                  <a:lnTo>
+                    <a:pt x="185" y="0"/>
+                  </a:lnTo>
+                </a:path>
+              </a:pathLst>
+            </a:custGeom>
+            <a:solidFill>
+              <a:srgbClr val="81d41a"/>
+            </a:solidFill>
+            <a:ln w="0">
+              <a:noFill/>
+            </a:ln>
+          </p:spPr>
+          <p:style>
+            <a:lnRef idx="0"/>
+            <a:fillRef idx="0"/>
+            <a:effectRef idx="0"/>
+            <a:fontRef idx="minor"/>
+          </p:style>
+        </p:sp>
+      </p:grpSp>
+      <p:sp>
+        <p:nvSpPr>
+          <p:cNvPr id="113" name=""/>
+          <p:cNvSpPr/>
+          <p:nvPr/>
+        </p:nvSpPr>
+        <p:spPr>
+          <a:xfrm>
+            <a:off x="3996000" y="2412000"/>
+            <a:ext cx="360000" cy="540000"/>
+          </a:xfrm>
+          <a:prstGeom prst="line">
+            <a:avLst/>
+          </a:prstGeom>
+          <a:ln w="0">
+            <a:solidFill>
+              <a:srgbClr val="222222"/>
+            </a:solidFill>
+            <a:tailEnd len="med" type="triangle" w="med"/>
+          </a:ln>
+        </p:spPr>
+        <p:style>
+          <a:lnRef idx="0"/>
+          <a:fillRef idx="0"/>
+          <a:effectRef idx="0"/>
+          <a:fontRef idx="minor"/>
+        </p:style>
+      </p:sp>
+      <p:sp>
+        <p:nvSpPr>
+          <p:cNvPr id="114" name=""/>
+          <p:cNvSpPr/>
+          <p:nvPr/>
+        </p:nvSpPr>
+        <p:spPr>
+          <a:xfrm flipH="1">
+            <a:off x="2700000" y="2412000"/>
+            <a:ext cx="540000" cy="648000"/>
+          </a:xfrm>
+          <a:prstGeom prst="line">
+            <a:avLst/>
+          </a:prstGeom>
+          <a:ln w="0">
+            <a:solidFill>
+              <a:srgbClr val="222222"/>
+            </a:solidFill>
+            <a:tailEnd len="med" type="triangle" w="med"/>
+          </a:ln>
+        </p:spPr>
+        <p:style>
+          <a:lnRef idx="0"/>
+          <a:fillRef idx="0"/>
+          <a:effectRef idx="0"/>
+          <a:fontRef idx="minor"/>
+        </p:style>
+      </p:sp>
     </p:spTree>
   </p:cSld>
   <mc:AlternateContent>

</xml_diff>

<commit_message>
Add more slides to ppt
</commit_message>
<xml_diff>
--- a/posts/2023/2023-01-20-storytelling/report-exemplo.pptx
+++ b/posts/2023/2023-01-20-storytelling/report-exemplo.pptx
@@ -7,6 +7,8 @@
   <p:sldIdLst>
     <p:sldId id="256" r:id="rId3"/>
     <p:sldId id="257" r:id="rId4"/>
+    <p:sldId id="258" r:id="rId5"/>
+    <p:sldId id="259" r:id="rId6"/>
   </p:sldIdLst>
   <p:sldSz cx="9144000" cy="5145087"/>
   <p:notesSz cx="7559675" cy="10691812"/>
@@ -1654,7 +1656,7 @@
         <p:spPr>
           <a:xfrm>
             <a:off x="3715200" y="919800"/>
-            <a:ext cx="235440" cy="259560"/>
+            <a:ext cx="235080" cy="259200"/>
           </a:xfrm>
           <a:prstGeom prst="rect">
             <a:avLst/>
@@ -1673,7 +1675,7 @@
         <p:spPr>
           <a:xfrm>
             <a:off x="3202920" y="1189440"/>
-            <a:ext cx="1263960" cy="538920"/>
+            <a:ext cx="1263600" cy="538560"/>
           </a:xfrm>
           <a:prstGeom prst="rect">
             <a:avLst/>
@@ -1750,7 +1752,7 @@
         <p:spPr>
           <a:xfrm>
             <a:off x="1275480" y="1187280"/>
-            <a:ext cx="843120" cy="451080"/>
+            <a:ext cx="842760" cy="450720"/>
           </a:xfrm>
           <a:prstGeom prst="rect">
             <a:avLst/>
@@ -1833,7 +1835,7 @@
         <p:spPr>
           <a:xfrm>
             <a:off x="1608120" y="939240"/>
-            <a:ext cx="178920" cy="248400"/>
+            <a:ext cx="178560" cy="248040"/>
           </a:xfrm>
           <a:prstGeom prst="rect">
             <a:avLst/>
@@ -1852,7 +1854,7 @@
         <p:spPr>
           <a:xfrm>
             <a:off x="2276280" y="1191600"/>
-            <a:ext cx="923040" cy="259560"/>
+            <a:ext cx="922680" cy="259200"/>
           </a:xfrm>
           <a:prstGeom prst="rect">
             <a:avLst/>
@@ -1935,7 +1937,7 @@
         <p:spPr>
           <a:xfrm>
             <a:off x="2643840" y="851760"/>
-            <a:ext cx="341640" cy="327240"/>
+            <a:ext cx="341280" cy="326880"/>
           </a:xfrm>
           <a:prstGeom prst="rect">
             <a:avLst/>
@@ -1954,7 +1956,7 @@
         <p:spPr>
           <a:xfrm>
             <a:off x="4300200" y="1191600"/>
-            <a:ext cx="1298880" cy="510480"/>
+            <a:ext cx="1298520" cy="510120"/>
           </a:xfrm>
           <a:prstGeom prst="rect">
             <a:avLst/>
@@ -2047,7 +2049,7 @@
         <p:spPr>
           <a:xfrm>
             <a:off x="4790160" y="898560"/>
-            <a:ext cx="341640" cy="297360"/>
+            <a:ext cx="341280" cy="297000"/>
           </a:xfrm>
           <a:prstGeom prst="rect">
             <a:avLst/>
@@ -2066,7 +2068,7 @@
         <p:spPr>
           <a:xfrm>
             <a:off x="3356640" y="1523160"/>
-            <a:ext cx="923040" cy="407520"/>
+            <a:ext cx="922680" cy="407160"/>
           </a:xfrm>
           <a:prstGeom prst="rect">
             <a:avLst/>
@@ -2153,7 +2155,7 @@
         <p:spPr>
           <a:xfrm>
             <a:off x="4312080" y="1525680"/>
-            <a:ext cx="1298880" cy="407520"/>
+            <a:ext cx="1298520" cy="407160"/>
           </a:xfrm>
           <a:prstGeom prst="rect">
             <a:avLst/>
@@ -2246,7 +2248,7 @@
         <p:spPr>
           <a:xfrm>
             <a:off x="5986080" y="927360"/>
-            <a:ext cx="289080" cy="257400"/>
+            <a:ext cx="288720" cy="257040"/>
           </a:xfrm>
           <a:prstGeom prst="rect">
             <a:avLst/>
@@ -2265,7 +2267,7 @@
         <p:spPr>
           <a:xfrm>
             <a:off x="5658840" y="1190880"/>
-            <a:ext cx="960840" cy="382680"/>
+            <a:ext cx="960480" cy="382320"/>
           </a:xfrm>
           <a:prstGeom prst="rect">
             <a:avLst/>
@@ -2319,7 +2321,7 @@
         <p:spPr>
           <a:xfrm>
             <a:off x="2282760" y="1523880"/>
-            <a:ext cx="923040" cy="451080"/>
+            <a:ext cx="922680" cy="450720"/>
           </a:xfrm>
           <a:prstGeom prst="rect">
             <a:avLst/>
@@ -2406,7 +2408,7 @@
         <p:spPr>
           <a:xfrm>
             <a:off x="1327320" y="1532160"/>
-            <a:ext cx="713520" cy="451080"/>
+            <a:ext cx="713160" cy="450720"/>
           </a:xfrm>
           <a:prstGeom prst="rect">
             <a:avLst/>
@@ -2493,7 +2495,7 @@
         <p:spPr>
           <a:xfrm>
             <a:off x="5726160" y="1526400"/>
-            <a:ext cx="843120" cy="407520"/>
+            <a:ext cx="842760" cy="407160"/>
           </a:xfrm>
           <a:prstGeom prst="rect">
             <a:avLst/>
@@ -2580,7 +2582,7 @@
         <p:spPr>
           <a:xfrm>
             <a:off x="3243960" y="290520"/>
-            <a:ext cx="2512080" cy="490680"/>
+            <a:ext cx="2511720" cy="490320"/>
           </a:xfrm>
           <a:prstGeom prst="rect">
             <a:avLst/>
@@ -2634,7 +2636,7 @@
         <p:spPr>
           <a:xfrm>
             <a:off x="6982200" y="1521720"/>
-            <a:ext cx="661680" cy="479520"/>
+            <a:ext cx="661320" cy="479160"/>
           </a:xfrm>
           <a:prstGeom prst="rect">
             <a:avLst/>
@@ -2711,7 +2713,7 @@
         <p:spPr>
           <a:xfrm>
             <a:off x="6391800" y="1190880"/>
-            <a:ext cx="1742040" cy="470520"/>
+            <a:ext cx="1741680" cy="470160"/>
           </a:xfrm>
           <a:prstGeom prst="rect">
             <a:avLst/>
@@ -2794,7 +2796,7 @@
         <p:spPr>
           <a:xfrm>
             <a:off x="7130160" y="919800"/>
-            <a:ext cx="288720" cy="271440"/>
+            <a:ext cx="288360" cy="271080"/>
           </a:xfrm>
           <a:prstGeom prst="rect">
             <a:avLst/>
@@ -2813,7 +2815,7 @@
         <p:spPr>
           <a:xfrm>
             <a:off x="7935480" y="1172520"/>
-            <a:ext cx="960840" cy="327240"/>
+            <a:ext cx="960480" cy="326880"/>
           </a:xfrm>
           <a:prstGeom prst="rect">
             <a:avLst/>
@@ -2867,7 +2869,7 @@
         <p:spPr>
           <a:xfrm>
             <a:off x="8079480" y="1505160"/>
-            <a:ext cx="672480" cy="518400"/>
+            <a:ext cx="672120" cy="518040"/>
           </a:xfrm>
           <a:prstGeom prst="rect">
             <a:avLst/>
@@ -2949,8 +2951,8 @@
         </p:blipFill>
         <p:spPr>
           <a:xfrm flipH="1" rot="10800000">
-            <a:off x="8265240" y="908640"/>
-            <a:ext cx="274320" cy="259920"/>
+            <a:off x="8265240" y="909000"/>
+            <a:ext cx="273960" cy="259560"/>
           </a:xfrm>
           <a:prstGeom prst="rect">
             <a:avLst/>
@@ -2969,7 +2971,7 @@
         <p:spPr>
           <a:xfrm>
             <a:off x="264960" y="1491480"/>
-            <a:ext cx="865080" cy="304920"/>
+            <a:ext cx="864720" cy="304560"/>
           </a:xfrm>
           <a:prstGeom prst="rect">
             <a:avLst/>
@@ -3023,7 +3025,7 @@
         <p:spPr>
           <a:xfrm>
             <a:off x="496800" y="1705680"/>
-            <a:ext cx="546840" cy="260280"/>
+            <a:ext cx="546480" cy="259920"/>
           </a:xfrm>
           <a:prstGeom prst="rect">
             <a:avLst/>
@@ -3081,7 +3083,7 @@
         <p:spPr>
           <a:xfrm>
             <a:off x="478080" y="874800"/>
-            <a:ext cx="450720" cy="451080"/>
+            <a:ext cx="450360" cy="450720"/>
           </a:xfrm>
           <a:prstGeom prst="rect">
             <a:avLst/>
@@ -3106,7 +3108,7 @@
         <p:spPr>
           <a:xfrm>
             <a:off x="1459440" y="1820880"/>
-            <a:ext cx="87480" cy="87840"/>
+            <a:ext cx="87120" cy="87480"/>
           </a:xfrm>
           <a:prstGeom prst="rect">
             <a:avLst/>
@@ -3131,7 +3133,7 @@
         <p:spPr>
           <a:xfrm>
             <a:off x="2508840" y="1804680"/>
-            <a:ext cx="87480" cy="87840"/>
+            <a:ext cx="87120" cy="87480"/>
           </a:xfrm>
           <a:prstGeom prst="rect">
             <a:avLst/>
@@ -3156,7 +3158,7 @@
         <p:spPr>
           <a:xfrm>
             <a:off x="3597120" y="1797120"/>
-            <a:ext cx="91800" cy="87840"/>
+            <a:ext cx="91440" cy="87480"/>
           </a:xfrm>
           <a:prstGeom prst="rect">
             <a:avLst/>
@@ -3181,7 +3183,7 @@
         <p:spPr>
           <a:xfrm>
             <a:off x="5893560" y="1816200"/>
-            <a:ext cx="87480" cy="87840"/>
+            <a:ext cx="87120" cy="87480"/>
           </a:xfrm>
           <a:prstGeom prst="rect">
             <a:avLst/>
@@ -3206,7 +3208,7 @@
         <p:spPr>
           <a:xfrm>
             <a:off x="445680" y="1805040"/>
-            <a:ext cx="91800" cy="87840"/>
+            <a:ext cx="91440" cy="87480"/>
           </a:xfrm>
           <a:prstGeom prst="rect">
             <a:avLst/>
@@ -3231,7 +3233,7 @@
         <p:spPr>
           <a:xfrm>
             <a:off x="4745520" y="1801080"/>
-            <a:ext cx="91800" cy="87840"/>
+            <a:ext cx="91440" cy="87480"/>
           </a:xfrm>
           <a:prstGeom prst="rect">
             <a:avLst/>
@@ -3256,7 +3258,7 @@
         <p:spPr>
           <a:xfrm>
             <a:off x="8151120" y="1792080"/>
-            <a:ext cx="91800" cy="87840"/>
+            <a:ext cx="91440" cy="87480"/>
           </a:xfrm>
           <a:prstGeom prst="rect">
             <a:avLst/>
@@ -3281,7 +3283,7 @@
         <p:spPr>
           <a:xfrm>
             <a:off x="7020000" y="1800360"/>
-            <a:ext cx="91800" cy="87840"/>
+            <a:ext cx="91440" cy="87480"/>
           </a:xfrm>
           <a:prstGeom prst="rect">
             <a:avLst/>
@@ -3300,7 +3302,7 @@
         <p:spPr>
           <a:xfrm>
             <a:off x="286920" y="1260000"/>
-            <a:ext cx="843120" cy="451080"/>
+            <a:ext cx="842760" cy="450720"/>
           </a:xfrm>
           <a:prstGeom prst="rect">
             <a:avLst/>
@@ -3354,7 +3356,7 @@
         <p:spPr>
           <a:xfrm>
             <a:off x="5916600" y="4571640"/>
-            <a:ext cx="1151280" cy="349200"/>
+            <a:ext cx="1150920" cy="348840"/>
           </a:xfrm>
           <a:prstGeom prst="rect">
             <a:avLst/>
@@ -3408,7 +3410,7 @@
         <p:spPr>
           <a:xfrm>
             <a:off x="1082520" y="4528440"/>
-            <a:ext cx="5025600" cy="382680"/>
+            <a:ext cx="5025240" cy="382320"/>
           </a:xfrm>
           <a:prstGeom prst="rect">
             <a:avLst/>
@@ -3552,7 +3554,7 @@
         <p:spPr>
           <a:xfrm>
             <a:off x="359640" y="2160000"/>
-            <a:ext cx="3959640" cy="1979280"/>
+            <a:ext cx="3959280" cy="1978920"/>
           </a:xfrm>
           <a:prstGeom prst="rect">
             <a:avLst/>
@@ -3575,7 +3577,7 @@
         <p:spPr>
           <a:xfrm>
             <a:off x="4680000" y="2160000"/>
-            <a:ext cx="4103640" cy="2051640"/>
+            <a:ext cx="4103280" cy="2051280"/>
           </a:xfrm>
           <a:prstGeom prst="rect">
             <a:avLst/>
@@ -3618,13 +3620,13 @@
       <p:sp>
         <p:nvSpPr>
           <p:cNvPr id="76" name=""/>
-          <p:cNvSpPr txBox="1"/>
+          <p:cNvSpPr/>
           <p:nvPr/>
         </p:nvSpPr>
         <p:spPr>
           <a:xfrm>
             <a:off x="3420000" y="180000"/>
-            <a:ext cx="2340000" cy="506520"/>
+            <a:ext cx="2339640" cy="506160"/>
           </a:xfrm>
           <a:prstGeom prst="rect">
             <a:avLst/>
@@ -3634,12 +3636,22 @@
             <a:noFill/>
           </a:ln>
         </p:spPr>
+        <p:style>
+          <a:lnRef idx="0"/>
+          <a:fillRef idx="0"/>
+          <a:effectRef idx="0"/>
+          <a:fontRef idx="minor"/>
+        </p:style>
         <p:txBody>
           <a:bodyPr lIns="90000" rIns="90000" tIns="45000" bIns="45000">
             <a:noAutofit/>
           </a:bodyPr>
           <a:p>
-            <a:pPr algn="ctr"/>
+            <a:pPr algn="ctr">
+              <a:lnSpc>
+                <a:spcPct val="100000"/>
+              </a:lnSpc>
+            </a:pPr>
             <a:r>
               <a:rPr b="0" lang="pt-BR" sz="2400" spc="-1" strike="noStrike">
                 <a:solidFill>
@@ -3650,10 +3662,7 @@
               <a:t>VENDAS</a:t>
             </a:r>
             <a:endParaRPr b="0" lang="pt-BR" sz="2400" spc="-1" strike="noStrike">
-              <a:solidFill>
-                <a:srgbClr val="222222"/>
-              </a:solidFill>
-              <a:latin typeface="Nunito Sans Black"/>
+              <a:latin typeface="Arial"/>
             </a:endParaRPr>
           </a:p>
         </p:txBody>
@@ -3661,13 +3670,13 @@
       <p:sp>
         <p:nvSpPr>
           <p:cNvPr id="77" name=""/>
-          <p:cNvSpPr txBox="1"/>
-          <p:nvPr/>
-        </p:nvSpPr>
-        <p:spPr>
-          <a:xfrm>
-            <a:off x="1080000" y="1080000"/>
-            <a:ext cx="1620000" cy="505080"/>
+          <p:cNvSpPr/>
+          <p:nvPr/>
+        </p:nvSpPr>
+        <p:spPr>
+          <a:xfrm>
+            <a:off x="1080000" y="1116360"/>
+            <a:ext cx="1619640" cy="504720"/>
           </a:xfrm>
           <a:prstGeom prst="rect">
             <a:avLst/>
@@ -3677,12 +3686,22 @@
             <a:noFill/>
           </a:ln>
         </p:spPr>
+        <p:style>
+          <a:lnRef idx="0"/>
+          <a:fillRef idx="0"/>
+          <a:effectRef idx="0"/>
+          <a:fontRef idx="minor"/>
+        </p:style>
         <p:txBody>
           <a:bodyPr lIns="90000" rIns="90000" tIns="45000" bIns="45000">
             <a:noAutofit/>
           </a:bodyPr>
           <a:p>
-            <a:pPr algn="ctr"/>
+            <a:pPr algn="ctr">
+              <a:lnSpc>
+                <a:spcPct val="100000"/>
+              </a:lnSpc>
+            </a:pPr>
             <a:r>
               <a:rPr b="0" lang="pt-BR" sz="1200" spc="-1" strike="noStrike">
                 <a:solidFill>
@@ -3693,10 +3712,7 @@
               <a:t>Número de propostas vendidas</a:t>
             </a:r>
             <a:endParaRPr b="0" lang="pt-BR" sz="1200" spc="-1" strike="noStrike">
-              <a:solidFill>
-                <a:srgbClr val="222222"/>
-              </a:solidFill>
-              <a:latin typeface="Nunito Sans"/>
+              <a:latin typeface="Arial"/>
             </a:endParaRPr>
           </a:p>
         </p:txBody>
@@ -3704,13 +3720,13 @@
       <p:sp>
         <p:nvSpPr>
           <p:cNvPr id="78" name=""/>
-          <p:cNvSpPr txBox="1"/>
-          <p:nvPr/>
-        </p:nvSpPr>
-        <p:spPr>
-          <a:xfrm>
-            <a:off x="1080000" y="1585080"/>
-            <a:ext cx="1620000" cy="471240"/>
+          <p:cNvSpPr/>
+          <p:nvPr/>
+        </p:nvSpPr>
+        <p:spPr>
+          <a:xfrm>
+            <a:off x="1080000" y="1621440"/>
+            <a:ext cx="1619640" cy="470880"/>
           </a:xfrm>
           <a:prstGeom prst="rect">
             <a:avLst/>
@@ -3720,12 +3736,22 @@
             <a:noFill/>
           </a:ln>
         </p:spPr>
+        <p:style>
+          <a:lnRef idx="0"/>
+          <a:fillRef idx="0"/>
+          <a:effectRef idx="0"/>
+          <a:fontRef idx="minor"/>
+        </p:style>
         <p:txBody>
           <a:bodyPr lIns="90000" rIns="90000" tIns="45000" bIns="45000">
             <a:noAutofit/>
           </a:bodyPr>
           <a:p>
-            <a:pPr algn="ctr"/>
+            <a:pPr algn="ctr">
+              <a:lnSpc>
+                <a:spcPct val="100000"/>
+              </a:lnSpc>
+            </a:pPr>
             <a:r>
               <a:rPr b="0" lang="pt-BR" sz="2200" spc="-1" strike="noStrike">
                 <a:solidFill>
@@ -3736,10 +3762,7 @@
               <a:t>1.500</a:t>
             </a:r>
             <a:endParaRPr b="0" lang="pt-BR" sz="2200" spc="-1" strike="noStrike">
-              <a:solidFill>
-                <a:srgbClr val="222222"/>
-              </a:solidFill>
-              <a:latin typeface="Nunito Sans Black"/>
+              <a:latin typeface="Arial"/>
             </a:endParaRPr>
           </a:p>
         </p:txBody>
@@ -3747,13 +3770,13 @@
       <p:sp>
         <p:nvSpPr>
           <p:cNvPr id="79" name=""/>
-          <p:cNvSpPr txBox="1"/>
-          <p:nvPr/>
-        </p:nvSpPr>
-        <p:spPr>
-          <a:xfrm>
-            <a:off x="1080000" y="2042280"/>
-            <a:ext cx="1620000" cy="297720"/>
+          <p:cNvSpPr/>
+          <p:nvPr/>
+        </p:nvSpPr>
+        <p:spPr>
+          <a:xfrm>
+            <a:off x="1080000" y="2078640"/>
+            <a:ext cx="1619640" cy="297360"/>
           </a:xfrm>
           <a:prstGeom prst="rect">
             <a:avLst/>
@@ -3763,12 +3786,22 @@
             <a:noFill/>
           </a:ln>
         </p:spPr>
+        <p:style>
+          <a:lnRef idx="0"/>
+          <a:fillRef idx="0"/>
+          <a:effectRef idx="0"/>
+          <a:fontRef idx="minor"/>
+        </p:style>
         <p:txBody>
           <a:bodyPr lIns="90000" rIns="90000" tIns="45000" bIns="45000">
             <a:noAutofit/>
           </a:bodyPr>
           <a:p>
-            <a:pPr algn="ctr"/>
+            <a:pPr algn="ctr">
+              <a:lnSpc>
+                <a:spcPct val="100000"/>
+              </a:lnSpc>
+            </a:pPr>
             <a:r>
               <a:rPr b="0" lang="pt-BR" sz="1200" spc="-1" strike="noStrike">
                 <a:solidFill>
@@ -3779,10 +3812,7 @@
               <a:t>15%</a:t>
             </a:r>
             <a:endParaRPr b="0" lang="pt-BR" sz="1200" spc="-1" strike="noStrike">
-              <a:solidFill>
-                <a:srgbClr val="222222"/>
-              </a:solidFill>
-              <a:latin typeface="Nunito Sans"/>
+              <a:latin typeface="Arial"/>
             </a:endParaRPr>
           </a:p>
         </p:txBody>
@@ -3795,10 +3825,10 @@
         </p:nvGrpSpPr>
         <p:grpSpPr>
           <a:xfrm>
-            <a:off x="1477800" y="2085480"/>
-            <a:ext cx="132840" cy="179280"/>
-            <a:chOff x="1477800" y="2085480"/>
-            <a:chExt cx="132840" cy="179280"/>
+            <a:off x="1477800" y="2121840"/>
+            <a:ext cx="132480" cy="178920"/>
+            <a:chOff x="1477800" y="2121840"/>
+            <a:chExt cx="132480" cy="178920"/>
           </a:xfrm>
         </p:grpSpPr>
         <p:sp>
@@ -3809,8 +3839,8 @@
           </p:nvSpPr>
           <p:spPr>
             <a:xfrm>
-              <a:off x="1511280" y="2131920"/>
-              <a:ext cx="66600" cy="132840"/>
+              <a:off x="1511280" y="2168280"/>
+              <a:ext cx="66240" cy="132480"/>
             </a:xfrm>
             <a:prstGeom prst="rect">
               <a:avLst/>
@@ -3839,14 +3869,14 @@
           </p:nvSpPr>
           <p:spPr>
             <a:xfrm>
-              <a:off x="1477800" y="2085480"/>
-              <a:ext cx="132840" cy="66600"/>
+              <a:off x="1477800" y="2121840"/>
+              <a:ext cx="132480" cy="66240"/>
             </a:xfrm>
             <a:custGeom>
               <a:avLst/>
               <a:gdLst/>
               <a:ahLst/>
-              <a:rect l="0" t="0" r="r" b="b"/>
+              <a:rect l="l" t="t" r="r" b="b"/>
               <a:pathLst>
                 <a:path w="371" h="187">
                   <a:moveTo>
@@ -3882,13 +3912,13 @@
       <p:sp>
         <p:nvSpPr>
           <p:cNvPr id="83" name=""/>
-          <p:cNvSpPr txBox="1"/>
-          <p:nvPr/>
-        </p:nvSpPr>
-        <p:spPr>
-          <a:xfrm>
-            <a:off x="2880000" y="1296000"/>
-            <a:ext cx="1620000" cy="297720"/>
+          <p:cNvSpPr/>
+          <p:nvPr/>
+        </p:nvSpPr>
+        <p:spPr>
+          <a:xfrm>
+            <a:off x="2880000" y="1332360"/>
+            <a:ext cx="1619640" cy="297360"/>
           </a:xfrm>
           <a:prstGeom prst="rect">
             <a:avLst/>
@@ -3898,12 +3928,22 @@
             <a:noFill/>
           </a:ln>
         </p:spPr>
+        <p:style>
+          <a:lnRef idx="0"/>
+          <a:fillRef idx="0"/>
+          <a:effectRef idx="0"/>
+          <a:fontRef idx="minor"/>
+        </p:style>
         <p:txBody>
           <a:bodyPr lIns="90000" rIns="90000" tIns="45000" bIns="45000">
             <a:noAutofit/>
           </a:bodyPr>
           <a:p>
-            <a:pPr algn="ctr"/>
+            <a:pPr algn="ctr">
+              <a:lnSpc>
+                <a:spcPct val="100000"/>
+              </a:lnSpc>
+            </a:pPr>
             <a:r>
               <a:rPr b="0" lang="pt-BR" sz="1200" spc="-1" strike="noStrike">
                 <a:solidFill>
@@ -3914,10 +3954,7 @@
               <a:t>Valor total vendido</a:t>
             </a:r>
             <a:endParaRPr b="0" lang="pt-BR" sz="1200" spc="-1" strike="noStrike">
-              <a:solidFill>
-                <a:srgbClr val="222222"/>
-              </a:solidFill>
-              <a:latin typeface="Nunito Sans"/>
+              <a:latin typeface="Arial"/>
             </a:endParaRPr>
           </a:p>
         </p:txBody>
@@ -3925,13 +3962,13 @@
       <p:sp>
         <p:nvSpPr>
           <p:cNvPr id="84" name=""/>
-          <p:cNvSpPr txBox="1"/>
-          <p:nvPr/>
-        </p:nvSpPr>
-        <p:spPr>
-          <a:xfrm>
-            <a:off x="2736000" y="1585080"/>
-            <a:ext cx="1800000" cy="471240"/>
+          <p:cNvSpPr/>
+          <p:nvPr/>
+        </p:nvSpPr>
+        <p:spPr>
+          <a:xfrm>
+            <a:off x="2736000" y="1621440"/>
+            <a:ext cx="1799640" cy="470880"/>
           </a:xfrm>
           <a:prstGeom prst="rect">
             <a:avLst/>
@@ -3941,12 +3978,22 @@
             <a:noFill/>
           </a:ln>
         </p:spPr>
+        <p:style>
+          <a:lnRef idx="0"/>
+          <a:fillRef idx="0"/>
+          <a:effectRef idx="0"/>
+          <a:fontRef idx="minor"/>
+        </p:style>
         <p:txBody>
           <a:bodyPr lIns="90000" rIns="90000" tIns="45000" bIns="45000">
             <a:noAutofit/>
           </a:bodyPr>
           <a:p>
-            <a:pPr algn="ctr"/>
+            <a:pPr algn="ctr">
+              <a:lnSpc>
+                <a:spcPct val="100000"/>
+              </a:lnSpc>
+            </a:pPr>
             <a:r>
               <a:rPr b="0" lang="pt-BR" sz="2200" spc="-1" strike="noStrike">
                 <a:solidFill>
@@ -3957,10 +4004,7 @@
               <a:t>R$ 20 Mil</a:t>
             </a:r>
             <a:endParaRPr b="0" lang="pt-BR" sz="2200" spc="-1" strike="noStrike">
-              <a:solidFill>
-                <a:srgbClr val="222222"/>
-              </a:solidFill>
-              <a:latin typeface="Nunito Sans Black"/>
+              <a:latin typeface="Arial"/>
             </a:endParaRPr>
           </a:p>
         </p:txBody>
@@ -3968,13 +4012,13 @@
       <p:sp>
         <p:nvSpPr>
           <p:cNvPr id="85" name=""/>
-          <p:cNvSpPr txBox="1"/>
-          <p:nvPr/>
-        </p:nvSpPr>
-        <p:spPr>
-          <a:xfrm>
-            <a:off x="2880000" y="2042280"/>
-            <a:ext cx="1620000" cy="297720"/>
+          <p:cNvSpPr/>
+          <p:nvPr/>
+        </p:nvSpPr>
+        <p:spPr>
+          <a:xfrm>
+            <a:off x="2880000" y="2078640"/>
+            <a:ext cx="1619640" cy="297360"/>
           </a:xfrm>
           <a:prstGeom prst="rect">
             <a:avLst/>
@@ -3984,12 +4028,22 @@
             <a:noFill/>
           </a:ln>
         </p:spPr>
+        <p:style>
+          <a:lnRef idx="0"/>
+          <a:fillRef idx="0"/>
+          <a:effectRef idx="0"/>
+          <a:fontRef idx="minor"/>
+        </p:style>
         <p:txBody>
           <a:bodyPr lIns="90000" rIns="90000" tIns="45000" bIns="45000">
             <a:noAutofit/>
           </a:bodyPr>
           <a:p>
-            <a:pPr algn="ctr"/>
+            <a:pPr algn="ctr">
+              <a:lnSpc>
+                <a:spcPct val="100000"/>
+              </a:lnSpc>
+            </a:pPr>
             <a:r>
               <a:rPr b="0" lang="pt-BR" sz="1200" spc="-1" strike="noStrike">
                 <a:solidFill>
@@ -4000,10 +4054,7 @@
               <a:t>20%</a:t>
             </a:r>
             <a:endParaRPr b="0" lang="pt-BR" sz="1200" spc="-1" strike="noStrike">
-              <a:solidFill>
-                <a:srgbClr val="222222"/>
-              </a:solidFill>
-              <a:latin typeface="Nunito Sans"/>
+              <a:latin typeface="Arial"/>
             </a:endParaRPr>
           </a:p>
         </p:txBody>
@@ -4016,10 +4067,10 @@
         </p:nvGrpSpPr>
         <p:grpSpPr>
           <a:xfrm>
-            <a:off x="3277800" y="2085480"/>
-            <a:ext cx="132840" cy="179280"/>
-            <a:chOff x="3277800" y="2085480"/>
-            <a:chExt cx="132840" cy="179280"/>
+            <a:off x="3277800" y="2121840"/>
+            <a:ext cx="132480" cy="178920"/>
+            <a:chOff x="3277800" y="2121840"/>
+            <a:chExt cx="132480" cy="178920"/>
           </a:xfrm>
         </p:grpSpPr>
         <p:sp>
@@ -4030,8 +4081,8 @@
           </p:nvSpPr>
           <p:spPr>
             <a:xfrm>
-              <a:off x="3311280" y="2131920"/>
-              <a:ext cx="66600" cy="132840"/>
+              <a:off x="3311280" y="2168280"/>
+              <a:ext cx="66240" cy="132480"/>
             </a:xfrm>
             <a:prstGeom prst="rect">
               <a:avLst/>
@@ -4060,14 +4111,14 @@
           </p:nvSpPr>
           <p:spPr>
             <a:xfrm>
-              <a:off x="3277800" y="2085480"/>
-              <a:ext cx="132840" cy="66600"/>
+              <a:off x="3277800" y="2121840"/>
+              <a:ext cx="132480" cy="66240"/>
             </a:xfrm>
             <a:custGeom>
               <a:avLst/>
               <a:gdLst/>
               <a:ahLst/>
-              <a:rect l="0" t="0" r="r" b="b"/>
+              <a:rect l="l" t="t" r="r" b="b"/>
               <a:pathLst>
                 <a:path w="371" h="187">
                   <a:moveTo>
@@ -4103,13 +4154,13 @@
       <p:sp>
         <p:nvSpPr>
           <p:cNvPr id="89" name=""/>
-          <p:cNvSpPr txBox="1"/>
-          <p:nvPr/>
-        </p:nvSpPr>
-        <p:spPr>
-          <a:xfrm>
-            <a:off x="4680000" y="1080000"/>
-            <a:ext cx="1620000" cy="505080"/>
+          <p:cNvSpPr/>
+          <p:nvPr/>
+        </p:nvSpPr>
+        <p:spPr>
+          <a:xfrm>
+            <a:off x="4644000" y="1110600"/>
+            <a:ext cx="1619640" cy="504720"/>
           </a:xfrm>
           <a:prstGeom prst="rect">
             <a:avLst/>
@@ -4119,12 +4170,22 @@
             <a:noFill/>
           </a:ln>
         </p:spPr>
+        <p:style>
+          <a:lnRef idx="0"/>
+          <a:fillRef idx="0"/>
+          <a:effectRef idx="0"/>
+          <a:fontRef idx="minor"/>
+        </p:style>
         <p:txBody>
           <a:bodyPr lIns="90000" rIns="90000" tIns="45000" bIns="45000">
             <a:noAutofit/>
           </a:bodyPr>
           <a:p>
-            <a:pPr algn="ctr"/>
+            <a:pPr algn="ctr">
+              <a:lnSpc>
+                <a:spcPct val="100000"/>
+              </a:lnSpc>
+            </a:pPr>
             <a:r>
               <a:rPr b="0" lang="pt-BR" sz="1200" spc="-1" strike="noStrike">
                 <a:solidFill>
@@ -4135,10 +4196,7 @@
               <a:t>Taxa de conversão geral</a:t>
             </a:r>
             <a:endParaRPr b="0" lang="pt-BR" sz="1200" spc="-1" strike="noStrike">
-              <a:solidFill>
-                <a:srgbClr val="222222"/>
-              </a:solidFill>
-              <a:latin typeface="Nunito Sans"/>
+              <a:latin typeface="Arial"/>
             </a:endParaRPr>
           </a:p>
         </p:txBody>
@@ -4146,13 +4204,13 @@
       <p:sp>
         <p:nvSpPr>
           <p:cNvPr id="90" name=""/>
-          <p:cNvSpPr txBox="1"/>
-          <p:nvPr/>
-        </p:nvSpPr>
-        <p:spPr>
-          <a:xfrm>
-            <a:off x="4680000" y="1585080"/>
-            <a:ext cx="1620000" cy="471240"/>
+          <p:cNvSpPr/>
+          <p:nvPr/>
+        </p:nvSpPr>
+        <p:spPr>
+          <a:xfrm>
+            <a:off x="4644000" y="1615680"/>
+            <a:ext cx="1619640" cy="470880"/>
           </a:xfrm>
           <a:prstGeom prst="rect">
             <a:avLst/>
@@ -4162,12 +4220,22 @@
             <a:noFill/>
           </a:ln>
         </p:spPr>
+        <p:style>
+          <a:lnRef idx="0"/>
+          <a:fillRef idx="0"/>
+          <a:effectRef idx="0"/>
+          <a:fontRef idx="minor"/>
+        </p:style>
         <p:txBody>
           <a:bodyPr lIns="90000" rIns="90000" tIns="45000" bIns="45000">
             <a:noAutofit/>
           </a:bodyPr>
           <a:p>
-            <a:pPr algn="ctr"/>
+            <a:pPr algn="ctr">
+              <a:lnSpc>
+                <a:spcPct val="100000"/>
+              </a:lnSpc>
+            </a:pPr>
             <a:r>
               <a:rPr b="0" lang="pt-BR" sz="2200" spc="-1" strike="noStrike">
                 <a:solidFill>
@@ -4178,10 +4246,7 @@
               <a:t>60%</a:t>
             </a:r>
             <a:endParaRPr b="0" lang="pt-BR" sz="2200" spc="-1" strike="noStrike">
-              <a:solidFill>
-                <a:srgbClr val="222222"/>
-              </a:solidFill>
-              <a:latin typeface="Nunito Sans Black"/>
+              <a:latin typeface="Arial"/>
             </a:endParaRPr>
           </a:p>
         </p:txBody>
@@ -4189,13 +4254,13 @@
       <p:sp>
         <p:nvSpPr>
           <p:cNvPr id="91" name=""/>
-          <p:cNvSpPr txBox="1"/>
-          <p:nvPr/>
-        </p:nvSpPr>
-        <p:spPr>
-          <a:xfrm>
-            <a:off x="4680000" y="2042280"/>
-            <a:ext cx="1620000" cy="297720"/>
+          <p:cNvSpPr/>
+          <p:nvPr/>
+        </p:nvSpPr>
+        <p:spPr>
+          <a:xfrm>
+            <a:off x="4644000" y="2072880"/>
+            <a:ext cx="1619640" cy="297360"/>
           </a:xfrm>
           <a:prstGeom prst="rect">
             <a:avLst/>
@@ -4205,12 +4270,22 @@
             <a:noFill/>
           </a:ln>
         </p:spPr>
+        <p:style>
+          <a:lnRef idx="0"/>
+          <a:fillRef idx="0"/>
+          <a:effectRef idx="0"/>
+          <a:fontRef idx="minor"/>
+        </p:style>
         <p:txBody>
           <a:bodyPr lIns="90000" rIns="90000" tIns="45000" bIns="45000">
             <a:noAutofit/>
           </a:bodyPr>
           <a:p>
-            <a:pPr algn="ctr"/>
+            <a:pPr algn="ctr">
+              <a:lnSpc>
+                <a:spcPct val="100000"/>
+              </a:lnSpc>
+            </a:pPr>
             <a:r>
               <a:rPr b="0" lang="pt-BR" sz="1200" spc="-1" strike="noStrike">
                 <a:solidFill>
@@ -4221,10 +4296,7 @@
               <a:t>15 p.p.</a:t>
             </a:r>
             <a:endParaRPr b="0" lang="pt-BR" sz="1200" spc="-1" strike="noStrike">
-              <a:solidFill>
-                <a:srgbClr val="222222"/>
-              </a:solidFill>
-              <a:latin typeface="Nunito Sans"/>
+              <a:latin typeface="Arial"/>
             </a:endParaRPr>
           </a:p>
         </p:txBody>
@@ -4237,10 +4309,10 @@
         </p:nvGrpSpPr>
         <p:grpSpPr>
           <a:xfrm>
-            <a:off x="5077800" y="2085480"/>
-            <a:ext cx="132840" cy="179280"/>
-            <a:chOff x="5077800" y="2085480"/>
-            <a:chExt cx="132840" cy="179280"/>
+            <a:off x="5041800" y="2116080"/>
+            <a:ext cx="132480" cy="178920"/>
+            <a:chOff x="5041800" y="2116080"/>
+            <a:chExt cx="132480" cy="178920"/>
           </a:xfrm>
         </p:grpSpPr>
         <p:sp>
@@ -4251,8 +4323,8 @@
           </p:nvSpPr>
           <p:spPr>
             <a:xfrm>
-              <a:off x="5111280" y="2131920"/>
-              <a:ext cx="66600" cy="132840"/>
+              <a:off x="5075280" y="2162520"/>
+              <a:ext cx="66240" cy="132480"/>
             </a:xfrm>
             <a:prstGeom prst="rect">
               <a:avLst/>
@@ -4281,14 +4353,14 @@
           </p:nvSpPr>
           <p:spPr>
             <a:xfrm>
-              <a:off x="5077800" y="2085480"/>
-              <a:ext cx="132840" cy="66600"/>
+              <a:off x="5041800" y="2116080"/>
+              <a:ext cx="132480" cy="66240"/>
             </a:xfrm>
             <a:custGeom>
               <a:avLst/>
               <a:gdLst/>
               <a:ahLst/>
-              <a:rect l="0" t="0" r="r" b="b"/>
+              <a:rect l="l" t="t" r="r" b="b"/>
               <a:pathLst>
                 <a:path w="371" h="187">
                   <a:moveTo>
@@ -4324,13 +4396,13 @@
       <p:sp>
         <p:nvSpPr>
           <p:cNvPr id="95" name=""/>
-          <p:cNvSpPr txBox="1"/>
-          <p:nvPr/>
-        </p:nvSpPr>
-        <p:spPr>
-          <a:xfrm>
-            <a:off x="6480000" y="1080000"/>
-            <a:ext cx="1620000" cy="505080"/>
+          <p:cNvSpPr/>
+          <p:nvPr/>
+        </p:nvSpPr>
+        <p:spPr>
+          <a:xfrm>
+            <a:off x="6444000" y="1110600"/>
+            <a:ext cx="1619640" cy="504720"/>
           </a:xfrm>
           <a:prstGeom prst="rect">
             <a:avLst/>
@@ -4340,12 +4412,22 @@
             <a:noFill/>
           </a:ln>
         </p:spPr>
+        <p:style>
+          <a:lnRef idx="0"/>
+          <a:fillRef idx="0"/>
+          <a:effectRef idx="0"/>
+          <a:fontRef idx="minor"/>
+        </p:style>
         <p:txBody>
           <a:bodyPr lIns="90000" rIns="90000" tIns="45000" bIns="45000">
             <a:noAutofit/>
           </a:bodyPr>
           <a:p>
-            <a:pPr algn="ctr"/>
+            <a:pPr algn="ctr">
+              <a:lnSpc>
+                <a:spcPct val="100000"/>
+              </a:lnSpc>
+            </a:pPr>
             <a:r>
               <a:rPr b="0" lang="pt-BR" sz="1200" spc="-1" strike="noStrike">
                 <a:solidFill>
@@ -4356,10 +4438,7 @@
               <a:t>Taxa de sucesso nas chamadas de API</a:t>
             </a:r>
             <a:endParaRPr b="0" lang="pt-BR" sz="1200" spc="-1" strike="noStrike">
-              <a:solidFill>
-                <a:srgbClr val="222222"/>
-              </a:solidFill>
-              <a:latin typeface="Nunito Sans"/>
+              <a:latin typeface="Arial"/>
             </a:endParaRPr>
           </a:p>
         </p:txBody>
@@ -4367,13 +4446,13 @@
       <p:sp>
         <p:nvSpPr>
           <p:cNvPr id="96" name=""/>
-          <p:cNvSpPr txBox="1"/>
-          <p:nvPr/>
-        </p:nvSpPr>
-        <p:spPr>
-          <a:xfrm>
-            <a:off x="6336000" y="1585080"/>
-            <a:ext cx="1800000" cy="471240"/>
+          <p:cNvSpPr/>
+          <p:nvPr/>
+        </p:nvSpPr>
+        <p:spPr>
+          <a:xfrm>
+            <a:off x="6300000" y="1615680"/>
+            <a:ext cx="1799640" cy="470880"/>
           </a:xfrm>
           <a:prstGeom prst="rect">
             <a:avLst/>
@@ -4383,12 +4462,22 @@
             <a:noFill/>
           </a:ln>
         </p:spPr>
+        <p:style>
+          <a:lnRef idx="0"/>
+          <a:fillRef idx="0"/>
+          <a:effectRef idx="0"/>
+          <a:fontRef idx="minor"/>
+        </p:style>
         <p:txBody>
           <a:bodyPr lIns="90000" rIns="90000" tIns="45000" bIns="45000">
             <a:noAutofit/>
           </a:bodyPr>
           <a:p>
-            <a:pPr algn="ctr"/>
+            <a:pPr algn="ctr">
+              <a:lnSpc>
+                <a:spcPct val="100000"/>
+              </a:lnSpc>
+            </a:pPr>
             <a:r>
               <a:rPr b="0" lang="pt-BR" sz="2200" spc="-1" strike="noStrike">
                 <a:solidFill>
@@ -4399,10 +4488,7 @@
               <a:t>90%</a:t>
             </a:r>
             <a:endParaRPr b="0" lang="pt-BR" sz="2200" spc="-1" strike="noStrike">
-              <a:solidFill>
-                <a:srgbClr val="222222"/>
-              </a:solidFill>
-              <a:latin typeface="Nunito Sans Black"/>
+              <a:latin typeface="Arial"/>
             </a:endParaRPr>
           </a:p>
         </p:txBody>
@@ -4410,13 +4496,13 @@
       <p:sp>
         <p:nvSpPr>
           <p:cNvPr id="97" name=""/>
-          <p:cNvSpPr txBox="1"/>
-          <p:nvPr/>
-        </p:nvSpPr>
-        <p:spPr>
-          <a:xfrm>
-            <a:off x="6480000" y="2042280"/>
-            <a:ext cx="1620000" cy="297720"/>
+          <p:cNvSpPr/>
+          <p:nvPr/>
+        </p:nvSpPr>
+        <p:spPr>
+          <a:xfrm>
+            <a:off x="6444000" y="2072880"/>
+            <a:ext cx="1619640" cy="297360"/>
           </a:xfrm>
           <a:prstGeom prst="rect">
             <a:avLst/>
@@ -4426,12 +4512,22 @@
             <a:noFill/>
           </a:ln>
         </p:spPr>
+        <p:style>
+          <a:lnRef idx="0"/>
+          <a:fillRef idx="0"/>
+          <a:effectRef idx="0"/>
+          <a:fontRef idx="minor"/>
+        </p:style>
         <p:txBody>
           <a:bodyPr lIns="90000" rIns="90000" tIns="45000" bIns="45000">
             <a:noAutofit/>
           </a:bodyPr>
           <a:p>
-            <a:pPr algn="ctr"/>
+            <a:pPr algn="ctr">
+              <a:lnSpc>
+                <a:spcPct val="100000"/>
+              </a:lnSpc>
+            </a:pPr>
             <a:r>
               <a:rPr b="0" lang="pt-BR" sz="1200" spc="-1" strike="noStrike">
                 <a:solidFill>
@@ -4442,10 +4538,7 @@
               <a:t>40 p.p.</a:t>
             </a:r>
             <a:endParaRPr b="0" lang="pt-BR" sz="1200" spc="-1" strike="noStrike">
-              <a:solidFill>
-                <a:srgbClr val="222222"/>
-              </a:solidFill>
-              <a:latin typeface="Nunito Sans"/>
+              <a:latin typeface="Arial"/>
             </a:endParaRPr>
           </a:p>
         </p:txBody>
@@ -4458,10 +4551,10 @@
         </p:nvGrpSpPr>
         <p:grpSpPr>
           <a:xfrm>
-            <a:off x="6877800" y="2085480"/>
-            <a:ext cx="132840" cy="179280"/>
-            <a:chOff x="6877800" y="2085480"/>
-            <a:chExt cx="132840" cy="179280"/>
+            <a:off x="6841800" y="2116080"/>
+            <a:ext cx="132480" cy="178920"/>
+            <a:chOff x="6841800" y="2116080"/>
+            <a:chExt cx="132480" cy="178920"/>
           </a:xfrm>
         </p:grpSpPr>
         <p:sp>
@@ -4472,8 +4565,8 @@
           </p:nvSpPr>
           <p:spPr>
             <a:xfrm>
-              <a:off x="6911280" y="2131920"/>
-              <a:ext cx="66600" cy="132840"/>
+              <a:off x="6875280" y="2162520"/>
+              <a:ext cx="66240" cy="132480"/>
             </a:xfrm>
             <a:prstGeom prst="rect">
               <a:avLst/>
@@ -4502,14 +4595,14 @@
           </p:nvSpPr>
           <p:spPr>
             <a:xfrm>
-              <a:off x="6877800" y="2085480"/>
-              <a:ext cx="132840" cy="66600"/>
+              <a:off x="6841800" y="2116080"/>
+              <a:ext cx="132480" cy="66240"/>
             </a:xfrm>
             <a:custGeom>
               <a:avLst/>
               <a:gdLst/>
               <a:ahLst/>
-              <a:rect l="0" t="0" r="r" b="b"/>
+              <a:rect l="l" t="t" r="r" b="b"/>
               <a:pathLst>
                 <a:path w="371" h="187">
                   <a:moveTo>
@@ -4545,13 +4638,13 @@
       <p:sp>
         <p:nvSpPr>
           <p:cNvPr id="101" name=""/>
-          <p:cNvSpPr txBox="1"/>
-          <p:nvPr/>
-        </p:nvSpPr>
-        <p:spPr>
-          <a:xfrm>
-            <a:off x="1548000" y="3240000"/>
-            <a:ext cx="1620000" cy="297720"/>
+          <p:cNvSpPr/>
+          <p:nvPr/>
+        </p:nvSpPr>
+        <p:spPr>
+          <a:xfrm>
+            <a:off x="1548000" y="3240360"/>
+            <a:ext cx="1619640" cy="297360"/>
           </a:xfrm>
           <a:prstGeom prst="rect">
             <a:avLst/>
@@ -4561,12 +4654,22 @@
             <a:noFill/>
           </a:ln>
         </p:spPr>
+        <p:style>
+          <a:lnRef idx="0"/>
+          <a:fillRef idx="0"/>
+          <a:effectRef idx="0"/>
+          <a:fontRef idx="minor"/>
+        </p:style>
         <p:txBody>
           <a:bodyPr lIns="90000" rIns="90000" tIns="45000" bIns="45000">
             <a:noAutofit/>
           </a:bodyPr>
           <a:p>
-            <a:pPr algn="ctr"/>
+            <a:pPr algn="ctr">
+              <a:lnSpc>
+                <a:spcPct val="100000"/>
+              </a:lnSpc>
+            </a:pPr>
             <a:r>
               <a:rPr b="0" lang="pt-BR" sz="1200" spc="-1" strike="noStrike">
                 <a:solidFill>
@@ -4577,10 +4680,7 @@
               <a:t>Consignado</a:t>
             </a:r>
             <a:endParaRPr b="0" lang="pt-BR" sz="1200" spc="-1" strike="noStrike">
-              <a:solidFill>
-                <a:srgbClr val="222222"/>
-              </a:solidFill>
-              <a:latin typeface="Nunito Sans"/>
+              <a:latin typeface="Arial"/>
             </a:endParaRPr>
           </a:p>
         </p:txBody>
@@ -4588,13 +4688,13 @@
       <p:sp>
         <p:nvSpPr>
           <p:cNvPr id="102" name=""/>
-          <p:cNvSpPr txBox="1"/>
-          <p:nvPr/>
-        </p:nvSpPr>
-        <p:spPr>
-          <a:xfrm>
-            <a:off x="1404000" y="3565080"/>
-            <a:ext cx="1800000" cy="471240"/>
+          <p:cNvSpPr/>
+          <p:nvPr/>
+        </p:nvSpPr>
+        <p:spPr>
+          <a:xfrm>
+            <a:off x="1404000" y="3565440"/>
+            <a:ext cx="1799640" cy="470880"/>
           </a:xfrm>
           <a:prstGeom prst="rect">
             <a:avLst/>
@@ -4604,12 +4704,22 @@
             <a:noFill/>
           </a:ln>
         </p:spPr>
+        <p:style>
+          <a:lnRef idx="0"/>
+          <a:fillRef idx="0"/>
+          <a:effectRef idx="0"/>
+          <a:fontRef idx="minor"/>
+        </p:style>
         <p:txBody>
           <a:bodyPr lIns="90000" rIns="90000" tIns="45000" bIns="45000">
             <a:noAutofit/>
           </a:bodyPr>
           <a:p>
-            <a:pPr algn="ctr"/>
+            <a:pPr algn="ctr">
+              <a:lnSpc>
+                <a:spcPct val="100000"/>
+              </a:lnSpc>
+            </a:pPr>
             <a:r>
               <a:rPr b="0" lang="pt-BR" sz="2200" spc="-1" strike="noStrike">
                 <a:solidFill>
@@ -4620,10 +4730,7 @@
               <a:t>R$ 8 Mil</a:t>
             </a:r>
             <a:endParaRPr b="0" lang="pt-BR" sz="2200" spc="-1" strike="noStrike">
-              <a:solidFill>
-                <a:srgbClr val="222222"/>
-              </a:solidFill>
-              <a:latin typeface="Nunito Sans Black"/>
+              <a:latin typeface="Arial"/>
             </a:endParaRPr>
           </a:p>
         </p:txBody>
@@ -4631,13 +4738,13 @@
       <p:sp>
         <p:nvSpPr>
           <p:cNvPr id="103" name=""/>
-          <p:cNvSpPr txBox="1"/>
-          <p:nvPr/>
-        </p:nvSpPr>
-        <p:spPr>
-          <a:xfrm>
-            <a:off x="1548000" y="4022280"/>
-            <a:ext cx="1620000" cy="297720"/>
+          <p:cNvSpPr/>
+          <p:nvPr/>
+        </p:nvSpPr>
+        <p:spPr>
+          <a:xfrm>
+            <a:off x="1548000" y="4022640"/>
+            <a:ext cx="1619640" cy="297360"/>
           </a:xfrm>
           <a:prstGeom prst="rect">
             <a:avLst/>
@@ -4647,12 +4754,22 @@
             <a:noFill/>
           </a:ln>
         </p:spPr>
+        <p:style>
+          <a:lnRef idx="0"/>
+          <a:fillRef idx="0"/>
+          <a:effectRef idx="0"/>
+          <a:fontRef idx="minor"/>
+        </p:style>
         <p:txBody>
           <a:bodyPr lIns="90000" rIns="90000" tIns="45000" bIns="45000">
             <a:noAutofit/>
           </a:bodyPr>
           <a:p>
-            <a:pPr algn="ctr"/>
+            <a:pPr algn="ctr">
+              <a:lnSpc>
+                <a:spcPct val="100000"/>
+              </a:lnSpc>
+            </a:pPr>
             <a:r>
               <a:rPr b="0" lang="pt-BR" sz="1200" spc="-1" strike="noStrike">
                 <a:solidFill>
@@ -4663,10 +4780,7 @@
               <a:t>5%</a:t>
             </a:r>
             <a:endParaRPr b="0" lang="pt-BR" sz="1200" spc="-1" strike="noStrike">
-              <a:solidFill>
-                <a:srgbClr val="222222"/>
-              </a:solidFill>
-              <a:latin typeface="Nunito Sans"/>
+              <a:latin typeface="Arial"/>
             </a:endParaRPr>
           </a:p>
         </p:txBody>
@@ -4680,9 +4794,9 @@
         <p:grpSpPr>
           <a:xfrm>
             <a:off x="2017800" y="4065480"/>
-            <a:ext cx="132840" cy="179280"/>
+            <a:ext cx="132480" cy="178920"/>
             <a:chOff x="2017800" y="4065480"/>
-            <a:chExt cx="132840" cy="179280"/>
+            <a:chExt cx="132480" cy="178920"/>
           </a:xfrm>
         </p:grpSpPr>
         <p:sp>
@@ -4693,8 +4807,8 @@
           </p:nvSpPr>
           <p:spPr>
             <a:xfrm flipV="1">
-              <a:off x="2051280" y="4065120"/>
-              <a:ext cx="66600" cy="132840"/>
+              <a:off x="2051280" y="4065480"/>
+              <a:ext cx="66240" cy="132480"/>
             </a:xfrm>
             <a:prstGeom prst="rect">
               <a:avLst/>
@@ -4723,14 +4837,14 @@
           </p:nvSpPr>
           <p:spPr>
             <a:xfrm>
-              <a:off x="2017800" y="4177800"/>
-              <a:ext cx="132840" cy="66600"/>
+              <a:off x="2017800" y="4178160"/>
+              <a:ext cx="132480" cy="66240"/>
             </a:xfrm>
             <a:custGeom>
               <a:avLst/>
               <a:gdLst/>
               <a:ahLst/>
-              <a:rect l="0" t="0" r="r" b="b"/>
+              <a:rect l="l" t="t" r="r" b="b"/>
               <a:pathLst>
                 <a:path w="371" h="187">
                   <a:moveTo>
@@ -4766,13 +4880,13 @@
       <p:sp>
         <p:nvSpPr>
           <p:cNvPr id="107" name=""/>
-          <p:cNvSpPr txBox="1"/>
-          <p:nvPr/>
-        </p:nvSpPr>
-        <p:spPr>
-          <a:xfrm>
-            <a:off x="3888000" y="3060000"/>
-            <a:ext cx="1620000" cy="505080"/>
+          <p:cNvSpPr/>
+          <p:nvPr/>
+        </p:nvSpPr>
+        <p:spPr>
+          <a:xfrm>
+            <a:off x="3888000" y="3060360"/>
+            <a:ext cx="1619640" cy="504720"/>
           </a:xfrm>
           <a:prstGeom prst="rect">
             <a:avLst/>
@@ -4782,12 +4896,22 @@
             <a:noFill/>
           </a:ln>
         </p:spPr>
+        <p:style>
+          <a:lnRef idx="0"/>
+          <a:fillRef idx="0"/>
+          <a:effectRef idx="0"/>
+          <a:fontRef idx="minor"/>
+        </p:style>
         <p:txBody>
           <a:bodyPr lIns="90000" rIns="90000" tIns="45000" bIns="45000">
             <a:noAutofit/>
           </a:bodyPr>
           <a:p>
-            <a:pPr algn="ctr"/>
+            <a:pPr algn="ctr">
+              <a:lnSpc>
+                <a:spcPct val="100000"/>
+              </a:lnSpc>
+            </a:pPr>
             <a:r>
               <a:rPr b="0" lang="pt-BR" sz="1200" spc="-1" strike="noStrike">
                 <a:solidFill>
@@ -4798,14 +4922,15 @@
               <a:t>Com garantia</a:t>
             </a:r>
             <a:endParaRPr b="0" lang="pt-BR" sz="1200" spc="-1" strike="noStrike">
-              <a:solidFill>
-                <a:srgbClr val="222222"/>
-              </a:solidFill>
-              <a:latin typeface="Nunito Sans"/>
-            </a:endParaRPr>
-          </a:p>
-          <a:p>
-            <a:pPr algn="ctr"/>
+              <a:latin typeface="Arial"/>
+            </a:endParaRPr>
+          </a:p>
+          <a:p>
+            <a:pPr algn="ctr">
+              <a:lnSpc>
+                <a:spcPct val="100000"/>
+              </a:lnSpc>
+            </a:pPr>
             <a:r>
               <a:rPr b="0" lang="pt-BR" sz="1200" spc="-1" strike="noStrike">
                 <a:solidFill>
@@ -4813,13 +4938,10 @@
                 </a:solidFill>
                 <a:latin typeface="Nunito Sans"/>
               </a:rPr>
-              <a:t>Sobre veículos</a:t>
+              <a:t>sobre veículos</a:t>
             </a:r>
             <a:endParaRPr b="0" lang="pt-BR" sz="1200" spc="-1" strike="noStrike">
-              <a:solidFill>
-                <a:srgbClr val="222222"/>
-              </a:solidFill>
-              <a:latin typeface="Nunito Sans"/>
+              <a:latin typeface="Arial"/>
             </a:endParaRPr>
           </a:p>
         </p:txBody>
@@ -4827,13 +4949,13 @@
       <p:sp>
         <p:nvSpPr>
           <p:cNvPr id="108" name=""/>
-          <p:cNvSpPr txBox="1"/>
-          <p:nvPr/>
-        </p:nvSpPr>
-        <p:spPr>
-          <a:xfrm>
-            <a:off x="3744000" y="3565080"/>
-            <a:ext cx="1800000" cy="471240"/>
+          <p:cNvSpPr/>
+          <p:nvPr/>
+        </p:nvSpPr>
+        <p:spPr>
+          <a:xfrm>
+            <a:off x="3744000" y="3565440"/>
+            <a:ext cx="1799640" cy="470880"/>
           </a:xfrm>
           <a:prstGeom prst="rect">
             <a:avLst/>
@@ -4843,12 +4965,22 @@
             <a:noFill/>
           </a:ln>
         </p:spPr>
+        <p:style>
+          <a:lnRef idx="0"/>
+          <a:fillRef idx="0"/>
+          <a:effectRef idx="0"/>
+          <a:fontRef idx="minor"/>
+        </p:style>
         <p:txBody>
           <a:bodyPr lIns="90000" rIns="90000" tIns="45000" bIns="45000">
             <a:noAutofit/>
           </a:bodyPr>
           <a:p>
-            <a:pPr algn="ctr"/>
+            <a:pPr algn="ctr">
+              <a:lnSpc>
+                <a:spcPct val="100000"/>
+              </a:lnSpc>
+            </a:pPr>
             <a:r>
               <a:rPr b="0" lang="pt-BR" sz="2200" spc="-1" strike="noStrike">
                 <a:solidFill>
@@ -4859,10 +4991,7 @@
               <a:t>R$ 12 Mil</a:t>
             </a:r>
             <a:endParaRPr b="0" lang="pt-BR" sz="2200" spc="-1" strike="noStrike">
-              <a:solidFill>
-                <a:srgbClr val="222222"/>
-              </a:solidFill>
-              <a:latin typeface="Nunito Sans Black"/>
+              <a:latin typeface="Arial"/>
             </a:endParaRPr>
           </a:p>
         </p:txBody>
@@ -4870,13 +4999,13 @@
       <p:sp>
         <p:nvSpPr>
           <p:cNvPr id="109" name=""/>
-          <p:cNvSpPr txBox="1"/>
-          <p:nvPr/>
-        </p:nvSpPr>
-        <p:spPr>
-          <a:xfrm>
-            <a:off x="3888000" y="4022280"/>
-            <a:ext cx="1620000" cy="297720"/>
+          <p:cNvSpPr/>
+          <p:nvPr/>
+        </p:nvSpPr>
+        <p:spPr>
+          <a:xfrm>
+            <a:off x="3888000" y="4022640"/>
+            <a:ext cx="1619640" cy="297360"/>
           </a:xfrm>
           <a:prstGeom prst="rect">
             <a:avLst/>
@@ -4886,12 +5015,22 @@
             <a:noFill/>
           </a:ln>
         </p:spPr>
+        <p:style>
+          <a:lnRef idx="0"/>
+          <a:fillRef idx="0"/>
+          <a:effectRef idx="0"/>
+          <a:fontRef idx="minor"/>
+        </p:style>
         <p:txBody>
           <a:bodyPr lIns="90000" rIns="90000" tIns="45000" bIns="45000">
             <a:noAutofit/>
           </a:bodyPr>
           <a:p>
-            <a:pPr algn="ctr"/>
+            <a:pPr algn="ctr">
+              <a:lnSpc>
+                <a:spcPct val="100000"/>
+              </a:lnSpc>
+            </a:pPr>
             <a:r>
               <a:rPr b="0" lang="pt-BR" sz="1200" spc="-1" strike="noStrike">
                 <a:solidFill>
@@ -4902,10 +5041,7 @@
               <a:t>100%</a:t>
             </a:r>
             <a:endParaRPr b="0" lang="pt-BR" sz="1200" spc="-1" strike="noStrike">
-              <a:solidFill>
-                <a:srgbClr val="222222"/>
-              </a:solidFill>
-              <a:latin typeface="Nunito Sans"/>
+              <a:latin typeface="Arial"/>
             </a:endParaRPr>
           </a:p>
         </p:txBody>
@@ -4918,10 +5054,10 @@
         </p:nvGrpSpPr>
         <p:grpSpPr>
           <a:xfrm>
-            <a:off x="4285800" y="4065480"/>
-            <a:ext cx="132840" cy="179280"/>
-            <a:chOff x="4285800" y="4065480"/>
-            <a:chExt cx="132840" cy="179280"/>
+            <a:off x="4285800" y="4065840"/>
+            <a:ext cx="132480" cy="178920"/>
+            <a:chOff x="4285800" y="4065840"/>
+            <a:chExt cx="132480" cy="178920"/>
           </a:xfrm>
         </p:grpSpPr>
         <p:sp>
@@ -4932,8 +5068,8 @@
           </p:nvSpPr>
           <p:spPr>
             <a:xfrm>
-              <a:off x="4319280" y="4111920"/>
-              <a:ext cx="66600" cy="132840"/>
+              <a:off x="4319280" y="4112280"/>
+              <a:ext cx="66240" cy="132480"/>
             </a:xfrm>
             <a:prstGeom prst="rect">
               <a:avLst/>
@@ -4962,14 +5098,14 @@
           </p:nvSpPr>
           <p:spPr>
             <a:xfrm>
-              <a:off x="4285800" y="4065480"/>
-              <a:ext cx="132840" cy="66600"/>
+              <a:off x="4285800" y="4065840"/>
+              <a:ext cx="132480" cy="66240"/>
             </a:xfrm>
             <a:custGeom>
               <a:avLst/>
               <a:gdLst/>
               <a:ahLst/>
-              <a:rect l="0" t="0" r="r" b="b"/>
+              <a:rect l="l" t="t" r="r" b="b"/>
               <a:pathLst>
                 <a:path w="371" h="187">
                   <a:moveTo>
@@ -5010,16 +5146,17 @@
         </p:nvSpPr>
         <p:spPr>
           <a:xfrm>
-            <a:off x="3996000" y="2412000"/>
-            <a:ext cx="360000" cy="540000"/>
+            <a:off x="3924000" y="2340360"/>
+            <a:ext cx="396000" cy="719640"/>
           </a:xfrm>
           <a:prstGeom prst="line">
             <a:avLst/>
           </a:prstGeom>
-          <a:ln w="0">
+          <a:ln w="36000">
             <a:solidFill>
               <a:srgbClr val="222222"/>
             </a:solidFill>
+            <a:round/>
             <a:tailEnd len="med" type="triangle" w="med"/>
           </a:ln>
         </p:spPr>
@@ -5038,16 +5175,17 @@
         </p:nvSpPr>
         <p:spPr>
           <a:xfrm flipH="1">
-            <a:off x="2700000" y="2412000"/>
-            <a:ext cx="540000" cy="648000"/>
+            <a:off x="2700000" y="2376000"/>
+            <a:ext cx="540000" cy="864000"/>
           </a:xfrm>
           <a:prstGeom prst="line">
             <a:avLst/>
           </a:prstGeom>
-          <a:ln w="0">
+          <a:ln w="36000">
             <a:solidFill>
               <a:srgbClr val="222222"/>
             </a:solidFill>
+            <a:round/>
             <a:tailEnd len="med" type="triangle" w="med"/>
           </a:ln>
         </p:spPr>
@@ -5057,6 +5195,2948 @@
           <a:effectRef idx="0"/>
           <a:fontRef idx="minor"/>
         </p:style>
+      </p:sp>
+    </p:spTree>
+  </p:cSld>
+  <mc:AlternateContent>
+    <mc:Choice Requires="p14">
+      <p:transition spd="slow" p14:dur="2000"/>
+    </mc:Choice>
+    <mc:Fallback>
+      <p:transition spd="slow"/>
+    </mc:Fallback>
+  </mc:AlternateContent>
+</p:sld>
+</file>
+
+<file path=ppt/slides/slide3.xml><?xml version="1.0" encoding="utf-8"?>
+<p:sld xmlns:a="http://schemas.openxmlformats.org/drawingml/2006/main" xmlns:p="http://schemas.openxmlformats.org/presentationml/2006/main" xmlns:r="http://schemas.openxmlformats.org/officeDocument/2006/relationships" xmlns:p14="http://schemas.microsoft.com/office/powerpoint/2010/main" xmlns:p15="http://schemas.microsoft.com/office/powerpoint/2012/main" xmlns:mc="http://schemas.openxmlformats.org/markup-compatibility/2006">
+  <p:cSld>
+    <p:spTree>
+      <p:nvGrpSpPr>
+        <p:cNvPr id="1" name=""/>
+        <p:cNvGrpSpPr/>
+        <p:nvPr/>
+      </p:nvGrpSpPr>
+      <p:grpSpPr>
+        <a:xfrm>
+          <a:off x="0" y="0"/>
+          <a:ext cx="0" cy="0"/>
+          <a:chOff x="0" y="0"/>
+          <a:chExt cx="0" cy="0"/>
+        </a:xfrm>
+      </p:grpSpPr>
+      <p:sp>
+        <p:nvSpPr>
+          <p:cNvPr id="115" name=""/>
+          <p:cNvSpPr/>
+          <p:nvPr/>
+        </p:nvSpPr>
+        <p:spPr>
+          <a:xfrm>
+            <a:off x="3420000" y="180000"/>
+            <a:ext cx="2339640" cy="506160"/>
+          </a:xfrm>
+          <a:prstGeom prst="rect">
+            <a:avLst/>
+          </a:prstGeom>
+          <a:noFill/>
+          <a:ln w="0">
+            <a:noFill/>
+          </a:ln>
+        </p:spPr>
+        <p:style>
+          <a:lnRef idx="0"/>
+          <a:fillRef idx="0"/>
+          <a:effectRef idx="0"/>
+          <a:fontRef idx="minor"/>
+        </p:style>
+        <p:txBody>
+          <a:bodyPr lIns="90000" rIns="90000" tIns="45000" bIns="45000">
+            <a:noAutofit/>
+          </a:bodyPr>
+          <a:p>
+            <a:pPr algn="ctr">
+              <a:lnSpc>
+                <a:spcPct val="100000"/>
+              </a:lnSpc>
+            </a:pPr>
+            <a:r>
+              <a:rPr b="0" lang="pt-BR" sz="2400" spc="-1" strike="noStrike">
+                <a:solidFill>
+                  <a:srgbClr val="222222"/>
+                </a:solidFill>
+                <a:latin typeface="Nunito Sans Black"/>
+              </a:rPr>
+              <a:t>VENDAS</a:t>
+            </a:r>
+            <a:endParaRPr b="0" lang="pt-BR" sz="2400" spc="-1" strike="noStrike">
+              <a:latin typeface="Arial"/>
+            </a:endParaRPr>
+          </a:p>
+        </p:txBody>
+      </p:sp>
+      <p:sp>
+        <p:nvSpPr>
+          <p:cNvPr id="116" name=""/>
+          <p:cNvSpPr/>
+          <p:nvPr/>
+        </p:nvSpPr>
+        <p:spPr>
+          <a:xfrm>
+            <a:off x="324360" y="1728000"/>
+            <a:ext cx="1619640" cy="504720"/>
+          </a:xfrm>
+          <a:prstGeom prst="rect">
+            <a:avLst/>
+          </a:prstGeom>
+          <a:noFill/>
+          <a:ln w="0">
+            <a:noFill/>
+          </a:ln>
+        </p:spPr>
+        <p:style>
+          <a:lnRef idx="0"/>
+          <a:fillRef idx="0"/>
+          <a:effectRef idx="0"/>
+          <a:fontRef idx="minor"/>
+        </p:style>
+        <p:txBody>
+          <a:bodyPr lIns="90000" rIns="90000" tIns="45000" bIns="45000">
+            <a:noAutofit/>
+          </a:bodyPr>
+          <a:p>
+            <a:pPr algn="ctr">
+              <a:lnSpc>
+                <a:spcPct val="100000"/>
+              </a:lnSpc>
+            </a:pPr>
+            <a:r>
+              <a:rPr b="0" lang="pt-BR" sz="1200" spc="-1" strike="noStrike">
+                <a:solidFill>
+                  <a:srgbClr val="222222"/>
+                </a:solidFill>
+                <a:latin typeface="Nunito Sans"/>
+              </a:rPr>
+              <a:t>Número de propostas vendidas</a:t>
+            </a:r>
+            <a:endParaRPr b="0" lang="pt-BR" sz="1200" spc="-1" strike="noStrike">
+              <a:latin typeface="Arial"/>
+            </a:endParaRPr>
+          </a:p>
+        </p:txBody>
+      </p:sp>
+      <p:sp>
+        <p:nvSpPr>
+          <p:cNvPr id="117" name=""/>
+          <p:cNvSpPr/>
+          <p:nvPr/>
+        </p:nvSpPr>
+        <p:spPr>
+          <a:xfrm>
+            <a:off x="324360" y="2233080"/>
+            <a:ext cx="1619640" cy="470880"/>
+          </a:xfrm>
+          <a:prstGeom prst="rect">
+            <a:avLst/>
+          </a:prstGeom>
+          <a:noFill/>
+          <a:ln w="0">
+            <a:noFill/>
+          </a:ln>
+        </p:spPr>
+        <p:style>
+          <a:lnRef idx="0"/>
+          <a:fillRef idx="0"/>
+          <a:effectRef idx="0"/>
+          <a:fontRef idx="minor"/>
+        </p:style>
+        <p:txBody>
+          <a:bodyPr lIns="90000" rIns="90000" tIns="45000" bIns="45000">
+            <a:noAutofit/>
+          </a:bodyPr>
+          <a:p>
+            <a:pPr algn="ctr">
+              <a:lnSpc>
+                <a:spcPct val="100000"/>
+              </a:lnSpc>
+            </a:pPr>
+            <a:r>
+              <a:rPr b="0" lang="pt-BR" sz="2200" spc="-1" strike="noStrike">
+                <a:solidFill>
+                  <a:srgbClr val="222222"/>
+                </a:solidFill>
+                <a:latin typeface="Nunito Sans Black"/>
+              </a:rPr>
+              <a:t>1.500</a:t>
+            </a:r>
+            <a:endParaRPr b="0" lang="pt-BR" sz="2200" spc="-1" strike="noStrike">
+              <a:latin typeface="Arial"/>
+            </a:endParaRPr>
+          </a:p>
+        </p:txBody>
+      </p:sp>
+      <p:sp>
+        <p:nvSpPr>
+          <p:cNvPr id="118" name=""/>
+          <p:cNvSpPr/>
+          <p:nvPr/>
+        </p:nvSpPr>
+        <p:spPr>
+          <a:xfrm>
+            <a:off x="324360" y="2690280"/>
+            <a:ext cx="1619640" cy="297360"/>
+          </a:xfrm>
+          <a:prstGeom prst="rect">
+            <a:avLst/>
+          </a:prstGeom>
+          <a:noFill/>
+          <a:ln w="0">
+            <a:noFill/>
+          </a:ln>
+        </p:spPr>
+        <p:style>
+          <a:lnRef idx="0"/>
+          <a:fillRef idx="0"/>
+          <a:effectRef idx="0"/>
+          <a:fontRef idx="minor"/>
+        </p:style>
+        <p:txBody>
+          <a:bodyPr lIns="90000" rIns="90000" tIns="45000" bIns="45000">
+            <a:noAutofit/>
+          </a:bodyPr>
+          <a:p>
+            <a:pPr algn="ctr">
+              <a:lnSpc>
+                <a:spcPct val="100000"/>
+              </a:lnSpc>
+            </a:pPr>
+            <a:r>
+              <a:rPr b="0" lang="pt-BR" sz="1200" spc="-1" strike="noStrike">
+                <a:solidFill>
+                  <a:srgbClr val="222222"/>
+                </a:solidFill>
+                <a:latin typeface="Nunito Sans"/>
+              </a:rPr>
+              <a:t>15%</a:t>
+            </a:r>
+            <a:endParaRPr b="0" lang="pt-BR" sz="1200" spc="-1" strike="noStrike">
+              <a:latin typeface="Arial"/>
+            </a:endParaRPr>
+          </a:p>
+        </p:txBody>
+      </p:sp>
+      <p:grpSp>
+        <p:nvGrpSpPr>
+          <p:cNvPr id="119" name=""/>
+          <p:cNvGrpSpPr/>
+          <p:nvPr/>
+        </p:nvGrpSpPr>
+        <p:grpSpPr>
+          <a:xfrm>
+            <a:off x="722160" y="2733480"/>
+            <a:ext cx="132480" cy="178920"/>
+            <a:chOff x="722160" y="2733480"/>
+            <a:chExt cx="132480" cy="178920"/>
+          </a:xfrm>
+        </p:grpSpPr>
+        <p:sp>
+          <p:nvSpPr>
+            <p:cNvPr id="120" name=""/>
+            <p:cNvSpPr/>
+            <p:nvPr/>
+          </p:nvSpPr>
+          <p:spPr>
+            <a:xfrm>
+              <a:off x="755640" y="2779920"/>
+              <a:ext cx="66240" cy="132480"/>
+            </a:xfrm>
+            <a:prstGeom prst="rect">
+              <a:avLst/>
+            </a:prstGeom>
+            <a:solidFill>
+              <a:srgbClr val="81d41a"/>
+            </a:solidFill>
+            <a:ln w="0">
+              <a:solidFill>
+                <a:srgbClr val="5eb91e"/>
+              </a:solidFill>
+            </a:ln>
+          </p:spPr>
+          <p:style>
+            <a:lnRef idx="0"/>
+            <a:fillRef idx="0"/>
+            <a:effectRef idx="0"/>
+            <a:fontRef idx="minor"/>
+          </p:style>
+        </p:sp>
+        <p:sp>
+          <p:nvSpPr>
+            <p:cNvPr id="121" name=""/>
+            <p:cNvSpPr/>
+            <p:nvPr/>
+          </p:nvSpPr>
+          <p:spPr>
+            <a:xfrm>
+              <a:off x="722160" y="2733480"/>
+              <a:ext cx="132480" cy="66240"/>
+            </a:xfrm>
+            <a:custGeom>
+              <a:avLst/>
+              <a:gdLst/>
+              <a:ahLst/>
+              <a:rect l="l" t="t" r="r" b="b"/>
+              <a:pathLst>
+                <a:path w="371" h="187">
+                  <a:moveTo>
+                    <a:pt x="185" y="0"/>
+                  </a:moveTo>
+                  <a:lnTo>
+                    <a:pt x="370" y="186"/>
+                  </a:lnTo>
+                  <a:lnTo>
+                    <a:pt x="0" y="186"/>
+                  </a:lnTo>
+                  <a:lnTo>
+                    <a:pt x="185" y="0"/>
+                  </a:lnTo>
+                </a:path>
+              </a:pathLst>
+            </a:custGeom>
+            <a:solidFill>
+              <a:srgbClr val="81d41a"/>
+            </a:solidFill>
+            <a:ln w="0">
+              <a:noFill/>
+            </a:ln>
+          </p:spPr>
+          <p:style>
+            <a:lnRef idx="0"/>
+            <a:fillRef idx="0"/>
+            <a:effectRef idx="0"/>
+            <a:fontRef idx="minor"/>
+          </p:style>
+        </p:sp>
+      </p:grpSp>
+      <p:sp>
+        <p:nvSpPr>
+          <p:cNvPr id="122" name=""/>
+          <p:cNvSpPr/>
+          <p:nvPr/>
+        </p:nvSpPr>
+        <p:spPr>
+          <a:xfrm>
+            <a:off x="2124360" y="1944000"/>
+            <a:ext cx="1619640" cy="297360"/>
+          </a:xfrm>
+          <a:prstGeom prst="rect">
+            <a:avLst/>
+          </a:prstGeom>
+          <a:noFill/>
+          <a:ln w="0">
+            <a:noFill/>
+          </a:ln>
+        </p:spPr>
+        <p:style>
+          <a:lnRef idx="0"/>
+          <a:fillRef idx="0"/>
+          <a:effectRef idx="0"/>
+          <a:fontRef idx="minor"/>
+        </p:style>
+        <p:txBody>
+          <a:bodyPr lIns="90000" rIns="90000" tIns="45000" bIns="45000">
+            <a:noAutofit/>
+          </a:bodyPr>
+          <a:p>
+            <a:pPr algn="ctr">
+              <a:lnSpc>
+                <a:spcPct val="100000"/>
+              </a:lnSpc>
+            </a:pPr>
+            <a:r>
+              <a:rPr b="0" lang="pt-BR" sz="1200" spc="-1" strike="noStrike">
+                <a:solidFill>
+                  <a:srgbClr val="222222"/>
+                </a:solidFill>
+                <a:latin typeface="Nunito Sans"/>
+              </a:rPr>
+              <a:t>Valor total vendido</a:t>
+            </a:r>
+            <a:endParaRPr b="0" lang="pt-BR" sz="1200" spc="-1" strike="noStrike">
+              <a:latin typeface="Arial"/>
+            </a:endParaRPr>
+          </a:p>
+        </p:txBody>
+      </p:sp>
+      <p:sp>
+        <p:nvSpPr>
+          <p:cNvPr id="123" name=""/>
+          <p:cNvSpPr/>
+          <p:nvPr/>
+        </p:nvSpPr>
+        <p:spPr>
+          <a:xfrm>
+            <a:off x="1980360" y="2233080"/>
+            <a:ext cx="1799640" cy="470880"/>
+          </a:xfrm>
+          <a:prstGeom prst="rect">
+            <a:avLst/>
+          </a:prstGeom>
+          <a:noFill/>
+          <a:ln w="0">
+            <a:noFill/>
+          </a:ln>
+        </p:spPr>
+        <p:style>
+          <a:lnRef idx="0"/>
+          <a:fillRef idx="0"/>
+          <a:effectRef idx="0"/>
+          <a:fontRef idx="minor"/>
+        </p:style>
+        <p:txBody>
+          <a:bodyPr lIns="90000" rIns="90000" tIns="45000" bIns="45000">
+            <a:noAutofit/>
+          </a:bodyPr>
+          <a:p>
+            <a:pPr algn="ctr">
+              <a:lnSpc>
+                <a:spcPct val="100000"/>
+              </a:lnSpc>
+            </a:pPr>
+            <a:r>
+              <a:rPr b="0" lang="pt-BR" sz="2200" spc="-1" strike="noStrike">
+                <a:solidFill>
+                  <a:srgbClr val="222222"/>
+                </a:solidFill>
+                <a:latin typeface="Nunito Sans Black"/>
+              </a:rPr>
+              <a:t>R$ 20 Mil</a:t>
+            </a:r>
+            <a:endParaRPr b="0" lang="pt-BR" sz="2200" spc="-1" strike="noStrike">
+              <a:latin typeface="Arial"/>
+            </a:endParaRPr>
+          </a:p>
+        </p:txBody>
+      </p:sp>
+      <p:sp>
+        <p:nvSpPr>
+          <p:cNvPr id="124" name=""/>
+          <p:cNvSpPr/>
+          <p:nvPr/>
+        </p:nvSpPr>
+        <p:spPr>
+          <a:xfrm>
+            <a:off x="2124360" y="2690280"/>
+            <a:ext cx="1619640" cy="297360"/>
+          </a:xfrm>
+          <a:prstGeom prst="rect">
+            <a:avLst/>
+          </a:prstGeom>
+          <a:noFill/>
+          <a:ln w="0">
+            <a:noFill/>
+          </a:ln>
+        </p:spPr>
+        <p:style>
+          <a:lnRef idx="0"/>
+          <a:fillRef idx="0"/>
+          <a:effectRef idx="0"/>
+          <a:fontRef idx="minor"/>
+        </p:style>
+        <p:txBody>
+          <a:bodyPr lIns="90000" rIns="90000" tIns="45000" bIns="45000">
+            <a:noAutofit/>
+          </a:bodyPr>
+          <a:p>
+            <a:pPr algn="ctr">
+              <a:lnSpc>
+                <a:spcPct val="100000"/>
+              </a:lnSpc>
+            </a:pPr>
+            <a:r>
+              <a:rPr b="0" lang="pt-BR" sz="1200" spc="-1" strike="noStrike">
+                <a:solidFill>
+                  <a:srgbClr val="222222"/>
+                </a:solidFill>
+                <a:latin typeface="Nunito Sans"/>
+              </a:rPr>
+              <a:t>20%</a:t>
+            </a:r>
+            <a:endParaRPr b="0" lang="pt-BR" sz="1200" spc="-1" strike="noStrike">
+              <a:latin typeface="Arial"/>
+            </a:endParaRPr>
+          </a:p>
+        </p:txBody>
+      </p:sp>
+      <p:grpSp>
+        <p:nvGrpSpPr>
+          <p:cNvPr id="125" name=""/>
+          <p:cNvGrpSpPr/>
+          <p:nvPr/>
+        </p:nvGrpSpPr>
+        <p:grpSpPr>
+          <a:xfrm>
+            <a:off x="2522160" y="2733480"/>
+            <a:ext cx="132480" cy="178920"/>
+            <a:chOff x="2522160" y="2733480"/>
+            <a:chExt cx="132480" cy="178920"/>
+          </a:xfrm>
+        </p:grpSpPr>
+        <p:sp>
+          <p:nvSpPr>
+            <p:cNvPr id="126" name=""/>
+            <p:cNvSpPr/>
+            <p:nvPr/>
+          </p:nvSpPr>
+          <p:spPr>
+            <a:xfrm>
+              <a:off x="2555640" y="2779920"/>
+              <a:ext cx="66240" cy="132480"/>
+            </a:xfrm>
+            <a:prstGeom prst="rect">
+              <a:avLst/>
+            </a:prstGeom>
+            <a:solidFill>
+              <a:srgbClr val="81d41a"/>
+            </a:solidFill>
+            <a:ln w="0">
+              <a:solidFill>
+                <a:srgbClr val="5eb91e"/>
+              </a:solidFill>
+            </a:ln>
+          </p:spPr>
+          <p:style>
+            <a:lnRef idx="0"/>
+            <a:fillRef idx="0"/>
+            <a:effectRef idx="0"/>
+            <a:fontRef idx="minor"/>
+          </p:style>
+        </p:sp>
+        <p:sp>
+          <p:nvSpPr>
+            <p:cNvPr id="127" name=""/>
+            <p:cNvSpPr/>
+            <p:nvPr/>
+          </p:nvSpPr>
+          <p:spPr>
+            <a:xfrm>
+              <a:off x="2522160" y="2733480"/>
+              <a:ext cx="132480" cy="66240"/>
+            </a:xfrm>
+            <a:custGeom>
+              <a:avLst/>
+              <a:gdLst/>
+              <a:ahLst/>
+              <a:rect l="l" t="t" r="r" b="b"/>
+              <a:pathLst>
+                <a:path w="371" h="187">
+                  <a:moveTo>
+                    <a:pt x="185" y="0"/>
+                  </a:moveTo>
+                  <a:lnTo>
+                    <a:pt x="370" y="186"/>
+                  </a:lnTo>
+                  <a:lnTo>
+                    <a:pt x="0" y="186"/>
+                  </a:lnTo>
+                  <a:lnTo>
+                    <a:pt x="185" y="0"/>
+                  </a:lnTo>
+                </a:path>
+              </a:pathLst>
+            </a:custGeom>
+            <a:solidFill>
+              <a:srgbClr val="81d41a"/>
+            </a:solidFill>
+            <a:ln w="0">
+              <a:noFill/>
+            </a:ln>
+          </p:spPr>
+          <p:style>
+            <a:lnRef idx="0"/>
+            <a:fillRef idx="0"/>
+            <a:effectRef idx="0"/>
+            <a:fontRef idx="minor"/>
+          </p:style>
+        </p:sp>
+      </p:grpSp>
+      <p:sp>
+        <p:nvSpPr>
+          <p:cNvPr id="128" name=""/>
+          <p:cNvSpPr/>
+          <p:nvPr/>
+        </p:nvSpPr>
+        <p:spPr>
+          <a:xfrm>
+            <a:off x="5364360" y="2098080"/>
+            <a:ext cx="1619640" cy="504720"/>
+          </a:xfrm>
+          <a:prstGeom prst="rect">
+            <a:avLst/>
+          </a:prstGeom>
+          <a:noFill/>
+          <a:ln w="0">
+            <a:noFill/>
+          </a:ln>
+        </p:spPr>
+        <p:style>
+          <a:lnRef idx="0"/>
+          <a:fillRef idx="0"/>
+          <a:effectRef idx="0"/>
+          <a:fontRef idx="minor"/>
+        </p:style>
+        <p:txBody>
+          <a:bodyPr lIns="90000" rIns="90000" tIns="45000" bIns="45000">
+            <a:noAutofit/>
+          </a:bodyPr>
+          <a:p>
+            <a:pPr algn="ctr">
+              <a:lnSpc>
+                <a:spcPct val="100000"/>
+              </a:lnSpc>
+            </a:pPr>
+            <a:r>
+              <a:rPr b="0" lang="pt-BR" sz="1200" spc="-1" strike="noStrike">
+                <a:solidFill>
+                  <a:srgbClr val="222222"/>
+                </a:solidFill>
+                <a:latin typeface="Nunito Sans"/>
+              </a:rPr>
+              <a:t>Taxa de conversão geral</a:t>
+            </a:r>
+            <a:endParaRPr b="0" lang="pt-BR" sz="1200" spc="-1" strike="noStrike">
+              <a:latin typeface="Arial"/>
+            </a:endParaRPr>
+          </a:p>
+        </p:txBody>
+      </p:sp>
+      <p:sp>
+        <p:nvSpPr>
+          <p:cNvPr id="129" name=""/>
+          <p:cNvSpPr/>
+          <p:nvPr/>
+        </p:nvSpPr>
+        <p:spPr>
+          <a:xfrm>
+            <a:off x="5364360" y="2603160"/>
+            <a:ext cx="1619640" cy="470880"/>
+          </a:xfrm>
+          <a:prstGeom prst="rect">
+            <a:avLst/>
+          </a:prstGeom>
+          <a:noFill/>
+          <a:ln w="0">
+            <a:noFill/>
+          </a:ln>
+        </p:spPr>
+        <p:style>
+          <a:lnRef idx="0"/>
+          <a:fillRef idx="0"/>
+          <a:effectRef idx="0"/>
+          <a:fontRef idx="minor"/>
+        </p:style>
+        <p:txBody>
+          <a:bodyPr lIns="90000" rIns="90000" tIns="45000" bIns="45000">
+            <a:noAutofit/>
+          </a:bodyPr>
+          <a:p>
+            <a:pPr algn="ctr">
+              <a:lnSpc>
+                <a:spcPct val="100000"/>
+              </a:lnSpc>
+            </a:pPr>
+            <a:r>
+              <a:rPr b="0" lang="pt-BR" sz="2200" spc="-1" strike="noStrike">
+                <a:solidFill>
+                  <a:srgbClr val="222222"/>
+                </a:solidFill>
+                <a:latin typeface="Nunito Sans Black"/>
+              </a:rPr>
+              <a:t>60%</a:t>
+            </a:r>
+            <a:endParaRPr b="0" lang="pt-BR" sz="2200" spc="-1" strike="noStrike">
+              <a:latin typeface="Arial"/>
+            </a:endParaRPr>
+          </a:p>
+        </p:txBody>
+      </p:sp>
+      <p:sp>
+        <p:nvSpPr>
+          <p:cNvPr id="130" name=""/>
+          <p:cNvSpPr/>
+          <p:nvPr/>
+        </p:nvSpPr>
+        <p:spPr>
+          <a:xfrm>
+            <a:off x="5364360" y="3060360"/>
+            <a:ext cx="1619640" cy="297360"/>
+          </a:xfrm>
+          <a:prstGeom prst="rect">
+            <a:avLst/>
+          </a:prstGeom>
+          <a:noFill/>
+          <a:ln w="0">
+            <a:noFill/>
+          </a:ln>
+        </p:spPr>
+        <p:style>
+          <a:lnRef idx="0"/>
+          <a:fillRef idx="0"/>
+          <a:effectRef idx="0"/>
+          <a:fontRef idx="minor"/>
+        </p:style>
+        <p:txBody>
+          <a:bodyPr lIns="90000" rIns="90000" tIns="45000" bIns="45000">
+            <a:noAutofit/>
+          </a:bodyPr>
+          <a:p>
+            <a:pPr algn="ctr">
+              <a:lnSpc>
+                <a:spcPct val="100000"/>
+              </a:lnSpc>
+            </a:pPr>
+            <a:r>
+              <a:rPr b="0" lang="pt-BR" sz="1200" spc="-1" strike="noStrike">
+                <a:solidFill>
+                  <a:srgbClr val="222222"/>
+                </a:solidFill>
+                <a:latin typeface="Nunito Sans"/>
+              </a:rPr>
+              <a:t>15 p.p.</a:t>
+            </a:r>
+            <a:endParaRPr b="0" lang="pt-BR" sz="1200" spc="-1" strike="noStrike">
+              <a:latin typeface="Arial"/>
+            </a:endParaRPr>
+          </a:p>
+        </p:txBody>
+      </p:sp>
+      <p:grpSp>
+        <p:nvGrpSpPr>
+          <p:cNvPr id="131" name=""/>
+          <p:cNvGrpSpPr/>
+          <p:nvPr/>
+        </p:nvGrpSpPr>
+        <p:grpSpPr>
+          <a:xfrm>
+            <a:off x="5762160" y="3103560"/>
+            <a:ext cx="132480" cy="178920"/>
+            <a:chOff x="5762160" y="3103560"/>
+            <a:chExt cx="132480" cy="178920"/>
+          </a:xfrm>
+        </p:grpSpPr>
+        <p:sp>
+          <p:nvSpPr>
+            <p:cNvPr id="132" name=""/>
+            <p:cNvSpPr/>
+            <p:nvPr/>
+          </p:nvSpPr>
+          <p:spPr>
+            <a:xfrm>
+              <a:off x="5795640" y="3150000"/>
+              <a:ext cx="66240" cy="132480"/>
+            </a:xfrm>
+            <a:prstGeom prst="rect">
+              <a:avLst/>
+            </a:prstGeom>
+            <a:solidFill>
+              <a:srgbClr val="81d41a"/>
+            </a:solidFill>
+            <a:ln w="0">
+              <a:solidFill>
+                <a:srgbClr val="5eb91e"/>
+              </a:solidFill>
+            </a:ln>
+          </p:spPr>
+          <p:style>
+            <a:lnRef idx="0"/>
+            <a:fillRef idx="0"/>
+            <a:effectRef idx="0"/>
+            <a:fontRef idx="minor"/>
+          </p:style>
+        </p:sp>
+        <p:sp>
+          <p:nvSpPr>
+            <p:cNvPr id="133" name=""/>
+            <p:cNvSpPr/>
+            <p:nvPr/>
+          </p:nvSpPr>
+          <p:spPr>
+            <a:xfrm>
+              <a:off x="5762160" y="3103560"/>
+              <a:ext cx="132480" cy="66240"/>
+            </a:xfrm>
+            <a:custGeom>
+              <a:avLst/>
+              <a:gdLst/>
+              <a:ahLst/>
+              <a:rect l="l" t="t" r="r" b="b"/>
+              <a:pathLst>
+                <a:path w="371" h="187">
+                  <a:moveTo>
+                    <a:pt x="185" y="0"/>
+                  </a:moveTo>
+                  <a:lnTo>
+                    <a:pt x="370" y="186"/>
+                  </a:lnTo>
+                  <a:lnTo>
+                    <a:pt x="0" y="186"/>
+                  </a:lnTo>
+                  <a:lnTo>
+                    <a:pt x="185" y="0"/>
+                  </a:lnTo>
+                </a:path>
+              </a:pathLst>
+            </a:custGeom>
+            <a:solidFill>
+              <a:srgbClr val="81d41a"/>
+            </a:solidFill>
+            <a:ln w="0">
+              <a:noFill/>
+            </a:ln>
+          </p:spPr>
+          <p:style>
+            <a:lnRef idx="0"/>
+            <a:fillRef idx="0"/>
+            <a:effectRef idx="0"/>
+            <a:fontRef idx="minor"/>
+          </p:style>
+        </p:sp>
+      </p:grpSp>
+      <p:sp>
+        <p:nvSpPr>
+          <p:cNvPr id="134" name=""/>
+          <p:cNvSpPr/>
+          <p:nvPr/>
+        </p:nvSpPr>
+        <p:spPr>
+          <a:xfrm>
+            <a:off x="7164360" y="2098080"/>
+            <a:ext cx="1619640" cy="504720"/>
+          </a:xfrm>
+          <a:prstGeom prst="rect">
+            <a:avLst/>
+          </a:prstGeom>
+          <a:noFill/>
+          <a:ln w="0">
+            <a:noFill/>
+          </a:ln>
+        </p:spPr>
+        <p:style>
+          <a:lnRef idx="0"/>
+          <a:fillRef idx="0"/>
+          <a:effectRef idx="0"/>
+          <a:fontRef idx="minor"/>
+        </p:style>
+        <p:txBody>
+          <a:bodyPr lIns="90000" rIns="90000" tIns="45000" bIns="45000">
+            <a:noAutofit/>
+          </a:bodyPr>
+          <a:p>
+            <a:pPr algn="ctr">
+              <a:lnSpc>
+                <a:spcPct val="100000"/>
+              </a:lnSpc>
+            </a:pPr>
+            <a:r>
+              <a:rPr b="0" lang="pt-BR" sz="1200" spc="-1" strike="noStrike">
+                <a:solidFill>
+                  <a:srgbClr val="222222"/>
+                </a:solidFill>
+                <a:latin typeface="Nunito Sans"/>
+              </a:rPr>
+              <a:t>Taxa de sucesso nas chamadas de API</a:t>
+            </a:r>
+            <a:endParaRPr b="0" lang="pt-BR" sz="1200" spc="-1" strike="noStrike">
+              <a:latin typeface="Arial"/>
+            </a:endParaRPr>
+          </a:p>
+        </p:txBody>
+      </p:sp>
+      <p:sp>
+        <p:nvSpPr>
+          <p:cNvPr id="135" name=""/>
+          <p:cNvSpPr/>
+          <p:nvPr/>
+        </p:nvSpPr>
+        <p:spPr>
+          <a:xfrm>
+            <a:off x="7020360" y="2603160"/>
+            <a:ext cx="1799640" cy="470880"/>
+          </a:xfrm>
+          <a:prstGeom prst="rect">
+            <a:avLst/>
+          </a:prstGeom>
+          <a:noFill/>
+          <a:ln w="0">
+            <a:noFill/>
+          </a:ln>
+        </p:spPr>
+        <p:style>
+          <a:lnRef idx="0"/>
+          <a:fillRef idx="0"/>
+          <a:effectRef idx="0"/>
+          <a:fontRef idx="minor"/>
+        </p:style>
+        <p:txBody>
+          <a:bodyPr lIns="90000" rIns="90000" tIns="45000" bIns="45000">
+            <a:noAutofit/>
+          </a:bodyPr>
+          <a:p>
+            <a:pPr algn="ctr">
+              <a:lnSpc>
+                <a:spcPct val="100000"/>
+              </a:lnSpc>
+            </a:pPr>
+            <a:r>
+              <a:rPr b="0" lang="pt-BR" sz="2200" spc="-1" strike="noStrike">
+                <a:solidFill>
+                  <a:srgbClr val="222222"/>
+                </a:solidFill>
+                <a:latin typeface="Nunito Sans Black"/>
+              </a:rPr>
+              <a:t>90%</a:t>
+            </a:r>
+            <a:endParaRPr b="0" lang="pt-BR" sz="2200" spc="-1" strike="noStrike">
+              <a:latin typeface="Arial"/>
+            </a:endParaRPr>
+          </a:p>
+        </p:txBody>
+      </p:sp>
+      <p:sp>
+        <p:nvSpPr>
+          <p:cNvPr id="136" name=""/>
+          <p:cNvSpPr/>
+          <p:nvPr/>
+        </p:nvSpPr>
+        <p:spPr>
+          <a:xfrm>
+            <a:off x="7164360" y="3060360"/>
+            <a:ext cx="1619640" cy="297360"/>
+          </a:xfrm>
+          <a:prstGeom prst="rect">
+            <a:avLst/>
+          </a:prstGeom>
+          <a:noFill/>
+          <a:ln w="0">
+            <a:noFill/>
+          </a:ln>
+        </p:spPr>
+        <p:style>
+          <a:lnRef idx="0"/>
+          <a:fillRef idx="0"/>
+          <a:effectRef idx="0"/>
+          <a:fontRef idx="minor"/>
+        </p:style>
+        <p:txBody>
+          <a:bodyPr lIns="90000" rIns="90000" tIns="45000" bIns="45000">
+            <a:noAutofit/>
+          </a:bodyPr>
+          <a:p>
+            <a:pPr algn="ctr">
+              <a:lnSpc>
+                <a:spcPct val="100000"/>
+              </a:lnSpc>
+            </a:pPr>
+            <a:r>
+              <a:rPr b="0" lang="pt-BR" sz="1200" spc="-1" strike="noStrike">
+                <a:solidFill>
+                  <a:srgbClr val="222222"/>
+                </a:solidFill>
+                <a:latin typeface="Nunito Sans"/>
+              </a:rPr>
+              <a:t>40 p.p.</a:t>
+            </a:r>
+            <a:endParaRPr b="0" lang="pt-BR" sz="1200" spc="-1" strike="noStrike">
+              <a:latin typeface="Arial"/>
+            </a:endParaRPr>
+          </a:p>
+        </p:txBody>
+      </p:sp>
+      <p:grpSp>
+        <p:nvGrpSpPr>
+          <p:cNvPr id="137" name=""/>
+          <p:cNvGrpSpPr/>
+          <p:nvPr/>
+        </p:nvGrpSpPr>
+        <p:grpSpPr>
+          <a:xfrm>
+            <a:off x="7562160" y="3103560"/>
+            <a:ext cx="132480" cy="178920"/>
+            <a:chOff x="7562160" y="3103560"/>
+            <a:chExt cx="132480" cy="178920"/>
+          </a:xfrm>
+        </p:grpSpPr>
+        <p:sp>
+          <p:nvSpPr>
+            <p:cNvPr id="138" name=""/>
+            <p:cNvSpPr/>
+            <p:nvPr/>
+          </p:nvSpPr>
+          <p:spPr>
+            <a:xfrm>
+              <a:off x="7595640" y="3150000"/>
+              <a:ext cx="66240" cy="132480"/>
+            </a:xfrm>
+            <a:prstGeom prst="rect">
+              <a:avLst/>
+            </a:prstGeom>
+            <a:solidFill>
+              <a:srgbClr val="81d41a"/>
+            </a:solidFill>
+            <a:ln w="0">
+              <a:solidFill>
+                <a:srgbClr val="5eb91e"/>
+              </a:solidFill>
+            </a:ln>
+          </p:spPr>
+          <p:style>
+            <a:lnRef idx="0"/>
+            <a:fillRef idx="0"/>
+            <a:effectRef idx="0"/>
+            <a:fontRef idx="minor"/>
+          </p:style>
+        </p:sp>
+        <p:sp>
+          <p:nvSpPr>
+            <p:cNvPr id="139" name=""/>
+            <p:cNvSpPr/>
+            <p:nvPr/>
+          </p:nvSpPr>
+          <p:spPr>
+            <a:xfrm>
+              <a:off x="7562160" y="3103560"/>
+              <a:ext cx="132480" cy="66240"/>
+            </a:xfrm>
+            <a:custGeom>
+              <a:avLst/>
+              <a:gdLst/>
+              <a:ahLst/>
+              <a:rect l="l" t="t" r="r" b="b"/>
+              <a:pathLst>
+                <a:path w="371" h="187">
+                  <a:moveTo>
+                    <a:pt x="185" y="0"/>
+                  </a:moveTo>
+                  <a:lnTo>
+                    <a:pt x="370" y="186"/>
+                  </a:lnTo>
+                  <a:lnTo>
+                    <a:pt x="0" y="186"/>
+                  </a:lnTo>
+                  <a:lnTo>
+                    <a:pt x="185" y="0"/>
+                  </a:lnTo>
+                </a:path>
+              </a:pathLst>
+            </a:custGeom>
+            <a:solidFill>
+              <a:srgbClr val="81d41a"/>
+            </a:solidFill>
+            <a:ln w="0">
+              <a:noFill/>
+            </a:ln>
+          </p:spPr>
+          <p:style>
+            <a:lnRef idx="0"/>
+            <a:fillRef idx="0"/>
+            <a:effectRef idx="0"/>
+            <a:fontRef idx="minor"/>
+          </p:style>
+        </p:sp>
+      </p:grpSp>
+      <p:sp>
+        <p:nvSpPr>
+          <p:cNvPr id="140" name=""/>
+          <p:cNvSpPr/>
+          <p:nvPr/>
+        </p:nvSpPr>
+        <p:spPr>
+          <a:xfrm>
+            <a:off x="792360" y="3384000"/>
+            <a:ext cx="1619640" cy="297360"/>
+          </a:xfrm>
+          <a:prstGeom prst="rect">
+            <a:avLst/>
+          </a:prstGeom>
+          <a:noFill/>
+          <a:ln w="0">
+            <a:noFill/>
+          </a:ln>
+        </p:spPr>
+        <p:style>
+          <a:lnRef idx="0"/>
+          <a:fillRef idx="0"/>
+          <a:effectRef idx="0"/>
+          <a:fontRef idx="minor"/>
+        </p:style>
+        <p:txBody>
+          <a:bodyPr lIns="90000" rIns="90000" tIns="45000" bIns="45000">
+            <a:noAutofit/>
+          </a:bodyPr>
+          <a:p>
+            <a:pPr algn="ctr">
+              <a:lnSpc>
+                <a:spcPct val="100000"/>
+              </a:lnSpc>
+            </a:pPr>
+            <a:r>
+              <a:rPr b="0" lang="pt-BR" sz="1200" spc="-1" strike="noStrike">
+                <a:solidFill>
+                  <a:srgbClr val="222222"/>
+                </a:solidFill>
+                <a:latin typeface="Nunito Sans"/>
+              </a:rPr>
+              <a:t>Consignado</a:t>
+            </a:r>
+            <a:endParaRPr b="0" lang="pt-BR" sz="1200" spc="-1" strike="noStrike">
+              <a:latin typeface="Arial"/>
+            </a:endParaRPr>
+          </a:p>
+        </p:txBody>
+      </p:sp>
+      <p:sp>
+        <p:nvSpPr>
+          <p:cNvPr id="141" name=""/>
+          <p:cNvSpPr/>
+          <p:nvPr/>
+        </p:nvSpPr>
+        <p:spPr>
+          <a:xfrm>
+            <a:off x="648360" y="3709080"/>
+            <a:ext cx="1799640" cy="470880"/>
+          </a:xfrm>
+          <a:prstGeom prst="rect">
+            <a:avLst/>
+          </a:prstGeom>
+          <a:noFill/>
+          <a:ln w="0">
+            <a:noFill/>
+          </a:ln>
+        </p:spPr>
+        <p:style>
+          <a:lnRef idx="0"/>
+          <a:fillRef idx="0"/>
+          <a:effectRef idx="0"/>
+          <a:fontRef idx="minor"/>
+        </p:style>
+        <p:txBody>
+          <a:bodyPr lIns="90000" rIns="90000" tIns="45000" bIns="45000">
+            <a:noAutofit/>
+          </a:bodyPr>
+          <a:p>
+            <a:pPr algn="ctr">
+              <a:lnSpc>
+                <a:spcPct val="100000"/>
+              </a:lnSpc>
+            </a:pPr>
+            <a:r>
+              <a:rPr b="0" lang="pt-BR" sz="2200" spc="-1" strike="noStrike">
+                <a:solidFill>
+                  <a:srgbClr val="222222"/>
+                </a:solidFill>
+                <a:latin typeface="Nunito Sans Black"/>
+              </a:rPr>
+              <a:t>R$ 8 Mil</a:t>
+            </a:r>
+            <a:endParaRPr b="0" lang="pt-BR" sz="2200" spc="-1" strike="noStrike">
+              <a:latin typeface="Arial"/>
+            </a:endParaRPr>
+          </a:p>
+        </p:txBody>
+      </p:sp>
+      <p:sp>
+        <p:nvSpPr>
+          <p:cNvPr id="142" name=""/>
+          <p:cNvSpPr/>
+          <p:nvPr/>
+        </p:nvSpPr>
+        <p:spPr>
+          <a:xfrm>
+            <a:off x="792360" y="4166280"/>
+            <a:ext cx="1619640" cy="297360"/>
+          </a:xfrm>
+          <a:prstGeom prst="rect">
+            <a:avLst/>
+          </a:prstGeom>
+          <a:noFill/>
+          <a:ln w="0">
+            <a:noFill/>
+          </a:ln>
+        </p:spPr>
+        <p:style>
+          <a:lnRef idx="0"/>
+          <a:fillRef idx="0"/>
+          <a:effectRef idx="0"/>
+          <a:fontRef idx="minor"/>
+        </p:style>
+        <p:txBody>
+          <a:bodyPr lIns="90000" rIns="90000" tIns="45000" bIns="45000">
+            <a:noAutofit/>
+          </a:bodyPr>
+          <a:p>
+            <a:pPr algn="ctr">
+              <a:lnSpc>
+                <a:spcPct val="100000"/>
+              </a:lnSpc>
+            </a:pPr>
+            <a:r>
+              <a:rPr b="0" lang="pt-BR" sz="1200" spc="-1" strike="noStrike">
+                <a:solidFill>
+                  <a:srgbClr val="222222"/>
+                </a:solidFill>
+                <a:latin typeface="Nunito Sans"/>
+              </a:rPr>
+              <a:t>5%</a:t>
+            </a:r>
+            <a:endParaRPr b="0" lang="pt-BR" sz="1200" spc="-1" strike="noStrike">
+              <a:latin typeface="Arial"/>
+            </a:endParaRPr>
+          </a:p>
+        </p:txBody>
+      </p:sp>
+      <p:grpSp>
+        <p:nvGrpSpPr>
+          <p:cNvPr id="143" name=""/>
+          <p:cNvGrpSpPr/>
+          <p:nvPr/>
+        </p:nvGrpSpPr>
+        <p:grpSpPr>
+          <a:xfrm>
+            <a:off x="1262160" y="4209120"/>
+            <a:ext cx="132480" cy="178920"/>
+            <a:chOff x="1262160" y="4209120"/>
+            <a:chExt cx="132480" cy="178920"/>
+          </a:xfrm>
+        </p:grpSpPr>
+        <p:sp>
+          <p:nvSpPr>
+            <p:cNvPr id="144" name=""/>
+            <p:cNvSpPr/>
+            <p:nvPr/>
+          </p:nvSpPr>
+          <p:spPr>
+            <a:xfrm flipV="1">
+              <a:off x="1295640" y="4209120"/>
+              <a:ext cx="66240" cy="132480"/>
+            </a:xfrm>
+            <a:prstGeom prst="rect">
+              <a:avLst/>
+            </a:prstGeom>
+            <a:solidFill>
+              <a:srgbClr val="fc2626"/>
+            </a:solidFill>
+            <a:ln w="0">
+              <a:solidFill>
+                <a:srgbClr val="fc2626"/>
+              </a:solidFill>
+            </a:ln>
+          </p:spPr>
+          <p:style>
+            <a:lnRef idx="0"/>
+            <a:fillRef idx="0"/>
+            <a:effectRef idx="0"/>
+            <a:fontRef idx="minor"/>
+          </p:style>
+        </p:sp>
+        <p:sp>
+          <p:nvSpPr>
+            <p:cNvPr id="145" name=""/>
+            <p:cNvSpPr/>
+            <p:nvPr/>
+          </p:nvSpPr>
+          <p:spPr>
+            <a:xfrm>
+              <a:off x="1262160" y="4321800"/>
+              <a:ext cx="132480" cy="66240"/>
+            </a:xfrm>
+            <a:custGeom>
+              <a:avLst/>
+              <a:gdLst/>
+              <a:ahLst/>
+              <a:rect l="l" t="t" r="r" b="b"/>
+              <a:pathLst>
+                <a:path w="371" h="187">
+                  <a:moveTo>
+                    <a:pt x="185" y="186"/>
+                  </a:moveTo>
+                  <a:lnTo>
+                    <a:pt x="370" y="0"/>
+                  </a:lnTo>
+                  <a:lnTo>
+                    <a:pt x="0" y="0"/>
+                  </a:lnTo>
+                  <a:lnTo>
+                    <a:pt x="185" y="186"/>
+                  </a:lnTo>
+                </a:path>
+              </a:pathLst>
+            </a:custGeom>
+            <a:solidFill>
+              <a:srgbClr val="fc2626"/>
+            </a:solidFill>
+            <a:ln w="0">
+              <a:noFill/>
+            </a:ln>
+          </p:spPr>
+          <p:style>
+            <a:lnRef idx="0"/>
+            <a:fillRef idx="0"/>
+            <a:effectRef idx="0"/>
+            <a:fontRef idx="minor"/>
+          </p:style>
+        </p:sp>
+      </p:grpSp>
+      <p:sp>
+        <p:nvSpPr>
+          <p:cNvPr id="146" name=""/>
+          <p:cNvSpPr/>
+          <p:nvPr/>
+        </p:nvSpPr>
+        <p:spPr>
+          <a:xfrm>
+            <a:off x="3132360" y="3204000"/>
+            <a:ext cx="1619640" cy="504720"/>
+          </a:xfrm>
+          <a:prstGeom prst="rect">
+            <a:avLst/>
+          </a:prstGeom>
+          <a:noFill/>
+          <a:ln w="0">
+            <a:noFill/>
+          </a:ln>
+        </p:spPr>
+        <p:style>
+          <a:lnRef idx="0"/>
+          <a:fillRef idx="0"/>
+          <a:effectRef idx="0"/>
+          <a:fontRef idx="minor"/>
+        </p:style>
+        <p:txBody>
+          <a:bodyPr lIns="90000" rIns="90000" tIns="45000" bIns="45000">
+            <a:noAutofit/>
+          </a:bodyPr>
+          <a:p>
+            <a:pPr algn="ctr">
+              <a:lnSpc>
+                <a:spcPct val="100000"/>
+              </a:lnSpc>
+            </a:pPr>
+            <a:r>
+              <a:rPr b="0" lang="pt-BR" sz="1200" spc="-1" strike="noStrike">
+                <a:solidFill>
+                  <a:srgbClr val="222222"/>
+                </a:solidFill>
+                <a:latin typeface="Nunito Sans"/>
+              </a:rPr>
+              <a:t>Com garantia</a:t>
+            </a:r>
+            <a:endParaRPr b="0" lang="pt-BR" sz="1200" spc="-1" strike="noStrike">
+              <a:latin typeface="Arial"/>
+            </a:endParaRPr>
+          </a:p>
+          <a:p>
+            <a:pPr algn="ctr">
+              <a:lnSpc>
+                <a:spcPct val="100000"/>
+              </a:lnSpc>
+            </a:pPr>
+            <a:r>
+              <a:rPr b="0" lang="pt-BR" sz="1200" spc="-1" strike="noStrike">
+                <a:solidFill>
+                  <a:srgbClr val="222222"/>
+                </a:solidFill>
+                <a:latin typeface="Nunito Sans"/>
+              </a:rPr>
+              <a:t>sobre veículos</a:t>
+            </a:r>
+            <a:endParaRPr b="0" lang="pt-BR" sz="1200" spc="-1" strike="noStrike">
+              <a:latin typeface="Arial"/>
+            </a:endParaRPr>
+          </a:p>
+        </p:txBody>
+      </p:sp>
+      <p:sp>
+        <p:nvSpPr>
+          <p:cNvPr id="147" name=""/>
+          <p:cNvSpPr/>
+          <p:nvPr/>
+        </p:nvSpPr>
+        <p:spPr>
+          <a:xfrm>
+            <a:off x="2988360" y="3709080"/>
+            <a:ext cx="1799640" cy="470880"/>
+          </a:xfrm>
+          <a:prstGeom prst="rect">
+            <a:avLst/>
+          </a:prstGeom>
+          <a:noFill/>
+          <a:ln w="0">
+            <a:noFill/>
+          </a:ln>
+        </p:spPr>
+        <p:style>
+          <a:lnRef idx="0"/>
+          <a:fillRef idx="0"/>
+          <a:effectRef idx="0"/>
+          <a:fontRef idx="minor"/>
+        </p:style>
+        <p:txBody>
+          <a:bodyPr lIns="90000" rIns="90000" tIns="45000" bIns="45000">
+            <a:noAutofit/>
+          </a:bodyPr>
+          <a:p>
+            <a:pPr algn="ctr">
+              <a:lnSpc>
+                <a:spcPct val="100000"/>
+              </a:lnSpc>
+            </a:pPr>
+            <a:r>
+              <a:rPr b="0" lang="pt-BR" sz="2200" spc="-1" strike="noStrike">
+                <a:solidFill>
+                  <a:srgbClr val="222222"/>
+                </a:solidFill>
+                <a:latin typeface="Nunito Sans Black"/>
+              </a:rPr>
+              <a:t>R$ 12 Mil</a:t>
+            </a:r>
+            <a:endParaRPr b="0" lang="pt-BR" sz="2200" spc="-1" strike="noStrike">
+              <a:latin typeface="Arial"/>
+            </a:endParaRPr>
+          </a:p>
+        </p:txBody>
+      </p:sp>
+      <p:sp>
+        <p:nvSpPr>
+          <p:cNvPr id="148" name=""/>
+          <p:cNvSpPr/>
+          <p:nvPr/>
+        </p:nvSpPr>
+        <p:spPr>
+          <a:xfrm>
+            <a:off x="3132360" y="4166280"/>
+            <a:ext cx="1619640" cy="297360"/>
+          </a:xfrm>
+          <a:prstGeom prst="rect">
+            <a:avLst/>
+          </a:prstGeom>
+          <a:noFill/>
+          <a:ln w="0">
+            <a:noFill/>
+          </a:ln>
+        </p:spPr>
+        <p:style>
+          <a:lnRef idx="0"/>
+          <a:fillRef idx="0"/>
+          <a:effectRef idx="0"/>
+          <a:fontRef idx="minor"/>
+        </p:style>
+        <p:txBody>
+          <a:bodyPr lIns="90000" rIns="90000" tIns="45000" bIns="45000">
+            <a:noAutofit/>
+          </a:bodyPr>
+          <a:p>
+            <a:pPr algn="ctr">
+              <a:lnSpc>
+                <a:spcPct val="100000"/>
+              </a:lnSpc>
+            </a:pPr>
+            <a:r>
+              <a:rPr b="0" lang="pt-BR" sz="1200" spc="-1" strike="noStrike">
+                <a:solidFill>
+                  <a:srgbClr val="222222"/>
+                </a:solidFill>
+                <a:latin typeface="Nunito Sans"/>
+              </a:rPr>
+              <a:t>100%</a:t>
+            </a:r>
+            <a:endParaRPr b="0" lang="pt-BR" sz="1200" spc="-1" strike="noStrike">
+              <a:latin typeface="Arial"/>
+            </a:endParaRPr>
+          </a:p>
+        </p:txBody>
+      </p:sp>
+      <p:grpSp>
+        <p:nvGrpSpPr>
+          <p:cNvPr id="149" name=""/>
+          <p:cNvGrpSpPr/>
+          <p:nvPr/>
+        </p:nvGrpSpPr>
+        <p:grpSpPr>
+          <a:xfrm>
+            <a:off x="3530160" y="4209480"/>
+            <a:ext cx="132480" cy="178920"/>
+            <a:chOff x="3530160" y="4209480"/>
+            <a:chExt cx="132480" cy="178920"/>
+          </a:xfrm>
+        </p:grpSpPr>
+        <p:sp>
+          <p:nvSpPr>
+            <p:cNvPr id="150" name=""/>
+            <p:cNvSpPr/>
+            <p:nvPr/>
+          </p:nvSpPr>
+          <p:spPr>
+            <a:xfrm>
+              <a:off x="3563640" y="4255920"/>
+              <a:ext cx="66240" cy="132480"/>
+            </a:xfrm>
+            <a:prstGeom prst="rect">
+              <a:avLst/>
+            </a:prstGeom>
+            <a:solidFill>
+              <a:srgbClr val="81d41a"/>
+            </a:solidFill>
+            <a:ln w="0">
+              <a:solidFill>
+                <a:srgbClr val="5eb91e"/>
+              </a:solidFill>
+            </a:ln>
+          </p:spPr>
+          <p:style>
+            <a:lnRef idx="0"/>
+            <a:fillRef idx="0"/>
+            <a:effectRef idx="0"/>
+            <a:fontRef idx="minor"/>
+          </p:style>
+        </p:sp>
+        <p:sp>
+          <p:nvSpPr>
+            <p:cNvPr id="151" name=""/>
+            <p:cNvSpPr/>
+            <p:nvPr/>
+          </p:nvSpPr>
+          <p:spPr>
+            <a:xfrm>
+              <a:off x="3530160" y="4209480"/>
+              <a:ext cx="132480" cy="66240"/>
+            </a:xfrm>
+            <a:custGeom>
+              <a:avLst/>
+              <a:gdLst/>
+              <a:ahLst/>
+              <a:rect l="l" t="t" r="r" b="b"/>
+              <a:pathLst>
+                <a:path w="371" h="187">
+                  <a:moveTo>
+                    <a:pt x="185" y="0"/>
+                  </a:moveTo>
+                  <a:lnTo>
+                    <a:pt x="370" y="186"/>
+                  </a:lnTo>
+                  <a:lnTo>
+                    <a:pt x="0" y="186"/>
+                  </a:lnTo>
+                  <a:lnTo>
+                    <a:pt x="185" y="0"/>
+                  </a:lnTo>
+                </a:path>
+              </a:pathLst>
+            </a:custGeom>
+            <a:solidFill>
+              <a:srgbClr val="81d41a"/>
+            </a:solidFill>
+            <a:ln w="0">
+              <a:noFill/>
+            </a:ln>
+          </p:spPr>
+          <p:style>
+            <a:lnRef idx="0"/>
+            <a:fillRef idx="0"/>
+            <a:effectRef idx="0"/>
+            <a:fontRef idx="minor"/>
+          </p:style>
+        </p:sp>
+      </p:grpSp>
+      <p:sp>
+        <p:nvSpPr>
+          <p:cNvPr id="152" name=""/>
+          <p:cNvSpPr/>
+          <p:nvPr/>
+        </p:nvSpPr>
+        <p:spPr>
+          <a:xfrm>
+            <a:off x="3168360" y="2952000"/>
+            <a:ext cx="287640" cy="287640"/>
+          </a:xfrm>
+          <a:prstGeom prst="line">
+            <a:avLst/>
+          </a:prstGeom>
+          <a:ln w="36000">
+            <a:solidFill>
+              <a:srgbClr val="222222"/>
+            </a:solidFill>
+            <a:round/>
+            <a:tailEnd len="med" type="triangle" w="med"/>
+          </a:ln>
+        </p:spPr>
+        <p:style>
+          <a:lnRef idx="0"/>
+          <a:fillRef idx="0"/>
+          <a:effectRef idx="0"/>
+          <a:fontRef idx="minor"/>
+        </p:style>
+      </p:sp>
+      <p:sp>
+        <p:nvSpPr>
+          <p:cNvPr id="153" name=""/>
+          <p:cNvSpPr/>
+          <p:nvPr/>
+        </p:nvSpPr>
+        <p:spPr>
+          <a:xfrm flipH="1">
+            <a:off x="2090880" y="2964960"/>
+            <a:ext cx="432000" cy="525600"/>
+          </a:xfrm>
+          <a:prstGeom prst="line">
+            <a:avLst/>
+          </a:prstGeom>
+          <a:ln w="36000">
+            <a:solidFill>
+              <a:srgbClr val="222222"/>
+            </a:solidFill>
+            <a:round/>
+            <a:tailEnd len="med" type="triangle" w="med"/>
+          </a:ln>
+        </p:spPr>
+        <p:style>
+          <a:lnRef idx="0"/>
+          <a:fillRef idx="0"/>
+          <a:effectRef idx="0"/>
+          <a:fontRef idx="minor"/>
+        </p:style>
+      </p:sp>
+      <p:sp>
+        <p:nvSpPr>
+          <p:cNvPr id="154" name=""/>
+          <p:cNvSpPr/>
+          <p:nvPr/>
+        </p:nvSpPr>
+        <p:spPr>
+          <a:xfrm>
+            <a:off x="5544360" y="1080000"/>
+            <a:ext cx="3240000" cy="1620000"/>
+          </a:xfrm>
+          <a:prstGeom prst="rect">
+            <a:avLst/>
+          </a:prstGeom>
+          <a:noFill/>
+          <a:ln w="0">
+            <a:noFill/>
+          </a:ln>
+        </p:spPr>
+        <p:style>
+          <a:lnRef idx="0"/>
+          <a:fillRef idx="0"/>
+          <a:effectRef idx="0"/>
+          <a:fontRef idx="minor"/>
+        </p:style>
+        <p:txBody>
+          <a:bodyPr lIns="90000" rIns="90000" tIns="45000" bIns="45000">
+            <a:noAutofit/>
+          </a:bodyPr>
+          <a:p>
+            <a:pPr>
+              <a:lnSpc>
+                <a:spcPct val="100000"/>
+              </a:lnSpc>
+            </a:pPr>
+            <a:r>
+              <a:rPr b="0" lang="pt-BR" sz="900" spc="-1" strike="noStrike">
+                <a:solidFill>
+                  <a:srgbClr val="222222"/>
+                </a:solidFill>
+                <a:latin typeface="Nunito Sans"/>
+              </a:rPr>
+              <a:t>Realizamos algumas melhorias na API utilizada no fluxo de vendas. Como resultado, a taxa de sucesso nas chamadas de API teve uma forte melhora. Isso contribuiu muito para o aumento da taxa de conversão geral, e para as vendas como um todo.</a:t>
+            </a:r>
+            <a:endParaRPr b="0" lang="pt-BR" sz="900" spc="-1" strike="noStrike">
+              <a:latin typeface="Arial"/>
+            </a:endParaRPr>
+          </a:p>
+        </p:txBody>
+      </p:sp>
+      <p:sp>
+        <p:nvSpPr>
+          <p:cNvPr id="155" name=""/>
+          <p:cNvSpPr/>
+          <p:nvPr/>
+        </p:nvSpPr>
+        <p:spPr>
+          <a:xfrm>
+            <a:off x="5220000" y="900000"/>
+            <a:ext cx="3780000" cy="2700000"/>
+          </a:xfrm>
+          <a:prstGeom prst="rect">
+            <a:avLst/>
+          </a:prstGeom>
+          <a:noFill/>
+          <a:ln w="36000">
+            <a:solidFill>
+              <a:srgbClr val="780373"/>
+            </a:solidFill>
+            <a:round/>
+          </a:ln>
+        </p:spPr>
+        <p:style>
+          <a:lnRef idx="0"/>
+          <a:fillRef idx="0"/>
+          <a:effectRef idx="0"/>
+          <a:fontRef idx="minor"/>
+        </p:style>
+      </p:sp>
+      <p:sp>
+        <p:nvSpPr>
+          <p:cNvPr id="156" name=""/>
+          <p:cNvSpPr/>
+          <p:nvPr/>
+        </p:nvSpPr>
+        <p:spPr>
+          <a:xfrm>
+            <a:off x="755640" y="928800"/>
+            <a:ext cx="3564360" cy="1620000"/>
+          </a:xfrm>
+          <a:prstGeom prst="rect">
+            <a:avLst/>
+          </a:prstGeom>
+          <a:noFill/>
+          <a:ln w="0">
+            <a:noFill/>
+          </a:ln>
+        </p:spPr>
+        <p:style>
+          <a:lnRef idx="0"/>
+          <a:fillRef idx="0"/>
+          <a:effectRef idx="0"/>
+          <a:fontRef idx="minor"/>
+        </p:style>
+        <p:txBody>
+          <a:bodyPr lIns="90000" rIns="90000" tIns="45000" bIns="45000">
+            <a:noAutofit/>
+          </a:bodyPr>
+          <a:p>
+            <a:pPr>
+              <a:lnSpc>
+                <a:spcPct val="100000"/>
+              </a:lnSpc>
+            </a:pPr>
+            <a:r>
+              <a:rPr b="0" lang="pt-BR" sz="900" spc="-1" strike="noStrike">
+                <a:solidFill>
+                  <a:srgbClr val="222222"/>
+                </a:solidFill>
+                <a:latin typeface="Nunito Sans"/>
+              </a:rPr>
+              <a:t>Mesmo com as quedas no número de usuários entrando na plataforma, e no valor total vendido para os produtos de consignado, tivemos um grande resultado com o aumento da taxa de conversão, e com a introdução de um novo produto no fluxo (empréstimos com garantia sobre veículos).</a:t>
+            </a:r>
+            <a:endParaRPr b="0" lang="pt-BR" sz="900" spc="-1" strike="noStrike">
+              <a:latin typeface="Arial"/>
+            </a:endParaRPr>
+          </a:p>
+        </p:txBody>
+      </p:sp>
+      <p:sp>
+        <p:nvSpPr>
+          <p:cNvPr id="157" name=""/>
+          <p:cNvSpPr/>
+          <p:nvPr/>
+        </p:nvSpPr>
+        <p:spPr>
+          <a:xfrm>
+            <a:off x="360000" y="720000"/>
+            <a:ext cx="4500000" cy="3960000"/>
+          </a:xfrm>
+          <a:prstGeom prst="rect">
+            <a:avLst/>
+          </a:prstGeom>
+          <a:noFill/>
+          <a:ln w="36000">
+            <a:solidFill>
+              <a:srgbClr val="780373"/>
+            </a:solidFill>
+            <a:round/>
+          </a:ln>
+        </p:spPr>
+        <p:style>
+          <a:lnRef idx="0"/>
+          <a:fillRef idx="0"/>
+          <a:effectRef idx="0"/>
+          <a:fontRef idx="minor"/>
+        </p:style>
+      </p:sp>
+    </p:spTree>
+  </p:cSld>
+  <mc:AlternateContent>
+    <mc:Choice Requires="p14">
+      <p:transition spd="slow" p14:dur="2000"/>
+    </mc:Choice>
+    <mc:Fallback>
+      <p:transition spd="slow"/>
+    </mc:Fallback>
+  </mc:AlternateContent>
+</p:sld>
+</file>
+
+<file path=ppt/slides/slide4.xml><?xml version="1.0" encoding="utf-8"?>
+<p:sld xmlns:a="http://schemas.openxmlformats.org/drawingml/2006/main" xmlns:p="http://schemas.openxmlformats.org/presentationml/2006/main" xmlns:r="http://schemas.openxmlformats.org/officeDocument/2006/relationships" xmlns:p14="http://schemas.microsoft.com/office/powerpoint/2010/main" xmlns:p15="http://schemas.microsoft.com/office/powerpoint/2012/main" xmlns:mc="http://schemas.openxmlformats.org/markup-compatibility/2006">
+  <p:cSld>
+    <p:spTree>
+      <p:nvGrpSpPr>
+        <p:cNvPr id="1" name=""/>
+        <p:cNvGrpSpPr/>
+        <p:nvPr/>
+      </p:nvGrpSpPr>
+      <p:grpSpPr>
+        <a:xfrm>
+          <a:off x="0" y="0"/>
+          <a:ext cx="0" cy="0"/>
+          <a:chOff x="0" y="0"/>
+          <a:chExt cx="0" cy="0"/>
+        </a:xfrm>
+      </p:grpSpPr>
+      <p:sp>
+        <p:nvSpPr>
+          <p:cNvPr id="158" name=""/>
+          <p:cNvSpPr/>
+          <p:nvPr/>
+        </p:nvSpPr>
+        <p:spPr>
+          <a:xfrm>
+            <a:off x="3420000" y="180000"/>
+            <a:ext cx="2339640" cy="506160"/>
+          </a:xfrm>
+          <a:prstGeom prst="rect">
+            <a:avLst/>
+          </a:prstGeom>
+          <a:noFill/>
+          <a:ln w="0">
+            <a:noFill/>
+          </a:ln>
+        </p:spPr>
+        <p:style>
+          <a:lnRef idx="0"/>
+          <a:fillRef idx="0"/>
+          <a:effectRef idx="0"/>
+          <a:fontRef idx="minor"/>
+        </p:style>
+        <p:txBody>
+          <a:bodyPr lIns="90000" rIns="90000" tIns="45000" bIns="45000">
+            <a:noAutofit/>
+          </a:bodyPr>
+          <a:p>
+            <a:pPr algn="ctr">
+              <a:lnSpc>
+                <a:spcPct val="100000"/>
+              </a:lnSpc>
+            </a:pPr>
+            <a:r>
+              <a:rPr b="0" lang="pt-BR" sz="2400" spc="-1" strike="noStrike">
+                <a:solidFill>
+                  <a:srgbClr val="222222"/>
+                </a:solidFill>
+                <a:latin typeface="Nunito Sans Black"/>
+              </a:rPr>
+              <a:t>VENDAS</a:t>
+            </a:r>
+            <a:endParaRPr b="0" lang="pt-BR" sz="2400" spc="-1" strike="noStrike">
+              <a:latin typeface="Arial"/>
+            </a:endParaRPr>
+          </a:p>
+        </p:txBody>
+      </p:sp>
+      <p:sp>
+        <p:nvSpPr>
+          <p:cNvPr id="159" name=""/>
+          <p:cNvSpPr/>
+          <p:nvPr/>
+        </p:nvSpPr>
+        <p:spPr>
+          <a:xfrm>
+            <a:off x="4356360" y="1224360"/>
+            <a:ext cx="1619640" cy="504720"/>
+          </a:xfrm>
+          <a:prstGeom prst="rect">
+            <a:avLst/>
+          </a:prstGeom>
+          <a:noFill/>
+          <a:ln w="0">
+            <a:noFill/>
+          </a:ln>
+        </p:spPr>
+        <p:style>
+          <a:lnRef idx="0"/>
+          <a:fillRef idx="0"/>
+          <a:effectRef idx="0"/>
+          <a:fontRef idx="minor"/>
+        </p:style>
+        <p:txBody>
+          <a:bodyPr lIns="90000" rIns="90000" tIns="45000" bIns="45000">
+            <a:noAutofit/>
+          </a:bodyPr>
+          <a:p>
+            <a:pPr algn="ctr">
+              <a:lnSpc>
+                <a:spcPct val="100000"/>
+              </a:lnSpc>
+            </a:pPr>
+            <a:r>
+              <a:rPr b="0" lang="pt-BR" sz="1200" spc="-1" strike="noStrike">
+                <a:solidFill>
+                  <a:srgbClr val="222222"/>
+                </a:solidFill>
+                <a:latin typeface="Nunito Sans"/>
+              </a:rPr>
+              <a:t>Número de propostas vendidas</a:t>
+            </a:r>
+            <a:endParaRPr b="0" lang="pt-BR" sz="1200" spc="-1" strike="noStrike">
+              <a:latin typeface="Arial"/>
+            </a:endParaRPr>
+          </a:p>
+        </p:txBody>
+      </p:sp>
+      <p:sp>
+        <p:nvSpPr>
+          <p:cNvPr id="160" name=""/>
+          <p:cNvSpPr/>
+          <p:nvPr/>
+        </p:nvSpPr>
+        <p:spPr>
+          <a:xfrm>
+            <a:off x="4356360" y="1729440"/>
+            <a:ext cx="1619640" cy="470880"/>
+          </a:xfrm>
+          <a:prstGeom prst="rect">
+            <a:avLst/>
+          </a:prstGeom>
+          <a:noFill/>
+          <a:ln w="0">
+            <a:noFill/>
+          </a:ln>
+        </p:spPr>
+        <p:style>
+          <a:lnRef idx="0"/>
+          <a:fillRef idx="0"/>
+          <a:effectRef idx="0"/>
+          <a:fontRef idx="minor"/>
+        </p:style>
+        <p:txBody>
+          <a:bodyPr lIns="90000" rIns="90000" tIns="45000" bIns="45000">
+            <a:noAutofit/>
+          </a:bodyPr>
+          <a:p>
+            <a:pPr algn="ctr">
+              <a:lnSpc>
+                <a:spcPct val="100000"/>
+              </a:lnSpc>
+            </a:pPr>
+            <a:r>
+              <a:rPr b="0" lang="pt-BR" sz="2200" spc="-1" strike="noStrike">
+                <a:solidFill>
+                  <a:srgbClr val="222222"/>
+                </a:solidFill>
+                <a:latin typeface="Nunito Sans Black"/>
+              </a:rPr>
+              <a:t>1.500</a:t>
+            </a:r>
+            <a:endParaRPr b="0" lang="pt-BR" sz="2200" spc="-1" strike="noStrike">
+              <a:latin typeface="Arial"/>
+            </a:endParaRPr>
+          </a:p>
+        </p:txBody>
+      </p:sp>
+      <p:sp>
+        <p:nvSpPr>
+          <p:cNvPr id="161" name=""/>
+          <p:cNvSpPr/>
+          <p:nvPr/>
+        </p:nvSpPr>
+        <p:spPr>
+          <a:xfrm>
+            <a:off x="4356360" y="2186640"/>
+            <a:ext cx="1619640" cy="297360"/>
+          </a:xfrm>
+          <a:prstGeom prst="rect">
+            <a:avLst/>
+          </a:prstGeom>
+          <a:noFill/>
+          <a:ln w="0">
+            <a:noFill/>
+          </a:ln>
+        </p:spPr>
+        <p:style>
+          <a:lnRef idx="0"/>
+          <a:fillRef idx="0"/>
+          <a:effectRef idx="0"/>
+          <a:fontRef idx="minor"/>
+        </p:style>
+        <p:txBody>
+          <a:bodyPr lIns="90000" rIns="90000" tIns="45000" bIns="45000">
+            <a:noAutofit/>
+          </a:bodyPr>
+          <a:p>
+            <a:pPr algn="ctr">
+              <a:lnSpc>
+                <a:spcPct val="100000"/>
+              </a:lnSpc>
+            </a:pPr>
+            <a:r>
+              <a:rPr b="0" lang="pt-BR" sz="1200" spc="-1" strike="noStrike">
+                <a:solidFill>
+                  <a:srgbClr val="222222"/>
+                </a:solidFill>
+                <a:latin typeface="Nunito Sans"/>
+              </a:rPr>
+              <a:t>15%</a:t>
+            </a:r>
+            <a:endParaRPr b="0" lang="pt-BR" sz="1200" spc="-1" strike="noStrike">
+              <a:latin typeface="Arial"/>
+            </a:endParaRPr>
+          </a:p>
+        </p:txBody>
+      </p:sp>
+      <p:grpSp>
+        <p:nvGrpSpPr>
+          <p:cNvPr id="162" name=""/>
+          <p:cNvGrpSpPr/>
+          <p:nvPr/>
+        </p:nvGrpSpPr>
+        <p:grpSpPr>
+          <a:xfrm>
+            <a:off x="4754160" y="2229840"/>
+            <a:ext cx="132480" cy="178920"/>
+            <a:chOff x="4754160" y="2229840"/>
+            <a:chExt cx="132480" cy="178920"/>
+          </a:xfrm>
+        </p:grpSpPr>
+        <p:sp>
+          <p:nvSpPr>
+            <p:cNvPr id="163" name=""/>
+            <p:cNvSpPr/>
+            <p:nvPr/>
+          </p:nvSpPr>
+          <p:spPr>
+            <a:xfrm>
+              <a:off x="4787640" y="2276280"/>
+              <a:ext cx="66240" cy="132480"/>
+            </a:xfrm>
+            <a:prstGeom prst="rect">
+              <a:avLst/>
+            </a:prstGeom>
+            <a:solidFill>
+              <a:srgbClr val="81d41a"/>
+            </a:solidFill>
+            <a:ln w="0">
+              <a:solidFill>
+                <a:srgbClr val="5eb91e"/>
+              </a:solidFill>
+            </a:ln>
+          </p:spPr>
+          <p:style>
+            <a:lnRef idx="0"/>
+            <a:fillRef idx="0"/>
+            <a:effectRef idx="0"/>
+            <a:fontRef idx="minor"/>
+          </p:style>
+        </p:sp>
+        <p:sp>
+          <p:nvSpPr>
+            <p:cNvPr id="164" name=""/>
+            <p:cNvSpPr/>
+            <p:nvPr/>
+          </p:nvSpPr>
+          <p:spPr>
+            <a:xfrm>
+              <a:off x="4754160" y="2229840"/>
+              <a:ext cx="132480" cy="66240"/>
+            </a:xfrm>
+            <a:custGeom>
+              <a:avLst/>
+              <a:gdLst/>
+              <a:ahLst/>
+              <a:rect l="l" t="t" r="r" b="b"/>
+              <a:pathLst>
+                <a:path w="371" h="187">
+                  <a:moveTo>
+                    <a:pt x="185" y="0"/>
+                  </a:moveTo>
+                  <a:lnTo>
+                    <a:pt x="370" y="186"/>
+                  </a:lnTo>
+                  <a:lnTo>
+                    <a:pt x="0" y="186"/>
+                  </a:lnTo>
+                  <a:lnTo>
+                    <a:pt x="185" y="0"/>
+                  </a:lnTo>
+                </a:path>
+              </a:pathLst>
+            </a:custGeom>
+            <a:solidFill>
+              <a:srgbClr val="81d41a"/>
+            </a:solidFill>
+            <a:ln w="0">
+              <a:noFill/>
+            </a:ln>
+          </p:spPr>
+          <p:style>
+            <a:lnRef idx="0"/>
+            <a:fillRef idx="0"/>
+            <a:effectRef idx="0"/>
+            <a:fontRef idx="minor"/>
+          </p:style>
+        </p:sp>
+      </p:grpSp>
+      <p:sp>
+        <p:nvSpPr>
+          <p:cNvPr id="165" name=""/>
+          <p:cNvSpPr/>
+          <p:nvPr/>
+        </p:nvSpPr>
+        <p:spPr>
+          <a:xfrm>
+            <a:off x="6156360" y="1440360"/>
+            <a:ext cx="1619640" cy="297360"/>
+          </a:xfrm>
+          <a:prstGeom prst="rect">
+            <a:avLst/>
+          </a:prstGeom>
+          <a:noFill/>
+          <a:ln w="0">
+            <a:noFill/>
+          </a:ln>
+        </p:spPr>
+        <p:style>
+          <a:lnRef idx="0"/>
+          <a:fillRef idx="0"/>
+          <a:effectRef idx="0"/>
+          <a:fontRef idx="minor"/>
+        </p:style>
+        <p:txBody>
+          <a:bodyPr lIns="90000" rIns="90000" tIns="45000" bIns="45000">
+            <a:noAutofit/>
+          </a:bodyPr>
+          <a:p>
+            <a:pPr algn="ctr">
+              <a:lnSpc>
+                <a:spcPct val="100000"/>
+              </a:lnSpc>
+            </a:pPr>
+            <a:r>
+              <a:rPr b="0" lang="pt-BR" sz="1200" spc="-1" strike="noStrike">
+                <a:solidFill>
+                  <a:srgbClr val="222222"/>
+                </a:solidFill>
+                <a:latin typeface="Nunito Sans"/>
+              </a:rPr>
+              <a:t>Valor total vendido</a:t>
+            </a:r>
+            <a:endParaRPr b="0" lang="pt-BR" sz="1200" spc="-1" strike="noStrike">
+              <a:latin typeface="Arial"/>
+            </a:endParaRPr>
+          </a:p>
+        </p:txBody>
+      </p:sp>
+      <p:sp>
+        <p:nvSpPr>
+          <p:cNvPr id="166" name=""/>
+          <p:cNvSpPr/>
+          <p:nvPr/>
+        </p:nvSpPr>
+        <p:spPr>
+          <a:xfrm>
+            <a:off x="6012360" y="1729440"/>
+            <a:ext cx="1799640" cy="470880"/>
+          </a:xfrm>
+          <a:prstGeom prst="rect">
+            <a:avLst/>
+          </a:prstGeom>
+          <a:noFill/>
+          <a:ln w="0">
+            <a:noFill/>
+          </a:ln>
+        </p:spPr>
+        <p:style>
+          <a:lnRef idx="0"/>
+          <a:fillRef idx="0"/>
+          <a:effectRef idx="0"/>
+          <a:fontRef idx="minor"/>
+        </p:style>
+        <p:txBody>
+          <a:bodyPr lIns="90000" rIns="90000" tIns="45000" bIns="45000">
+            <a:noAutofit/>
+          </a:bodyPr>
+          <a:p>
+            <a:pPr algn="ctr">
+              <a:lnSpc>
+                <a:spcPct val="100000"/>
+              </a:lnSpc>
+            </a:pPr>
+            <a:r>
+              <a:rPr b="0" lang="pt-BR" sz="2200" spc="-1" strike="noStrike">
+                <a:solidFill>
+                  <a:srgbClr val="222222"/>
+                </a:solidFill>
+                <a:latin typeface="Nunito Sans Black"/>
+              </a:rPr>
+              <a:t>R$ 20 Mil</a:t>
+            </a:r>
+            <a:endParaRPr b="0" lang="pt-BR" sz="2200" spc="-1" strike="noStrike">
+              <a:latin typeface="Arial"/>
+            </a:endParaRPr>
+          </a:p>
+        </p:txBody>
+      </p:sp>
+      <p:sp>
+        <p:nvSpPr>
+          <p:cNvPr id="167" name=""/>
+          <p:cNvSpPr/>
+          <p:nvPr/>
+        </p:nvSpPr>
+        <p:spPr>
+          <a:xfrm>
+            <a:off x="6156360" y="2186640"/>
+            <a:ext cx="1619640" cy="297360"/>
+          </a:xfrm>
+          <a:prstGeom prst="rect">
+            <a:avLst/>
+          </a:prstGeom>
+          <a:noFill/>
+          <a:ln w="0">
+            <a:noFill/>
+          </a:ln>
+        </p:spPr>
+        <p:style>
+          <a:lnRef idx="0"/>
+          <a:fillRef idx="0"/>
+          <a:effectRef idx="0"/>
+          <a:fontRef idx="minor"/>
+        </p:style>
+        <p:txBody>
+          <a:bodyPr lIns="90000" rIns="90000" tIns="45000" bIns="45000">
+            <a:noAutofit/>
+          </a:bodyPr>
+          <a:p>
+            <a:pPr algn="ctr">
+              <a:lnSpc>
+                <a:spcPct val="100000"/>
+              </a:lnSpc>
+            </a:pPr>
+            <a:r>
+              <a:rPr b="0" lang="pt-BR" sz="1200" spc="-1" strike="noStrike">
+                <a:solidFill>
+                  <a:srgbClr val="222222"/>
+                </a:solidFill>
+                <a:latin typeface="Nunito Sans"/>
+              </a:rPr>
+              <a:t>20%</a:t>
+            </a:r>
+            <a:endParaRPr b="0" lang="pt-BR" sz="1200" spc="-1" strike="noStrike">
+              <a:latin typeface="Arial"/>
+            </a:endParaRPr>
+          </a:p>
+        </p:txBody>
+      </p:sp>
+      <p:grpSp>
+        <p:nvGrpSpPr>
+          <p:cNvPr id="168" name=""/>
+          <p:cNvGrpSpPr/>
+          <p:nvPr/>
+        </p:nvGrpSpPr>
+        <p:grpSpPr>
+          <a:xfrm>
+            <a:off x="6554160" y="2229840"/>
+            <a:ext cx="132480" cy="178920"/>
+            <a:chOff x="6554160" y="2229840"/>
+            <a:chExt cx="132480" cy="178920"/>
+          </a:xfrm>
+        </p:grpSpPr>
+        <p:sp>
+          <p:nvSpPr>
+            <p:cNvPr id="169" name=""/>
+            <p:cNvSpPr/>
+            <p:nvPr/>
+          </p:nvSpPr>
+          <p:spPr>
+            <a:xfrm>
+              <a:off x="6587640" y="2276280"/>
+              <a:ext cx="66240" cy="132480"/>
+            </a:xfrm>
+            <a:prstGeom prst="rect">
+              <a:avLst/>
+            </a:prstGeom>
+            <a:solidFill>
+              <a:srgbClr val="81d41a"/>
+            </a:solidFill>
+            <a:ln w="0">
+              <a:solidFill>
+                <a:srgbClr val="5eb91e"/>
+              </a:solidFill>
+            </a:ln>
+          </p:spPr>
+          <p:style>
+            <a:lnRef idx="0"/>
+            <a:fillRef idx="0"/>
+            <a:effectRef idx="0"/>
+            <a:fontRef idx="minor"/>
+          </p:style>
+        </p:sp>
+        <p:sp>
+          <p:nvSpPr>
+            <p:cNvPr id="170" name=""/>
+            <p:cNvSpPr/>
+            <p:nvPr/>
+          </p:nvSpPr>
+          <p:spPr>
+            <a:xfrm>
+              <a:off x="6554160" y="2229840"/>
+              <a:ext cx="132480" cy="66240"/>
+            </a:xfrm>
+            <a:custGeom>
+              <a:avLst/>
+              <a:gdLst/>
+              <a:ahLst/>
+              <a:rect l="l" t="t" r="r" b="b"/>
+              <a:pathLst>
+                <a:path w="371" h="187">
+                  <a:moveTo>
+                    <a:pt x="185" y="0"/>
+                  </a:moveTo>
+                  <a:lnTo>
+                    <a:pt x="370" y="186"/>
+                  </a:lnTo>
+                  <a:lnTo>
+                    <a:pt x="0" y="186"/>
+                  </a:lnTo>
+                  <a:lnTo>
+                    <a:pt x="185" y="0"/>
+                  </a:lnTo>
+                </a:path>
+              </a:pathLst>
+            </a:custGeom>
+            <a:solidFill>
+              <a:srgbClr val="81d41a"/>
+            </a:solidFill>
+            <a:ln w="0">
+              <a:noFill/>
+            </a:ln>
+          </p:spPr>
+          <p:style>
+            <a:lnRef idx="0"/>
+            <a:fillRef idx="0"/>
+            <a:effectRef idx="0"/>
+            <a:fontRef idx="minor"/>
+          </p:style>
+        </p:sp>
+      </p:grpSp>
+      <p:sp>
+        <p:nvSpPr>
+          <p:cNvPr id="171" name=""/>
+          <p:cNvSpPr/>
+          <p:nvPr/>
+        </p:nvSpPr>
+        <p:spPr>
+          <a:xfrm>
+            <a:off x="4824360" y="2880360"/>
+            <a:ext cx="1619640" cy="297360"/>
+          </a:xfrm>
+          <a:prstGeom prst="rect">
+            <a:avLst/>
+          </a:prstGeom>
+          <a:noFill/>
+          <a:ln w="0">
+            <a:noFill/>
+          </a:ln>
+        </p:spPr>
+        <p:style>
+          <a:lnRef idx="0"/>
+          <a:fillRef idx="0"/>
+          <a:effectRef idx="0"/>
+          <a:fontRef idx="minor"/>
+        </p:style>
+        <p:txBody>
+          <a:bodyPr lIns="90000" rIns="90000" tIns="45000" bIns="45000">
+            <a:noAutofit/>
+          </a:bodyPr>
+          <a:p>
+            <a:pPr algn="ctr">
+              <a:lnSpc>
+                <a:spcPct val="100000"/>
+              </a:lnSpc>
+            </a:pPr>
+            <a:r>
+              <a:rPr b="0" lang="pt-BR" sz="1200" spc="-1" strike="noStrike">
+                <a:solidFill>
+                  <a:srgbClr val="222222"/>
+                </a:solidFill>
+                <a:latin typeface="Nunito Sans"/>
+              </a:rPr>
+              <a:t>Consignado</a:t>
+            </a:r>
+            <a:endParaRPr b="0" lang="pt-BR" sz="1200" spc="-1" strike="noStrike">
+              <a:latin typeface="Arial"/>
+            </a:endParaRPr>
+          </a:p>
+        </p:txBody>
+      </p:sp>
+      <p:sp>
+        <p:nvSpPr>
+          <p:cNvPr id="172" name=""/>
+          <p:cNvSpPr/>
+          <p:nvPr/>
+        </p:nvSpPr>
+        <p:spPr>
+          <a:xfrm>
+            <a:off x="4680360" y="3205440"/>
+            <a:ext cx="1799640" cy="470880"/>
+          </a:xfrm>
+          <a:prstGeom prst="rect">
+            <a:avLst/>
+          </a:prstGeom>
+          <a:noFill/>
+          <a:ln w="0">
+            <a:noFill/>
+          </a:ln>
+        </p:spPr>
+        <p:style>
+          <a:lnRef idx="0"/>
+          <a:fillRef idx="0"/>
+          <a:effectRef idx="0"/>
+          <a:fontRef idx="minor"/>
+        </p:style>
+        <p:txBody>
+          <a:bodyPr lIns="90000" rIns="90000" tIns="45000" bIns="45000">
+            <a:noAutofit/>
+          </a:bodyPr>
+          <a:p>
+            <a:pPr algn="ctr">
+              <a:lnSpc>
+                <a:spcPct val="100000"/>
+              </a:lnSpc>
+            </a:pPr>
+            <a:r>
+              <a:rPr b="0" lang="pt-BR" sz="2200" spc="-1" strike="noStrike">
+                <a:solidFill>
+                  <a:srgbClr val="222222"/>
+                </a:solidFill>
+                <a:latin typeface="Nunito Sans Black"/>
+              </a:rPr>
+              <a:t>R$ 8 Mil</a:t>
+            </a:r>
+            <a:endParaRPr b="0" lang="pt-BR" sz="2200" spc="-1" strike="noStrike">
+              <a:latin typeface="Arial"/>
+            </a:endParaRPr>
+          </a:p>
+        </p:txBody>
+      </p:sp>
+      <p:sp>
+        <p:nvSpPr>
+          <p:cNvPr id="173" name=""/>
+          <p:cNvSpPr/>
+          <p:nvPr/>
+        </p:nvSpPr>
+        <p:spPr>
+          <a:xfrm>
+            <a:off x="4824360" y="3662640"/>
+            <a:ext cx="1619640" cy="297360"/>
+          </a:xfrm>
+          <a:prstGeom prst="rect">
+            <a:avLst/>
+          </a:prstGeom>
+          <a:noFill/>
+          <a:ln w="0">
+            <a:noFill/>
+          </a:ln>
+        </p:spPr>
+        <p:style>
+          <a:lnRef idx="0"/>
+          <a:fillRef idx="0"/>
+          <a:effectRef idx="0"/>
+          <a:fontRef idx="minor"/>
+        </p:style>
+        <p:txBody>
+          <a:bodyPr lIns="90000" rIns="90000" tIns="45000" bIns="45000">
+            <a:noAutofit/>
+          </a:bodyPr>
+          <a:p>
+            <a:pPr algn="ctr">
+              <a:lnSpc>
+                <a:spcPct val="100000"/>
+              </a:lnSpc>
+            </a:pPr>
+            <a:r>
+              <a:rPr b="0" lang="pt-BR" sz="1200" spc="-1" strike="noStrike">
+                <a:solidFill>
+                  <a:srgbClr val="222222"/>
+                </a:solidFill>
+                <a:latin typeface="Nunito Sans"/>
+              </a:rPr>
+              <a:t>5%</a:t>
+            </a:r>
+            <a:endParaRPr b="0" lang="pt-BR" sz="1200" spc="-1" strike="noStrike">
+              <a:latin typeface="Arial"/>
+            </a:endParaRPr>
+          </a:p>
+        </p:txBody>
+      </p:sp>
+      <p:grpSp>
+        <p:nvGrpSpPr>
+          <p:cNvPr id="174" name=""/>
+          <p:cNvGrpSpPr/>
+          <p:nvPr/>
+        </p:nvGrpSpPr>
+        <p:grpSpPr>
+          <a:xfrm>
+            <a:off x="5294160" y="3705480"/>
+            <a:ext cx="132480" cy="178920"/>
+            <a:chOff x="5294160" y="3705480"/>
+            <a:chExt cx="132480" cy="178920"/>
+          </a:xfrm>
+        </p:grpSpPr>
+        <p:sp>
+          <p:nvSpPr>
+            <p:cNvPr id="175" name=""/>
+            <p:cNvSpPr/>
+            <p:nvPr/>
+          </p:nvSpPr>
+          <p:spPr>
+            <a:xfrm flipV="1">
+              <a:off x="5327640" y="3705480"/>
+              <a:ext cx="66240" cy="132480"/>
+            </a:xfrm>
+            <a:prstGeom prst="rect">
+              <a:avLst/>
+            </a:prstGeom>
+            <a:solidFill>
+              <a:srgbClr val="fc2626"/>
+            </a:solidFill>
+            <a:ln w="0">
+              <a:solidFill>
+                <a:srgbClr val="fc2626"/>
+              </a:solidFill>
+            </a:ln>
+          </p:spPr>
+          <p:style>
+            <a:lnRef idx="0"/>
+            <a:fillRef idx="0"/>
+            <a:effectRef idx="0"/>
+            <a:fontRef idx="minor"/>
+          </p:style>
+        </p:sp>
+        <p:sp>
+          <p:nvSpPr>
+            <p:cNvPr id="176" name=""/>
+            <p:cNvSpPr/>
+            <p:nvPr/>
+          </p:nvSpPr>
+          <p:spPr>
+            <a:xfrm>
+              <a:off x="5294160" y="3818160"/>
+              <a:ext cx="132480" cy="66240"/>
+            </a:xfrm>
+            <a:custGeom>
+              <a:avLst/>
+              <a:gdLst/>
+              <a:ahLst/>
+              <a:rect l="l" t="t" r="r" b="b"/>
+              <a:pathLst>
+                <a:path w="371" h="187">
+                  <a:moveTo>
+                    <a:pt x="185" y="186"/>
+                  </a:moveTo>
+                  <a:lnTo>
+                    <a:pt x="370" y="0"/>
+                  </a:lnTo>
+                  <a:lnTo>
+                    <a:pt x="0" y="0"/>
+                  </a:lnTo>
+                  <a:lnTo>
+                    <a:pt x="185" y="186"/>
+                  </a:lnTo>
+                </a:path>
+              </a:pathLst>
+            </a:custGeom>
+            <a:solidFill>
+              <a:srgbClr val="fc2626"/>
+            </a:solidFill>
+            <a:ln w="0">
+              <a:noFill/>
+            </a:ln>
+          </p:spPr>
+          <p:style>
+            <a:lnRef idx="0"/>
+            <a:fillRef idx="0"/>
+            <a:effectRef idx="0"/>
+            <a:fontRef idx="minor"/>
+          </p:style>
+        </p:sp>
+      </p:grpSp>
+      <p:sp>
+        <p:nvSpPr>
+          <p:cNvPr id="177" name=""/>
+          <p:cNvSpPr/>
+          <p:nvPr/>
+        </p:nvSpPr>
+        <p:spPr>
+          <a:xfrm>
+            <a:off x="7164360" y="2700360"/>
+            <a:ext cx="1619640" cy="504720"/>
+          </a:xfrm>
+          <a:prstGeom prst="rect">
+            <a:avLst/>
+          </a:prstGeom>
+          <a:noFill/>
+          <a:ln w="0">
+            <a:noFill/>
+          </a:ln>
+        </p:spPr>
+        <p:style>
+          <a:lnRef idx="0"/>
+          <a:fillRef idx="0"/>
+          <a:effectRef idx="0"/>
+          <a:fontRef idx="minor"/>
+        </p:style>
+        <p:txBody>
+          <a:bodyPr lIns="90000" rIns="90000" tIns="45000" bIns="45000">
+            <a:noAutofit/>
+          </a:bodyPr>
+          <a:p>
+            <a:pPr algn="ctr">
+              <a:lnSpc>
+                <a:spcPct val="100000"/>
+              </a:lnSpc>
+            </a:pPr>
+            <a:r>
+              <a:rPr b="0" lang="pt-BR" sz="1200" spc="-1" strike="noStrike">
+                <a:solidFill>
+                  <a:srgbClr val="222222"/>
+                </a:solidFill>
+                <a:latin typeface="Nunito Sans"/>
+              </a:rPr>
+              <a:t>Com garantia</a:t>
+            </a:r>
+            <a:endParaRPr b="0" lang="pt-BR" sz="1200" spc="-1" strike="noStrike">
+              <a:latin typeface="Arial"/>
+            </a:endParaRPr>
+          </a:p>
+          <a:p>
+            <a:pPr algn="ctr">
+              <a:lnSpc>
+                <a:spcPct val="100000"/>
+              </a:lnSpc>
+            </a:pPr>
+            <a:r>
+              <a:rPr b="0" lang="pt-BR" sz="1200" spc="-1" strike="noStrike">
+                <a:solidFill>
+                  <a:srgbClr val="222222"/>
+                </a:solidFill>
+                <a:latin typeface="Nunito Sans"/>
+              </a:rPr>
+              <a:t>sobre veículos</a:t>
+            </a:r>
+            <a:endParaRPr b="0" lang="pt-BR" sz="1200" spc="-1" strike="noStrike">
+              <a:latin typeface="Arial"/>
+            </a:endParaRPr>
+          </a:p>
+        </p:txBody>
+      </p:sp>
+      <p:sp>
+        <p:nvSpPr>
+          <p:cNvPr id="178" name=""/>
+          <p:cNvSpPr/>
+          <p:nvPr/>
+        </p:nvSpPr>
+        <p:spPr>
+          <a:xfrm>
+            <a:off x="7020360" y="3205440"/>
+            <a:ext cx="1799640" cy="470880"/>
+          </a:xfrm>
+          <a:prstGeom prst="rect">
+            <a:avLst/>
+          </a:prstGeom>
+          <a:noFill/>
+          <a:ln w="0">
+            <a:noFill/>
+          </a:ln>
+        </p:spPr>
+        <p:style>
+          <a:lnRef idx="0"/>
+          <a:fillRef idx="0"/>
+          <a:effectRef idx="0"/>
+          <a:fontRef idx="minor"/>
+        </p:style>
+        <p:txBody>
+          <a:bodyPr lIns="90000" rIns="90000" tIns="45000" bIns="45000">
+            <a:noAutofit/>
+          </a:bodyPr>
+          <a:p>
+            <a:pPr algn="ctr">
+              <a:lnSpc>
+                <a:spcPct val="100000"/>
+              </a:lnSpc>
+            </a:pPr>
+            <a:r>
+              <a:rPr b="0" lang="pt-BR" sz="2200" spc="-1" strike="noStrike">
+                <a:solidFill>
+                  <a:srgbClr val="222222"/>
+                </a:solidFill>
+                <a:latin typeface="Nunito Sans Black"/>
+              </a:rPr>
+              <a:t>R$ 12 Mil</a:t>
+            </a:r>
+            <a:endParaRPr b="0" lang="pt-BR" sz="2200" spc="-1" strike="noStrike">
+              <a:latin typeface="Arial"/>
+            </a:endParaRPr>
+          </a:p>
+        </p:txBody>
+      </p:sp>
+      <p:sp>
+        <p:nvSpPr>
+          <p:cNvPr id="179" name=""/>
+          <p:cNvSpPr/>
+          <p:nvPr/>
+        </p:nvSpPr>
+        <p:spPr>
+          <a:xfrm>
+            <a:off x="7164360" y="3662640"/>
+            <a:ext cx="1619640" cy="297360"/>
+          </a:xfrm>
+          <a:prstGeom prst="rect">
+            <a:avLst/>
+          </a:prstGeom>
+          <a:noFill/>
+          <a:ln w="0">
+            <a:noFill/>
+          </a:ln>
+        </p:spPr>
+        <p:style>
+          <a:lnRef idx="0"/>
+          <a:fillRef idx="0"/>
+          <a:effectRef idx="0"/>
+          <a:fontRef idx="minor"/>
+        </p:style>
+        <p:txBody>
+          <a:bodyPr lIns="90000" rIns="90000" tIns="45000" bIns="45000">
+            <a:noAutofit/>
+          </a:bodyPr>
+          <a:p>
+            <a:pPr algn="ctr">
+              <a:lnSpc>
+                <a:spcPct val="100000"/>
+              </a:lnSpc>
+            </a:pPr>
+            <a:r>
+              <a:rPr b="0" lang="pt-BR" sz="1200" spc="-1" strike="noStrike">
+                <a:solidFill>
+                  <a:srgbClr val="222222"/>
+                </a:solidFill>
+                <a:latin typeface="Nunito Sans"/>
+              </a:rPr>
+              <a:t>100%</a:t>
+            </a:r>
+            <a:endParaRPr b="0" lang="pt-BR" sz="1200" spc="-1" strike="noStrike">
+              <a:latin typeface="Arial"/>
+            </a:endParaRPr>
+          </a:p>
+        </p:txBody>
+      </p:sp>
+      <p:grpSp>
+        <p:nvGrpSpPr>
+          <p:cNvPr id="180" name=""/>
+          <p:cNvGrpSpPr/>
+          <p:nvPr/>
+        </p:nvGrpSpPr>
+        <p:grpSpPr>
+          <a:xfrm>
+            <a:off x="7562160" y="3705840"/>
+            <a:ext cx="132480" cy="178920"/>
+            <a:chOff x="7562160" y="3705840"/>
+            <a:chExt cx="132480" cy="178920"/>
+          </a:xfrm>
+        </p:grpSpPr>
+        <p:sp>
+          <p:nvSpPr>
+            <p:cNvPr id="181" name=""/>
+            <p:cNvSpPr/>
+            <p:nvPr/>
+          </p:nvSpPr>
+          <p:spPr>
+            <a:xfrm>
+              <a:off x="7595640" y="3752280"/>
+              <a:ext cx="66240" cy="132480"/>
+            </a:xfrm>
+            <a:prstGeom prst="rect">
+              <a:avLst/>
+            </a:prstGeom>
+            <a:solidFill>
+              <a:srgbClr val="81d41a"/>
+            </a:solidFill>
+            <a:ln w="0">
+              <a:solidFill>
+                <a:srgbClr val="5eb91e"/>
+              </a:solidFill>
+            </a:ln>
+          </p:spPr>
+          <p:style>
+            <a:lnRef idx="0"/>
+            <a:fillRef idx="0"/>
+            <a:effectRef idx="0"/>
+            <a:fontRef idx="minor"/>
+          </p:style>
+        </p:sp>
+        <p:sp>
+          <p:nvSpPr>
+            <p:cNvPr id="182" name=""/>
+            <p:cNvSpPr/>
+            <p:nvPr/>
+          </p:nvSpPr>
+          <p:spPr>
+            <a:xfrm>
+              <a:off x="7562160" y="3705840"/>
+              <a:ext cx="132480" cy="66240"/>
+            </a:xfrm>
+            <a:custGeom>
+              <a:avLst/>
+              <a:gdLst/>
+              <a:ahLst/>
+              <a:rect l="l" t="t" r="r" b="b"/>
+              <a:pathLst>
+                <a:path w="371" h="187">
+                  <a:moveTo>
+                    <a:pt x="185" y="0"/>
+                  </a:moveTo>
+                  <a:lnTo>
+                    <a:pt x="370" y="186"/>
+                  </a:lnTo>
+                  <a:lnTo>
+                    <a:pt x="0" y="186"/>
+                  </a:lnTo>
+                  <a:lnTo>
+                    <a:pt x="185" y="0"/>
+                  </a:lnTo>
+                </a:path>
+              </a:pathLst>
+            </a:custGeom>
+            <a:solidFill>
+              <a:srgbClr val="81d41a"/>
+            </a:solidFill>
+            <a:ln w="0">
+              <a:noFill/>
+            </a:ln>
+          </p:spPr>
+          <p:style>
+            <a:lnRef idx="0"/>
+            <a:fillRef idx="0"/>
+            <a:effectRef idx="0"/>
+            <a:fontRef idx="minor"/>
+          </p:style>
+        </p:sp>
+      </p:grpSp>
+      <p:sp>
+        <p:nvSpPr>
+          <p:cNvPr id="183" name=""/>
+          <p:cNvSpPr/>
+          <p:nvPr/>
+        </p:nvSpPr>
+        <p:spPr>
+          <a:xfrm>
+            <a:off x="7200360" y="2448360"/>
+            <a:ext cx="287640" cy="287640"/>
+          </a:xfrm>
+          <a:prstGeom prst="line">
+            <a:avLst/>
+          </a:prstGeom>
+          <a:ln w="36000">
+            <a:solidFill>
+              <a:srgbClr val="222222"/>
+            </a:solidFill>
+            <a:round/>
+            <a:tailEnd len="med" type="triangle" w="med"/>
+          </a:ln>
+        </p:spPr>
+        <p:style>
+          <a:lnRef idx="0"/>
+          <a:fillRef idx="0"/>
+          <a:effectRef idx="0"/>
+          <a:fontRef idx="minor"/>
+        </p:style>
+      </p:sp>
+      <p:sp>
+        <p:nvSpPr>
+          <p:cNvPr id="184" name=""/>
+          <p:cNvSpPr/>
+          <p:nvPr/>
+        </p:nvSpPr>
+        <p:spPr>
+          <a:xfrm flipH="1">
+            <a:off x="6122880" y="2461320"/>
+            <a:ext cx="432000" cy="525600"/>
+          </a:xfrm>
+          <a:prstGeom prst="line">
+            <a:avLst/>
+          </a:prstGeom>
+          <a:ln w="36000">
+            <a:solidFill>
+              <a:srgbClr val="222222"/>
+            </a:solidFill>
+            <a:round/>
+            <a:tailEnd len="med" type="triangle" w="med"/>
+          </a:ln>
+        </p:spPr>
+        <p:style>
+          <a:lnRef idx="0"/>
+          <a:fillRef idx="0"/>
+          <a:effectRef idx="0"/>
+          <a:fontRef idx="minor"/>
+        </p:style>
+      </p:sp>
+      <p:sp>
+        <p:nvSpPr>
+          <p:cNvPr id="185" name=""/>
+          <p:cNvSpPr/>
+          <p:nvPr/>
+        </p:nvSpPr>
+        <p:spPr>
+          <a:xfrm>
+            <a:off x="575640" y="1260000"/>
+            <a:ext cx="3384360" cy="1620000"/>
+          </a:xfrm>
+          <a:prstGeom prst="rect">
+            <a:avLst/>
+          </a:prstGeom>
+          <a:noFill/>
+          <a:ln w="0">
+            <a:noFill/>
+          </a:ln>
+        </p:spPr>
+        <p:style>
+          <a:lnRef idx="0"/>
+          <a:fillRef idx="0"/>
+          <a:effectRef idx="0"/>
+          <a:fontRef idx="minor"/>
+        </p:style>
+        <p:txBody>
+          <a:bodyPr lIns="90000" rIns="90000" tIns="45000" bIns="45000">
+            <a:noAutofit/>
+          </a:bodyPr>
+          <a:p>
+            <a:pPr>
+              <a:lnSpc>
+                <a:spcPct val="100000"/>
+              </a:lnSpc>
+            </a:pPr>
+            <a:r>
+              <a:rPr b="0" lang="pt-BR" sz="1200" spc="-1" strike="noStrike">
+                <a:solidFill>
+                  <a:srgbClr val="222222"/>
+                </a:solidFill>
+                <a:latin typeface="Nunito Sans"/>
+              </a:rPr>
+              <a:t>Mesmo com as quedas de 12% no número de usuários entrando na plataforma, e de 5% no valor total vendido para os produtos de consignado, tivemos um aumento significativo de 20% sobre o valor total vendido. Pois tivemos um aumento de 15 p.p. sobre a taxa de conversão. Além da introdução de um novo produto no fluxo (empréstimos com garantia sobre veículos) que obteve R$ 12 Mil em vendas logo no seu primeiro mês.</a:t>
+            </a:r>
+            <a:endParaRPr b="0" lang="pt-BR" sz="1200" spc="-1" strike="noStrike">
+              <a:latin typeface="Arial"/>
+            </a:endParaRPr>
+          </a:p>
+        </p:txBody>
       </p:sp>
     </p:spTree>
   </p:cSld>

</xml_diff>

<commit_message>
More content to storytelling post
</commit_message>
<xml_diff>
--- a/posts/2023/2023-01-20-storytelling/report-exemplo.pptx
+++ b/posts/2023/2023-01-20-storytelling/report-exemplo.pptx
@@ -1656,7 +1656,7 @@
         <p:spPr>
           <a:xfrm>
             <a:off x="3715200" y="919800"/>
-            <a:ext cx="235080" cy="259200"/>
+            <a:ext cx="234720" cy="258840"/>
           </a:xfrm>
           <a:prstGeom prst="rect">
             <a:avLst/>
@@ -1675,7 +1675,7 @@
         <p:spPr>
           <a:xfrm>
             <a:off x="3202920" y="1189440"/>
-            <a:ext cx="1263600" cy="538560"/>
+            <a:ext cx="1263240" cy="538200"/>
           </a:xfrm>
           <a:prstGeom prst="rect">
             <a:avLst/>
@@ -1752,7 +1752,7 @@
         <p:spPr>
           <a:xfrm>
             <a:off x="1275480" y="1187280"/>
-            <a:ext cx="842760" cy="450720"/>
+            <a:ext cx="842400" cy="450360"/>
           </a:xfrm>
           <a:prstGeom prst="rect">
             <a:avLst/>
@@ -1835,7 +1835,7 @@
         <p:spPr>
           <a:xfrm>
             <a:off x="1608120" y="939240"/>
-            <a:ext cx="178560" cy="248040"/>
+            <a:ext cx="178200" cy="247680"/>
           </a:xfrm>
           <a:prstGeom prst="rect">
             <a:avLst/>
@@ -1854,7 +1854,7 @@
         <p:spPr>
           <a:xfrm>
             <a:off x="2276280" y="1191600"/>
-            <a:ext cx="922680" cy="259200"/>
+            <a:ext cx="922320" cy="258840"/>
           </a:xfrm>
           <a:prstGeom prst="rect">
             <a:avLst/>
@@ -1937,7 +1937,7 @@
         <p:spPr>
           <a:xfrm>
             <a:off x="2643840" y="851760"/>
-            <a:ext cx="341280" cy="326880"/>
+            <a:ext cx="340920" cy="326520"/>
           </a:xfrm>
           <a:prstGeom prst="rect">
             <a:avLst/>
@@ -1956,7 +1956,7 @@
         <p:spPr>
           <a:xfrm>
             <a:off x="4300200" y="1191600"/>
-            <a:ext cx="1298520" cy="510120"/>
+            <a:ext cx="1298160" cy="509760"/>
           </a:xfrm>
           <a:prstGeom prst="rect">
             <a:avLst/>
@@ -2049,7 +2049,7 @@
         <p:spPr>
           <a:xfrm>
             <a:off x="4790160" y="898560"/>
-            <a:ext cx="341280" cy="297000"/>
+            <a:ext cx="340920" cy="296640"/>
           </a:xfrm>
           <a:prstGeom prst="rect">
             <a:avLst/>
@@ -2068,7 +2068,7 @@
         <p:spPr>
           <a:xfrm>
             <a:off x="3356640" y="1523160"/>
-            <a:ext cx="922680" cy="407160"/>
+            <a:ext cx="922320" cy="406800"/>
           </a:xfrm>
           <a:prstGeom prst="rect">
             <a:avLst/>
@@ -2155,7 +2155,7 @@
         <p:spPr>
           <a:xfrm>
             <a:off x="4312080" y="1525680"/>
-            <a:ext cx="1298520" cy="407160"/>
+            <a:ext cx="1298160" cy="406800"/>
           </a:xfrm>
           <a:prstGeom prst="rect">
             <a:avLst/>
@@ -2248,7 +2248,7 @@
         <p:spPr>
           <a:xfrm>
             <a:off x="5986080" y="927360"/>
-            <a:ext cx="288720" cy="257040"/>
+            <a:ext cx="288360" cy="256680"/>
           </a:xfrm>
           <a:prstGeom prst="rect">
             <a:avLst/>
@@ -2267,7 +2267,7 @@
         <p:spPr>
           <a:xfrm>
             <a:off x="5658840" y="1190880"/>
-            <a:ext cx="960480" cy="382320"/>
+            <a:ext cx="960120" cy="381960"/>
           </a:xfrm>
           <a:prstGeom prst="rect">
             <a:avLst/>
@@ -2321,7 +2321,7 @@
         <p:spPr>
           <a:xfrm>
             <a:off x="2282760" y="1523880"/>
-            <a:ext cx="922680" cy="450720"/>
+            <a:ext cx="922320" cy="450360"/>
           </a:xfrm>
           <a:prstGeom prst="rect">
             <a:avLst/>
@@ -2408,7 +2408,7 @@
         <p:spPr>
           <a:xfrm>
             <a:off x="1327320" y="1532160"/>
-            <a:ext cx="713160" cy="450720"/>
+            <a:ext cx="712800" cy="450360"/>
           </a:xfrm>
           <a:prstGeom prst="rect">
             <a:avLst/>
@@ -2495,7 +2495,7 @@
         <p:spPr>
           <a:xfrm>
             <a:off x="5726160" y="1526400"/>
-            <a:ext cx="842760" cy="407160"/>
+            <a:ext cx="842400" cy="406800"/>
           </a:xfrm>
           <a:prstGeom prst="rect">
             <a:avLst/>
@@ -2582,7 +2582,7 @@
         <p:spPr>
           <a:xfrm>
             <a:off x="3243960" y="290520"/>
-            <a:ext cx="2511720" cy="490320"/>
+            <a:ext cx="2511360" cy="489960"/>
           </a:xfrm>
           <a:prstGeom prst="rect">
             <a:avLst/>
@@ -2636,7 +2636,7 @@
         <p:spPr>
           <a:xfrm>
             <a:off x="6982200" y="1521720"/>
-            <a:ext cx="661320" cy="479160"/>
+            <a:ext cx="660960" cy="478800"/>
           </a:xfrm>
           <a:prstGeom prst="rect">
             <a:avLst/>
@@ -2713,7 +2713,7 @@
         <p:spPr>
           <a:xfrm>
             <a:off x="6391800" y="1190880"/>
-            <a:ext cx="1741680" cy="470160"/>
+            <a:ext cx="1741320" cy="469800"/>
           </a:xfrm>
           <a:prstGeom prst="rect">
             <a:avLst/>
@@ -2796,7 +2796,7 @@
         <p:spPr>
           <a:xfrm>
             <a:off x="7130160" y="919800"/>
-            <a:ext cx="288360" cy="271080"/>
+            <a:ext cx="288000" cy="270720"/>
           </a:xfrm>
           <a:prstGeom prst="rect">
             <a:avLst/>
@@ -2815,7 +2815,7 @@
         <p:spPr>
           <a:xfrm>
             <a:off x="7935480" y="1172520"/>
-            <a:ext cx="960480" cy="326880"/>
+            <a:ext cx="960120" cy="326520"/>
           </a:xfrm>
           <a:prstGeom prst="rect">
             <a:avLst/>
@@ -2869,7 +2869,7 @@
         <p:spPr>
           <a:xfrm>
             <a:off x="8079480" y="1505160"/>
-            <a:ext cx="672120" cy="518040"/>
+            <a:ext cx="671760" cy="517680"/>
           </a:xfrm>
           <a:prstGeom prst="rect">
             <a:avLst/>
@@ -2951,8 +2951,8 @@
         </p:blipFill>
         <p:spPr>
           <a:xfrm flipH="1" rot="10800000">
-            <a:off x="8265240" y="909000"/>
-            <a:ext cx="273960" cy="259560"/>
+            <a:off x="8265240" y="909360"/>
+            <a:ext cx="273600" cy="259200"/>
           </a:xfrm>
           <a:prstGeom prst="rect">
             <a:avLst/>
@@ -2971,7 +2971,7 @@
         <p:spPr>
           <a:xfrm>
             <a:off x="264960" y="1491480"/>
-            <a:ext cx="864720" cy="304560"/>
+            <a:ext cx="864360" cy="304200"/>
           </a:xfrm>
           <a:prstGeom prst="rect">
             <a:avLst/>
@@ -3025,7 +3025,7 @@
         <p:spPr>
           <a:xfrm>
             <a:off x="496800" y="1705680"/>
-            <a:ext cx="546480" cy="259920"/>
+            <a:ext cx="546120" cy="259560"/>
           </a:xfrm>
           <a:prstGeom prst="rect">
             <a:avLst/>
@@ -3083,7 +3083,7 @@
         <p:spPr>
           <a:xfrm>
             <a:off x="478080" y="874800"/>
-            <a:ext cx="450360" cy="450720"/>
+            <a:ext cx="450000" cy="450360"/>
           </a:xfrm>
           <a:prstGeom prst="rect">
             <a:avLst/>
@@ -3108,7 +3108,7 @@
         <p:spPr>
           <a:xfrm>
             <a:off x="1459440" y="1820880"/>
-            <a:ext cx="87120" cy="87480"/>
+            <a:ext cx="86760" cy="87120"/>
           </a:xfrm>
           <a:prstGeom prst="rect">
             <a:avLst/>
@@ -3133,7 +3133,7 @@
         <p:spPr>
           <a:xfrm>
             <a:off x="2508840" y="1804680"/>
-            <a:ext cx="87120" cy="87480"/>
+            <a:ext cx="86760" cy="87120"/>
           </a:xfrm>
           <a:prstGeom prst="rect">
             <a:avLst/>
@@ -3158,7 +3158,7 @@
         <p:spPr>
           <a:xfrm>
             <a:off x="3597120" y="1797120"/>
-            <a:ext cx="91440" cy="87480"/>
+            <a:ext cx="91080" cy="87120"/>
           </a:xfrm>
           <a:prstGeom prst="rect">
             <a:avLst/>
@@ -3183,7 +3183,7 @@
         <p:spPr>
           <a:xfrm>
             <a:off x="5893560" y="1816200"/>
-            <a:ext cx="87120" cy="87480"/>
+            <a:ext cx="86760" cy="87120"/>
           </a:xfrm>
           <a:prstGeom prst="rect">
             <a:avLst/>
@@ -3208,7 +3208,7 @@
         <p:spPr>
           <a:xfrm>
             <a:off x="445680" y="1805040"/>
-            <a:ext cx="91440" cy="87480"/>
+            <a:ext cx="91080" cy="87120"/>
           </a:xfrm>
           <a:prstGeom prst="rect">
             <a:avLst/>
@@ -3233,7 +3233,7 @@
         <p:spPr>
           <a:xfrm>
             <a:off x="4745520" y="1801080"/>
-            <a:ext cx="91440" cy="87480"/>
+            <a:ext cx="91080" cy="87120"/>
           </a:xfrm>
           <a:prstGeom prst="rect">
             <a:avLst/>
@@ -3258,7 +3258,7 @@
         <p:spPr>
           <a:xfrm>
             <a:off x="8151120" y="1792080"/>
-            <a:ext cx="91440" cy="87480"/>
+            <a:ext cx="91080" cy="87120"/>
           </a:xfrm>
           <a:prstGeom prst="rect">
             <a:avLst/>
@@ -3283,7 +3283,7 @@
         <p:spPr>
           <a:xfrm>
             <a:off x="7020000" y="1800360"/>
-            <a:ext cx="91440" cy="87480"/>
+            <a:ext cx="91080" cy="87120"/>
           </a:xfrm>
           <a:prstGeom prst="rect">
             <a:avLst/>
@@ -3302,7 +3302,7 @@
         <p:spPr>
           <a:xfrm>
             <a:off x="286920" y="1260000"/>
-            <a:ext cx="842760" cy="450720"/>
+            <a:ext cx="842400" cy="450360"/>
           </a:xfrm>
           <a:prstGeom prst="rect">
             <a:avLst/>
@@ -3356,7 +3356,7 @@
         <p:spPr>
           <a:xfrm>
             <a:off x="5916600" y="4571640"/>
-            <a:ext cx="1150920" cy="348840"/>
+            <a:ext cx="1150560" cy="348480"/>
           </a:xfrm>
           <a:prstGeom prst="rect">
             <a:avLst/>
@@ -3410,7 +3410,7 @@
         <p:spPr>
           <a:xfrm>
             <a:off x="1082520" y="4528440"/>
-            <a:ext cx="5025240" cy="382320"/>
+            <a:ext cx="5024880" cy="381960"/>
           </a:xfrm>
           <a:prstGeom prst="rect">
             <a:avLst/>
@@ -3554,7 +3554,7 @@
         <p:spPr>
           <a:xfrm>
             <a:off x="359640" y="2160000"/>
-            <a:ext cx="3959280" cy="1978920"/>
+            <a:ext cx="3958920" cy="1978560"/>
           </a:xfrm>
           <a:prstGeom prst="rect">
             <a:avLst/>
@@ -3577,7 +3577,7 @@
         <p:spPr>
           <a:xfrm>
             <a:off x="4680000" y="2160000"/>
-            <a:ext cx="4103280" cy="2051280"/>
+            <a:ext cx="4102920" cy="2050920"/>
           </a:xfrm>
           <a:prstGeom prst="rect">
             <a:avLst/>
@@ -3626,7 +3626,7 @@
         <p:spPr>
           <a:xfrm>
             <a:off x="3420000" y="180000"/>
-            <a:ext cx="2339640" cy="506160"/>
+            <a:ext cx="2339280" cy="505800"/>
           </a:xfrm>
           <a:prstGeom prst="rect">
             <a:avLst/>
@@ -3658,6 +3658,7 @@
                   <a:srgbClr val="222222"/>
                 </a:solidFill>
                 <a:latin typeface="Nunito Sans Black"/>
+                <a:ea typeface="DejaVu Sans"/>
               </a:rPr>
               <a:t>VENDAS</a:t>
             </a:r>
@@ -3676,7 +3677,7 @@
         <p:spPr>
           <a:xfrm>
             <a:off x="1080000" y="1116360"/>
-            <a:ext cx="1619640" cy="504720"/>
+            <a:ext cx="1619280" cy="504360"/>
           </a:xfrm>
           <a:prstGeom prst="rect">
             <a:avLst/>
@@ -3708,6 +3709,7 @@
                   <a:srgbClr val="222222"/>
                 </a:solidFill>
                 <a:latin typeface="Nunito Sans"/>
+                <a:ea typeface="DejaVu Sans"/>
               </a:rPr>
               <a:t>Número de propostas vendidas</a:t>
             </a:r>
@@ -3726,7 +3728,7 @@
         <p:spPr>
           <a:xfrm>
             <a:off x="1080000" y="1621440"/>
-            <a:ext cx="1619640" cy="470880"/>
+            <a:ext cx="1619280" cy="470520"/>
           </a:xfrm>
           <a:prstGeom prst="rect">
             <a:avLst/>
@@ -3758,6 +3760,7 @@
                   <a:srgbClr val="222222"/>
                 </a:solidFill>
                 <a:latin typeface="Nunito Sans Black"/>
+                <a:ea typeface="DejaVu Sans"/>
               </a:rPr>
               <a:t>1.500</a:t>
             </a:r>
@@ -3776,7 +3779,7 @@
         <p:spPr>
           <a:xfrm>
             <a:off x="1080000" y="2078640"/>
-            <a:ext cx="1619640" cy="297360"/>
+            <a:ext cx="1619280" cy="297000"/>
           </a:xfrm>
           <a:prstGeom prst="rect">
             <a:avLst/>
@@ -3808,6 +3811,7 @@
                   <a:srgbClr val="222222"/>
                 </a:solidFill>
                 <a:latin typeface="Nunito Sans"/>
+                <a:ea typeface="DejaVu Sans"/>
               </a:rPr>
               <a:t>15%</a:t>
             </a:r>
@@ -3826,9 +3830,9 @@
         <p:grpSpPr>
           <a:xfrm>
             <a:off x="1477800" y="2121840"/>
-            <a:ext cx="132480" cy="178920"/>
+            <a:ext cx="132120" cy="178560"/>
             <a:chOff x="1477800" y="2121840"/>
-            <a:chExt cx="132480" cy="178920"/>
+            <a:chExt cx="132120" cy="178560"/>
           </a:xfrm>
         </p:grpSpPr>
         <p:sp>
@@ -3840,7 +3844,7 @@
           <p:spPr>
             <a:xfrm>
               <a:off x="1511280" y="2168280"/>
-              <a:ext cx="66240" cy="132480"/>
+              <a:ext cx="65880" cy="132120"/>
             </a:xfrm>
             <a:prstGeom prst="rect">
               <a:avLst/>
@@ -3870,7 +3874,7 @@
           <p:spPr>
             <a:xfrm>
               <a:off x="1477800" y="2121840"/>
-              <a:ext cx="132480" cy="66240"/>
+              <a:ext cx="132120" cy="65880"/>
             </a:xfrm>
             <a:custGeom>
               <a:avLst/>
@@ -3918,7 +3922,7 @@
         <p:spPr>
           <a:xfrm>
             <a:off x="2880000" y="1332360"/>
-            <a:ext cx="1619640" cy="297360"/>
+            <a:ext cx="1619280" cy="297000"/>
           </a:xfrm>
           <a:prstGeom prst="rect">
             <a:avLst/>
@@ -3950,6 +3954,7 @@
                   <a:srgbClr val="222222"/>
                 </a:solidFill>
                 <a:latin typeface="Nunito Sans"/>
+                <a:ea typeface="DejaVu Sans"/>
               </a:rPr>
               <a:t>Valor total vendido</a:t>
             </a:r>
@@ -3968,7 +3973,7 @@
         <p:spPr>
           <a:xfrm>
             <a:off x="2736000" y="1621440"/>
-            <a:ext cx="1799640" cy="470880"/>
+            <a:ext cx="1799280" cy="470520"/>
           </a:xfrm>
           <a:prstGeom prst="rect">
             <a:avLst/>
@@ -4000,6 +4005,7 @@
                   <a:srgbClr val="222222"/>
                 </a:solidFill>
                 <a:latin typeface="Nunito Sans Black"/>
+                <a:ea typeface="DejaVu Sans"/>
               </a:rPr>
               <a:t>R$ 20 Mil</a:t>
             </a:r>
@@ -4018,7 +4024,7 @@
         <p:spPr>
           <a:xfrm>
             <a:off x="2880000" y="2078640"/>
-            <a:ext cx="1619640" cy="297360"/>
+            <a:ext cx="1619280" cy="297000"/>
           </a:xfrm>
           <a:prstGeom prst="rect">
             <a:avLst/>
@@ -4050,6 +4056,7 @@
                   <a:srgbClr val="222222"/>
                 </a:solidFill>
                 <a:latin typeface="Nunito Sans"/>
+                <a:ea typeface="DejaVu Sans"/>
               </a:rPr>
               <a:t>20%</a:t>
             </a:r>
@@ -4068,9 +4075,9 @@
         <p:grpSpPr>
           <a:xfrm>
             <a:off x="3277800" y="2121840"/>
-            <a:ext cx="132480" cy="178920"/>
+            <a:ext cx="132120" cy="178560"/>
             <a:chOff x="3277800" y="2121840"/>
-            <a:chExt cx="132480" cy="178920"/>
+            <a:chExt cx="132120" cy="178560"/>
           </a:xfrm>
         </p:grpSpPr>
         <p:sp>
@@ -4082,7 +4089,7 @@
           <p:spPr>
             <a:xfrm>
               <a:off x="3311280" y="2168280"/>
-              <a:ext cx="66240" cy="132480"/>
+              <a:ext cx="65880" cy="132120"/>
             </a:xfrm>
             <a:prstGeom prst="rect">
               <a:avLst/>
@@ -4112,7 +4119,7 @@
           <p:spPr>
             <a:xfrm>
               <a:off x="3277800" y="2121840"/>
-              <a:ext cx="132480" cy="66240"/>
+              <a:ext cx="132120" cy="65880"/>
             </a:xfrm>
             <a:custGeom>
               <a:avLst/>
@@ -4160,7 +4167,7 @@
         <p:spPr>
           <a:xfrm>
             <a:off x="4644000" y="1110600"/>
-            <a:ext cx="1619640" cy="504720"/>
+            <a:ext cx="1619280" cy="504360"/>
           </a:xfrm>
           <a:prstGeom prst="rect">
             <a:avLst/>
@@ -4192,6 +4199,7 @@
                   <a:srgbClr val="222222"/>
                 </a:solidFill>
                 <a:latin typeface="Nunito Sans"/>
+                <a:ea typeface="DejaVu Sans"/>
               </a:rPr>
               <a:t>Taxa de conversão geral</a:t>
             </a:r>
@@ -4210,7 +4218,7 @@
         <p:spPr>
           <a:xfrm>
             <a:off x="4644000" y="1615680"/>
-            <a:ext cx="1619640" cy="470880"/>
+            <a:ext cx="1619280" cy="470520"/>
           </a:xfrm>
           <a:prstGeom prst="rect">
             <a:avLst/>
@@ -4242,6 +4250,7 @@
                   <a:srgbClr val="222222"/>
                 </a:solidFill>
                 <a:latin typeface="Nunito Sans Black"/>
+                <a:ea typeface="DejaVu Sans"/>
               </a:rPr>
               <a:t>60%</a:t>
             </a:r>
@@ -4260,7 +4269,7 @@
         <p:spPr>
           <a:xfrm>
             <a:off x="4644000" y="2072880"/>
-            <a:ext cx="1619640" cy="297360"/>
+            <a:ext cx="1619280" cy="297000"/>
           </a:xfrm>
           <a:prstGeom prst="rect">
             <a:avLst/>
@@ -4292,6 +4301,7 @@
                   <a:srgbClr val="222222"/>
                 </a:solidFill>
                 <a:latin typeface="Nunito Sans"/>
+                <a:ea typeface="DejaVu Sans"/>
               </a:rPr>
               <a:t>15 p.p.</a:t>
             </a:r>
@@ -4310,9 +4320,9 @@
         <p:grpSpPr>
           <a:xfrm>
             <a:off x="5041800" y="2116080"/>
-            <a:ext cx="132480" cy="178920"/>
+            <a:ext cx="132120" cy="178560"/>
             <a:chOff x="5041800" y="2116080"/>
-            <a:chExt cx="132480" cy="178920"/>
+            <a:chExt cx="132120" cy="178560"/>
           </a:xfrm>
         </p:grpSpPr>
         <p:sp>
@@ -4324,7 +4334,7 @@
           <p:spPr>
             <a:xfrm>
               <a:off x="5075280" y="2162520"/>
-              <a:ext cx="66240" cy="132480"/>
+              <a:ext cx="65880" cy="132120"/>
             </a:xfrm>
             <a:prstGeom prst="rect">
               <a:avLst/>
@@ -4354,7 +4364,7 @@
           <p:spPr>
             <a:xfrm>
               <a:off x="5041800" y="2116080"/>
-              <a:ext cx="132480" cy="66240"/>
+              <a:ext cx="132120" cy="65880"/>
             </a:xfrm>
             <a:custGeom>
               <a:avLst/>
@@ -4402,7 +4412,7 @@
         <p:spPr>
           <a:xfrm>
             <a:off x="6444000" y="1110600"/>
-            <a:ext cx="1619640" cy="504720"/>
+            <a:ext cx="1619280" cy="504360"/>
           </a:xfrm>
           <a:prstGeom prst="rect">
             <a:avLst/>
@@ -4434,6 +4444,7 @@
                   <a:srgbClr val="222222"/>
                 </a:solidFill>
                 <a:latin typeface="Nunito Sans"/>
+                <a:ea typeface="DejaVu Sans"/>
               </a:rPr>
               <a:t>Taxa de sucesso nas chamadas de API</a:t>
             </a:r>
@@ -4452,7 +4463,7 @@
         <p:spPr>
           <a:xfrm>
             <a:off x="6300000" y="1615680"/>
-            <a:ext cx="1799640" cy="470880"/>
+            <a:ext cx="1799280" cy="470520"/>
           </a:xfrm>
           <a:prstGeom prst="rect">
             <a:avLst/>
@@ -4484,6 +4495,7 @@
                   <a:srgbClr val="222222"/>
                 </a:solidFill>
                 <a:latin typeface="Nunito Sans Black"/>
+                <a:ea typeface="DejaVu Sans"/>
               </a:rPr>
               <a:t>90%</a:t>
             </a:r>
@@ -4502,7 +4514,7 @@
         <p:spPr>
           <a:xfrm>
             <a:off x="6444000" y="2072880"/>
-            <a:ext cx="1619640" cy="297360"/>
+            <a:ext cx="1619280" cy="297000"/>
           </a:xfrm>
           <a:prstGeom prst="rect">
             <a:avLst/>
@@ -4534,6 +4546,7 @@
                   <a:srgbClr val="222222"/>
                 </a:solidFill>
                 <a:latin typeface="Nunito Sans"/>
+                <a:ea typeface="DejaVu Sans"/>
               </a:rPr>
               <a:t>40 p.p.</a:t>
             </a:r>
@@ -4552,9 +4565,9 @@
         <p:grpSpPr>
           <a:xfrm>
             <a:off x="6841800" y="2116080"/>
-            <a:ext cx="132480" cy="178920"/>
+            <a:ext cx="132120" cy="178560"/>
             <a:chOff x="6841800" y="2116080"/>
-            <a:chExt cx="132480" cy="178920"/>
+            <a:chExt cx="132120" cy="178560"/>
           </a:xfrm>
         </p:grpSpPr>
         <p:sp>
@@ -4566,7 +4579,7 @@
           <p:spPr>
             <a:xfrm>
               <a:off x="6875280" y="2162520"/>
-              <a:ext cx="66240" cy="132480"/>
+              <a:ext cx="65880" cy="132120"/>
             </a:xfrm>
             <a:prstGeom prst="rect">
               <a:avLst/>
@@ -4596,7 +4609,7 @@
           <p:spPr>
             <a:xfrm>
               <a:off x="6841800" y="2116080"/>
-              <a:ext cx="132480" cy="66240"/>
+              <a:ext cx="132120" cy="65880"/>
             </a:xfrm>
             <a:custGeom>
               <a:avLst/>
@@ -4644,7 +4657,7 @@
         <p:spPr>
           <a:xfrm>
             <a:off x="1548000" y="3240360"/>
-            <a:ext cx="1619640" cy="297360"/>
+            <a:ext cx="1619280" cy="297000"/>
           </a:xfrm>
           <a:prstGeom prst="rect">
             <a:avLst/>
@@ -4676,6 +4689,7 @@
                   <a:srgbClr val="222222"/>
                 </a:solidFill>
                 <a:latin typeface="Nunito Sans"/>
+                <a:ea typeface="DejaVu Sans"/>
               </a:rPr>
               <a:t>Consignado</a:t>
             </a:r>
@@ -4694,7 +4708,7 @@
         <p:spPr>
           <a:xfrm>
             <a:off x="1404000" y="3565440"/>
-            <a:ext cx="1799640" cy="470880"/>
+            <a:ext cx="1799280" cy="470520"/>
           </a:xfrm>
           <a:prstGeom prst="rect">
             <a:avLst/>
@@ -4726,6 +4740,7 @@
                   <a:srgbClr val="222222"/>
                 </a:solidFill>
                 <a:latin typeface="Nunito Sans Black"/>
+                <a:ea typeface="DejaVu Sans"/>
               </a:rPr>
               <a:t>R$ 8 Mil</a:t>
             </a:r>
@@ -4744,7 +4759,7 @@
         <p:spPr>
           <a:xfrm>
             <a:off x="1548000" y="4022640"/>
-            <a:ext cx="1619640" cy="297360"/>
+            <a:ext cx="1619280" cy="297000"/>
           </a:xfrm>
           <a:prstGeom prst="rect">
             <a:avLst/>
@@ -4776,6 +4791,7 @@
                   <a:srgbClr val="222222"/>
                 </a:solidFill>
                 <a:latin typeface="Nunito Sans"/>
+                <a:ea typeface="DejaVu Sans"/>
               </a:rPr>
               <a:t>5%</a:t>
             </a:r>
@@ -4793,10 +4809,10 @@
         </p:nvGrpSpPr>
         <p:grpSpPr>
           <a:xfrm>
-            <a:off x="2017800" y="4065480"/>
-            <a:ext cx="132480" cy="178920"/>
-            <a:chOff x="2017800" y="4065480"/>
-            <a:chExt cx="132480" cy="178920"/>
+            <a:off x="2017800" y="4065120"/>
+            <a:ext cx="132120" cy="178920"/>
+            <a:chOff x="2017800" y="4065120"/>
+            <a:chExt cx="132120" cy="178920"/>
           </a:xfrm>
         </p:grpSpPr>
         <p:sp>
@@ -4807,8 +4823,8 @@
           </p:nvSpPr>
           <p:spPr>
             <a:xfrm flipV="1">
-              <a:off x="2051280" y="4065480"/>
-              <a:ext cx="66240" cy="132480"/>
+              <a:off x="2051280" y="4064760"/>
+              <a:ext cx="65880" cy="132120"/>
             </a:xfrm>
             <a:prstGeom prst="rect">
               <a:avLst/>
@@ -4838,7 +4854,7 @@
           <p:spPr>
             <a:xfrm>
               <a:off x="2017800" y="4178160"/>
-              <a:ext cx="132480" cy="66240"/>
+              <a:ext cx="132120" cy="65880"/>
             </a:xfrm>
             <a:custGeom>
               <a:avLst/>
@@ -4886,7 +4902,7 @@
         <p:spPr>
           <a:xfrm>
             <a:off x="3888000" y="3060360"/>
-            <a:ext cx="1619640" cy="504720"/>
+            <a:ext cx="1619280" cy="504360"/>
           </a:xfrm>
           <a:prstGeom prst="rect">
             <a:avLst/>
@@ -4918,6 +4934,7 @@
                   <a:srgbClr val="222222"/>
                 </a:solidFill>
                 <a:latin typeface="Nunito Sans"/>
+                <a:ea typeface="DejaVu Sans"/>
               </a:rPr>
               <a:t>Com garantia</a:t>
             </a:r>
@@ -4937,6 +4954,7 @@
                   <a:srgbClr val="222222"/>
                 </a:solidFill>
                 <a:latin typeface="Nunito Sans"/>
+                <a:ea typeface="DejaVu Sans"/>
               </a:rPr>
               <a:t>sobre veículos</a:t>
             </a:r>
@@ -4955,7 +4973,7 @@
         <p:spPr>
           <a:xfrm>
             <a:off x="3744000" y="3565440"/>
-            <a:ext cx="1799640" cy="470880"/>
+            <a:ext cx="1799280" cy="470520"/>
           </a:xfrm>
           <a:prstGeom prst="rect">
             <a:avLst/>
@@ -4987,6 +5005,7 @@
                   <a:srgbClr val="222222"/>
                 </a:solidFill>
                 <a:latin typeface="Nunito Sans Black"/>
+                <a:ea typeface="DejaVu Sans"/>
               </a:rPr>
               <a:t>R$ 12 Mil</a:t>
             </a:r>
@@ -5005,7 +5024,7 @@
         <p:spPr>
           <a:xfrm>
             <a:off x="3888000" y="4022640"/>
-            <a:ext cx="1619640" cy="297360"/>
+            <a:ext cx="1619280" cy="297000"/>
           </a:xfrm>
           <a:prstGeom prst="rect">
             <a:avLst/>
@@ -5037,6 +5056,7 @@
                   <a:srgbClr val="222222"/>
                 </a:solidFill>
                 <a:latin typeface="Nunito Sans"/>
+                <a:ea typeface="DejaVu Sans"/>
               </a:rPr>
               <a:t>100%</a:t>
             </a:r>
@@ -5055,9 +5075,9 @@
         <p:grpSpPr>
           <a:xfrm>
             <a:off x="4285800" y="4065840"/>
-            <a:ext cx="132480" cy="178920"/>
+            <a:ext cx="132120" cy="178560"/>
             <a:chOff x="4285800" y="4065840"/>
-            <a:chExt cx="132480" cy="178920"/>
+            <a:chExt cx="132120" cy="178560"/>
           </a:xfrm>
         </p:grpSpPr>
         <p:sp>
@@ -5069,7 +5089,7 @@
           <p:spPr>
             <a:xfrm>
               <a:off x="4319280" y="4112280"/>
-              <a:ext cx="66240" cy="132480"/>
+              <a:ext cx="65880" cy="132120"/>
             </a:xfrm>
             <a:prstGeom prst="rect">
               <a:avLst/>
@@ -5099,7 +5119,7 @@
           <p:spPr>
             <a:xfrm>
               <a:off x="4285800" y="4065840"/>
-              <a:ext cx="132480" cy="66240"/>
+              <a:ext cx="132120" cy="65880"/>
             </a:xfrm>
             <a:custGeom>
               <a:avLst/>
@@ -5235,7 +5255,7 @@
         <p:spPr>
           <a:xfrm>
             <a:off x="3420000" y="180000"/>
-            <a:ext cx="2339640" cy="506160"/>
+            <a:ext cx="2339280" cy="505800"/>
           </a:xfrm>
           <a:prstGeom prst="rect">
             <a:avLst/>
@@ -5267,6 +5287,7 @@
                   <a:srgbClr val="222222"/>
                 </a:solidFill>
                 <a:latin typeface="Nunito Sans Black"/>
+                <a:ea typeface="DejaVu Sans"/>
               </a:rPr>
               <a:t>VENDAS</a:t>
             </a:r>
@@ -5284,8 +5305,8 @@
         </p:nvSpPr>
         <p:spPr>
           <a:xfrm>
-            <a:off x="324360" y="1728000"/>
-            <a:ext cx="1619640" cy="504720"/>
+            <a:off x="324360" y="1980000"/>
+            <a:ext cx="1619280" cy="504360"/>
           </a:xfrm>
           <a:prstGeom prst="rect">
             <a:avLst/>
@@ -5317,6 +5338,7 @@
                   <a:srgbClr val="222222"/>
                 </a:solidFill>
                 <a:latin typeface="Nunito Sans"/>
+                <a:ea typeface="DejaVu Sans"/>
               </a:rPr>
               <a:t>Número de propostas vendidas</a:t>
             </a:r>
@@ -5334,8 +5356,8 @@
         </p:nvSpPr>
         <p:spPr>
           <a:xfrm>
-            <a:off x="324360" y="2233080"/>
-            <a:ext cx="1619640" cy="470880"/>
+            <a:off x="324360" y="2485080"/>
+            <a:ext cx="1619280" cy="470520"/>
           </a:xfrm>
           <a:prstGeom prst="rect">
             <a:avLst/>
@@ -5367,6 +5389,7 @@
                   <a:srgbClr val="222222"/>
                 </a:solidFill>
                 <a:latin typeface="Nunito Sans Black"/>
+                <a:ea typeface="DejaVu Sans"/>
               </a:rPr>
               <a:t>1.500</a:t>
             </a:r>
@@ -5384,8 +5407,8 @@
         </p:nvSpPr>
         <p:spPr>
           <a:xfrm>
-            <a:off x="324360" y="2690280"/>
-            <a:ext cx="1619640" cy="297360"/>
+            <a:off x="324360" y="2942280"/>
+            <a:ext cx="1619280" cy="297000"/>
           </a:xfrm>
           <a:prstGeom prst="rect">
             <a:avLst/>
@@ -5417,6 +5440,7 @@
                   <a:srgbClr val="222222"/>
                 </a:solidFill>
                 <a:latin typeface="Nunito Sans"/>
+                <a:ea typeface="DejaVu Sans"/>
               </a:rPr>
               <a:t>15%</a:t>
             </a:r>
@@ -5434,10 +5458,10 @@
         </p:nvGrpSpPr>
         <p:grpSpPr>
           <a:xfrm>
-            <a:off x="722160" y="2733480"/>
-            <a:ext cx="132480" cy="178920"/>
-            <a:chOff x="722160" y="2733480"/>
-            <a:chExt cx="132480" cy="178920"/>
+            <a:off x="722160" y="2985480"/>
+            <a:ext cx="132120" cy="178560"/>
+            <a:chOff x="722160" y="2985480"/>
+            <a:chExt cx="132120" cy="178560"/>
           </a:xfrm>
         </p:grpSpPr>
         <p:sp>
@@ -5448,8 +5472,8 @@
           </p:nvSpPr>
           <p:spPr>
             <a:xfrm>
-              <a:off x="755640" y="2779920"/>
-              <a:ext cx="66240" cy="132480"/>
+              <a:off x="755640" y="3031920"/>
+              <a:ext cx="65880" cy="132120"/>
             </a:xfrm>
             <a:prstGeom prst="rect">
               <a:avLst/>
@@ -5478,8 +5502,8 @@
           </p:nvSpPr>
           <p:spPr>
             <a:xfrm>
-              <a:off x="722160" y="2733480"/>
-              <a:ext cx="132480" cy="66240"/>
+              <a:off x="722160" y="2985480"/>
+              <a:ext cx="132120" cy="65880"/>
             </a:xfrm>
             <a:custGeom>
               <a:avLst/>
@@ -5526,8 +5550,8 @@
         </p:nvSpPr>
         <p:spPr>
           <a:xfrm>
-            <a:off x="2124360" y="1944000"/>
-            <a:ext cx="1619640" cy="297360"/>
+            <a:off x="2124360" y="2196000"/>
+            <a:ext cx="1619280" cy="297000"/>
           </a:xfrm>
           <a:prstGeom prst="rect">
             <a:avLst/>
@@ -5559,6 +5583,7 @@
                   <a:srgbClr val="222222"/>
                 </a:solidFill>
                 <a:latin typeface="Nunito Sans"/>
+                <a:ea typeface="DejaVu Sans"/>
               </a:rPr>
               <a:t>Valor total vendido</a:t>
             </a:r>
@@ -5576,8 +5601,8 @@
         </p:nvSpPr>
         <p:spPr>
           <a:xfrm>
-            <a:off x="1980360" y="2233080"/>
-            <a:ext cx="1799640" cy="470880"/>
+            <a:off x="1980360" y="2485080"/>
+            <a:ext cx="1799280" cy="470520"/>
           </a:xfrm>
           <a:prstGeom prst="rect">
             <a:avLst/>
@@ -5609,6 +5634,7 @@
                   <a:srgbClr val="222222"/>
                 </a:solidFill>
                 <a:latin typeface="Nunito Sans Black"/>
+                <a:ea typeface="DejaVu Sans"/>
               </a:rPr>
               <a:t>R$ 20 Mil</a:t>
             </a:r>
@@ -5626,8 +5652,8 @@
         </p:nvSpPr>
         <p:spPr>
           <a:xfrm>
-            <a:off x="2124360" y="2690280"/>
-            <a:ext cx="1619640" cy="297360"/>
+            <a:off x="2124360" y="2942280"/>
+            <a:ext cx="1619280" cy="297000"/>
           </a:xfrm>
           <a:prstGeom prst="rect">
             <a:avLst/>
@@ -5659,6 +5685,7 @@
                   <a:srgbClr val="222222"/>
                 </a:solidFill>
                 <a:latin typeface="Nunito Sans"/>
+                <a:ea typeface="DejaVu Sans"/>
               </a:rPr>
               <a:t>20%</a:t>
             </a:r>
@@ -5676,10 +5703,10 @@
         </p:nvGrpSpPr>
         <p:grpSpPr>
           <a:xfrm>
-            <a:off x="2522160" y="2733480"/>
-            <a:ext cx="132480" cy="178920"/>
-            <a:chOff x="2522160" y="2733480"/>
-            <a:chExt cx="132480" cy="178920"/>
+            <a:off x="2522160" y="2985480"/>
+            <a:ext cx="132120" cy="178560"/>
+            <a:chOff x="2522160" y="2985480"/>
+            <a:chExt cx="132120" cy="178560"/>
           </a:xfrm>
         </p:grpSpPr>
         <p:sp>
@@ -5690,8 +5717,8 @@
           </p:nvSpPr>
           <p:spPr>
             <a:xfrm>
-              <a:off x="2555640" y="2779920"/>
-              <a:ext cx="66240" cy="132480"/>
+              <a:off x="2555640" y="3031920"/>
+              <a:ext cx="65880" cy="132120"/>
             </a:xfrm>
             <a:prstGeom prst="rect">
               <a:avLst/>
@@ -5720,8 +5747,8 @@
           </p:nvSpPr>
           <p:spPr>
             <a:xfrm>
-              <a:off x="2522160" y="2733480"/>
-              <a:ext cx="132480" cy="66240"/>
+              <a:off x="2522160" y="2985480"/>
+              <a:ext cx="132120" cy="65880"/>
             </a:xfrm>
             <a:custGeom>
               <a:avLst/>
@@ -5769,7 +5796,7 @@
         <p:spPr>
           <a:xfrm>
             <a:off x="5364360" y="2098080"/>
-            <a:ext cx="1619640" cy="504720"/>
+            <a:ext cx="1619280" cy="504360"/>
           </a:xfrm>
           <a:prstGeom prst="rect">
             <a:avLst/>
@@ -5801,6 +5828,7 @@
                   <a:srgbClr val="222222"/>
                 </a:solidFill>
                 <a:latin typeface="Nunito Sans"/>
+                <a:ea typeface="DejaVu Sans"/>
               </a:rPr>
               <a:t>Taxa de conversão geral</a:t>
             </a:r>
@@ -5819,7 +5847,7 @@
         <p:spPr>
           <a:xfrm>
             <a:off x="5364360" y="2603160"/>
-            <a:ext cx="1619640" cy="470880"/>
+            <a:ext cx="1619280" cy="470520"/>
           </a:xfrm>
           <a:prstGeom prst="rect">
             <a:avLst/>
@@ -5851,6 +5879,7 @@
                   <a:srgbClr val="222222"/>
                 </a:solidFill>
                 <a:latin typeface="Nunito Sans Black"/>
+                <a:ea typeface="DejaVu Sans"/>
               </a:rPr>
               <a:t>60%</a:t>
             </a:r>
@@ -5869,7 +5898,7 @@
         <p:spPr>
           <a:xfrm>
             <a:off x="5364360" y="3060360"/>
-            <a:ext cx="1619640" cy="297360"/>
+            <a:ext cx="1619280" cy="297000"/>
           </a:xfrm>
           <a:prstGeom prst="rect">
             <a:avLst/>
@@ -5901,6 +5930,7 @@
                   <a:srgbClr val="222222"/>
                 </a:solidFill>
                 <a:latin typeface="Nunito Sans"/>
+                <a:ea typeface="DejaVu Sans"/>
               </a:rPr>
               <a:t>15 p.p.</a:t>
             </a:r>
@@ -5919,9 +5949,9 @@
         <p:grpSpPr>
           <a:xfrm>
             <a:off x="5762160" y="3103560"/>
-            <a:ext cx="132480" cy="178920"/>
+            <a:ext cx="132120" cy="178560"/>
             <a:chOff x="5762160" y="3103560"/>
-            <a:chExt cx="132480" cy="178920"/>
+            <a:chExt cx="132120" cy="178560"/>
           </a:xfrm>
         </p:grpSpPr>
         <p:sp>
@@ -5933,7 +5963,7 @@
           <p:spPr>
             <a:xfrm>
               <a:off x="5795640" y="3150000"/>
-              <a:ext cx="66240" cy="132480"/>
+              <a:ext cx="65880" cy="132120"/>
             </a:xfrm>
             <a:prstGeom prst="rect">
               <a:avLst/>
@@ -5963,7 +5993,7 @@
           <p:spPr>
             <a:xfrm>
               <a:off x="5762160" y="3103560"/>
-              <a:ext cx="132480" cy="66240"/>
+              <a:ext cx="132120" cy="65880"/>
             </a:xfrm>
             <a:custGeom>
               <a:avLst/>
@@ -6011,7 +6041,7 @@
         <p:spPr>
           <a:xfrm>
             <a:off x="7164360" y="2098080"/>
-            <a:ext cx="1619640" cy="504720"/>
+            <a:ext cx="1619280" cy="504360"/>
           </a:xfrm>
           <a:prstGeom prst="rect">
             <a:avLst/>
@@ -6043,6 +6073,7 @@
                   <a:srgbClr val="222222"/>
                 </a:solidFill>
                 <a:latin typeface="Nunito Sans"/>
+                <a:ea typeface="DejaVu Sans"/>
               </a:rPr>
               <a:t>Taxa de sucesso nas chamadas de API</a:t>
             </a:r>
@@ -6061,7 +6092,7 @@
         <p:spPr>
           <a:xfrm>
             <a:off x="7020360" y="2603160"/>
-            <a:ext cx="1799640" cy="470880"/>
+            <a:ext cx="1799280" cy="470520"/>
           </a:xfrm>
           <a:prstGeom prst="rect">
             <a:avLst/>
@@ -6093,6 +6124,7 @@
                   <a:srgbClr val="222222"/>
                 </a:solidFill>
                 <a:latin typeface="Nunito Sans Black"/>
+                <a:ea typeface="DejaVu Sans"/>
               </a:rPr>
               <a:t>90%</a:t>
             </a:r>
@@ -6111,7 +6143,7 @@
         <p:spPr>
           <a:xfrm>
             <a:off x="7164360" y="3060360"/>
-            <a:ext cx="1619640" cy="297360"/>
+            <a:ext cx="1619280" cy="297000"/>
           </a:xfrm>
           <a:prstGeom prst="rect">
             <a:avLst/>
@@ -6143,6 +6175,7 @@
                   <a:srgbClr val="222222"/>
                 </a:solidFill>
                 <a:latin typeface="Nunito Sans"/>
+                <a:ea typeface="DejaVu Sans"/>
               </a:rPr>
               <a:t>40 p.p.</a:t>
             </a:r>
@@ -6161,9 +6194,9 @@
         <p:grpSpPr>
           <a:xfrm>
             <a:off x="7562160" y="3103560"/>
-            <a:ext cx="132480" cy="178920"/>
+            <a:ext cx="132120" cy="178560"/>
             <a:chOff x="7562160" y="3103560"/>
-            <a:chExt cx="132480" cy="178920"/>
+            <a:chExt cx="132120" cy="178560"/>
           </a:xfrm>
         </p:grpSpPr>
         <p:sp>
@@ -6175,7 +6208,7 @@
           <p:spPr>
             <a:xfrm>
               <a:off x="7595640" y="3150000"/>
-              <a:ext cx="66240" cy="132480"/>
+              <a:ext cx="65880" cy="132120"/>
             </a:xfrm>
             <a:prstGeom prst="rect">
               <a:avLst/>
@@ -6205,7 +6238,7 @@
           <p:spPr>
             <a:xfrm>
               <a:off x="7562160" y="3103560"/>
-              <a:ext cx="132480" cy="66240"/>
+              <a:ext cx="132120" cy="65880"/>
             </a:xfrm>
             <a:custGeom>
               <a:avLst/>
@@ -6252,8 +6285,8 @@
         </p:nvSpPr>
         <p:spPr>
           <a:xfrm>
-            <a:off x="792360" y="3384000"/>
-            <a:ext cx="1619640" cy="297360"/>
+            <a:off x="792360" y="3636000"/>
+            <a:ext cx="1619280" cy="297000"/>
           </a:xfrm>
           <a:prstGeom prst="rect">
             <a:avLst/>
@@ -6285,6 +6318,7 @@
                   <a:srgbClr val="222222"/>
                 </a:solidFill>
                 <a:latin typeface="Nunito Sans"/>
+                <a:ea typeface="DejaVu Sans"/>
               </a:rPr>
               <a:t>Consignado</a:t>
             </a:r>
@@ -6302,8 +6336,8 @@
         </p:nvSpPr>
         <p:spPr>
           <a:xfrm>
-            <a:off x="648360" y="3709080"/>
-            <a:ext cx="1799640" cy="470880"/>
+            <a:off x="648360" y="3961080"/>
+            <a:ext cx="1799280" cy="470520"/>
           </a:xfrm>
           <a:prstGeom prst="rect">
             <a:avLst/>
@@ -6335,6 +6369,7 @@
                   <a:srgbClr val="222222"/>
                 </a:solidFill>
                 <a:latin typeface="Nunito Sans Black"/>
+                <a:ea typeface="DejaVu Sans"/>
               </a:rPr>
               <a:t>R$ 8 Mil</a:t>
             </a:r>
@@ -6352,8 +6387,8 @@
         </p:nvSpPr>
         <p:spPr>
           <a:xfrm>
-            <a:off x="792360" y="4166280"/>
-            <a:ext cx="1619640" cy="297360"/>
+            <a:off x="792360" y="4418280"/>
+            <a:ext cx="1619280" cy="297000"/>
           </a:xfrm>
           <a:prstGeom prst="rect">
             <a:avLst/>
@@ -6385,6 +6420,7 @@
                   <a:srgbClr val="222222"/>
                 </a:solidFill>
                 <a:latin typeface="Nunito Sans"/>
+                <a:ea typeface="DejaVu Sans"/>
               </a:rPr>
               <a:t>5%</a:t>
             </a:r>
@@ -6402,10 +6438,10 @@
         </p:nvGrpSpPr>
         <p:grpSpPr>
           <a:xfrm>
-            <a:off x="1262160" y="4209120"/>
-            <a:ext cx="132480" cy="178920"/>
-            <a:chOff x="1262160" y="4209120"/>
-            <a:chExt cx="132480" cy="178920"/>
+            <a:off x="1262160" y="4460760"/>
+            <a:ext cx="132120" cy="178920"/>
+            <a:chOff x="1262160" y="4460760"/>
+            <a:chExt cx="132120" cy="178920"/>
           </a:xfrm>
         </p:grpSpPr>
         <p:sp>
@@ -6416,8 +6452,8 @@
           </p:nvSpPr>
           <p:spPr>
             <a:xfrm flipV="1">
-              <a:off x="1295640" y="4209120"/>
-              <a:ext cx="66240" cy="132480"/>
+              <a:off x="1295640" y="4460400"/>
+              <a:ext cx="65880" cy="132120"/>
             </a:xfrm>
             <a:prstGeom prst="rect">
               <a:avLst/>
@@ -6446,8 +6482,8 @@
           </p:nvSpPr>
           <p:spPr>
             <a:xfrm>
-              <a:off x="1262160" y="4321800"/>
-              <a:ext cx="132480" cy="66240"/>
+              <a:off x="1262160" y="4573800"/>
+              <a:ext cx="132120" cy="65880"/>
             </a:xfrm>
             <a:custGeom>
               <a:avLst/>
@@ -6494,8 +6530,8 @@
         </p:nvSpPr>
         <p:spPr>
           <a:xfrm>
-            <a:off x="3132360" y="3204000"/>
-            <a:ext cx="1619640" cy="504720"/>
+            <a:off x="3132360" y="3456000"/>
+            <a:ext cx="1619280" cy="504360"/>
           </a:xfrm>
           <a:prstGeom prst="rect">
             <a:avLst/>
@@ -6527,6 +6563,7 @@
                   <a:srgbClr val="222222"/>
                 </a:solidFill>
                 <a:latin typeface="Nunito Sans"/>
+                <a:ea typeface="DejaVu Sans"/>
               </a:rPr>
               <a:t>Com garantia</a:t>
             </a:r>
@@ -6546,6 +6583,7 @@
                   <a:srgbClr val="222222"/>
                 </a:solidFill>
                 <a:latin typeface="Nunito Sans"/>
+                <a:ea typeface="DejaVu Sans"/>
               </a:rPr>
               <a:t>sobre veículos</a:t>
             </a:r>
@@ -6563,8 +6601,8 @@
         </p:nvSpPr>
         <p:spPr>
           <a:xfrm>
-            <a:off x="2988360" y="3709080"/>
-            <a:ext cx="1799640" cy="470880"/>
+            <a:off x="2988360" y="3961080"/>
+            <a:ext cx="1799280" cy="470520"/>
           </a:xfrm>
           <a:prstGeom prst="rect">
             <a:avLst/>
@@ -6596,6 +6634,7 @@
                   <a:srgbClr val="222222"/>
                 </a:solidFill>
                 <a:latin typeface="Nunito Sans Black"/>
+                <a:ea typeface="DejaVu Sans"/>
               </a:rPr>
               <a:t>R$ 12 Mil</a:t>
             </a:r>
@@ -6613,8 +6652,8 @@
         </p:nvSpPr>
         <p:spPr>
           <a:xfrm>
-            <a:off x="3132360" y="4166280"/>
-            <a:ext cx="1619640" cy="297360"/>
+            <a:off x="3132360" y="4418280"/>
+            <a:ext cx="1619280" cy="297000"/>
           </a:xfrm>
           <a:prstGeom prst="rect">
             <a:avLst/>
@@ -6646,6 +6685,7 @@
                   <a:srgbClr val="222222"/>
                 </a:solidFill>
                 <a:latin typeface="Nunito Sans"/>
+                <a:ea typeface="DejaVu Sans"/>
               </a:rPr>
               <a:t>100%</a:t>
             </a:r>
@@ -6663,10 +6703,10 @@
         </p:nvGrpSpPr>
         <p:grpSpPr>
           <a:xfrm>
-            <a:off x="3530160" y="4209480"/>
-            <a:ext cx="132480" cy="178920"/>
-            <a:chOff x="3530160" y="4209480"/>
-            <a:chExt cx="132480" cy="178920"/>
+            <a:off x="3530160" y="4461480"/>
+            <a:ext cx="132120" cy="178560"/>
+            <a:chOff x="3530160" y="4461480"/>
+            <a:chExt cx="132120" cy="178560"/>
           </a:xfrm>
         </p:grpSpPr>
         <p:sp>
@@ -6677,8 +6717,8 @@
           </p:nvSpPr>
           <p:spPr>
             <a:xfrm>
-              <a:off x="3563640" y="4255920"/>
-              <a:ext cx="66240" cy="132480"/>
+              <a:off x="3563640" y="4507920"/>
+              <a:ext cx="65880" cy="132120"/>
             </a:xfrm>
             <a:prstGeom prst="rect">
               <a:avLst/>
@@ -6707,8 +6747,8 @@
           </p:nvSpPr>
           <p:spPr>
             <a:xfrm>
-              <a:off x="3530160" y="4209480"/>
-              <a:ext cx="132480" cy="66240"/>
+              <a:off x="3530160" y="4461480"/>
+              <a:ext cx="132120" cy="65880"/>
             </a:xfrm>
             <a:custGeom>
               <a:avLst/>
@@ -6755,7 +6795,7 @@
         </p:nvSpPr>
         <p:spPr>
           <a:xfrm>
-            <a:off x="3168360" y="2952000"/>
+            <a:off x="3168360" y="3204000"/>
             <a:ext cx="287640" cy="287640"/>
           </a:xfrm>
           <a:prstGeom prst="line">
@@ -6784,7 +6824,7 @@
         </p:nvSpPr>
         <p:spPr>
           <a:xfrm flipH="1">
-            <a:off x="2090880" y="2964960"/>
+            <a:off x="2090880" y="3216960"/>
             <a:ext cx="432000" cy="525600"/>
           </a:xfrm>
           <a:prstGeom prst="line">
@@ -6814,7 +6854,7 @@
         <p:spPr>
           <a:xfrm>
             <a:off x="5544360" y="1080000"/>
-            <a:ext cx="3240000" cy="1620000"/>
+            <a:ext cx="3239640" cy="1619640"/>
           </a:xfrm>
           <a:prstGeom prst="rect">
             <a:avLst/>
@@ -6846,6 +6886,7 @@
                   <a:srgbClr val="222222"/>
                 </a:solidFill>
                 <a:latin typeface="Nunito Sans"/>
+                <a:ea typeface="DejaVu Sans"/>
               </a:rPr>
               <a:t>Realizamos algumas melhorias na API utilizada no fluxo de vendas. Como resultado, a taxa de sucesso nas chamadas de API teve uma forte melhora. Isso contribuiu muito para o aumento da taxa de conversão geral, e para as vendas como um todo.</a:t>
             </a:r>
@@ -6863,18 +6904,15 @@
         </p:nvSpPr>
         <p:spPr>
           <a:xfrm>
-            <a:off x="5220000" y="900000"/>
-            <a:ext cx="3780000" cy="2700000"/>
+            <a:off x="396000" y="720000"/>
+            <a:ext cx="3564000" cy="900000"/>
           </a:xfrm>
           <a:prstGeom prst="rect">
             <a:avLst/>
           </a:prstGeom>
           <a:noFill/>
-          <a:ln w="36000">
-            <a:solidFill>
-              <a:srgbClr val="780373"/>
-            </a:solidFill>
-            <a:round/>
+          <a:ln w="0">
+            <a:noFill/>
           </a:ln>
         </p:spPr>
         <p:style>
@@ -6883,32 +6921,6 @@
           <a:effectRef idx="0"/>
           <a:fontRef idx="minor"/>
         </p:style>
-      </p:sp>
-      <p:sp>
-        <p:nvSpPr>
-          <p:cNvPr id="156" name=""/>
-          <p:cNvSpPr/>
-          <p:nvPr/>
-        </p:nvSpPr>
-        <p:spPr>
-          <a:xfrm>
-            <a:off x="755640" y="928800"/>
-            <a:ext cx="3564360" cy="1620000"/>
-          </a:xfrm>
-          <a:prstGeom prst="rect">
-            <a:avLst/>
-          </a:prstGeom>
-          <a:noFill/>
-          <a:ln w="0">
-            <a:noFill/>
-          </a:ln>
-        </p:spPr>
-        <p:style>
-          <a:lnRef idx="0"/>
-          <a:fillRef idx="0"/>
-          <a:effectRef idx="0"/>
-          <a:fontRef idx="minor"/>
-        </p:style>
         <p:txBody>
           <a:bodyPr lIns="90000" rIns="90000" tIns="45000" bIns="45000">
             <a:noAutofit/>
@@ -6925,6 +6937,7 @@
                   <a:srgbClr val="222222"/>
                 </a:solidFill>
                 <a:latin typeface="Nunito Sans"/>
+                <a:ea typeface="DejaVu Sans"/>
               </a:rPr>
               <a:t>Mesmo com as quedas no número de usuários entrando na plataforma, e no valor total vendido para os produtos de consignado, tivemos um grande resultado com o aumento da taxa de conversão, e com a introdução de um novo produto no fluxo (empréstimos com garantia sobre veículos).</a:t>
             </a:r>
@@ -6933,35 +6946,6 @@
             </a:endParaRPr>
           </a:p>
         </p:txBody>
-      </p:sp>
-      <p:sp>
-        <p:nvSpPr>
-          <p:cNvPr id="157" name=""/>
-          <p:cNvSpPr/>
-          <p:nvPr/>
-        </p:nvSpPr>
-        <p:spPr>
-          <a:xfrm>
-            <a:off x="360000" y="720000"/>
-            <a:ext cx="4500000" cy="3960000"/>
-          </a:xfrm>
-          <a:prstGeom prst="rect">
-            <a:avLst/>
-          </a:prstGeom>
-          <a:noFill/>
-          <a:ln w="36000">
-            <a:solidFill>
-              <a:srgbClr val="780373"/>
-            </a:solidFill>
-            <a:round/>
-          </a:ln>
-        </p:spPr>
-        <p:style>
-          <a:lnRef idx="0"/>
-          <a:fillRef idx="0"/>
-          <a:effectRef idx="0"/>
-          <a:fontRef idx="minor"/>
-        </p:style>
       </p:sp>
     </p:spTree>
   </p:cSld>
@@ -6995,14 +6979,14 @@
       </p:grpSpPr>
       <p:sp>
         <p:nvSpPr>
-          <p:cNvPr id="158" name=""/>
+          <p:cNvPr id="156" name=""/>
           <p:cNvSpPr/>
           <p:nvPr/>
         </p:nvSpPr>
         <p:spPr>
           <a:xfrm>
             <a:off x="3420000" y="180000"/>
-            <a:ext cx="2339640" cy="506160"/>
+            <a:ext cx="2339280" cy="505800"/>
           </a:xfrm>
           <a:prstGeom prst="rect">
             <a:avLst/>
@@ -7034,6 +7018,7 @@
                   <a:srgbClr val="222222"/>
                 </a:solidFill>
                 <a:latin typeface="Nunito Sans Black"/>
+                <a:ea typeface="DejaVu Sans"/>
               </a:rPr>
               <a:t>VENDAS</a:t>
             </a:r>
@@ -7045,14 +7030,14 @@
       </p:sp>
       <p:sp>
         <p:nvSpPr>
-          <p:cNvPr id="159" name=""/>
+          <p:cNvPr id="157" name=""/>
           <p:cNvSpPr/>
           <p:nvPr/>
         </p:nvSpPr>
         <p:spPr>
           <a:xfrm>
             <a:off x="4356360" y="1224360"/>
-            <a:ext cx="1619640" cy="504720"/>
+            <a:ext cx="1619280" cy="504360"/>
           </a:xfrm>
           <a:prstGeom prst="rect">
             <a:avLst/>
@@ -7084,6 +7069,7 @@
                   <a:srgbClr val="222222"/>
                 </a:solidFill>
                 <a:latin typeface="Nunito Sans"/>
+                <a:ea typeface="DejaVu Sans"/>
               </a:rPr>
               <a:t>Número de propostas vendidas</a:t>
             </a:r>
@@ -7095,14 +7081,14 @@
       </p:sp>
       <p:sp>
         <p:nvSpPr>
-          <p:cNvPr id="160" name=""/>
+          <p:cNvPr id="158" name=""/>
           <p:cNvSpPr/>
           <p:nvPr/>
         </p:nvSpPr>
         <p:spPr>
           <a:xfrm>
             <a:off x="4356360" y="1729440"/>
-            <a:ext cx="1619640" cy="470880"/>
+            <a:ext cx="1619280" cy="470520"/>
           </a:xfrm>
           <a:prstGeom prst="rect">
             <a:avLst/>
@@ -7134,6 +7120,7 @@
                   <a:srgbClr val="222222"/>
                 </a:solidFill>
                 <a:latin typeface="Nunito Sans Black"/>
+                <a:ea typeface="DejaVu Sans"/>
               </a:rPr>
               <a:t>1.500</a:t>
             </a:r>
@@ -7145,14 +7132,14 @@
       </p:sp>
       <p:sp>
         <p:nvSpPr>
-          <p:cNvPr id="161" name=""/>
+          <p:cNvPr id="159" name=""/>
           <p:cNvSpPr/>
           <p:nvPr/>
         </p:nvSpPr>
         <p:spPr>
           <a:xfrm>
             <a:off x="4356360" y="2186640"/>
-            <a:ext cx="1619640" cy="297360"/>
+            <a:ext cx="1619280" cy="297000"/>
           </a:xfrm>
           <a:prstGeom prst="rect">
             <a:avLst/>
@@ -7184,6 +7171,7 @@
                   <a:srgbClr val="222222"/>
                 </a:solidFill>
                 <a:latin typeface="Nunito Sans"/>
+                <a:ea typeface="DejaVu Sans"/>
               </a:rPr>
               <a:t>15%</a:t>
             </a:r>
@@ -7195,28 +7183,28 @@
       </p:sp>
       <p:grpSp>
         <p:nvGrpSpPr>
-          <p:cNvPr id="162" name=""/>
+          <p:cNvPr id="160" name=""/>
           <p:cNvGrpSpPr/>
           <p:nvPr/>
         </p:nvGrpSpPr>
         <p:grpSpPr>
           <a:xfrm>
             <a:off x="4754160" y="2229840"/>
-            <a:ext cx="132480" cy="178920"/>
+            <a:ext cx="132120" cy="178560"/>
             <a:chOff x="4754160" y="2229840"/>
-            <a:chExt cx="132480" cy="178920"/>
+            <a:chExt cx="132120" cy="178560"/>
           </a:xfrm>
         </p:grpSpPr>
         <p:sp>
           <p:nvSpPr>
-            <p:cNvPr id="163" name=""/>
+            <p:cNvPr id="161" name=""/>
             <p:cNvSpPr/>
             <p:nvPr/>
           </p:nvSpPr>
           <p:spPr>
             <a:xfrm>
               <a:off x="4787640" y="2276280"/>
-              <a:ext cx="66240" cy="132480"/>
+              <a:ext cx="65880" cy="132120"/>
             </a:xfrm>
             <a:prstGeom prst="rect">
               <a:avLst/>
@@ -7239,14 +7227,14 @@
         </p:sp>
         <p:sp>
           <p:nvSpPr>
-            <p:cNvPr id="164" name=""/>
+            <p:cNvPr id="162" name=""/>
             <p:cNvSpPr/>
             <p:nvPr/>
           </p:nvSpPr>
           <p:spPr>
             <a:xfrm>
               <a:off x="4754160" y="2229840"/>
-              <a:ext cx="132480" cy="66240"/>
+              <a:ext cx="132120" cy="65880"/>
             </a:xfrm>
             <a:custGeom>
               <a:avLst/>
@@ -7287,14 +7275,14 @@
       </p:grpSp>
       <p:sp>
         <p:nvSpPr>
-          <p:cNvPr id="165" name=""/>
+          <p:cNvPr id="163" name=""/>
           <p:cNvSpPr/>
           <p:nvPr/>
         </p:nvSpPr>
         <p:spPr>
           <a:xfrm>
             <a:off x="6156360" y="1440360"/>
-            <a:ext cx="1619640" cy="297360"/>
+            <a:ext cx="1619280" cy="297000"/>
           </a:xfrm>
           <a:prstGeom prst="rect">
             <a:avLst/>
@@ -7326,6 +7314,7 @@
                   <a:srgbClr val="222222"/>
                 </a:solidFill>
                 <a:latin typeface="Nunito Sans"/>
+                <a:ea typeface="DejaVu Sans"/>
               </a:rPr>
               <a:t>Valor total vendido</a:t>
             </a:r>
@@ -7337,14 +7326,14 @@
       </p:sp>
       <p:sp>
         <p:nvSpPr>
-          <p:cNvPr id="166" name=""/>
+          <p:cNvPr id="164" name=""/>
           <p:cNvSpPr/>
           <p:nvPr/>
         </p:nvSpPr>
         <p:spPr>
           <a:xfrm>
             <a:off x="6012360" y="1729440"/>
-            <a:ext cx="1799640" cy="470880"/>
+            <a:ext cx="1799280" cy="470520"/>
           </a:xfrm>
           <a:prstGeom prst="rect">
             <a:avLst/>
@@ -7376,6 +7365,7 @@
                   <a:srgbClr val="222222"/>
                 </a:solidFill>
                 <a:latin typeface="Nunito Sans Black"/>
+                <a:ea typeface="DejaVu Sans"/>
               </a:rPr>
               <a:t>R$ 20 Mil</a:t>
             </a:r>
@@ -7387,14 +7377,14 @@
       </p:sp>
       <p:sp>
         <p:nvSpPr>
-          <p:cNvPr id="167" name=""/>
+          <p:cNvPr id="165" name=""/>
           <p:cNvSpPr/>
           <p:nvPr/>
         </p:nvSpPr>
         <p:spPr>
           <a:xfrm>
             <a:off x="6156360" y="2186640"/>
-            <a:ext cx="1619640" cy="297360"/>
+            <a:ext cx="1619280" cy="297000"/>
           </a:xfrm>
           <a:prstGeom prst="rect">
             <a:avLst/>
@@ -7426,6 +7416,7 @@
                   <a:srgbClr val="222222"/>
                 </a:solidFill>
                 <a:latin typeface="Nunito Sans"/>
+                <a:ea typeface="DejaVu Sans"/>
               </a:rPr>
               <a:t>20%</a:t>
             </a:r>
@@ -7437,28 +7428,28 @@
       </p:sp>
       <p:grpSp>
         <p:nvGrpSpPr>
-          <p:cNvPr id="168" name=""/>
+          <p:cNvPr id="166" name=""/>
           <p:cNvGrpSpPr/>
           <p:nvPr/>
         </p:nvGrpSpPr>
         <p:grpSpPr>
           <a:xfrm>
             <a:off x="6554160" y="2229840"/>
-            <a:ext cx="132480" cy="178920"/>
+            <a:ext cx="132120" cy="178560"/>
             <a:chOff x="6554160" y="2229840"/>
-            <a:chExt cx="132480" cy="178920"/>
+            <a:chExt cx="132120" cy="178560"/>
           </a:xfrm>
         </p:grpSpPr>
         <p:sp>
           <p:nvSpPr>
-            <p:cNvPr id="169" name=""/>
+            <p:cNvPr id="167" name=""/>
             <p:cNvSpPr/>
             <p:nvPr/>
           </p:nvSpPr>
           <p:spPr>
             <a:xfrm>
               <a:off x="6587640" y="2276280"/>
-              <a:ext cx="66240" cy="132480"/>
+              <a:ext cx="65880" cy="132120"/>
             </a:xfrm>
             <a:prstGeom prst="rect">
               <a:avLst/>
@@ -7481,14 +7472,14 @@
         </p:sp>
         <p:sp>
           <p:nvSpPr>
-            <p:cNvPr id="170" name=""/>
+            <p:cNvPr id="168" name=""/>
             <p:cNvSpPr/>
             <p:nvPr/>
           </p:nvSpPr>
           <p:spPr>
             <a:xfrm>
               <a:off x="6554160" y="2229840"/>
-              <a:ext cx="132480" cy="66240"/>
+              <a:ext cx="132120" cy="65880"/>
             </a:xfrm>
             <a:custGeom>
               <a:avLst/>
@@ -7529,14 +7520,14 @@
       </p:grpSp>
       <p:sp>
         <p:nvSpPr>
-          <p:cNvPr id="171" name=""/>
+          <p:cNvPr id="169" name=""/>
           <p:cNvSpPr/>
           <p:nvPr/>
         </p:nvSpPr>
         <p:spPr>
           <a:xfrm>
             <a:off x="4824360" y="2880360"/>
-            <a:ext cx="1619640" cy="297360"/>
+            <a:ext cx="1619280" cy="297000"/>
           </a:xfrm>
           <a:prstGeom prst="rect">
             <a:avLst/>
@@ -7568,6 +7559,7 @@
                   <a:srgbClr val="222222"/>
                 </a:solidFill>
                 <a:latin typeface="Nunito Sans"/>
+                <a:ea typeface="DejaVu Sans"/>
               </a:rPr>
               <a:t>Consignado</a:t>
             </a:r>
@@ -7579,14 +7571,14 @@
       </p:sp>
       <p:sp>
         <p:nvSpPr>
-          <p:cNvPr id="172" name=""/>
+          <p:cNvPr id="170" name=""/>
           <p:cNvSpPr/>
           <p:nvPr/>
         </p:nvSpPr>
         <p:spPr>
           <a:xfrm>
             <a:off x="4680360" y="3205440"/>
-            <a:ext cx="1799640" cy="470880"/>
+            <a:ext cx="1799280" cy="470520"/>
           </a:xfrm>
           <a:prstGeom prst="rect">
             <a:avLst/>
@@ -7618,6 +7610,7 @@
                   <a:srgbClr val="222222"/>
                 </a:solidFill>
                 <a:latin typeface="Nunito Sans Black"/>
+                <a:ea typeface="DejaVu Sans"/>
               </a:rPr>
               <a:t>R$ 8 Mil</a:t>
             </a:r>
@@ -7629,14 +7622,14 @@
       </p:sp>
       <p:sp>
         <p:nvSpPr>
-          <p:cNvPr id="173" name=""/>
+          <p:cNvPr id="171" name=""/>
           <p:cNvSpPr/>
           <p:nvPr/>
         </p:nvSpPr>
         <p:spPr>
           <a:xfrm>
             <a:off x="4824360" y="3662640"/>
-            <a:ext cx="1619640" cy="297360"/>
+            <a:ext cx="1619280" cy="297000"/>
           </a:xfrm>
           <a:prstGeom prst="rect">
             <a:avLst/>
@@ -7668,6 +7661,7 @@
                   <a:srgbClr val="222222"/>
                 </a:solidFill>
                 <a:latin typeface="Nunito Sans"/>
+                <a:ea typeface="DejaVu Sans"/>
               </a:rPr>
               <a:t>5%</a:t>
             </a:r>
@@ -7679,28 +7673,28 @@
       </p:sp>
       <p:grpSp>
         <p:nvGrpSpPr>
-          <p:cNvPr id="174" name=""/>
+          <p:cNvPr id="172" name=""/>
           <p:cNvGrpSpPr/>
           <p:nvPr/>
         </p:nvGrpSpPr>
         <p:grpSpPr>
           <a:xfrm>
-            <a:off x="5294160" y="3705480"/>
-            <a:ext cx="132480" cy="178920"/>
-            <a:chOff x="5294160" y="3705480"/>
-            <a:chExt cx="132480" cy="178920"/>
+            <a:off x="5294160" y="3705120"/>
+            <a:ext cx="132120" cy="178920"/>
+            <a:chOff x="5294160" y="3705120"/>
+            <a:chExt cx="132120" cy="178920"/>
           </a:xfrm>
         </p:grpSpPr>
         <p:sp>
           <p:nvSpPr>
-            <p:cNvPr id="175" name=""/>
+            <p:cNvPr id="173" name=""/>
             <p:cNvSpPr/>
             <p:nvPr/>
           </p:nvSpPr>
           <p:spPr>
             <a:xfrm flipV="1">
-              <a:off x="5327640" y="3705480"/>
-              <a:ext cx="66240" cy="132480"/>
+              <a:off x="5327640" y="3704760"/>
+              <a:ext cx="65880" cy="132120"/>
             </a:xfrm>
             <a:prstGeom prst="rect">
               <a:avLst/>
@@ -7723,14 +7717,14 @@
         </p:sp>
         <p:sp>
           <p:nvSpPr>
-            <p:cNvPr id="176" name=""/>
+            <p:cNvPr id="174" name=""/>
             <p:cNvSpPr/>
             <p:nvPr/>
           </p:nvSpPr>
           <p:spPr>
             <a:xfrm>
               <a:off x="5294160" y="3818160"/>
-              <a:ext cx="132480" cy="66240"/>
+              <a:ext cx="132120" cy="65880"/>
             </a:xfrm>
             <a:custGeom>
               <a:avLst/>
@@ -7771,14 +7765,14 @@
       </p:grpSp>
       <p:sp>
         <p:nvSpPr>
-          <p:cNvPr id="177" name=""/>
+          <p:cNvPr id="175" name=""/>
           <p:cNvSpPr/>
           <p:nvPr/>
         </p:nvSpPr>
         <p:spPr>
           <a:xfrm>
             <a:off x="7164360" y="2700360"/>
-            <a:ext cx="1619640" cy="504720"/>
+            <a:ext cx="1619280" cy="504360"/>
           </a:xfrm>
           <a:prstGeom prst="rect">
             <a:avLst/>
@@ -7810,6 +7804,7 @@
                   <a:srgbClr val="222222"/>
                 </a:solidFill>
                 <a:latin typeface="Nunito Sans"/>
+                <a:ea typeface="DejaVu Sans"/>
               </a:rPr>
               <a:t>Com garantia</a:t>
             </a:r>
@@ -7829,6 +7824,7 @@
                   <a:srgbClr val="222222"/>
                 </a:solidFill>
                 <a:latin typeface="Nunito Sans"/>
+                <a:ea typeface="DejaVu Sans"/>
               </a:rPr>
               <a:t>sobre veículos</a:t>
             </a:r>
@@ -7840,14 +7836,14 @@
       </p:sp>
       <p:sp>
         <p:nvSpPr>
-          <p:cNvPr id="178" name=""/>
+          <p:cNvPr id="176" name=""/>
           <p:cNvSpPr/>
           <p:nvPr/>
         </p:nvSpPr>
         <p:spPr>
           <a:xfrm>
             <a:off x="7020360" y="3205440"/>
-            <a:ext cx="1799640" cy="470880"/>
+            <a:ext cx="1799280" cy="470520"/>
           </a:xfrm>
           <a:prstGeom prst="rect">
             <a:avLst/>
@@ -7879,6 +7875,7 @@
                   <a:srgbClr val="222222"/>
                 </a:solidFill>
                 <a:latin typeface="Nunito Sans Black"/>
+                <a:ea typeface="DejaVu Sans"/>
               </a:rPr>
               <a:t>R$ 12 Mil</a:t>
             </a:r>
@@ -7890,14 +7887,14 @@
       </p:sp>
       <p:sp>
         <p:nvSpPr>
-          <p:cNvPr id="179" name=""/>
+          <p:cNvPr id="177" name=""/>
           <p:cNvSpPr/>
           <p:nvPr/>
         </p:nvSpPr>
         <p:spPr>
           <a:xfrm>
             <a:off x="7164360" y="3662640"/>
-            <a:ext cx="1619640" cy="297360"/>
+            <a:ext cx="1619280" cy="297000"/>
           </a:xfrm>
           <a:prstGeom prst="rect">
             <a:avLst/>
@@ -7929,6 +7926,7 @@
                   <a:srgbClr val="222222"/>
                 </a:solidFill>
                 <a:latin typeface="Nunito Sans"/>
+                <a:ea typeface="DejaVu Sans"/>
               </a:rPr>
               <a:t>100%</a:t>
             </a:r>
@@ -7940,28 +7938,28 @@
       </p:sp>
       <p:grpSp>
         <p:nvGrpSpPr>
-          <p:cNvPr id="180" name=""/>
+          <p:cNvPr id="178" name=""/>
           <p:cNvGrpSpPr/>
           <p:nvPr/>
         </p:nvGrpSpPr>
         <p:grpSpPr>
           <a:xfrm>
             <a:off x="7562160" y="3705840"/>
-            <a:ext cx="132480" cy="178920"/>
+            <a:ext cx="132120" cy="178560"/>
             <a:chOff x="7562160" y="3705840"/>
-            <a:chExt cx="132480" cy="178920"/>
+            <a:chExt cx="132120" cy="178560"/>
           </a:xfrm>
         </p:grpSpPr>
         <p:sp>
           <p:nvSpPr>
-            <p:cNvPr id="181" name=""/>
+            <p:cNvPr id="179" name=""/>
             <p:cNvSpPr/>
             <p:nvPr/>
           </p:nvSpPr>
           <p:spPr>
             <a:xfrm>
               <a:off x="7595640" y="3752280"/>
-              <a:ext cx="66240" cy="132480"/>
+              <a:ext cx="65880" cy="132120"/>
             </a:xfrm>
             <a:prstGeom prst="rect">
               <a:avLst/>
@@ -7984,14 +7982,14 @@
         </p:sp>
         <p:sp>
           <p:nvSpPr>
-            <p:cNvPr id="182" name=""/>
+            <p:cNvPr id="180" name=""/>
             <p:cNvSpPr/>
             <p:nvPr/>
           </p:nvSpPr>
           <p:spPr>
             <a:xfrm>
               <a:off x="7562160" y="3705840"/>
-              <a:ext cx="132480" cy="66240"/>
+              <a:ext cx="132120" cy="65880"/>
             </a:xfrm>
             <a:custGeom>
               <a:avLst/>
@@ -8032,7 +8030,7 @@
       </p:grpSp>
       <p:sp>
         <p:nvSpPr>
-          <p:cNvPr id="183" name=""/>
+          <p:cNvPr id="181" name=""/>
           <p:cNvSpPr/>
           <p:nvPr/>
         </p:nvSpPr>
@@ -8061,7 +8059,7 @@
       </p:sp>
       <p:sp>
         <p:nvSpPr>
-          <p:cNvPr id="184" name=""/>
+          <p:cNvPr id="182" name=""/>
           <p:cNvSpPr/>
           <p:nvPr/>
         </p:nvSpPr>
@@ -8090,14 +8088,14 @@
       </p:sp>
       <p:sp>
         <p:nvSpPr>
-          <p:cNvPr id="185" name=""/>
+          <p:cNvPr id="183" name=""/>
           <p:cNvSpPr/>
           <p:nvPr/>
         </p:nvSpPr>
         <p:spPr>
           <a:xfrm>
             <a:off x="575640" y="1260000"/>
-            <a:ext cx="3384360" cy="1620000"/>
+            <a:ext cx="3384000" cy="1619640"/>
           </a:xfrm>
           <a:prstGeom prst="rect">
             <a:avLst/>
@@ -8129,6 +8127,7 @@
                   <a:srgbClr val="222222"/>
                 </a:solidFill>
                 <a:latin typeface="Nunito Sans"/>
+                <a:ea typeface="DejaVu Sans"/>
               </a:rPr>
               <a:t>Mesmo com as quedas de 12% no número de usuários entrando na plataforma, e de 5% no valor total vendido para os produtos de consignado, tivemos um aumento significativo de 20% sobre o valor total vendido. Pois tivemos um aumento de 15 p.p. sobre a taxa de conversão. Além da introdução de um novo produto no fluxo (empréstimos com garantia sobre veículos) que obteve R$ 12 Mil em vendas logo no seu primeiro mês.</a:t>
             </a:r>

</xml_diff>

<commit_message>
Add a better structure to the post
</commit_message>
<xml_diff>
--- a/posts/2023/2023-01-20-storytelling/report-exemplo.pptx
+++ b/posts/2023/2023-01-20-storytelling/report-exemplo.pptx
@@ -1446,7 +1446,7 @@
         </p:spPr>
         <p:txBody>
           <a:bodyPr lIns="0" rIns="0" tIns="0" bIns="0">
-            <a:normAutofit fontScale="88000"/>
+            <a:normAutofit fontScale="80000"/>
           </a:bodyPr>
           <a:p>
             <a:pPr marL="432000" indent="-324000">
@@ -1656,7 +1656,7 @@
         <p:spPr>
           <a:xfrm>
             <a:off x="3715200" y="919800"/>
-            <a:ext cx="234720" cy="258840"/>
+            <a:ext cx="234360" cy="258480"/>
           </a:xfrm>
           <a:prstGeom prst="rect">
             <a:avLst/>
@@ -1675,7 +1675,7 @@
         <p:spPr>
           <a:xfrm>
             <a:off x="3202920" y="1189440"/>
-            <a:ext cx="1263240" cy="538200"/>
+            <a:ext cx="1262880" cy="537840"/>
           </a:xfrm>
           <a:prstGeom prst="rect">
             <a:avLst/>
@@ -1752,7 +1752,7 @@
         <p:spPr>
           <a:xfrm>
             <a:off x="1275480" y="1187280"/>
-            <a:ext cx="842400" cy="450360"/>
+            <a:ext cx="842040" cy="450000"/>
           </a:xfrm>
           <a:prstGeom prst="rect">
             <a:avLst/>
@@ -1835,7 +1835,7 @@
         <p:spPr>
           <a:xfrm>
             <a:off x="1608120" y="939240"/>
-            <a:ext cx="178200" cy="247680"/>
+            <a:ext cx="177840" cy="247320"/>
           </a:xfrm>
           <a:prstGeom prst="rect">
             <a:avLst/>
@@ -1854,7 +1854,7 @@
         <p:spPr>
           <a:xfrm>
             <a:off x="2276280" y="1191600"/>
-            <a:ext cx="922320" cy="258840"/>
+            <a:ext cx="921960" cy="258480"/>
           </a:xfrm>
           <a:prstGeom prst="rect">
             <a:avLst/>
@@ -1937,7 +1937,7 @@
         <p:spPr>
           <a:xfrm>
             <a:off x="2643840" y="851760"/>
-            <a:ext cx="340920" cy="326520"/>
+            <a:ext cx="340560" cy="326160"/>
           </a:xfrm>
           <a:prstGeom prst="rect">
             <a:avLst/>
@@ -1956,7 +1956,7 @@
         <p:spPr>
           <a:xfrm>
             <a:off x="4300200" y="1191600"/>
-            <a:ext cx="1298160" cy="509760"/>
+            <a:ext cx="1297800" cy="509400"/>
           </a:xfrm>
           <a:prstGeom prst="rect">
             <a:avLst/>
@@ -2049,7 +2049,7 @@
         <p:spPr>
           <a:xfrm>
             <a:off x="4790160" y="898560"/>
-            <a:ext cx="340920" cy="296640"/>
+            <a:ext cx="340560" cy="296280"/>
           </a:xfrm>
           <a:prstGeom prst="rect">
             <a:avLst/>
@@ -2068,7 +2068,7 @@
         <p:spPr>
           <a:xfrm>
             <a:off x="3356640" y="1523160"/>
-            <a:ext cx="922320" cy="406800"/>
+            <a:ext cx="921960" cy="406440"/>
           </a:xfrm>
           <a:prstGeom prst="rect">
             <a:avLst/>
@@ -2155,7 +2155,7 @@
         <p:spPr>
           <a:xfrm>
             <a:off x="4312080" y="1525680"/>
-            <a:ext cx="1298160" cy="406800"/>
+            <a:ext cx="1297800" cy="406440"/>
           </a:xfrm>
           <a:prstGeom prst="rect">
             <a:avLst/>
@@ -2248,7 +2248,7 @@
         <p:spPr>
           <a:xfrm>
             <a:off x="5986080" y="927360"/>
-            <a:ext cx="288360" cy="256680"/>
+            <a:ext cx="288000" cy="256320"/>
           </a:xfrm>
           <a:prstGeom prst="rect">
             <a:avLst/>
@@ -2267,7 +2267,7 @@
         <p:spPr>
           <a:xfrm>
             <a:off x="5658840" y="1190880"/>
-            <a:ext cx="960120" cy="381960"/>
+            <a:ext cx="959760" cy="381600"/>
           </a:xfrm>
           <a:prstGeom prst="rect">
             <a:avLst/>
@@ -2321,7 +2321,7 @@
         <p:spPr>
           <a:xfrm>
             <a:off x="2282760" y="1523880"/>
-            <a:ext cx="922320" cy="450360"/>
+            <a:ext cx="921960" cy="450000"/>
           </a:xfrm>
           <a:prstGeom prst="rect">
             <a:avLst/>
@@ -2408,7 +2408,7 @@
         <p:spPr>
           <a:xfrm>
             <a:off x="1327320" y="1532160"/>
-            <a:ext cx="712800" cy="450360"/>
+            <a:ext cx="712440" cy="450000"/>
           </a:xfrm>
           <a:prstGeom prst="rect">
             <a:avLst/>
@@ -2495,7 +2495,7 @@
         <p:spPr>
           <a:xfrm>
             <a:off x="5726160" y="1526400"/>
-            <a:ext cx="842400" cy="406800"/>
+            <a:ext cx="842040" cy="406440"/>
           </a:xfrm>
           <a:prstGeom prst="rect">
             <a:avLst/>
@@ -2582,7 +2582,7 @@
         <p:spPr>
           <a:xfrm>
             <a:off x="3243960" y="290520"/>
-            <a:ext cx="2511360" cy="489960"/>
+            <a:ext cx="2511000" cy="489600"/>
           </a:xfrm>
           <a:prstGeom prst="rect">
             <a:avLst/>
@@ -2636,7 +2636,7 @@
         <p:spPr>
           <a:xfrm>
             <a:off x="6982200" y="1521720"/>
-            <a:ext cx="660960" cy="478800"/>
+            <a:ext cx="660600" cy="478440"/>
           </a:xfrm>
           <a:prstGeom prst="rect">
             <a:avLst/>
@@ -2713,7 +2713,7 @@
         <p:spPr>
           <a:xfrm>
             <a:off x="6391800" y="1190880"/>
-            <a:ext cx="1741320" cy="469800"/>
+            <a:ext cx="1740960" cy="469440"/>
           </a:xfrm>
           <a:prstGeom prst="rect">
             <a:avLst/>
@@ -2796,7 +2796,7 @@
         <p:spPr>
           <a:xfrm>
             <a:off x="7130160" y="919800"/>
-            <a:ext cx="288000" cy="270720"/>
+            <a:ext cx="287640" cy="270360"/>
           </a:xfrm>
           <a:prstGeom prst="rect">
             <a:avLst/>
@@ -2815,7 +2815,7 @@
         <p:spPr>
           <a:xfrm>
             <a:off x="7935480" y="1172520"/>
-            <a:ext cx="960120" cy="326520"/>
+            <a:ext cx="959760" cy="326160"/>
           </a:xfrm>
           <a:prstGeom prst="rect">
             <a:avLst/>
@@ -2869,7 +2869,7 @@
         <p:spPr>
           <a:xfrm>
             <a:off x="8079480" y="1505160"/>
-            <a:ext cx="671760" cy="517680"/>
+            <a:ext cx="671400" cy="517320"/>
           </a:xfrm>
           <a:prstGeom prst="rect">
             <a:avLst/>
@@ -2951,8 +2951,8 @@
         </p:blipFill>
         <p:spPr>
           <a:xfrm flipH="1" rot="10800000">
-            <a:off x="8265240" y="909360"/>
-            <a:ext cx="273600" cy="259200"/>
+            <a:off x="8265240" y="909720"/>
+            <a:ext cx="273240" cy="258840"/>
           </a:xfrm>
           <a:prstGeom prst="rect">
             <a:avLst/>
@@ -2971,7 +2971,7 @@
         <p:spPr>
           <a:xfrm>
             <a:off x="264960" y="1491480"/>
-            <a:ext cx="864360" cy="304200"/>
+            <a:ext cx="864000" cy="303840"/>
           </a:xfrm>
           <a:prstGeom prst="rect">
             <a:avLst/>
@@ -3025,7 +3025,7 @@
         <p:spPr>
           <a:xfrm>
             <a:off x="496800" y="1705680"/>
-            <a:ext cx="546120" cy="259560"/>
+            <a:ext cx="545760" cy="259200"/>
           </a:xfrm>
           <a:prstGeom prst="rect">
             <a:avLst/>
@@ -3083,7 +3083,7 @@
         <p:spPr>
           <a:xfrm>
             <a:off x="478080" y="874800"/>
-            <a:ext cx="450000" cy="450360"/>
+            <a:ext cx="449640" cy="450000"/>
           </a:xfrm>
           <a:prstGeom prst="rect">
             <a:avLst/>
@@ -3108,7 +3108,7 @@
         <p:spPr>
           <a:xfrm>
             <a:off x="1459440" y="1820880"/>
-            <a:ext cx="86760" cy="87120"/>
+            <a:ext cx="86400" cy="86760"/>
           </a:xfrm>
           <a:prstGeom prst="rect">
             <a:avLst/>
@@ -3133,7 +3133,7 @@
         <p:spPr>
           <a:xfrm>
             <a:off x="2508840" y="1804680"/>
-            <a:ext cx="86760" cy="87120"/>
+            <a:ext cx="86400" cy="86760"/>
           </a:xfrm>
           <a:prstGeom prst="rect">
             <a:avLst/>
@@ -3158,7 +3158,7 @@
         <p:spPr>
           <a:xfrm>
             <a:off x="3597120" y="1797120"/>
-            <a:ext cx="91080" cy="87120"/>
+            <a:ext cx="90720" cy="86760"/>
           </a:xfrm>
           <a:prstGeom prst="rect">
             <a:avLst/>
@@ -3183,7 +3183,7 @@
         <p:spPr>
           <a:xfrm>
             <a:off x="5893560" y="1816200"/>
-            <a:ext cx="86760" cy="87120"/>
+            <a:ext cx="86400" cy="86760"/>
           </a:xfrm>
           <a:prstGeom prst="rect">
             <a:avLst/>
@@ -3208,7 +3208,7 @@
         <p:spPr>
           <a:xfrm>
             <a:off x="445680" y="1805040"/>
-            <a:ext cx="91080" cy="87120"/>
+            <a:ext cx="90720" cy="86760"/>
           </a:xfrm>
           <a:prstGeom prst="rect">
             <a:avLst/>
@@ -3233,7 +3233,7 @@
         <p:spPr>
           <a:xfrm>
             <a:off x="4745520" y="1801080"/>
-            <a:ext cx="91080" cy="87120"/>
+            <a:ext cx="90720" cy="86760"/>
           </a:xfrm>
           <a:prstGeom prst="rect">
             <a:avLst/>
@@ -3258,7 +3258,7 @@
         <p:spPr>
           <a:xfrm>
             <a:off x="8151120" y="1792080"/>
-            <a:ext cx="91080" cy="87120"/>
+            <a:ext cx="90720" cy="86760"/>
           </a:xfrm>
           <a:prstGeom prst="rect">
             <a:avLst/>
@@ -3283,7 +3283,7 @@
         <p:spPr>
           <a:xfrm>
             <a:off x="7020000" y="1800360"/>
-            <a:ext cx="91080" cy="87120"/>
+            <a:ext cx="90720" cy="86760"/>
           </a:xfrm>
           <a:prstGeom prst="rect">
             <a:avLst/>
@@ -3302,7 +3302,7 @@
         <p:spPr>
           <a:xfrm>
             <a:off x="286920" y="1260000"/>
-            <a:ext cx="842400" cy="450360"/>
+            <a:ext cx="842040" cy="450000"/>
           </a:xfrm>
           <a:prstGeom prst="rect">
             <a:avLst/>
@@ -3356,7 +3356,7 @@
         <p:spPr>
           <a:xfrm>
             <a:off x="5916600" y="4571640"/>
-            <a:ext cx="1150560" cy="348480"/>
+            <a:ext cx="1150200" cy="348120"/>
           </a:xfrm>
           <a:prstGeom prst="rect">
             <a:avLst/>
@@ -3410,7 +3410,7 @@
         <p:spPr>
           <a:xfrm>
             <a:off x="1082520" y="4528440"/>
-            <a:ext cx="5024880" cy="381960"/>
+            <a:ext cx="5024520" cy="381600"/>
           </a:xfrm>
           <a:prstGeom prst="rect">
             <a:avLst/>
@@ -3554,7 +3554,7 @@
         <p:spPr>
           <a:xfrm>
             <a:off x="359640" y="2160000"/>
-            <a:ext cx="3958920" cy="1978560"/>
+            <a:ext cx="3958560" cy="1978200"/>
           </a:xfrm>
           <a:prstGeom prst="rect">
             <a:avLst/>
@@ -3577,7 +3577,7 @@
         <p:spPr>
           <a:xfrm>
             <a:off x="4680000" y="2160000"/>
-            <a:ext cx="4102920" cy="2050920"/>
+            <a:ext cx="4102560" cy="2050560"/>
           </a:xfrm>
           <a:prstGeom prst="rect">
             <a:avLst/>
@@ -3626,7 +3626,7 @@
         <p:spPr>
           <a:xfrm>
             <a:off x="3420000" y="180000"/>
-            <a:ext cx="2339280" cy="505800"/>
+            <a:ext cx="2338920" cy="505440"/>
           </a:xfrm>
           <a:prstGeom prst="rect">
             <a:avLst/>
@@ -3677,7 +3677,7 @@
         <p:spPr>
           <a:xfrm>
             <a:off x="1080000" y="1116360"/>
-            <a:ext cx="1619280" cy="504360"/>
+            <a:ext cx="1618920" cy="504000"/>
           </a:xfrm>
           <a:prstGeom prst="rect">
             <a:avLst/>
@@ -3728,7 +3728,7 @@
         <p:spPr>
           <a:xfrm>
             <a:off x="1080000" y="1621440"/>
-            <a:ext cx="1619280" cy="470520"/>
+            <a:ext cx="1618920" cy="470160"/>
           </a:xfrm>
           <a:prstGeom prst="rect">
             <a:avLst/>
@@ -3779,7 +3779,7 @@
         <p:spPr>
           <a:xfrm>
             <a:off x="1080000" y="2078640"/>
-            <a:ext cx="1619280" cy="297000"/>
+            <a:ext cx="1618920" cy="296640"/>
           </a:xfrm>
           <a:prstGeom prst="rect">
             <a:avLst/>
@@ -3830,9 +3830,9 @@
         <p:grpSpPr>
           <a:xfrm>
             <a:off x="1477800" y="2121840"/>
-            <a:ext cx="132120" cy="178560"/>
+            <a:ext cx="131760" cy="178200"/>
             <a:chOff x="1477800" y="2121840"/>
-            <a:chExt cx="132120" cy="178560"/>
+            <a:chExt cx="131760" cy="178200"/>
           </a:xfrm>
         </p:grpSpPr>
         <p:sp>
@@ -3844,7 +3844,7 @@
           <p:spPr>
             <a:xfrm>
               <a:off x="1511280" y="2168280"/>
-              <a:ext cx="65880" cy="132120"/>
+              <a:ext cx="65520" cy="131760"/>
             </a:xfrm>
             <a:prstGeom prst="rect">
               <a:avLst/>
@@ -3874,7 +3874,7 @@
           <p:spPr>
             <a:xfrm>
               <a:off x="1477800" y="2121840"/>
-              <a:ext cx="132120" cy="65880"/>
+              <a:ext cx="131760" cy="65520"/>
             </a:xfrm>
             <a:custGeom>
               <a:avLst/>
@@ -3922,7 +3922,7 @@
         <p:spPr>
           <a:xfrm>
             <a:off x="2880000" y="1332360"/>
-            <a:ext cx="1619280" cy="297000"/>
+            <a:ext cx="1618920" cy="296640"/>
           </a:xfrm>
           <a:prstGeom prst="rect">
             <a:avLst/>
@@ -3973,7 +3973,7 @@
         <p:spPr>
           <a:xfrm>
             <a:off x="2736000" y="1621440"/>
-            <a:ext cx="1799280" cy="470520"/>
+            <a:ext cx="1798920" cy="470160"/>
           </a:xfrm>
           <a:prstGeom prst="rect">
             <a:avLst/>
@@ -4024,7 +4024,7 @@
         <p:spPr>
           <a:xfrm>
             <a:off x="2880000" y="2078640"/>
-            <a:ext cx="1619280" cy="297000"/>
+            <a:ext cx="1618920" cy="296640"/>
           </a:xfrm>
           <a:prstGeom prst="rect">
             <a:avLst/>
@@ -4075,9 +4075,9 @@
         <p:grpSpPr>
           <a:xfrm>
             <a:off x="3277800" y="2121840"/>
-            <a:ext cx="132120" cy="178560"/>
+            <a:ext cx="131760" cy="178200"/>
             <a:chOff x="3277800" y="2121840"/>
-            <a:chExt cx="132120" cy="178560"/>
+            <a:chExt cx="131760" cy="178200"/>
           </a:xfrm>
         </p:grpSpPr>
         <p:sp>
@@ -4089,7 +4089,7 @@
           <p:spPr>
             <a:xfrm>
               <a:off x="3311280" y="2168280"/>
-              <a:ext cx="65880" cy="132120"/>
+              <a:ext cx="65520" cy="131760"/>
             </a:xfrm>
             <a:prstGeom prst="rect">
               <a:avLst/>
@@ -4119,7 +4119,7 @@
           <p:spPr>
             <a:xfrm>
               <a:off x="3277800" y="2121840"/>
-              <a:ext cx="132120" cy="65880"/>
+              <a:ext cx="131760" cy="65520"/>
             </a:xfrm>
             <a:custGeom>
               <a:avLst/>
@@ -4167,7 +4167,7 @@
         <p:spPr>
           <a:xfrm>
             <a:off x="4644000" y="1110600"/>
-            <a:ext cx="1619280" cy="504360"/>
+            <a:ext cx="1618920" cy="504000"/>
           </a:xfrm>
           <a:prstGeom prst="rect">
             <a:avLst/>
@@ -4218,7 +4218,7 @@
         <p:spPr>
           <a:xfrm>
             <a:off x="4644000" y="1615680"/>
-            <a:ext cx="1619280" cy="470520"/>
+            <a:ext cx="1618920" cy="470160"/>
           </a:xfrm>
           <a:prstGeom prst="rect">
             <a:avLst/>
@@ -4269,7 +4269,7 @@
         <p:spPr>
           <a:xfrm>
             <a:off x="4644000" y="2072880"/>
-            <a:ext cx="1619280" cy="297000"/>
+            <a:ext cx="1618920" cy="296640"/>
           </a:xfrm>
           <a:prstGeom prst="rect">
             <a:avLst/>
@@ -4320,9 +4320,9 @@
         <p:grpSpPr>
           <a:xfrm>
             <a:off x="5041800" y="2116080"/>
-            <a:ext cx="132120" cy="178560"/>
+            <a:ext cx="131760" cy="178200"/>
             <a:chOff x="5041800" y="2116080"/>
-            <a:chExt cx="132120" cy="178560"/>
+            <a:chExt cx="131760" cy="178200"/>
           </a:xfrm>
         </p:grpSpPr>
         <p:sp>
@@ -4334,7 +4334,7 @@
           <p:spPr>
             <a:xfrm>
               <a:off x="5075280" y="2162520"/>
-              <a:ext cx="65880" cy="132120"/>
+              <a:ext cx="65520" cy="131760"/>
             </a:xfrm>
             <a:prstGeom prst="rect">
               <a:avLst/>
@@ -4364,7 +4364,7 @@
           <p:spPr>
             <a:xfrm>
               <a:off x="5041800" y="2116080"/>
-              <a:ext cx="132120" cy="65880"/>
+              <a:ext cx="131760" cy="65520"/>
             </a:xfrm>
             <a:custGeom>
               <a:avLst/>
@@ -4412,7 +4412,7 @@
         <p:spPr>
           <a:xfrm>
             <a:off x="6444000" y="1110600"/>
-            <a:ext cx="1619280" cy="504360"/>
+            <a:ext cx="1618920" cy="504000"/>
           </a:xfrm>
           <a:prstGeom prst="rect">
             <a:avLst/>
@@ -4463,7 +4463,7 @@
         <p:spPr>
           <a:xfrm>
             <a:off x="6300000" y="1615680"/>
-            <a:ext cx="1799280" cy="470520"/>
+            <a:ext cx="1798920" cy="470160"/>
           </a:xfrm>
           <a:prstGeom prst="rect">
             <a:avLst/>
@@ -4514,7 +4514,7 @@
         <p:spPr>
           <a:xfrm>
             <a:off x="6444000" y="2072880"/>
-            <a:ext cx="1619280" cy="297000"/>
+            <a:ext cx="1618920" cy="296640"/>
           </a:xfrm>
           <a:prstGeom prst="rect">
             <a:avLst/>
@@ -4565,9 +4565,9 @@
         <p:grpSpPr>
           <a:xfrm>
             <a:off x="6841800" y="2116080"/>
-            <a:ext cx="132120" cy="178560"/>
+            <a:ext cx="131760" cy="178200"/>
             <a:chOff x="6841800" y="2116080"/>
-            <a:chExt cx="132120" cy="178560"/>
+            <a:chExt cx="131760" cy="178200"/>
           </a:xfrm>
         </p:grpSpPr>
         <p:sp>
@@ -4579,7 +4579,7 @@
           <p:spPr>
             <a:xfrm>
               <a:off x="6875280" y="2162520"/>
-              <a:ext cx="65880" cy="132120"/>
+              <a:ext cx="65520" cy="131760"/>
             </a:xfrm>
             <a:prstGeom prst="rect">
               <a:avLst/>
@@ -4609,7 +4609,7 @@
           <p:spPr>
             <a:xfrm>
               <a:off x="6841800" y="2116080"/>
-              <a:ext cx="132120" cy="65880"/>
+              <a:ext cx="131760" cy="65520"/>
             </a:xfrm>
             <a:custGeom>
               <a:avLst/>
@@ -4657,7 +4657,7 @@
         <p:spPr>
           <a:xfrm>
             <a:off x="1548000" y="3240360"/>
-            <a:ext cx="1619280" cy="297000"/>
+            <a:ext cx="1618920" cy="296640"/>
           </a:xfrm>
           <a:prstGeom prst="rect">
             <a:avLst/>
@@ -4691,7 +4691,7 @@
                 <a:latin typeface="Nunito Sans"/>
                 <a:ea typeface="DejaVu Sans"/>
               </a:rPr>
-              <a:t>Consignado</a:t>
+              <a:t>Empréstimo Consignado</a:t>
             </a:r>
             <a:endParaRPr b="0" lang="pt-BR" sz="1200" spc="-1" strike="noStrike">
               <a:latin typeface="Arial"/>
@@ -4707,8 +4707,8 @@
         </p:nvSpPr>
         <p:spPr>
           <a:xfrm>
-            <a:off x="1404000" y="3565440"/>
-            <a:ext cx="1799280" cy="470520"/>
+            <a:off x="1404000" y="3637440"/>
+            <a:ext cx="1798920" cy="470160"/>
           </a:xfrm>
           <a:prstGeom prst="rect">
             <a:avLst/>
@@ -4758,8 +4758,8 @@
         </p:nvSpPr>
         <p:spPr>
           <a:xfrm>
-            <a:off x="1548000" y="4022640"/>
-            <a:ext cx="1619280" cy="297000"/>
+            <a:off x="1548000" y="4094640"/>
+            <a:ext cx="1618920" cy="296640"/>
           </a:xfrm>
           <a:prstGeom prst="rect">
             <a:avLst/>
@@ -4809,10 +4809,10 @@
         </p:nvGrpSpPr>
         <p:grpSpPr>
           <a:xfrm>
-            <a:off x="2017800" y="4065120"/>
-            <a:ext cx="132120" cy="178920"/>
-            <a:chOff x="2017800" y="4065120"/>
-            <a:chExt cx="132120" cy="178920"/>
+            <a:off x="2017800" y="4136760"/>
+            <a:ext cx="131760" cy="178920"/>
+            <a:chOff x="2017800" y="4136760"/>
+            <a:chExt cx="131760" cy="178920"/>
           </a:xfrm>
         </p:grpSpPr>
         <p:sp>
@@ -4823,8 +4823,8 @@
           </p:nvSpPr>
           <p:spPr>
             <a:xfrm flipV="1">
-              <a:off x="2051280" y="4064760"/>
-              <a:ext cx="65880" cy="132120"/>
+              <a:off x="2051280" y="4136760"/>
+              <a:ext cx="65520" cy="131760"/>
             </a:xfrm>
             <a:prstGeom prst="rect">
               <a:avLst/>
@@ -4853,8 +4853,8 @@
           </p:nvSpPr>
           <p:spPr>
             <a:xfrm>
-              <a:off x="2017800" y="4178160"/>
-              <a:ext cx="132120" cy="65880"/>
+              <a:off x="2017800" y="4250160"/>
+              <a:ext cx="131760" cy="65520"/>
             </a:xfrm>
             <a:custGeom>
               <a:avLst/>
@@ -4901,8 +4901,8 @@
         </p:nvSpPr>
         <p:spPr>
           <a:xfrm>
-            <a:off x="3888000" y="3060360"/>
-            <a:ext cx="1619280" cy="504360"/>
+            <a:off x="3600000" y="3132000"/>
+            <a:ext cx="2052000" cy="504000"/>
           </a:xfrm>
           <a:prstGeom prst="rect">
             <a:avLst/>
@@ -4936,7 +4936,7 @@
                 <a:latin typeface="Nunito Sans"/>
                 <a:ea typeface="DejaVu Sans"/>
               </a:rPr>
-              <a:t>Com garantia</a:t>
+              <a:t>Empréstimo com garantia</a:t>
             </a:r>
             <a:endParaRPr b="0" lang="pt-BR" sz="1200" spc="-1" strike="noStrike">
               <a:latin typeface="Arial"/>
@@ -4973,7 +4973,7 @@
         <p:spPr>
           <a:xfrm>
             <a:off x="3744000" y="3565440"/>
-            <a:ext cx="1799280" cy="470520"/>
+            <a:ext cx="1798920" cy="470160"/>
           </a:xfrm>
           <a:prstGeom prst="rect">
             <a:avLst/>
@@ -5024,7 +5024,7 @@
         <p:spPr>
           <a:xfrm>
             <a:off x="3888000" y="4022640"/>
-            <a:ext cx="1619280" cy="297000"/>
+            <a:ext cx="1618920" cy="296640"/>
           </a:xfrm>
           <a:prstGeom prst="rect">
             <a:avLst/>
@@ -5075,9 +5075,9 @@
         <p:grpSpPr>
           <a:xfrm>
             <a:off x="4285800" y="4065840"/>
-            <a:ext cx="132120" cy="178560"/>
+            <a:ext cx="131760" cy="178200"/>
             <a:chOff x="4285800" y="4065840"/>
-            <a:chExt cx="132120" cy="178560"/>
+            <a:chExt cx="131760" cy="178200"/>
           </a:xfrm>
         </p:grpSpPr>
         <p:sp>
@@ -5089,7 +5089,7 @@
           <p:spPr>
             <a:xfrm>
               <a:off x="4319280" y="4112280"/>
-              <a:ext cx="65880" cy="132120"/>
+              <a:ext cx="65520" cy="131760"/>
             </a:xfrm>
             <a:prstGeom prst="rect">
               <a:avLst/>
@@ -5119,7 +5119,7 @@
           <p:spPr>
             <a:xfrm>
               <a:off x="4285800" y="4065840"/>
-              <a:ext cx="132120" cy="65880"/>
+              <a:ext cx="131760" cy="65520"/>
             </a:xfrm>
             <a:custGeom>
               <a:avLst/>
@@ -5255,7 +5255,7 @@
         <p:spPr>
           <a:xfrm>
             <a:off x="3420000" y="180000"/>
-            <a:ext cx="2339280" cy="505800"/>
+            <a:ext cx="2338920" cy="505440"/>
           </a:xfrm>
           <a:prstGeom prst="rect">
             <a:avLst/>
@@ -5306,7 +5306,7 @@
         <p:spPr>
           <a:xfrm>
             <a:off x="324360" y="1980000"/>
-            <a:ext cx="1619280" cy="504360"/>
+            <a:ext cx="1618920" cy="504000"/>
           </a:xfrm>
           <a:prstGeom prst="rect">
             <a:avLst/>
@@ -5357,7 +5357,7 @@
         <p:spPr>
           <a:xfrm>
             <a:off x="324360" y="2485080"/>
-            <a:ext cx="1619280" cy="470520"/>
+            <a:ext cx="1618920" cy="470160"/>
           </a:xfrm>
           <a:prstGeom prst="rect">
             <a:avLst/>
@@ -5408,7 +5408,7 @@
         <p:spPr>
           <a:xfrm>
             <a:off x="324360" y="2942280"/>
-            <a:ext cx="1619280" cy="297000"/>
+            <a:ext cx="1618920" cy="296640"/>
           </a:xfrm>
           <a:prstGeom prst="rect">
             <a:avLst/>
@@ -5459,9 +5459,9 @@
         <p:grpSpPr>
           <a:xfrm>
             <a:off x="722160" y="2985480"/>
-            <a:ext cx="132120" cy="178560"/>
+            <a:ext cx="131760" cy="178200"/>
             <a:chOff x="722160" y="2985480"/>
-            <a:chExt cx="132120" cy="178560"/>
+            <a:chExt cx="131760" cy="178200"/>
           </a:xfrm>
         </p:grpSpPr>
         <p:sp>
@@ -5473,7 +5473,7 @@
           <p:spPr>
             <a:xfrm>
               <a:off x="755640" y="3031920"/>
-              <a:ext cx="65880" cy="132120"/>
+              <a:ext cx="65520" cy="131760"/>
             </a:xfrm>
             <a:prstGeom prst="rect">
               <a:avLst/>
@@ -5503,7 +5503,7 @@
           <p:spPr>
             <a:xfrm>
               <a:off x="722160" y="2985480"/>
-              <a:ext cx="132120" cy="65880"/>
+              <a:ext cx="131760" cy="65520"/>
             </a:xfrm>
             <a:custGeom>
               <a:avLst/>
@@ -5551,7 +5551,7 @@
         <p:spPr>
           <a:xfrm>
             <a:off x="2124360" y="2196000"/>
-            <a:ext cx="1619280" cy="297000"/>
+            <a:ext cx="1618920" cy="296640"/>
           </a:xfrm>
           <a:prstGeom prst="rect">
             <a:avLst/>
@@ -5602,7 +5602,7 @@
         <p:spPr>
           <a:xfrm>
             <a:off x="1980360" y="2485080"/>
-            <a:ext cx="1799280" cy="470520"/>
+            <a:ext cx="1798920" cy="470160"/>
           </a:xfrm>
           <a:prstGeom prst="rect">
             <a:avLst/>
@@ -5653,7 +5653,7 @@
         <p:spPr>
           <a:xfrm>
             <a:off x="2124360" y="2942280"/>
-            <a:ext cx="1619280" cy="297000"/>
+            <a:ext cx="1618920" cy="296640"/>
           </a:xfrm>
           <a:prstGeom prst="rect">
             <a:avLst/>
@@ -5704,9 +5704,9 @@
         <p:grpSpPr>
           <a:xfrm>
             <a:off x="2522160" y="2985480"/>
-            <a:ext cx="132120" cy="178560"/>
+            <a:ext cx="131760" cy="178200"/>
             <a:chOff x="2522160" y="2985480"/>
-            <a:chExt cx="132120" cy="178560"/>
+            <a:chExt cx="131760" cy="178200"/>
           </a:xfrm>
         </p:grpSpPr>
         <p:sp>
@@ -5718,7 +5718,7 @@
           <p:spPr>
             <a:xfrm>
               <a:off x="2555640" y="3031920"/>
-              <a:ext cx="65880" cy="132120"/>
+              <a:ext cx="65520" cy="131760"/>
             </a:xfrm>
             <a:prstGeom prst="rect">
               <a:avLst/>
@@ -5748,7 +5748,7 @@
           <p:spPr>
             <a:xfrm>
               <a:off x="2522160" y="2985480"/>
-              <a:ext cx="132120" cy="65880"/>
+              <a:ext cx="131760" cy="65520"/>
             </a:xfrm>
             <a:custGeom>
               <a:avLst/>
@@ -5796,7 +5796,7 @@
         <p:spPr>
           <a:xfrm>
             <a:off x="5364360" y="2098080"/>
-            <a:ext cx="1619280" cy="504360"/>
+            <a:ext cx="1618920" cy="504000"/>
           </a:xfrm>
           <a:prstGeom prst="rect">
             <a:avLst/>
@@ -5847,7 +5847,7 @@
         <p:spPr>
           <a:xfrm>
             <a:off x="5364360" y="2603160"/>
-            <a:ext cx="1619280" cy="470520"/>
+            <a:ext cx="1618920" cy="470160"/>
           </a:xfrm>
           <a:prstGeom prst="rect">
             <a:avLst/>
@@ -5898,7 +5898,7 @@
         <p:spPr>
           <a:xfrm>
             <a:off x="5364360" y="3060360"/>
-            <a:ext cx="1619280" cy="297000"/>
+            <a:ext cx="1618920" cy="296640"/>
           </a:xfrm>
           <a:prstGeom prst="rect">
             <a:avLst/>
@@ -5949,9 +5949,9 @@
         <p:grpSpPr>
           <a:xfrm>
             <a:off x="5762160" y="3103560"/>
-            <a:ext cx="132120" cy="178560"/>
+            <a:ext cx="131760" cy="178200"/>
             <a:chOff x="5762160" y="3103560"/>
-            <a:chExt cx="132120" cy="178560"/>
+            <a:chExt cx="131760" cy="178200"/>
           </a:xfrm>
         </p:grpSpPr>
         <p:sp>
@@ -5963,7 +5963,7 @@
           <p:spPr>
             <a:xfrm>
               <a:off x="5795640" y="3150000"/>
-              <a:ext cx="65880" cy="132120"/>
+              <a:ext cx="65520" cy="131760"/>
             </a:xfrm>
             <a:prstGeom prst="rect">
               <a:avLst/>
@@ -5993,7 +5993,7 @@
           <p:spPr>
             <a:xfrm>
               <a:off x="5762160" y="3103560"/>
-              <a:ext cx="132120" cy="65880"/>
+              <a:ext cx="131760" cy="65520"/>
             </a:xfrm>
             <a:custGeom>
               <a:avLst/>
@@ -6041,7 +6041,7 @@
         <p:spPr>
           <a:xfrm>
             <a:off x="7164360" y="2098080"/>
-            <a:ext cx="1619280" cy="504360"/>
+            <a:ext cx="1618920" cy="504000"/>
           </a:xfrm>
           <a:prstGeom prst="rect">
             <a:avLst/>
@@ -6092,7 +6092,7 @@
         <p:spPr>
           <a:xfrm>
             <a:off x="7020360" y="2603160"/>
-            <a:ext cx="1799280" cy="470520"/>
+            <a:ext cx="1798920" cy="470160"/>
           </a:xfrm>
           <a:prstGeom prst="rect">
             <a:avLst/>
@@ -6143,7 +6143,7 @@
         <p:spPr>
           <a:xfrm>
             <a:off x="7164360" y="3060360"/>
-            <a:ext cx="1619280" cy="297000"/>
+            <a:ext cx="1618920" cy="296640"/>
           </a:xfrm>
           <a:prstGeom prst="rect">
             <a:avLst/>
@@ -6194,9 +6194,9 @@
         <p:grpSpPr>
           <a:xfrm>
             <a:off x="7562160" y="3103560"/>
-            <a:ext cx="132120" cy="178560"/>
+            <a:ext cx="131760" cy="178200"/>
             <a:chOff x="7562160" y="3103560"/>
-            <a:chExt cx="132120" cy="178560"/>
+            <a:chExt cx="131760" cy="178200"/>
           </a:xfrm>
         </p:grpSpPr>
         <p:sp>
@@ -6208,7 +6208,7 @@
           <p:spPr>
             <a:xfrm>
               <a:off x="7595640" y="3150000"/>
-              <a:ext cx="65880" cy="132120"/>
+              <a:ext cx="65520" cy="131760"/>
             </a:xfrm>
             <a:prstGeom prst="rect">
               <a:avLst/>
@@ -6238,7 +6238,7 @@
           <p:spPr>
             <a:xfrm>
               <a:off x="7562160" y="3103560"/>
-              <a:ext cx="132120" cy="65880"/>
+              <a:ext cx="131760" cy="65520"/>
             </a:xfrm>
             <a:custGeom>
               <a:avLst/>
@@ -6286,7 +6286,7 @@
         <p:spPr>
           <a:xfrm>
             <a:off x="792360" y="3636000"/>
-            <a:ext cx="1619280" cy="297000"/>
+            <a:ext cx="1618920" cy="296640"/>
           </a:xfrm>
           <a:prstGeom prst="rect">
             <a:avLst/>
@@ -6337,7 +6337,7 @@
         <p:spPr>
           <a:xfrm>
             <a:off x="648360" y="3961080"/>
-            <a:ext cx="1799280" cy="470520"/>
+            <a:ext cx="1798920" cy="470160"/>
           </a:xfrm>
           <a:prstGeom prst="rect">
             <a:avLst/>
@@ -6388,7 +6388,7 @@
         <p:spPr>
           <a:xfrm>
             <a:off x="792360" y="4418280"/>
-            <a:ext cx="1619280" cy="297000"/>
+            <a:ext cx="1618920" cy="296640"/>
           </a:xfrm>
           <a:prstGeom prst="rect">
             <a:avLst/>
@@ -6438,10 +6438,10 @@
         </p:nvGrpSpPr>
         <p:grpSpPr>
           <a:xfrm>
-            <a:off x="1262160" y="4460760"/>
-            <a:ext cx="132120" cy="178920"/>
-            <a:chOff x="1262160" y="4460760"/>
-            <a:chExt cx="132120" cy="178920"/>
+            <a:off x="1262160" y="4460400"/>
+            <a:ext cx="131760" cy="178920"/>
+            <a:chOff x="1262160" y="4460400"/>
+            <a:chExt cx="131760" cy="178920"/>
           </a:xfrm>
         </p:grpSpPr>
         <p:sp>
@@ -6453,7 +6453,7 @@
           <p:spPr>
             <a:xfrm flipV="1">
               <a:off x="1295640" y="4460400"/>
-              <a:ext cx="65880" cy="132120"/>
+              <a:ext cx="65520" cy="131760"/>
             </a:xfrm>
             <a:prstGeom prst="rect">
               <a:avLst/>
@@ -6483,7 +6483,7 @@
           <p:spPr>
             <a:xfrm>
               <a:off x="1262160" y="4573800"/>
-              <a:ext cx="132120" cy="65880"/>
+              <a:ext cx="131760" cy="65520"/>
             </a:xfrm>
             <a:custGeom>
               <a:avLst/>
@@ -6531,7 +6531,7 @@
         <p:spPr>
           <a:xfrm>
             <a:off x="3132360" y="3456000"/>
-            <a:ext cx="1619280" cy="504360"/>
+            <a:ext cx="1618920" cy="504000"/>
           </a:xfrm>
           <a:prstGeom prst="rect">
             <a:avLst/>
@@ -6602,7 +6602,7 @@
         <p:spPr>
           <a:xfrm>
             <a:off x="2988360" y="3961080"/>
-            <a:ext cx="1799280" cy="470520"/>
+            <a:ext cx="1798920" cy="470160"/>
           </a:xfrm>
           <a:prstGeom prst="rect">
             <a:avLst/>
@@ -6653,7 +6653,7 @@
         <p:spPr>
           <a:xfrm>
             <a:off x="3132360" y="4418280"/>
-            <a:ext cx="1619280" cy="297000"/>
+            <a:ext cx="1618920" cy="296640"/>
           </a:xfrm>
           <a:prstGeom prst="rect">
             <a:avLst/>
@@ -6704,9 +6704,9 @@
         <p:grpSpPr>
           <a:xfrm>
             <a:off x="3530160" y="4461480"/>
-            <a:ext cx="132120" cy="178560"/>
+            <a:ext cx="131760" cy="178200"/>
             <a:chOff x="3530160" y="4461480"/>
-            <a:chExt cx="132120" cy="178560"/>
+            <a:chExt cx="131760" cy="178200"/>
           </a:xfrm>
         </p:grpSpPr>
         <p:sp>
@@ -6718,7 +6718,7 @@
           <p:spPr>
             <a:xfrm>
               <a:off x="3563640" y="4507920"/>
-              <a:ext cx="65880" cy="132120"/>
+              <a:ext cx="65520" cy="131760"/>
             </a:xfrm>
             <a:prstGeom prst="rect">
               <a:avLst/>
@@ -6748,7 +6748,7 @@
           <p:spPr>
             <a:xfrm>
               <a:off x="3530160" y="4461480"/>
-              <a:ext cx="132120" cy="65880"/>
+              <a:ext cx="131760" cy="65520"/>
             </a:xfrm>
             <a:custGeom>
               <a:avLst/>
@@ -6854,7 +6854,7 @@
         <p:spPr>
           <a:xfrm>
             <a:off x="5544360" y="1080000"/>
-            <a:ext cx="3239640" cy="1619640"/>
+            <a:ext cx="3239280" cy="1619280"/>
           </a:xfrm>
           <a:prstGeom prst="rect">
             <a:avLst/>
@@ -6905,7 +6905,7 @@
         <p:spPr>
           <a:xfrm>
             <a:off x="396000" y="720000"/>
-            <a:ext cx="3564000" cy="900000"/>
+            <a:ext cx="3563640" cy="899640"/>
           </a:xfrm>
           <a:prstGeom prst="rect">
             <a:avLst/>
@@ -6986,7 +6986,7 @@
         <p:spPr>
           <a:xfrm>
             <a:off x="3420000" y="180000"/>
-            <a:ext cx="2339280" cy="505800"/>
+            <a:ext cx="2338920" cy="505440"/>
           </a:xfrm>
           <a:prstGeom prst="rect">
             <a:avLst/>
@@ -7037,7 +7037,7 @@
         <p:spPr>
           <a:xfrm>
             <a:off x="4356360" y="1224360"/>
-            <a:ext cx="1619280" cy="504360"/>
+            <a:ext cx="1618920" cy="504000"/>
           </a:xfrm>
           <a:prstGeom prst="rect">
             <a:avLst/>
@@ -7088,7 +7088,7 @@
         <p:spPr>
           <a:xfrm>
             <a:off x="4356360" y="1729440"/>
-            <a:ext cx="1619280" cy="470520"/>
+            <a:ext cx="1618920" cy="470160"/>
           </a:xfrm>
           <a:prstGeom prst="rect">
             <a:avLst/>
@@ -7139,7 +7139,7 @@
         <p:spPr>
           <a:xfrm>
             <a:off x="4356360" y="2186640"/>
-            <a:ext cx="1619280" cy="297000"/>
+            <a:ext cx="1618920" cy="296640"/>
           </a:xfrm>
           <a:prstGeom prst="rect">
             <a:avLst/>
@@ -7190,9 +7190,9 @@
         <p:grpSpPr>
           <a:xfrm>
             <a:off x="4754160" y="2229840"/>
-            <a:ext cx="132120" cy="178560"/>
+            <a:ext cx="131760" cy="178200"/>
             <a:chOff x="4754160" y="2229840"/>
-            <a:chExt cx="132120" cy="178560"/>
+            <a:chExt cx="131760" cy="178200"/>
           </a:xfrm>
         </p:grpSpPr>
         <p:sp>
@@ -7204,7 +7204,7 @@
           <p:spPr>
             <a:xfrm>
               <a:off x="4787640" y="2276280"/>
-              <a:ext cx="65880" cy="132120"/>
+              <a:ext cx="65520" cy="131760"/>
             </a:xfrm>
             <a:prstGeom prst="rect">
               <a:avLst/>
@@ -7234,7 +7234,7 @@
           <p:spPr>
             <a:xfrm>
               <a:off x="4754160" y="2229840"/>
-              <a:ext cx="132120" cy="65880"/>
+              <a:ext cx="131760" cy="65520"/>
             </a:xfrm>
             <a:custGeom>
               <a:avLst/>
@@ -7282,7 +7282,7 @@
         <p:spPr>
           <a:xfrm>
             <a:off x="6156360" y="1440360"/>
-            <a:ext cx="1619280" cy="297000"/>
+            <a:ext cx="1618920" cy="296640"/>
           </a:xfrm>
           <a:prstGeom prst="rect">
             <a:avLst/>
@@ -7333,7 +7333,7 @@
         <p:spPr>
           <a:xfrm>
             <a:off x="6012360" y="1729440"/>
-            <a:ext cx="1799280" cy="470520"/>
+            <a:ext cx="1798920" cy="470160"/>
           </a:xfrm>
           <a:prstGeom prst="rect">
             <a:avLst/>
@@ -7384,7 +7384,7 @@
         <p:spPr>
           <a:xfrm>
             <a:off x="6156360" y="2186640"/>
-            <a:ext cx="1619280" cy="297000"/>
+            <a:ext cx="1618920" cy="296640"/>
           </a:xfrm>
           <a:prstGeom prst="rect">
             <a:avLst/>
@@ -7435,9 +7435,9 @@
         <p:grpSpPr>
           <a:xfrm>
             <a:off x="6554160" y="2229840"/>
-            <a:ext cx="132120" cy="178560"/>
+            <a:ext cx="131760" cy="178200"/>
             <a:chOff x="6554160" y="2229840"/>
-            <a:chExt cx="132120" cy="178560"/>
+            <a:chExt cx="131760" cy="178200"/>
           </a:xfrm>
         </p:grpSpPr>
         <p:sp>
@@ -7449,7 +7449,7 @@
           <p:spPr>
             <a:xfrm>
               <a:off x="6587640" y="2276280"/>
-              <a:ext cx="65880" cy="132120"/>
+              <a:ext cx="65520" cy="131760"/>
             </a:xfrm>
             <a:prstGeom prst="rect">
               <a:avLst/>
@@ -7479,7 +7479,7 @@
           <p:spPr>
             <a:xfrm>
               <a:off x="6554160" y="2229840"/>
-              <a:ext cx="132120" cy="65880"/>
+              <a:ext cx="131760" cy="65520"/>
             </a:xfrm>
             <a:custGeom>
               <a:avLst/>
@@ -7527,7 +7527,7 @@
         <p:spPr>
           <a:xfrm>
             <a:off x="4824360" y="2880360"/>
-            <a:ext cx="1619280" cy="297000"/>
+            <a:ext cx="1618920" cy="296640"/>
           </a:xfrm>
           <a:prstGeom prst="rect">
             <a:avLst/>
@@ -7561,7 +7561,7 @@
                 <a:latin typeface="Nunito Sans"/>
                 <a:ea typeface="DejaVu Sans"/>
               </a:rPr>
-              <a:t>Consignado</a:t>
+              <a:t>Empréstimo Consignado</a:t>
             </a:r>
             <a:endParaRPr b="0" lang="pt-BR" sz="1200" spc="-1" strike="noStrike">
               <a:latin typeface="Arial"/>
@@ -7577,8 +7577,8 @@
         </p:nvSpPr>
         <p:spPr>
           <a:xfrm>
-            <a:off x="4680360" y="3205440"/>
-            <a:ext cx="1799280" cy="470520"/>
+            <a:off x="4680360" y="3313440"/>
+            <a:ext cx="1798920" cy="470160"/>
           </a:xfrm>
           <a:prstGeom prst="rect">
             <a:avLst/>
@@ -7628,8 +7628,8 @@
         </p:nvSpPr>
         <p:spPr>
           <a:xfrm>
-            <a:off x="4824360" y="3662640"/>
-            <a:ext cx="1619280" cy="297000"/>
+            <a:off x="4824360" y="3770640"/>
+            <a:ext cx="1618920" cy="296640"/>
           </a:xfrm>
           <a:prstGeom prst="rect">
             <a:avLst/>
@@ -7679,10 +7679,10 @@
         </p:nvGrpSpPr>
         <p:grpSpPr>
           <a:xfrm>
-            <a:off x="5294160" y="3705120"/>
-            <a:ext cx="132120" cy="178920"/>
-            <a:chOff x="5294160" y="3705120"/>
-            <a:chExt cx="132120" cy="178920"/>
+            <a:off x="5294160" y="3812760"/>
+            <a:ext cx="131760" cy="178920"/>
+            <a:chOff x="5294160" y="3812760"/>
+            <a:chExt cx="131760" cy="178920"/>
           </a:xfrm>
         </p:grpSpPr>
         <p:sp>
@@ -7693,8 +7693,8 @@
           </p:nvSpPr>
           <p:spPr>
             <a:xfrm flipV="1">
-              <a:off x="5327640" y="3704760"/>
-              <a:ext cx="65880" cy="132120"/>
+              <a:off x="5327640" y="3812760"/>
+              <a:ext cx="65520" cy="131760"/>
             </a:xfrm>
             <a:prstGeom prst="rect">
               <a:avLst/>
@@ -7723,8 +7723,8 @@
           </p:nvSpPr>
           <p:spPr>
             <a:xfrm>
-              <a:off x="5294160" y="3818160"/>
-              <a:ext cx="132120" cy="65880"/>
+              <a:off x="5294160" y="3926160"/>
+              <a:ext cx="131760" cy="65520"/>
             </a:xfrm>
             <a:custGeom>
               <a:avLst/>
@@ -7771,8 +7771,8 @@
         </p:nvSpPr>
         <p:spPr>
           <a:xfrm>
-            <a:off x="7164360" y="2700360"/>
-            <a:ext cx="1619280" cy="504360"/>
+            <a:off x="6840000" y="2880000"/>
+            <a:ext cx="2015640" cy="504000"/>
           </a:xfrm>
           <a:prstGeom prst="rect">
             <a:avLst/>
@@ -7806,7 +7806,7 @@
                 <a:latin typeface="Nunito Sans"/>
                 <a:ea typeface="DejaVu Sans"/>
               </a:rPr>
-              <a:t>Com garantia</a:t>
+              <a:t>Empréstimo com garantia</a:t>
             </a:r>
             <a:endParaRPr b="0" lang="pt-BR" sz="1200" spc="-1" strike="noStrike">
               <a:latin typeface="Arial"/>
@@ -7842,8 +7842,8 @@
         </p:nvSpPr>
         <p:spPr>
           <a:xfrm>
-            <a:off x="7020360" y="3205440"/>
-            <a:ext cx="1799280" cy="470520"/>
+            <a:off x="7020360" y="3313440"/>
+            <a:ext cx="1798920" cy="470160"/>
           </a:xfrm>
           <a:prstGeom prst="rect">
             <a:avLst/>
@@ -7893,8 +7893,8 @@
         </p:nvSpPr>
         <p:spPr>
           <a:xfrm>
-            <a:off x="7164360" y="3662640"/>
-            <a:ext cx="1619280" cy="297000"/>
+            <a:off x="7164360" y="3770640"/>
+            <a:ext cx="1618920" cy="296640"/>
           </a:xfrm>
           <a:prstGeom prst="rect">
             <a:avLst/>
@@ -7944,10 +7944,10 @@
         </p:nvGrpSpPr>
         <p:grpSpPr>
           <a:xfrm>
-            <a:off x="7562160" y="3705840"/>
-            <a:ext cx="132120" cy="178560"/>
-            <a:chOff x="7562160" y="3705840"/>
-            <a:chExt cx="132120" cy="178560"/>
+            <a:off x="7562160" y="3813840"/>
+            <a:ext cx="131760" cy="178200"/>
+            <a:chOff x="7562160" y="3813840"/>
+            <a:chExt cx="131760" cy="178200"/>
           </a:xfrm>
         </p:grpSpPr>
         <p:sp>
@@ -7958,8 +7958,8 @@
           </p:nvSpPr>
           <p:spPr>
             <a:xfrm>
-              <a:off x="7595640" y="3752280"/>
-              <a:ext cx="65880" cy="132120"/>
+              <a:off x="7595640" y="3860280"/>
+              <a:ext cx="65520" cy="131760"/>
             </a:xfrm>
             <a:prstGeom prst="rect">
               <a:avLst/>
@@ -7988,8 +7988,8 @@
           </p:nvSpPr>
           <p:spPr>
             <a:xfrm>
-              <a:off x="7562160" y="3705840"/>
-              <a:ext cx="132120" cy="65880"/>
+              <a:off x="7562160" y="3813840"/>
+              <a:ext cx="131760" cy="65520"/>
             </a:xfrm>
             <a:custGeom>
               <a:avLst/>
@@ -8037,7 +8037,7 @@
         <p:spPr>
           <a:xfrm>
             <a:off x="7200360" y="2448360"/>
-            <a:ext cx="287640" cy="287640"/>
+            <a:ext cx="359640" cy="431640"/>
           </a:xfrm>
           <a:prstGeom prst="line">
             <a:avLst/>
@@ -8095,7 +8095,7 @@
         <p:spPr>
           <a:xfrm>
             <a:off x="575640" y="1260000"/>
-            <a:ext cx="3384000" cy="1619640"/>
+            <a:ext cx="3383640" cy="1619280"/>
           </a:xfrm>
           <a:prstGeom prst="rect">
             <a:avLst/>

</xml_diff>

<commit_message>
Add new slide to presentation
</commit_message>
<xml_diff>
--- a/posts/2023/2023-01-20-storytelling/report-exemplo.pptx
+++ b/posts/2023/2023-01-20-storytelling/report-exemplo.pptx
@@ -9,9 +9,11 @@
     <p:sldId id="257" r:id="rId4"/>
     <p:sldId id="258" r:id="rId5"/>
     <p:sldId id="259" r:id="rId6"/>
+    <p:sldId id="260" r:id="rId7"/>
+    <p:sldId id="261" r:id="rId8"/>
   </p:sldIdLst>
-  <p:sldSz cx="9144000" cy="5145087"/>
-  <p:notesSz cx="7559675" cy="10691812"/>
+  <p:sldSz cx="9144000" cy="5145088"/>
+  <p:notesSz cx="7559675" cy="10691813"/>
 </p:presentation>
 </file>
 
@@ -72,13 +74,19 @@
           <a:prstGeom prst="rect">
             <a:avLst/>
           </a:prstGeom>
+          <a:noFill/>
+          <a:ln w="0">
+            <a:noFill/>
+          </a:ln>
         </p:spPr>
         <p:txBody>
           <a:bodyPr lIns="0" rIns="0" tIns="0" bIns="0" anchor="ctr">
             <a:noAutofit/>
           </a:bodyPr>
           <a:p>
-            <a:pPr algn="ctr"/>
+            <a:pPr algn="ctr">
+              <a:buNone/>
+            </a:pPr>
             <a:endParaRPr b="0" lang="pt-BR" sz="4400" spc="-1" strike="noStrike">
               <a:latin typeface="Arial"/>
             </a:endParaRPr>
@@ -92,7 +100,7 @@
             <a:spLocks noGrp="1"/>
           </p:cNvSpPr>
           <p:nvPr>
-            <p:ph type="body"/>
+            <p:ph/>
           </p:nvPr>
         </p:nvSpPr>
         <p:spPr>
@@ -103,9 +111,13 @@
           <a:prstGeom prst="rect">
             <a:avLst/>
           </a:prstGeom>
-        </p:spPr>
-        <p:txBody>
-          <a:bodyPr lIns="0" rIns="0" tIns="0" bIns="0">
+          <a:noFill/>
+          <a:ln w="0">
+            <a:noFill/>
+          </a:ln>
+        </p:spPr>
+        <p:txBody>
+          <a:bodyPr lIns="0" rIns="0" tIns="0" bIns="0" anchor="t">
             <a:normAutofit/>
           </a:bodyPr>
           <a:p>
@@ -122,7 +134,7 @@
             <a:spLocks noGrp="1"/>
           </p:cNvSpPr>
           <p:nvPr>
-            <p:ph type="body"/>
+            <p:ph/>
           </p:nvPr>
         </p:nvSpPr>
         <p:spPr>
@@ -133,9 +145,13 @@
           <a:prstGeom prst="rect">
             <a:avLst/>
           </a:prstGeom>
-        </p:spPr>
-        <p:txBody>
-          <a:bodyPr lIns="0" rIns="0" tIns="0" bIns="0">
+          <a:noFill/>
+          <a:ln w="0">
+            <a:noFill/>
+          </a:ln>
+        </p:spPr>
+        <p:txBody>
+          <a:bodyPr lIns="0" rIns="0" tIns="0" bIns="0" anchor="t">
             <a:normAutofit/>
           </a:bodyPr>
           <a:p>
@@ -185,13 +201,19 @@
           <a:prstGeom prst="rect">
             <a:avLst/>
           </a:prstGeom>
+          <a:noFill/>
+          <a:ln w="0">
+            <a:noFill/>
+          </a:ln>
         </p:spPr>
         <p:txBody>
           <a:bodyPr lIns="0" rIns="0" tIns="0" bIns="0" anchor="ctr">
             <a:noAutofit/>
           </a:bodyPr>
           <a:p>
-            <a:pPr algn="ctr"/>
+            <a:pPr algn="ctr">
+              <a:buNone/>
+            </a:pPr>
             <a:endParaRPr b="0" lang="pt-BR" sz="4400" spc="-1" strike="noStrike">
               <a:latin typeface="Arial"/>
             </a:endParaRPr>
@@ -205,7 +227,7 @@
             <a:spLocks noGrp="1"/>
           </p:cNvSpPr>
           <p:nvPr>
-            <p:ph type="body"/>
+            <p:ph/>
           </p:nvPr>
         </p:nvSpPr>
         <p:spPr>
@@ -216,9 +238,13 @@
           <a:prstGeom prst="rect">
             <a:avLst/>
           </a:prstGeom>
-        </p:spPr>
-        <p:txBody>
-          <a:bodyPr lIns="0" rIns="0" tIns="0" bIns="0">
+          <a:noFill/>
+          <a:ln w="0">
+            <a:noFill/>
+          </a:ln>
+        </p:spPr>
+        <p:txBody>
+          <a:bodyPr lIns="0" rIns="0" tIns="0" bIns="0" anchor="t">
             <a:normAutofit/>
           </a:bodyPr>
           <a:p>
@@ -235,7 +261,7 @@
             <a:spLocks noGrp="1"/>
           </p:cNvSpPr>
           <p:nvPr>
-            <p:ph type="body"/>
+            <p:ph/>
           </p:nvPr>
         </p:nvSpPr>
         <p:spPr>
@@ -246,9 +272,13 @@
           <a:prstGeom prst="rect">
             <a:avLst/>
           </a:prstGeom>
-        </p:spPr>
-        <p:txBody>
-          <a:bodyPr lIns="0" rIns="0" tIns="0" bIns="0">
+          <a:noFill/>
+          <a:ln w="0">
+            <a:noFill/>
+          </a:ln>
+        </p:spPr>
+        <p:txBody>
+          <a:bodyPr lIns="0" rIns="0" tIns="0" bIns="0" anchor="t">
             <a:normAutofit/>
           </a:bodyPr>
           <a:p>
@@ -265,7 +295,7 @@
             <a:spLocks noGrp="1"/>
           </p:cNvSpPr>
           <p:nvPr>
-            <p:ph type="body"/>
+            <p:ph/>
           </p:nvPr>
         </p:nvSpPr>
         <p:spPr>
@@ -276,9 +306,13 @@
           <a:prstGeom prst="rect">
             <a:avLst/>
           </a:prstGeom>
-        </p:spPr>
-        <p:txBody>
-          <a:bodyPr lIns="0" rIns="0" tIns="0" bIns="0">
+          <a:noFill/>
+          <a:ln w="0">
+            <a:noFill/>
+          </a:ln>
+        </p:spPr>
+        <p:txBody>
+          <a:bodyPr lIns="0" rIns="0" tIns="0" bIns="0" anchor="t">
             <a:normAutofit/>
           </a:bodyPr>
           <a:p>
@@ -295,7 +329,7 @@
             <a:spLocks noGrp="1"/>
           </p:cNvSpPr>
           <p:nvPr>
-            <p:ph type="body"/>
+            <p:ph/>
           </p:nvPr>
         </p:nvSpPr>
         <p:spPr>
@@ -306,9 +340,13 @@
           <a:prstGeom prst="rect">
             <a:avLst/>
           </a:prstGeom>
-        </p:spPr>
-        <p:txBody>
-          <a:bodyPr lIns="0" rIns="0" tIns="0" bIns="0">
+          <a:noFill/>
+          <a:ln w="0">
+            <a:noFill/>
+          </a:ln>
+        </p:spPr>
+        <p:txBody>
+          <a:bodyPr lIns="0" rIns="0" tIns="0" bIns="0" anchor="t">
             <a:normAutofit/>
           </a:bodyPr>
           <a:p>
@@ -358,13 +396,19 @@
           <a:prstGeom prst="rect">
             <a:avLst/>
           </a:prstGeom>
+          <a:noFill/>
+          <a:ln w="0">
+            <a:noFill/>
+          </a:ln>
         </p:spPr>
         <p:txBody>
           <a:bodyPr lIns="0" rIns="0" tIns="0" bIns="0" anchor="ctr">
             <a:noAutofit/>
           </a:bodyPr>
           <a:p>
-            <a:pPr algn="ctr"/>
+            <a:pPr algn="ctr">
+              <a:buNone/>
+            </a:pPr>
             <a:endParaRPr b="0" lang="pt-BR" sz="4400" spc="-1" strike="noStrike">
               <a:latin typeface="Arial"/>
             </a:endParaRPr>
@@ -378,7 +422,7 @@
             <a:spLocks noGrp="1"/>
           </p:cNvSpPr>
           <p:nvPr>
-            <p:ph type="body"/>
+            <p:ph/>
           </p:nvPr>
         </p:nvSpPr>
         <p:spPr>
@@ -389,9 +433,13 @@
           <a:prstGeom prst="rect">
             <a:avLst/>
           </a:prstGeom>
-        </p:spPr>
-        <p:txBody>
-          <a:bodyPr lIns="0" rIns="0" tIns="0" bIns="0">
+          <a:noFill/>
+          <a:ln w="0">
+            <a:noFill/>
+          </a:ln>
+        </p:spPr>
+        <p:txBody>
+          <a:bodyPr lIns="0" rIns="0" tIns="0" bIns="0" anchor="t">
             <a:normAutofit/>
           </a:bodyPr>
           <a:p>
@@ -408,7 +456,7 @@
             <a:spLocks noGrp="1"/>
           </p:cNvSpPr>
           <p:nvPr>
-            <p:ph type="body"/>
+            <p:ph/>
           </p:nvPr>
         </p:nvSpPr>
         <p:spPr>
@@ -419,9 +467,13 @@
           <a:prstGeom prst="rect">
             <a:avLst/>
           </a:prstGeom>
-        </p:spPr>
-        <p:txBody>
-          <a:bodyPr lIns="0" rIns="0" tIns="0" bIns="0">
+          <a:noFill/>
+          <a:ln w="0">
+            <a:noFill/>
+          </a:ln>
+        </p:spPr>
+        <p:txBody>
+          <a:bodyPr lIns="0" rIns="0" tIns="0" bIns="0" anchor="t">
             <a:normAutofit/>
           </a:bodyPr>
           <a:p>
@@ -438,7 +490,7 @@
             <a:spLocks noGrp="1"/>
           </p:cNvSpPr>
           <p:nvPr>
-            <p:ph type="body"/>
+            <p:ph/>
           </p:nvPr>
         </p:nvSpPr>
         <p:spPr>
@@ -449,9 +501,13 @@
           <a:prstGeom prst="rect">
             <a:avLst/>
           </a:prstGeom>
-        </p:spPr>
-        <p:txBody>
-          <a:bodyPr lIns="0" rIns="0" tIns="0" bIns="0">
+          <a:noFill/>
+          <a:ln w="0">
+            <a:noFill/>
+          </a:ln>
+        </p:spPr>
+        <p:txBody>
+          <a:bodyPr lIns="0" rIns="0" tIns="0" bIns="0" anchor="t">
             <a:normAutofit/>
           </a:bodyPr>
           <a:p>
@@ -468,7 +524,7 @@
             <a:spLocks noGrp="1"/>
           </p:cNvSpPr>
           <p:nvPr>
-            <p:ph type="body"/>
+            <p:ph/>
           </p:nvPr>
         </p:nvSpPr>
         <p:spPr>
@@ -479,9 +535,13 @@
           <a:prstGeom prst="rect">
             <a:avLst/>
           </a:prstGeom>
-        </p:spPr>
-        <p:txBody>
-          <a:bodyPr lIns="0" rIns="0" tIns="0" bIns="0">
+          <a:noFill/>
+          <a:ln w="0">
+            <a:noFill/>
+          </a:ln>
+        </p:spPr>
+        <p:txBody>
+          <a:bodyPr lIns="0" rIns="0" tIns="0" bIns="0" anchor="t">
             <a:normAutofit/>
           </a:bodyPr>
           <a:p>
@@ -498,7 +558,7 @@
             <a:spLocks noGrp="1"/>
           </p:cNvSpPr>
           <p:nvPr>
-            <p:ph type="body"/>
+            <p:ph/>
           </p:nvPr>
         </p:nvSpPr>
         <p:spPr>
@@ -509,9 +569,13 @@
           <a:prstGeom prst="rect">
             <a:avLst/>
           </a:prstGeom>
-        </p:spPr>
-        <p:txBody>
-          <a:bodyPr lIns="0" rIns="0" tIns="0" bIns="0">
+          <a:noFill/>
+          <a:ln w="0">
+            <a:noFill/>
+          </a:ln>
+        </p:spPr>
+        <p:txBody>
+          <a:bodyPr lIns="0" rIns="0" tIns="0" bIns="0" anchor="t">
             <a:normAutofit/>
           </a:bodyPr>
           <a:p>
@@ -528,7 +592,7 @@
             <a:spLocks noGrp="1"/>
           </p:cNvSpPr>
           <p:nvPr>
-            <p:ph type="body"/>
+            <p:ph/>
           </p:nvPr>
         </p:nvSpPr>
         <p:spPr>
@@ -539,9 +603,13 @@
           <a:prstGeom prst="rect">
             <a:avLst/>
           </a:prstGeom>
-        </p:spPr>
-        <p:txBody>
-          <a:bodyPr lIns="0" rIns="0" tIns="0" bIns="0">
+          <a:noFill/>
+          <a:ln w="0">
+            <a:noFill/>
+          </a:ln>
+        </p:spPr>
+        <p:txBody>
+          <a:bodyPr lIns="0" rIns="0" tIns="0" bIns="0" anchor="t">
             <a:normAutofit/>
           </a:bodyPr>
           <a:p>
@@ -591,13 +659,19 @@
           <a:prstGeom prst="rect">
             <a:avLst/>
           </a:prstGeom>
+          <a:noFill/>
+          <a:ln w="0">
+            <a:noFill/>
+          </a:ln>
         </p:spPr>
         <p:txBody>
           <a:bodyPr lIns="0" rIns="0" tIns="0" bIns="0" anchor="ctr">
             <a:noAutofit/>
           </a:bodyPr>
           <a:p>
-            <a:pPr algn="ctr"/>
+            <a:pPr algn="ctr">
+              <a:buNone/>
+            </a:pPr>
             <a:endParaRPr b="0" lang="pt-BR" sz="4400" spc="-1" strike="noStrike">
               <a:latin typeface="Arial"/>
             </a:endParaRPr>
@@ -622,13 +696,19 @@
           <a:prstGeom prst="rect">
             <a:avLst/>
           </a:prstGeom>
+          <a:noFill/>
+          <a:ln w="0">
+            <a:noFill/>
+          </a:ln>
         </p:spPr>
         <p:txBody>
           <a:bodyPr lIns="0" rIns="0" tIns="0" bIns="0" anchor="ctr">
             <a:noAutofit/>
           </a:bodyPr>
           <a:p>
-            <a:pPr algn="ctr"/>
+            <a:pPr algn="ctr">
+              <a:buNone/>
+            </a:pPr>
             <a:endParaRPr b="0" lang="pt-BR" sz="3200" spc="-1" strike="noStrike">
               <a:latin typeface="Arial"/>
             </a:endParaRPr>
@@ -675,13 +755,19 @@
           <a:prstGeom prst="rect">
             <a:avLst/>
           </a:prstGeom>
+          <a:noFill/>
+          <a:ln w="0">
+            <a:noFill/>
+          </a:ln>
         </p:spPr>
         <p:txBody>
           <a:bodyPr lIns="0" rIns="0" tIns="0" bIns="0" anchor="ctr">
             <a:noAutofit/>
           </a:bodyPr>
           <a:p>
-            <a:pPr algn="ctr"/>
+            <a:pPr algn="ctr">
+              <a:buNone/>
+            </a:pPr>
             <a:endParaRPr b="0" lang="pt-BR" sz="4400" spc="-1" strike="noStrike">
               <a:latin typeface="Arial"/>
             </a:endParaRPr>
@@ -695,7 +781,7 @@
             <a:spLocks noGrp="1"/>
           </p:cNvSpPr>
           <p:nvPr>
-            <p:ph type="body"/>
+            <p:ph/>
           </p:nvPr>
         </p:nvSpPr>
         <p:spPr>
@@ -706,9 +792,13 @@
           <a:prstGeom prst="rect">
             <a:avLst/>
           </a:prstGeom>
-        </p:spPr>
-        <p:txBody>
-          <a:bodyPr lIns="0" rIns="0" tIns="0" bIns="0">
+          <a:noFill/>
+          <a:ln w="0">
+            <a:noFill/>
+          </a:ln>
+        </p:spPr>
+        <p:txBody>
+          <a:bodyPr lIns="0" rIns="0" tIns="0" bIns="0" anchor="t">
             <a:normAutofit/>
           </a:bodyPr>
           <a:p>
@@ -758,13 +848,19 @@
           <a:prstGeom prst="rect">
             <a:avLst/>
           </a:prstGeom>
+          <a:noFill/>
+          <a:ln w="0">
+            <a:noFill/>
+          </a:ln>
         </p:spPr>
         <p:txBody>
           <a:bodyPr lIns="0" rIns="0" tIns="0" bIns="0" anchor="ctr">
             <a:noAutofit/>
           </a:bodyPr>
           <a:p>
-            <a:pPr algn="ctr"/>
+            <a:pPr algn="ctr">
+              <a:buNone/>
+            </a:pPr>
             <a:endParaRPr b="0" lang="pt-BR" sz="4400" spc="-1" strike="noStrike">
               <a:latin typeface="Arial"/>
             </a:endParaRPr>
@@ -778,7 +874,7 @@
             <a:spLocks noGrp="1"/>
           </p:cNvSpPr>
           <p:nvPr>
-            <p:ph type="body"/>
+            <p:ph/>
           </p:nvPr>
         </p:nvSpPr>
         <p:spPr>
@@ -789,9 +885,13 @@
           <a:prstGeom prst="rect">
             <a:avLst/>
           </a:prstGeom>
-        </p:spPr>
-        <p:txBody>
-          <a:bodyPr lIns="0" rIns="0" tIns="0" bIns="0">
+          <a:noFill/>
+          <a:ln w="0">
+            <a:noFill/>
+          </a:ln>
+        </p:spPr>
+        <p:txBody>
+          <a:bodyPr lIns="0" rIns="0" tIns="0" bIns="0" anchor="t">
             <a:normAutofit/>
           </a:bodyPr>
           <a:p>
@@ -808,7 +908,7 @@
             <a:spLocks noGrp="1"/>
           </p:cNvSpPr>
           <p:nvPr>
-            <p:ph type="body"/>
+            <p:ph/>
           </p:nvPr>
         </p:nvSpPr>
         <p:spPr>
@@ -819,9 +919,13 @@
           <a:prstGeom prst="rect">
             <a:avLst/>
           </a:prstGeom>
-        </p:spPr>
-        <p:txBody>
-          <a:bodyPr lIns="0" rIns="0" tIns="0" bIns="0">
+          <a:noFill/>
+          <a:ln w="0">
+            <a:noFill/>
+          </a:ln>
+        </p:spPr>
+        <p:txBody>
+          <a:bodyPr lIns="0" rIns="0" tIns="0" bIns="0" anchor="t">
             <a:normAutofit/>
           </a:bodyPr>
           <a:p>
@@ -871,13 +975,19 @@
           <a:prstGeom prst="rect">
             <a:avLst/>
           </a:prstGeom>
+          <a:noFill/>
+          <a:ln w="0">
+            <a:noFill/>
+          </a:ln>
         </p:spPr>
         <p:txBody>
           <a:bodyPr lIns="0" rIns="0" tIns="0" bIns="0" anchor="ctr">
             <a:noAutofit/>
           </a:bodyPr>
           <a:p>
-            <a:pPr algn="ctr"/>
+            <a:pPr algn="ctr">
+              <a:buNone/>
+            </a:pPr>
             <a:endParaRPr b="0" lang="pt-BR" sz="4400" spc="-1" strike="noStrike">
               <a:latin typeface="Arial"/>
             </a:endParaRPr>
@@ -924,13 +1034,19 @@
           <a:prstGeom prst="rect">
             <a:avLst/>
           </a:prstGeom>
+          <a:noFill/>
+          <a:ln w="0">
+            <a:noFill/>
+          </a:ln>
         </p:spPr>
         <p:txBody>
           <a:bodyPr lIns="0" rIns="0" tIns="0" bIns="0" anchor="ctr">
             <a:noAutofit/>
           </a:bodyPr>
           <a:p>
-            <a:pPr algn="ctr"/>
+            <a:pPr algn="ctr">
+              <a:buNone/>
+            </a:pPr>
             <a:endParaRPr b="0" lang="pt-BR" sz="3200" spc="-1" strike="noStrike">
               <a:latin typeface="Arial"/>
             </a:endParaRPr>
@@ -977,13 +1093,19 @@
           <a:prstGeom prst="rect">
             <a:avLst/>
           </a:prstGeom>
+          <a:noFill/>
+          <a:ln w="0">
+            <a:noFill/>
+          </a:ln>
         </p:spPr>
         <p:txBody>
           <a:bodyPr lIns="0" rIns="0" tIns="0" bIns="0" anchor="ctr">
             <a:noAutofit/>
           </a:bodyPr>
           <a:p>
-            <a:pPr algn="ctr"/>
+            <a:pPr algn="ctr">
+              <a:buNone/>
+            </a:pPr>
             <a:endParaRPr b="0" lang="pt-BR" sz="4400" spc="-1" strike="noStrike">
               <a:latin typeface="Arial"/>
             </a:endParaRPr>
@@ -997,7 +1119,7 @@
             <a:spLocks noGrp="1"/>
           </p:cNvSpPr>
           <p:nvPr>
-            <p:ph type="body"/>
+            <p:ph/>
           </p:nvPr>
         </p:nvSpPr>
         <p:spPr>
@@ -1008,9 +1130,13 @@
           <a:prstGeom prst="rect">
             <a:avLst/>
           </a:prstGeom>
-        </p:spPr>
-        <p:txBody>
-          <a:bodyPr lIns="0" rIns="0" tIns="0" bIns="0">
+          <a:noFill/>
+          <a:ln w="0">
+            <a:noFill/>
+          </a:ln>
+        </p:spPr>
+        <p:txBody>
+          <a:bodyPr lIns="0" rIns="0" tIns="0" bIns="0" anchor="t">
             <a:normAutofit/>
           </a:bodyPr>
           <a:p>
@@ -1027,7 +1153,7 @@
             <a:spLocks noGrp="1"/>
           </p:cNvSpPr>
           <p:nvPr>
-            <p:ph type="body"/>
+            <p:ph/>
           </p:nvPr>
         </p:nvSpPr>
         <p:spPr>
@@ -1038,9 +1164,13 @@
           <a:prstGeom prst="rect">
             <a:avLst/>
           </a:prstGeom>
-        </p:spPr>
-        <p:txBody>
-          <a:bodyPr lIns="0" rIns="0" tIns="0" bIns="0">
+          <a:noFill/>
+          <a:ln w="0">
+            <a:noFill/>
+          </a:ln>
+        </p:spPr>
+        <p:txBody>
+          <a:bodyPr lIns="0" rIns="0" tIns="0" bIns="0" anchor="t">
             <a:normAutofit/>
           </a:bodyPr>
           <a:p>
@@ -1057,7 +1187,7 @@
             <a:spLocks noGrp="1"/>
           </p:cNvSpPr>
           <p:nvPr>
-            <p:ph type="body"/>
+            <p:ph/>
           </p:nvPr>
         </p:nvSpPr>
         <p:spPr>
@@ -1068,9 +1198,13 @@
           <a:prstGeom prst="rect">
             <a:avLst/>
           </a:prstGeom>
-        </p:spPr>
-        <p:txBody>
-          <a:bodyPr lIns="0" rIns="0" tIns="0" bIns="0">
+          <a:noFill/>
+          <a:ln w="0">
+            <a:noFill/>
+          </a:ln>
+        </p:spPr>
+        <p:txBody>
+          <a:bodyPr lIns="0" rIns="0" tIns="0" bIns="0" anchor="t">
             <a:normAutofit/>
           </a:bodyPr>
           <a:p>
@@ -1120,13 +1254,19 @@
           <a:prstGeom prst="rect">
             <a:avLst/>
           </a:prstGeom>
+          <a:noFill/>
+          <a:ln w="0">
+            <a:noFill/>
+          </a:ln>
         </p:spPr>
         <p:txBody>
           <a:bodyPr lIns="0" rIns="0" tIns="0" bIns="0" anchor="ctr">
             <a:noAutofit/>
           </a:bodyPr>
           <a:p>
-            <a:pPr algn="ctr"/>
+            <a:pPr algn="ctr">
+              <a:buNone/>
+            </a:pPr>
             <a:endParaRPr b="0" lang="pt-BR" sz="4400" spc="-1" strike="noStrike">
               <a:latin typeface="Arial"/>
             </a:endParaRPr>
@@ -1140,7 +1280,7 @@
             <a:spLocks noGrp="1"/>
           </p:cNvSpPr>
           <p:nvPr>
-            <p:ph type="body"/>
+            <p:ph/>
           </p:nvPr>
         </p:nvSpPr>
         <p:spPr>
@@ -1151,9 +1291,13 @@
           <a:prstGeom prst="rect">
             <a:avLst/>
           </a:prstGeom>
-        </p:spPr>
-        <p:txBody>
-          <a:bodyPr lIns="0" rIns="0" tIns="0" bIns="0">
+          <a:noFill/>
+          <a:ln w="0">
+            <a:noFill/>
+          </a:ln>
+        </p:spPr>
+        <p:txBody>
+          <a:bodyPr lIns="0" rIns="0" tIns="0" bIns="0" anchor="t">
             <a:normAutofit/>
           </a:bodyPr>
           <a:p>
@@ -1170,7 +1314,7 @@
             <a:spLocks noGrp="1"/>
           </p:cNvSpPr>
           <p:nvPr>
-            <p:ph type="body"/>
+            <p:ph/>
           </p:nvPr>
         </p:nvSpPr>
         <p:spPr>
@@ -1181,9 +1325,13 @@
           <a:prstGeom prst="rect">
             <a:avLst/>
           </a:prstGeom>
-        </p:spPr>
-        <p:txBody>
-          <a:bodyPr lIns="0" rIns="0" tIns="0" bIns="0">
+          <a:noFill/>
+          <a:ln w="0">
+            <a:noFill/>
+          </a:ln>
+        </p:spPr>
+        <p:txBody>
+          <a:bodyPr lIns="0" rIns="0" tIns="0" bIns="0" anchor="t">
             <a:normAutofit/>
           </a:bodyPr>
           <a:p>
@@ -1200,7 +1348,7 @@
             <a:spLocks noGrp="1"/>
           </p:cNvSpPr>
           <p:nvPr>
-            <p:ph type="body"/>
+            <p:ph/>
           </p:nvPr>
         </p:nvSpPr>
         <p:spPr>
@@ -1211,9 +1359,13 @@
           <a:prstGeom prst="rect">
             <a:avLst/>
           </a:prstGeom>
-        </p:spPr>
-        <p:txBody>
-          <a:bodyPr lIns="0" rIns="0" tIns="0" bIns="0">
+          <a:noFill/>
+          <a:ln w="0">
+            <a:noFill/>
+          </a:ln>
+        </p:spPr>
+        <p:txBody>
+          <a:bodyPr lIns="0" rIns="0" tIns="0" bIns="0" anchor="t">
             <a:normAutofit/>
           </a:bodyPr>
           <a:p>
@@ -1263,13 +1415,19 @@
           <a:prstGeom prst="rect">
             <a:avLst/>
           </a:prstGeom>
+          <a:noFill/>
+          <a:ln w="0">
+            <a:noFill/>
+          </a:ln>
         </p:spPr>
         <p:txBody>
           <a:bodyPr lIns="0" rIns="0" tIns="0" bIns="0" anchor="ctr">
             <a:noAutofit/>
           </a:bodyPr>
           <a:p>
-            <a:pPr algn="ctr"/>
+            <a:pPr algn="ctr">
+              <a:buNone/>
+            </a:pPr>
             <a:endParaRPr b="0" lang="pt-BR" sz="4400" spc="-1" strike="noStrike">
               <a:latin typeface="Arial"/>
             </a:endParaRPr>
@@ -1283,7 +1441,7 @@
             <a:spLocks noGrp="1"/>
           </p:cNvSpPr>
           <p:nvPr>
-            <p:ph type="body"/>
+            <p:ph/>
           </p:nvPr>
         </p:nvSpPr>
         <p:spPr>
@@ -1294,9 +1452,13 @@
           <a:prstGeom prst="rect">
             <a:avLst/>
           </a:prstGeom>
-        </p:spPr>
-        <p:txBody>
-          <a:bodyPr lIns="0" rIns="0" tIns="0" bIns="0">
+          <a:noFill/>
+          <a:ln w="0">
+            <a:noFill/>
+          </a:ln>
+        </p:spPr>
+        <p:txBody>
+          <a:bodyPr lIns="0" rIns="0" tIns="0" bIns="0" anchor="t">
             <a:normAutofit/>
           </a:bodyPr>
           <a:p>
@@ -1313,7 +1475,7 @@
             <a:spLocks noGrp="1"/>
           </p:cNvSpPr>
           <p:nvPr>
-            <p:ph type="body"/>
+            <p:ph/>
           </p:nvPr>
         </p:nvSpPr>
         <p:spPr>
@@ -1324,9 +1486,13 @@
           <a:prstGeom prst="rect">
             <a:avLst/>
           </a:prstGeom>
-        </p:spPr>
-        <p:txBody>
-          <a:bodyPr lIns="0" rIns="0" tIns="0" bIns="0">
+          <a:noFill/>
+          <a:ln w="0">
+            <a:noFill/>
+          </a:ln>
+        </p:spPr>
+        <p:txBody>
+          <a:bodyPr lIns="0" rIns="0" tIns="0" bIns="0" anchor="t">
             <a:normAutofit/>
           </a:bodyPr>
           <a:p>
@@ -1343,7 +1509,7 @@
             <a:spLocks noGrp="1"/>
           </p:cNvSpPr>
           <p:nvPr>
-            <p:ph type="body"/>
+            <p:ph/>
           </p:nvPr>
         </p:nvSpPr>
         <p:spPr>
@@ -1354,9 +1520,13 @@
           <a:prstGeom prst="rect">
             <a:avLst/>
           </a:prstGeom>
-        </p:spPr>
-        <p:txBody>
-          <a:bodyPr lIns="0" rIns="0" tIns="0" bIns="0">
+          <a:noFill/>
+          <a:ln w="0">
+            <a:noFill/>
+          </a:ln>
+        </p:spPr>
+        <p:txBody>
+          <a:bodyPr lIns="0" rIns="0" tIns="0" bIns="0" anchor="t">
             <a:normAutofit/>
           </a:bodyPr>
           <a:p>
@@ -1406,18 +1576,24 @@
           <a:prstGeom prst="rect">
             <a:avLst/>
           </a:prstGeom>
+          <a:noFill/>
+          <a:ln w="0">
+            <a:noFill/>
+          </a:ln>
         </p:spPr>
         <p:txBody>
           <a:bodyPr lIns="0" rIns="0" tIns="0" bIns="0" anchor="ctr">
             <a:noAutofit/>
           </a:bodyPr>
           <a:p>
-            <a:pPr algn="ctr"/>
+            <a:pPr algn="ctr">
+              <a:buNone/>
+            </a:pPr>
             <a:r>
               <a:rPr b="0" lang="pt-BR" sz="4400" spc="-1" strike="noStrike">
                 <a:latin typeface="Arial"/>
               </a:rPr>
-              <a:t>Clique para editar o formato do texto do título</a:t>
+              <a:t>Click to edit the title text format</a:t>
             </a:r>
             <a:endParaRPr b="0" lang="pt-BR" sz="4400" spc="-1" strike="noStrike">
               <a:latin typeface="Arial"/>
@@ -1443,10 +1619,14 @@
           <a:prstGeom prst="rect">
             <a:avLst/>
           </a:prstGeom>
-        </p:spPr>
-        <p:txBody>
-          <a:bodyPr lIns="0" rIns="0" tIns="0" bIns="0">
-            <a:normAutofit fontScale="80000"/>
+          <a:noFill/>
+          <a:ln w="0">
+            <a:noFill/>
+          </a:ln>
+        </p:spPr>
+        <p:txBody>
+          <a:bodyPr lIns="0" rIns="0" tIns="0" bIns="0" anchor="t">
+            <a:normAutofit/>
           </a:bodyPr>
           <a:p>
             <a:pPr marL="432000" indent="-324000">
@@ -1464,7 +1644,7 @@
               <a:rPr b="0" lang="pt-BR" sz="3200" spc="-1" strike="noStrike">
                 <a:latin typeface="Arial"/>
               </a:rPr>
-              <a:t>Clique para editar o formato do texto da estrutura de tópicos</a:t>
+              <a:t>Click to edit the outline text format</a:t>
             </a:r>
             <a:endParaRPr b="0" lang="pt-BR" sz="3200" spc="-1" strike="noStrike">
               <a:latin typeface="Arial"/>
@@ -1486,7 +1666,7 @@
               <a:rPr b="0" lang="pt-BR" sz="2800" spc="-1" strike="noStrike">
                 <a:latin typeface="Arial"/>
               </a:rPr>
-              <a:t>2.º nível da estrutura de tópicos</a:t>
+              <a:t>Second Outline Level</a:t>
             </a:r>
             <a:endParaRPr b="0" lang="pt-BR" sz="2800" spc="-1" strike="noStrike">
               <a:latin typeface="Arial"/>
@@ -1508,7 +1688,7 @@
               <a:rPr b="0" lang="pt-BR" sz="2400" spc="-1" strike="noStrike">
                 <a:latin typeface="Arial"/>
               </a:rPr>
-              <a:t>3.º nível da estrutura de tópicos</a:t>
+              <a:t>Third Outline Level</a:t>
             </a:r>
             <a:endParaRPr b="0" lang="pt-BR" sz="2400" spc="-1" strike="noStrike">
               <a:latin typeface="Arial"/>
@@ -1530,7 +1710,7 @@
               <a:rPr b="0" lang="pt-BR" sz="2000" spc="-1" strike="noStrike">
                 <a:latin typeface="Arial"/>
               </a:rPr>
-              <a:t>4.º nível da estrutura de tópicos</a:t>
+              <a:t>Fourth Outline Level</a:t>
             </a:r>
             <a:endParaRPr b="0" lang="pt-BR" sz="2000" spc="-1" strike="noStrike">
               <a:latin typeface="Arial"/>
@@ -1552,7 +1732,7 @@
               <a:rPr b="0" lang="pt-BR" sz="2000" spc="-1" strike="noStrike">
                 <a:latin typeface="Arial"/>
               </a:rPr>
-              <a:t>5.º nível da estrutura de tópicos</a:t>
+              <a:t>Fifth Outline Level</a:t>
             </a:r>
             <a:endParaRPr b="0" lang="pt-BR" sz="2000" spc="-1" strike="noStrike">
               <a:latin typeface="Arial"/>
@@ -1574,7 +1754,7 @@
               <a:rPr b="0" lang="pt-BR" sz="2000" spc="-1" strike="noStrike">
                 <a:latin typeface="Arial"/>
               </a:rPr>
-              <a:t>6.º nível da estrutura de tópicos</a:t>
+              <a:t>Sixth Outline Level</a:t>
             </a:r>
             <a:endParaRPr b="0" lang="pt-BR" sz="2000" spc="-1" strike="noStrike">
               <a:latin typeface="Arial"/>
@@ -1596,7 +1776,7 @@
               <a:rPr b="0" lang="pt-BR" sz="2000" spc="-1" strike="noStrike">
                 <a:latin typeface="Arial"/>
               </a:rPr>
-              <a:t>7.º nível da estrutura de tópicos</a:t>
+              <a:t>Seventh Outline Level</a:t>
             </a:r>
             <a:endParaRPr b="0" lang="pt-BR" sz="2000" spc="-1" strike="noStrike">
               <a:latin typeface="Arial"/>
@@ -1656,7 +1836,7 @@
         <p:spPr>
           <a:xfrm>
             <a:off x="3715200" y="919800"/>
-            <a:ext cx="234360" cy="258480"/>
+            <a:ext cx="233640" cy="257760"/>
           </a:xfrm>
           <a:prstGeom prst="rect">
             <a:avLst/>
@@ -1675,7 +1855,7 @@
         <p:spPr>
           <a:xfrm>
             <a:off x="3202920" y="1189440"/>
-            <a:ext cx="1262880" cy="537840"/>
+            <a:ext cx="1262160" cy="537120"/>
           </a:xfrm>
           <a:prstGeom prst="rect">
             <a:avLst/>
@@ -1692,7 +1872,7 @@
           <a:fontRef idx="minor"/>
         </p:style>
         <p:txBody>
-          <a:bodyPr lIns="90000" rIns="90000" tIns="91440" bIns="91440">
+          <a:bodyPr lIns="90000" rIns="90000" tIns="91440" bIns="91440" anchor="t">
             <a:noAutofit/>
           </a:bodyPr>
           <a:p>
@@ -1700,6 +1880,7 @@
               <a:lnSpc>
                 <a:spcPct val="100000"/>
               </a:lnSpc>
+              <a:buNone/>
               <a:tabLst>
                 <a:tab algn="l" pos="0"/>
               </a:tabLst>
@@ -1723,6 +1904,7 @@
               <a:lnSpc>
                 <a:spcPct val="100000"/>
               </a:lnSpc>
+              <a:buNone/>
               <a:tabLst>
                 <a:tab algn="l" pos="0"/>
               </a:tabLst>
@@ -1752,7 +1934,7 @@
         <p:spPr>
           <a:xfrm>
             <a:off x="1275480" y="1187280"/>
-            <a:ext cx="842040" cy="450000"/>
+            <a:ext cx="841320" cy="449280"/>
           </a:xfrm>
           <a:prstGeom prst="rect">
             <a:avLst/>
@@ -1769,7 +1951,7 @@
           <a:fontRef idx="minor"/>
         </p:style>
         <p:txBody>
-          <a:bodyPr lIns="90000" rIns="90000" tIns="91440" bIns="91440">
+          <a:bodyPr lIns="90000" rIns="90000" tIns="91440" bIns="91440" anchor="t">
             <a:noAutofit/>
           </a:bodyPr>
           <a:p>
@@ -1777,6 +1959,7 @@
               <a:lnSpc>
                 <a:spcPct val="100000"/>
               </a:lnSpc>
+              <a:buNone/>
               <a:tabLst>
                 <a:tab algn="l" pos="0"/>
               </a:tabLst>
@@ -1800,6 +1983,7 @@
               <a:lnSpc>
                 <a:spcPct val="100000"/>
               </a:lnSpc>
+              <a:buNone/>
               <a:tabLst>
                 <a:tab algn="l" pos="0"/>
               </a:tabLst>
@@ -1835,7 +2019,7 @@
         <p:spPr>
           <a:xfrm>
             <a:off x="1608120" y="939240"/>
-            <a:ext cx="177840" cy="247320"/>
+            <a:ext cx="177120" cy="246600"/>
           </a:xfrm>
           <a:prstGeom prst="rect">
             <a:avLst/>
@@ -1854,7 +2038,7 @@
         <p:spPr>
           <a:xfrm>
             <a:off x="2276280" y="1191600"/>
-            <a:ext cx="921960" cy="258480"/>
+            <a:ext cx="921240" cy="257760"/>
           </a:xfrm>
           <a:prstGeom prst="rect">
             <a:avLst/>
@@ -1871,7 +2055,7 @@
           <a:fontRef idx="minor"/>
         </p:style>
         <p:txBody>
-          <a:bodyPr lIns="90000" rIns="90000" tIns="91440" bIns="91440">
+          <a:bodyPr lIns="90000" rIns="90000" tIns="258480" bIns="258480" anchor="t">
             <a:noAutofit/>
           </a:bodyPr>
           <a:p>
@@ -1879,6 +2063,7 @@
               <a:lnSpc>
                 <a:spcPct val="100000"/>
               </a:lnSpc>
+              <a:buNone/>
               <a:tabLst>
                 <a:tab algn="l" pos="0"/>
               </a:tabLst>
@@ -1902,6 +2087,7 @@
               <a:lnSpc>
                 <a:spcPct val="100000"/>
               </a:lnSpc>
+              <a:buNone/>
               <a:tabLst>
                 <a:tab algn="l" pos="0"/>
               </a:tabLst>
@@ -1937,7 +2123,7 @@
         <p:spPr>
           <a:xfrm>
             <a:off x="2643840" y="851760"/>
-            <a:ext cx="340560" cy="326160"/>
+            <a:ext cx="339840" cy="325440"/>
           </a:xfrm>
           <a:prstGeom prst="rect">
             <a:avLst/>
@@ -1956,7 +2142,7 @@
         <p:spPr>
           <a:xfrm>
             <a:off x="4300200" y="1191600"/>
-            <a:ext cx="1297800" cy="509400"/>
+            <a:ext cx="1297080" cy="508680"/>
           </a:xfrm>
           <a:prstGeom prst="rect">
             <a:avLst/>
@@ -1973,7 +2159,7 @@
           <a:fontRef idx="minor"/>
         </p:style>
         <p:txBody>
-          <a:bodyPr lIns="90000" rIns="90000" tIns="91440" bIns="91440">
+          <a:bodyPr lIns="90000" rIns="90000" tIns="91440" bIns="91440" anchor="t">
             <a:noAutofit/>
           </a:bodyPr>
           <a:p>
@@ -1981,6 +2167,7 @@
               <a:lnSpc>
                 <a:spcPct val="100000"/>
               </a:lnSpc>
+              <a:buNone/>
               <a:tabLst>
                 <a:tab algn="l" pos="0"/>
               </a:tabLst>
@@ -2014,6 +2201,7 @@
               <a:lnSpc>
                 <a:spcPct val="100000"/>
               </a:lnSpc>
+              <a:buNone/>
               <a:tabLst>
                 <a:tab algn="l" pos="0"/>
               </a:tabLst>
@@ -2049,7 +2237,7 @@
         <p:spPr>
           <a:xfrm>
             <a:off x="4790160" y="898560"/>
-            <a:ext cx="340560" cy="296280"/>
+            <a:ext cx="339840" cy="295560"/>
           </a:xfrm>
           <a:prstGeom prst="rect">
             <a:avLst/>
@@ -2068,7 +2256,7 @@
         <p:spPr>
           <a:xfrm>
             <a:off x="3356640" y="1523160"/>
-            <a:ext cx="921960" cy="406440"/>
+            <a:ext cx="921240" cy="405720"/>
           </a:xfrm>
           <a:prstGeom prst="rect">
             <a:avLst/>
@@ -2085,7 +2273,7 @@
           <a:fontRef idx="minor"/>
         </p:style>
         <p:txBody>
-          <a:bodyPr lIns="90000" rIns="90000" tIns="91440" bIns="91440">
+          <a:bodyPr lIns="90000" rIns="90000" tIns="91440" bIns="91440" anchor="t">
             <a:noAutofit/>
           </a:bodyPr>
           <a:p>
@@ -2093,6 +2281,7 @@
               <a:lnSpc>
                 <a:spcPct val="115000"/>
               </a:lnSpc>
+              <a:buNone/>
               <a:tabLst>
                 <a:tab algn="l" pos="0"/>
               </a:tabLst>
@@ -2116,6 +2305,7 @@
               <a:lnSpc>
                 <a:spcPct val="115000"/>
               </a:lnSpc>
+              <a:buNone/>
               <a:tabLst>
                 <a:tab algn="l" pos="0"/>
               </a:tabLst>
@@ -2155,7 +2345,7 @@
         <p:spPr>
           <a:xfrm>
             <a:off x="4312080" y="1525680"/>
-            <a:ext cx="1297800" cy="406440"/>
+            <a:ext cx="1297080" cy="405720"/>
           </a:xfrm>
           <a:prstGeom prst="rect">
             <a:avLst/>
@@ -2172,7 +2362,7 @@
           <a:fontRef idx="minor"/>
         </p:style>
         <p:txBody>
-          <a:bodyPr lIns="90000" rIns="90000" tIns="91440" bIns="91440">
+          <a:bodyPr lIns="90000" rIns="90000" tIns="91440" bIns="91440" anchor="t">
             <a:noAutofit/>
           </a:bodyPr>
           <a:p>
@@ -2180,6 +2370,7 @@
               <a:lnSpc>
                 <a:spcPct val="115000"/>
               </a:lnSpc>
+              <a:buNone/>
               <a:tabLst>
                 <a:tab algn="l" pos="0"/>
               </a:tabLst>
@@ -2203,6 +2394,7 @@
               <a:lnSpc>
                 <a:spcPct val="115000"/>
               </a:lnSpc>
+              <a:buNone/>
               <a:tabLst>
                 <a:tab algn="l" pos="0"/>
               </a:tabLst>
@@ -2248,7 +2440,7 @@
         <p:spPr>
           <a:xfrm>
             <a:off x="5986080" y="927360"/>
-            <a:ext cx="288000" cy="256320"/>
+            <a:ext cx="287280" cy="255600"/>
           </a:xfrm>
           <a:prstGeom prst="rect">
             <a:avLst/>
@@ -2267,7 +2459,7 @@
         <p:spPr>
           <a:xfrm>
             <a:off x="5658840" y="1190880"/>
-            <a:ext cx="959760" cy="381600"/>
+            <a:ext cx="959040" cy="380880"/>
           </a:xfrm>
           <a:prstGeom prst="rect">
             <a:avLst/>
@@ -2284,7 +2476,7 @@
           <a:fontRef idx="minor"/>
         </p:style>
         <p:txBody>
-          <a:bodyPr lIns="90000" rIns="90000" tIns="91440" bIns="91440">
+          <a:bodyPr lIns="90000" rIns="90000" tIns="91440" bIns="91440" anchor="t">
             <a:noAutofit/>
           </a:bodyPr>
           <a:p>
@@ -2292,6 +2484,7 @@
               <a:lnSpc>
                 <a:spcPct val="100000"/>
               </a:lnSpc>
+              <a:buNone/>
               <a:tabLst>
                 <a:tab algn="l" pos="0"/>
               </a:tabLst>
@@ -2321,7 +2514,7 @@
         <p:spPr>
           <a:xfrm>
             <a:off x="2282760" y="1523880"/>
-            <a:ext cx="921960" cy="450000"/>
+            <a:ext cx="921240" cy="449280"/>
           </a:xfrm>
           <a:prstGeom prst="rect">
             <a:avLst/>
@@ -2338,7 +2531,7 @@
           <a:fontRef idx="minor"/>
         </p:style>
         <p:txBody>
-          <a:bodyPr lIns="90000" rIns="90000" tIns="91440" bIns="91440">
+          <a:bodyPr lIns="90000" rIns="90000" tIns="91440" bIns="91440" anchor="t">
             <a:noAutofit/>
           </a:bodyPr>
           <a:p>
@@ -2346,6 +2539,7 @@
               <a:lnSpc>
                 <a:spcPct val="115000"/>
               </a:lnSpc>
+              <a:buNone/>
               <a:tabLst>
                 <a:tab algn="l" pos="0"/>
               </a:tabLst>
@@ -2369,6 +2563,7 @@
               <a:lnSpc>
                 <a:spcPct val="115000"/>
               </a:lnSpc>
+              <a:buNone/>
               <a:tabLst>
                 <a:tab algn="l" pos="0"/>
               </a:tabLst>
@@ -2408,7 +2603,7 @@
         <p:spPr>
           <a:xfrm>
             <a:off x="1327320" y="1532160"/>
-            <a:ext cx="712440" cy="450000"/>
+            <a:ext cx="711720" cy="449280"/>
           </a:xfrm>
           <a:prstGeom prst="rect">
             <a:avLst/>
@@ -2425,7 +2620,7 @@
           <a:fontRef idx="minor"/>
         </p:style>
         <p:txBody>
-          <a:bodyPr lIns="90000" rIns="90000" tIns="91440" bIns="91440">
+          <a:bodyPr lIns="90000" rIns="90000" tIns="91440" bIns="91440" anchor="t">
             <a:noAutofit/>
           </a:bodyPr>
           <a:p>
@@ -2433,6 +2628,7 @@
               <a:lnSpc>
                 <a:spcPct val="115000"/>
               </a:lnSpc>
+              <a:buNone/>
               <a:tabLst>
                 <a:tab algn="l" pos="0"/>
               </a:tabLst>
@@ -2456,6 +2652,7 @@
               <a:lnSpc>
                 <a:spcPct val="115000"/>
               </a:lnSpc>
+              <a:buNone/>
               <a:tabLst>
                 <a:tab algn="l" pos="0"/>
               </a:tabLst>
@@ -2495,7 +2692,7 @@
         <p:spPr>
           <a:xfrm>
             <a:off x="5726160" y="1526400"/>
-            <a:ext cx="842040" cy="406440"/>
+            <a:ext cx="841320" cy="405720"/>
           </a:xfrm>
           <a:prstGeom prst="rect">
             <a:avLst/>
@@ -2512,7 +2709,7 @@
           <a:fontRef idx="minor"/>
         </p:style>
         <p:txBody>
-          <a:bodyPr lIns="90000" rIns="90000" tIns="91440" bIns="91440">
+          <a:bodyPr lIns="90000" rIns="90000" tIns="91440" bIns="91440" anchor="t">
             <a:noAutofit/>
           </a:bodyPr>
           <a:p>
@@ -2520,6 +2717,7 @@
               <a:lnSpc>
                 <a:spcPct val="115000"/>
               </a:lnSpc>
+              <a:buNone/>
               <a:tabLst>
                 <a:tab algn="l" pos="0"/>
               </a:tabLst>
@@ -2543,6 +2741,7 @@
               <a:lnSpc>
                 <a:spcPct val="115000"/>
               </a:lnSpc>
+              <a:buNone/>
               <a:tabLst>
                 <a:tab algn="l" pos="0"/>
               </a:tabLst>
@@ -2582,7 +2781,7 @@
         <p:spPr>
           <a:xfrm>
             <a:off x="3243960" y="290520"/>
-            <a:ext cx="2511000" cy="489600"/>
+            <a:ext cx="2510280" cy="488880"/>
           </a:xfrm>
           <a:prstGeom prst="rect">
             <a:avLst/>
@@ -2599,7 +2798,7 @@
           <a:fontRef idx="minor"/>
         </p:style>
         <p:txBody>
-          <a:bodyPr lIns="90000" rIns="90000" tIns="91440" bIns="91440">
+          <a:bodyPr lIns="90000" rIns="90000" tIns="91440" bIns="91440" anchor="t">
             <a:noAutofit/>
           </a:bodyPr>
           <a:p>
@@ -2607,6 +2806,7 @@
               <a:lnSpc>
                 <a:spcPct val="100000"/>
               </a:lnSpc>
+              <a:buNone/>
               <a:tabLst>
                 <a:tab algn="l" pos="0"/>
               </a:tabLst>
@@ -2636,7 +2836,7 @@
         <p:spPr>
           <a:xfrm>
             <a:off x="6982200" y="1521720"/>
-            <a:ext cx="660600" cy="478440"/>
+            <a:ext cx="659880" cy="477720"/>
           </a:xfrm>
           <a:prstGeom prst="rect">
             <a:avLst/>
@@ -2653,7 +2853,7 @@
           <a:fontRef idx="minor"/>
         </p:style>
         <p:txBody>
-          <a:bodyPr lIns="90000" rIns="90000" tIns="91440" bIns="91440">
+          <a:bodyPr lIns="90000" rIns="90000" tIns="91440" bIns="91440" anchor="t">
             <a:noAutofit/>
           </a:bodyPr>
           <a:p>
@@ -2661,6 +2861,7 @@
               <a:lnSpc>
                 <a:spcPct val="115000"/>
               </a:lnSpc>
+              <a:buNone/>
               <a:tabLst>
                 <a:tab algn="l" pos="0"/>
               </a:tabLst>
@@ -2684,6 +2885,7 @@
               <a:lnSpc>
                 <a:spcPct val="115000"/>
               </a:lnSpc>
+              <a:buNone/>
               <a:tabLst>
                 <a:tab algn="l" pos="0"/>
               </a:tabLst>
@@ -2713,7 +2915,7 @@
         <p:spPr>
           <a:xfrm>
             <a:off x="6391800" y="1190880"/>
-            <a:ext cx="1740960" cy="469440"/>
+            <a:ext cx="1740240" cy="468720"/>
           </a:xfrm>
           <a:prstGeom prst="rect">
             <a:avLst/>
@@ -2730,7 +2932,7 @@
           <a:fontRef idx="minor"/>
         </p:style>
         <p:txBody>
-          <a:bodyPr lIns="90000" rIns="90000" tIns="91440" bIns="91440">
+          <a:bodyPr lIns="90000" rIns="90000" tIns="91440" bIns="91440" anchor="t">
             <a:noAutofit/>
           </a:bodyPr>
           <a:p>
@@ -2738,6 +2940,7 @@
               <a:lnSpc>
                 <a:spcPct val="100000"/>
               </a:lnSpc>
+              <a:buNone/>
               <a:tabLst>
                 <a:tab algn="l" pos="0"/>
               </a:tabLst>
@@ -2761,6 +2964,7 @@
               <a:lnSpc>
                 <a:spcPct val="100000"/>
               </a:lnSpc>
+              <a:buNone/>
               <a:tabLst>
                 <a:tab algn="l" pos="0"/>
               </a:tabLst>
@@ -2796,7 +3000,7 @@
         <p:spPr>
           <a:xfrm>
             <a:off x="7130160" y="919800"/>
-            <a:ext cx="287640" cy="270360"/>
+            <a:ext cx="286920" cy="269640"/>
           </a:xfrm>
           <a:prstGeom prst="rect">
             <a:avLst/>
@@ -2815,7 +3019,7 @@
         <p:spPr>
           <a:xfrm>
             <a:off x="7935480" y="1172520"/>
-            <a:ext cx="959760" cy="326160"/>
+            <a:ext cx="959040" cy="325440"/>
           </a:xfrm>
           <a:prstGeom prst="rect">
             <a:avLst/>
@@ -2832,7 +3036,7 @@
           <a:fontRef idx="minor"/>
         </p:style>
         <p:txBody>
-          <a:bodyPr lIns="90000" rIns="90000" tIns="91440" bIns="91440">
+          <a:bodyPr lIns="90000" rIns="90000" tIns="326160" bIns="326160" anchor="t">
             <a:noAutofit/>
           </a:bodyPr>
           <a:p>
@@ -2840,6 +3044,7 @@
               <a:lnSpc>
                 <a:spcPct val="100000"/>
               </a:lnSpc>
+              <a:buNone/>
               <a:tabLst>
                 <a:tab algn="l" pos="0"/>
               </a:tabLst>
@@ -2869,7 +3074,7 @@
         <p:spPr>
           <a:xfrm>
             <a:off x="8079480" y="1505160"/>
-            <a:ext cx="671400" cy="517320"/>
+            <a:ext cx="670680" cy="516600"/>
           </a:xfrm>
           <a:prstGeom prst="rect">
             <a:avLst/>
@@ -2886,7 +3091,7 @@
           <a:fontRef idx="minor"/>
         </p:style>
         <p:txBody>
-          <a:bodyPr lIns="90000" rIns="90000" tIns="91440" bIns="91440">
+          <a:bodyPr lIns="90000" rIns="90000" tIns="91440" bIns="91440" anchor="t">
             <a:noAutofit/>
           </a:bodyPr>
           <a:p>
@@ -2894,6 +3099,7 @@
               <a:lnSpc>
                 <a:spcPct val="115000"/>
               </a:lnSpc>
+              <a:buNone/>
               <a:tabLst>
                 <a:tab algn="l" pos="0"/>
               </a:tabLst>
@@ -2917,6 +3123,7 @@
               <a:lnSpc>
                 <a:spcPct val="115000"/>
               </a:lnSpc>
+              <a:buNone/>
               <a:tabLst>
                 <a:tab algn="l" pos="0"/>
               </a:tabLst>
@@ -2951,8 +3158,8 @@
         </p:blipFill>
         <p:spPr>
           <a:xfrm flipH="1" rot="10800000">
-            <a:off x="8265240" y="909720"/>
-            <a:ext cx="273240" cy="258840"/>
+            <a:off x="8265240" y="910440"/>
+            <a:ext cx="272520" cy="258120"/>
           </a:xfrm>
           <a:prstGeom prst="rect">
             <a:avLst/>
@@ -2971,7 +3178,7 @@
         <p:spPr>
           <a:xfrm>
             <a:off x="264960" y="1491480"/>
-            <a:ext cx="864000" cy="303840"/>
+            <a:ext cx="863280" cy="303120"/>
           </a:xfrm>
           <a:prstGeom prst="rect">
             <a:avLst/>
@@ -2988,7 +3195,7 @@
           <a:fontRef idx="minor"/>
         </p:style>
         <p:txBody>
-          <a:bodyPr lIns="90000" rIns="90000" tIns="91440" bIns="91440">
+          <a:bodyPr lIns="90000" rIns="90000" tIns="303840" bIns="303840" anchor="t">
             <a:noAutofit/>
           </a:bodyPr>
           <a:p>
@@ -2996,6 +3203,7 @@
               <a:lnSpc>
                 <a:spcPct val="115000"/>
               </a:lnSpc>
+              <a:buNone/>
               <a:tabLst>
                 <a:tab algn="l" pos="0"/>
               </a:tabLst>
@@ -3025,7 +3233,7 @@
         <p:spPr>
           <a:xfrm>
             <a:off x="496800" y="1705680"/>
-            <a:ext cx="545760" cy="259200"/>
+            <a:ext cx="545040" cy="258480"/>
           </a:xfrm>
           <a:prstGeom prst="rect">
             <a:avLst/>
@@ -3042,7 +3250,7 @@
           <a:fontRef idx="minor"/>
         </p:style>
         <p:txBody>
-          <a:bodyPr lIns="90000" rIns="90000" tIns="91440" bIns="91440">
+          <a:bodyPr lIns="90000" rIns="90000" tIns="259200" bIns="259200" anchor="t">
             <a:noAutofit/>
           </a:bodyPr>
           <a:p>
@@ -3050,6 +3258,7 @@
               <a:lnSpc>
                 <a:spcPct val="100000"/>
               </a:lnSpc>
+              <a:buNone/>
               <a:tabLst>
                 <a:tab algn="l" pos="0"/>
               </a:tabLst>
@@ -3083,7 +3292,7 @@
         <p:spPr>
           <a:xfrm>
             <a:off x="478080" y="874800"/>
-            <a:ext cx="449640" cy="450000"/>
+            <a:ext cx="448920" cy="449280"/>
           </a:xfrm>
           <a:prstGeom prst="rect">
             <a:avLst/>
@@ -3108,7 +3317,7 @@
         <p:spPr>
           <a:xfrm>
             <a:off x="1459440" y="1820880"/>
-            <a:ext cx="86400" cy="86760"/>
+            <a:ext cx="85680" cy="86040"/>
           </a:xfrm>
           <a:prstGeom prst="rect">
             <a:avLst/>
@@ -3133,7 +3342,7 @@
         <p:spPr>
           <a:xfrm>
             <a:off x="2508840" y="1804680"/>
-            <a:ext cx="86400" cy="86760"/>
+            <a:ext cx="85680" cy="86040"/>
           </a:xfrm>
           <a:prstGeom prst="rect">
             <a:avLst/>
@@ -3158,7 +3367,7 @@
         <p:spPr>
           <a:xfrm>
             <a:off x="3597120" y="1797120"/>
-            <a:ext cx="90720" cy="86760"/>
+            <a:ext cx="90000" cy="86040"/>
           </a:xfrm>
           <a:prstGeom prst="rect">
             <a:avLst/>
@@ -3183,7 +3392,7 @@
         <p:spPr>
           <a:xfrm>
             <a:off x="5893560" y="1816200"/>
-            <a:ext cx="86400" cy="86760"/>
+            <a:ext cx="85680" cy="86040"/>
           </a:xfrm>
           <a:prstGeom prst="rect">
             <a:avLst/>
@@ -3208,7 +3417,7 @@
         <p:spPr>
           <a:xfrm>
             <a:off x="445680" y="1805040"/>
-            <a:ext cx="90720" cy="86760"/>
+            <a:ext cx="90000" cy="86040"/>
           </a:xfrm>
           <a:prstGeom prst="rect">
             <a:avLst/>
@@ -3233,7 +3442,7 @@
         <p:spPr>
           <a:xfrm>
             <a:off x="4745520" y="1801080"/>
-            <a:ext cx="90720" cy="86760"/>
+            <a:ext cx="90000" cy="86040"/>
           </a:xfrm>
           <a:prstGeom prst="rect">
             <a:avLst/>
@@ -3258,7 +3467,7 @@
         <p:spPr>
           <a:xfrm>
             <a:off x="8151120" y="1792080"/>
-            <a:ext cx="90720" cy="86760"/>
+            <a:ext cx="90000" cy="86040"/>
           </a:xfrm>
           <a:prstGeom prst="rect">
             <a:avLst/>
@@ -3283,7 +3492,7 @@
         <p:spPr>
           <a:xfrm>
             <a:off x="7020000" y="1800360"/>
-            <a:ext cx="90720" cy="86760"/>
+            <a:ext cx="90000" cy="86040"/>
           </a:xfrm>
           <a:prstGeom prst="rect">
             <a:avLst/>
@@ -3302,7 +3511,7 @@
         <p:spPr>
           <a:xfrm>
             <a:off x="286920" y="1260000"/>
-            <a:ext cx="842040" cy="450000"/>
+            <a:ext cx="841320" cy="449280"/>
           </a:xfrm>
           <a:prstGeom prst="rect">
             <a:avLst/>
@@ -3319,7 +3528,7 @@
           <a:fontRef idx="minor"/>
         </p:style>
         <p:txBody>
-          <a:bodyPr lIns="90000" rIns="90000" tIns="91440" bIns="91440">
+          <a:bodyPr lIns="90000" rIns="90000" tIns="91440" bIns="91440" anchor="t">
             <a:noAutofit/>
           </a:bodyPr>
           <a:p>
@@ -3327,6 +3536,7 @@
               <a:lnSpc>
                 <a:spcPct val="100000"/>
               </a:lnSpc>
+              <a:buNone/>
               <a:tabLst>
                 <a:tab algn="l" pos="0"/>
               </a:tabLst>
@@ -3356,7 +3566,7 @@
         <p:spPr>
           <a:xfrm>
             <a:off x="5916600" y="4571640"/>
-            <a:ext cx="1150200" cy="348120"/>
+            <a:ext cx="1149480" cy="347400"/>
           </a:xfrm>
           <a:prstGeom prst="rect">
             <a:avLst/>
@@ -3373,7 +3583,7 @@
           <a:fontRef idx="minor"/>
         </p:style>
         <p:txBody>
-          <a:bodyPr lIns="90000" rIns="90000" tIns="91440" bIns="91440">
+          <a:bodyPr lIns="90000" rIns="90000" tIns="347760" bIns="347760" anchor="t">
             <a:noAutofit/>
           </a:bodyPr>
           <a:p>
@@ -3381,6 +3591,7 @@
               <a:lnSpc>
                 <a:spcPct val="100000"/>
               </a:lnSpc>
+              <a:buNone/>
               <a:tabLst>
                 <a:tab algn="l" pos="0"/>
               </a:tabLst>
@@ -3410,7 +3621,7 @@
         <p:spPr>
           <a:xfrm>
             <a:off x="1082520" y="4528440"/>
-            <a:ext cx="5024520" cy="381600"/>
+            <a:ext cx="5023800" cy="380880"/>
           </a:xfrm>
           <a:prstGeom prst="rect">
             <a:avLst/>
@@ -3427,7 +3638,7 @@
           <a:fontRef idx="minor"/>
         </p:style>
         <p:txBody>
-          <a:bodyPr lIns="90000" rIns="90000" tIns="91440" bIns="91440">
+          <a:bodyPr lIns="90000" rIns="90000" tIns="91440" bIns="91440" anchor="t">
             <a:noAutofit/>
           </a:bodyPr>
           <a:p>
@@ -3435,6 +3646,7 @@
               <a:lnSpc>
                 <a:spcPct val="100000"/>
               </a:lnSpc>
+              <a:buNone/>
               <a:tabLst>
                 <a:tab algn="l" pos="0"/>
               </a:tabLst>
@@ -3478,6 +3690,7 @@
               <a:lnSpc>
                 <a:spcPct val="100000"/>
               </a:lnSpc>
+              <a:buNone/>
               <a:tabLst>
                 <a:tab algn="l" pos="0"/>
               </a:tabLst>
@@ -3531,6 +3744,7 @@
               <a:lnSpc>
                 <a:spcPct val="100000"/>
               </a:lnSpc>
+              <a:buNone/>
               <a:tabLst>
                 <a:tab algn="l" pos="0"/>
               </a:tabLst>
@@ -3554,7 +3768,7 @@
         <p:spPr>
           <a:xfrm>
             <a:off x="359640" y="2160000"/>
-            <a:ext cx="3958560" cy="1978200"/>
+            <a:ext cx="3957840" cy="1977480"/>
           </a:xfrm>
           <a:prstGeom prst="rect">
             <a:avLst/>
@@ -3577,7 +3791,7 @@
         <p:spPr>
           <a:xfrm>
             <a:off x="4680000" y="2160000"/>
-            <a:ext cx="4102560" cy="2050560"/>
+            <a:ext cx="4101840" cy="2049840"/>
           </a:xfrm>
           <a:prstGeom prst="rect">
             <a:avLst/>
@@ -3626,7 +3840,7 @@
         <p:spPr>
           <a:xfrm>
             <a:off x="3420000" y="180000"/>
-            <a:ext cx="2338920" cy="505440"/>
+            <a:ext cx="2338200" cy="504720"/>
           </a:xfrm>
           <a:prstGeom prst="rect">
             <a:avLst/>
@@ -3643,7 +3857,7 @@
           <a:fontRef idx="minor"/>
         </p:style>
         <p:txBody>
-          <a:bodyPr lIns="90000" rIns="90000" tIns="45000" bIns="45000">
+          <a:bodyPr lIns="90000" rIns="90000" tIns="45000" bIns="45000" anchor="t">
             <a:noAutofit/>
           </a:bodyPr>
           <a:p>
@@ -3651,6 +3865,7 @@
               <a:lnSpc>
                 <a:spcPct val="100000"/>
               </a:lnSpc>
+              <a:buNone/>
             </a:pPr>
             <a:r>
               <a:rPr b="0" lang="pt-BR" sz="2400" spc="-1" strike="noStrike">
@@ -3677,7 +3892,7 @@
         <p:spPr>
           <a:xfrm>
             <a:off x="1080000" y="1116360"/>
-            <a:ext cx="1618920" cy="504000"/>
+            <a:ext cx="1618200" cy="503280"/>
           </a:xfrm>
           <a:prstGeom prst="rect">
             <a:avLst/>
@@ -3694,7 +3909,7 @@
           <a:fontRef idx="minor"/>
         </p:style>
         <p:txBody>
-          <a:bodyPr lIns="90000" rIns="90000" tIns="45000" bIns="45000">
+          <a:bodyPr lIns="90000" rIns="90000" tIns="45000" bIns="45000" anchor="t">
             <a:noAutofit/>
           </a:bodyPr>
           <a:p>
@@ -3702,6 +3917,7 @@
               <a:lnSpc>
                 <a:spcPct val="100000"/>
               </a:lnSpc>
+              <a:buNone/>
             </a:pPr>
             <a:r>
               <a:rPr b="0" lang="pt-BR" sz="1200" spc="-1" strike="noStrike">
@@ -3728,7 +3944,7 @@
         <p:spPr>
           <a:xfrm>
             <a:off x="1080000" y="1621440"/>
-            <a:ext cx="1618920" cy="470160"/>
+            <a:ext cx="1618200" cy="469440"/>
           </a:xfrm>
           <a:prstGeom prst="rect">
             <a:avLst/>
@@ -3745,7 +3961,7 @@
           <a:fontRef idx="minor"/>
         </p:style>
         <p:txBody>
-          <a:bodyPr lIns="90000" rIns="90000" tIns="45000" bIns="45000">
+          <a:bodyPr lIns="90000" rIns="90000" tIns="45000" bIns="45000" anchor="t">
             <a:noAutofit/>
           </a:bodyPr>
           <a:p>
@@ -3753,6 +3969,7 @@
               <a:lnSpc>
                 <a:spcPct val="100000"/>
               </a:lnSpc>
+              <a:buNone/>
             </a:pPr>
             <a:r>
               <a:rPr b="0" lang="pt-BR" sz="2200" spc="-1" strike="noStrike">
@@ -3779,7 +3996,7 @@
         <p:spPr>
           <a:xfrm>
             <a:off x="1080000" y="2078640"/>
-            <a:ext cx="1618920" cy="296640"/>
+            <a:ext cx="1618200" cy="295920"/>
           </a:xfrm>
           <a:prstGeom prst="rect">
             <a:avLst/>
@@ -3796,7 +4013,7 @@
           <a:fontRef idx="minor"/>
         </p:style>
         <p:txBody>
-          <a:bodyPr lIns="90000" rIns="90000" tIns="45000" bIns="45000">
+          <a:bodyPr lIns="90000" rIns="90000" tIns="45000" bIns="45000" anchor="t">
             <a:noAutofit/>
           </a:bodyPr>
           <a:p>
@@ -3804,6 +4021,7 @@
               <a:lnSpc>
                 <a:spcPct val="100000"/>
               </a:lnSpc>
+              <a:buNone/>
             </a:pPr>
             <a:r>
               <a:rPr b="0" lang="pt-BR" sz="1200" spc="-1" strike="noStrike">
@@ -3830,9 +4048,9 @@
         <p:grpSpPr>
           <a:xfrm>
             <a:off x="1477800" y="2121840"/>
-            <a:ext cx="131760" cy="178200"/>
+            <a:ext cx="131040" cy="177480"/>
             <a:chOff x="1477800" y="2121840"/>
-            <a:chExt cx="131760" cy="178200"/>
+            <a:chExt cx="131040" cy="177480"/>
           </a:xfrm>
         </p:grpSpPr>
         <p:sp>
@@ -3844,7 +4062,7 @@
           <p:spPr>
             <a:xfrm>
               <a:off x="1511280" y="2168280"/>
-              <a:ext cx="65520" cy="131760"/>
+              <a:ext cx="64800" cy="131040"/>
             </a:xfrm>
             <a:prstGeom prst="rect">
               <a:avLst/>
@@ -3874,7 +4092,7 @@
           <p:spPr>
             <a:xfrm>
               <a:off x="1477800" y="2121840"/>
-              <a:ext cx="131760" cy="65520"/>
+              <a:ext cx="131040" cy="64800"/>
             </a:xfrm>
             <a:custGeom>
               <a:avLst/>
@@ -3922,7 +4140,7 @@
         <p:spPr>
           <a:xfrm>
             <a:off x="2880000" y="1332360"/>
-            <a:ext cx="1618920" cy="296640"/>
+            <a:ext cx="1618200" cy="295920"/>
           </a:xfrm>
           <a:prstGeom prst="rect">
             <a:avLst/>
@@ -3939,7 +4157,7 @@
           <a:fontRef idx="minor"/>
         </p:style>
         <p:txBody>
-          <a:bodyPr lIns="90000" rIns="90000" tIns="45000" bIns="45000">
+          <a:bodyPr lIns="90000" rIns="90000" tIns="45000" bIns="45000" anchor="t">
             <a:noAutofit/>
           </a:bodyPr>
           <a:p>
@@ -3947,6 +4165,7 @@
               <a:lnSpc>
                 <a:spcPct val="100000"/>
               </a:lnSpc>
+              <a:buNone/>
             </a:pPr>
             <a:r>
               <a:rPr b="0" lang="pt-BR" sz="1200" spc="-1" strike="noStrike">
@@ -3973,7 +4192,7 @@
         <p:spPr>
           <a:xfrm>
             <a:off x="2736000" y="1621440"/>
-            <a:ext cx="1798920" cy="470160"/>
+            <a:ext cx="1798200" cy="469440"/>
           </a:xfrm>
           <a:prstGeom prst="rect">
             <a:avLst/>
@@ -3990,7 +4209,7 @@
           <a:fontRef idx="minor"/>
         </p:style>
         <p:txBody>
-          <a:bodyPr lIns="90000" rIns="90000" tIns="45000" bIns="45000">
+          <a:bodyPr lIns="90000" rIns="90000" tIns="45000" bIns="45000" anchor="t">
             <a:noAutofit/>
           </a:bodyPr>
           <a:p>
@@ -3998,6 +4217,7 @@
               <a:lnSpc>
                 <a:spcPct val="100000"/>
               </a:lnSpc>
+              <a:buNone/>
             </a:pPr>
             <a:r>
               <a:rPr b="0" lang="pt-BR" sz="2200" spc="-1" strike="noStrike">
@@ -4024,7 +4244,7 @@
         <p:spPr>
           <a:xfrm>
             <a:off x="2880000" y="2078640"/>
-            <a:ext cx="1618920" cy="296640"/>
+            <a:ext cx="1618200" cy="295920"/>
           </a:xfrm>
           <a:prstGeom prst="rect">
             <a:avLst/>
@@ -4041,7 +4261,7 @@
           <a:fontRef idx="minor"/>
         </p:style>
         <p:txBody>
-          <a:bodyPr lIns="90000" rIns="90000" tIns="45000" bIns="45000">
+          <a:bodyPr lIns="90000" rIns="90000" tIns="45000" bIns="45000" anchor="t">
             <a:noAutofit/>
           </a:bodyPr>
           <a:p>
@@ -4049,6 +4269,7 @@
               <a:lnSpc>
                 <a:spcPct val="100000"/>
               </a:lnSpc>
+              <a:buNone/>
             </a:pPr>
             <a:r>
               <a:rPr b="0" lang="pt-BR" sz="1200" spc="-1" strike="noStrike">
@@ -4075,9 +4296,9 @@
         <p:grpSpPr>
           <a:xfrm>
             <a:off x="3277800" y="2121840"/>
-            <a:ext cx="131760" cy="178200"/>
+            <a:ext cx="131040" cy="177480"/>
             <a:chOff x="3277800" y="2121840"/>
-            <a:chExt cx="131760" cy="178200"/>
+            <a:chExt cx="131040" cy="177480"/>
           </a:xfrm>
         </p:grpSpPr>
         <p:sp>
@@ -4089,7 +4310,7 @@
           <p:spPr>
             <a:xfrm>
               <a:off x="3311280" y="2168280"/>
-              <a:ext cx="65520" cy="131760"/>
+              <a:ext cx="64800" cy="131040"/>
             </a:xfrm>
             <a:prstGeom prst="rect">
               <a:avLst/>
@@ -4119,7 +4340,7 @@
           <p:spPr>
             <a:xfrm>
               <a:off x="3277800" y="2121840"/>
-              <a:ext cx="131760" cy="65520"/>
+              <a:ext cx="131040" cy="64800"/>
             </a:xfrm>
             <a:custGeom>
               <a:avLst/>
@@ -4167,7 +4388,7 @@
         <p:spPr>
           <a:xfrm>
             <a:off x="4644000" y="1110600"/>
-            <a:ext cx="1618920" cy="504000"/>
+            <a:ext cx="1618200" cy="503280"/>
           </a:xfrm>
           <a:prstGeom prst="rect">
             <a:avLst/>
@@ -4184,7 +4405,7 @@
           <a:fontRef idx="minor"/>
         </p:style>
         <p:txBody>
-          <a:bodyPr lIns="90000" rIns="90000" tIns="45000" bIns="45000">
+          <a:bodyPr lIns="90000" rIns="90000" tIns="45000" bIns="45000" anchor="t">
             <a:noAutofit/>
           </a:bodyPr>
           <a:p>
@@ -4192,6 +4413,7 @@
               <a:lnSpc>
                 <a:spcPct val="100000"/>
               </a:lnSpc>
+              <a:buNone/>
             </a:pPr>
             <a:r>
               <a:rPr b="0" lang="pt-BR" sz="1200" spc="-1" strike="noStrike">
@@ -4218,7 +4440,7 @@
         <p:spPr>
           <a:xfrm>
             <a:off x="4644000" y="1615680"/>
-            <a:ext cx="1618920" cy="470160"/>
+            <a:ext cx="1618200" cy="469440"/>
           </a:xfrm>
           <a:prstGeom prst="rect">
             <a:avLst/>
@@ -4235,7 +4457,7 @@
           <a:fontRef idx="minor"/>
         </p:style>
         <p:txBody>
-          <a:bodyPr lIns="90000" rIns="90000" tIns="45000" bIns="45000">
+          <a:bodyPr lIns="90000" rIns="90000" tIns="45000" bIns="45000" anchor="t">
             <a:noAutofit/>
           </a:bodyPr>
           <a:p>
@@ -4243,6 +4465,7 @@
               <a:lnSpc>
                 <a:spcPct val="100000"/>
               </a:lnSpc>
+              <a:buNone/>
             </a:pPr>
             <a:r>
               <a:rPr b="0" lang="pt-BR" sz="2200" spc="-1" strike="noStrike">
@@ -4269,7 +4492,7 @@
         <p:spPr>
           <a:xfrm>
             <a:off x="4644000" y="2072880"/>
-            <a:ext cx="1618920" cy="296640"/>
+            <a:ext cx="1618200" cy="295920"/>
           </a:xfrm>
           <a:prstGeom prst="rect">
             <a:avLst/>
@@ -4286,7 +4509,7 @@
           <a:fontRef idx="minor"/>
         </p:style>
         <p:txBody>
-          <a:bodyPr lIns="90000" rIns="90000" tIns="45000" bIns="45000">
+          <a:bodyPr lIns="90000" rIns="90000" tIns="45000" bIns="45000" anchor="t">
             <a:noAutofit/>
           </a:bodyPr>
           <a:p>
@@ -4294,6 +4517,7 @@
               <a:lnSpc>
                 <a:spcPct val="100000"/>
               </a:lnSpc>
+              <a:buNone/>
             </a:pPr>
             <a:r>
               <a:rPr b="0" lang="pt-BR" sz="1200" spc="-1" strike="noStrike">
@@ -4320,9 +4544,9 @@
         <p:grpSpPr>
           <a:xfrm>
             <a:off x="5041800" y="2116080"/>
-            <a:ext cx="131760" cy="178200"/>
+            <a:ext cx="131040" cy="177480"/>
             <a:chOff x="5041800" y="2116080"/>
-            <a:chExt cx="131760" cy="178200"/>
+            <a:chExt cx="131040" cy="177480"/>
           </a:xfrm>
         </p:grpSpPr>
         <p:sp>
@@ -4334,7 +4558,7 @@
           <p:spPr>
             <a:xfrm>
               <a:off x="5075280" y="2162520"/>
-              <a:ext cx="65520" cy="131760"/>
+              <a:ext cx="64800" cy="131040"/>
             </a:xfrm>
             <a:prstGeom prst="rect">
               <a:avLst/>
@@ -4364,7 +4588,7 @@
           <p:spPr>
             <a:xfrm>
               <a:off x="5041800" y="2116080"/>
-              <a:ext cx="131760" cy="65520"/>
+              <a:ext cx="131040" cy="64800"/>
             </a:xfrm>
             <a:custGeom>
               <a:avLst/>
@@ -4412,7 +4636,7 @@
         <p:spPr>
           <a:xfrm>
             <a:off x="6444000" y="1110600"/>
-            <a:ext cx="1618920" cy="504000"/>
+            <a:ext cx="1618200" cy="503280"/>
           </a:xfrm>
           <a:prstGeom prst="rect">
             <a:avLst/>
@@ -4429,7 +4653,7 @@
           <a:fontRef idx="minor"/>
         </p:style>
         <p:txBody>
-          <a:bodyPr lIns="90000" rIns="90000" tIns="45000" bIns="45000">
+          <a:bodyPr lIns="90000" rIns="90000" tIns="45000" bIns="45000" anchor="t">
             <a:noAutofit/>
           </a:bodyPr>
           <a:p>
@@ -4437,6 +4661,7 @@
               <a:lnSpc>
                 <a:spcPct val="100000"/>
               </a:lnSpc>
+              <a:buNone/>
             </a:pPr>
             <a:r>
               <a:rPr b="0" lang="pt-BR" sz="1200" spc="-1" strike="noStrike">
@@ -4463,7 +4688,7 @@
         <p:spPr>
           <a:xfrm>
             <a:off x="6300000" y="1615680"/>
-            <a:ext cx="1798920" cy="470160"/>
+            <a:ext cx="1798200" cy="469440"/>
           </a:xfrm>
           <a:prstGeom prst="rect">
             <a:avLst/>
@@ -4480,7 +4705,7 @@
           <a:fontRef idx="minor"/>
         </p:style>
         <p:txBody>
-          <a:bodyPr lIns="90000" rIns="90000" tIns="45000" bIns="45000">
+          <a:bodyPr lIns="90000" rIns="90000" tIns="45000" bIns="45000" anchor="t">
             <a:noAutofit/>
           </a:bodyPr>
           <a:p>
@@ -4488,6 +4713,7 @@
               <a:lnSpc>
                 <a:spcPct val="100000"/>
               </a:lnSpc>
+              <a:buNone/>
             </a:pPr>
             <a:r>
               <a:rPr b="0" lang="pt-BR" sz="2200" spc="-1" strike="noStrike">
@@ -4514,7 +4740,7 @@
         <p:spPr>
           <a:xfrm>
             <a:off x="6444000" y="2072880"/>
-            <a:ext cx="1618920" cy="296640"/>
+            <a:ext cx="1618200" cy="295920"/>
           </a:xfrm>
           <a:prstGeom prst="rect">
             <a:avLst/>
@@ -4531,7 +4757,7 @@
           <a:fontRef idx="minor"/>
         </p:style>
         <p:txBody>
-          <a:bodyPr lIns="90000" rIns="90000" tIns="45000" bIns="45000">
+          <a:bodyPr lIns="90000" rIns="90000" tIns="45000" bIns="45000" anchor="t">
             <a:noAutofit/>
           </a:bodyPr>
           <a:p>
@@ -4539,6 +4765,7 @@
               <a:lnSpc>
                 <a:spcPct val="100000"/>
               </a:lnSpc>
+              <a:buNone/>
             </a:pPr>
             <a:r>
               <a:rPr b="0" lang="pt-BR" sz="1200" spc="-1" strike="noStrike">
@@ -4565,9 +4792,9 @@
         <p:grpSpPr>
           <a:xfrm>
             <a:off x="6841800" y="2116080"/>
-            <a:ext cx="131760" cy="178200"/>
+            <a:ext cx="131040" cy="177480"/>
             <a:chOff x="6841800" y="2116080"/>
-            <a:chExt cx="131760" cy="178200"/>
+            <a:chExt cx="131040" cy="177480"/>
           </a:xfrm>
         </p:grpSpPr>
         <p:sp>
@@ -4579,7 +4806,7 @@
           <p:spPr>
             <a:xfrm>
               <a:off x="6875280" y="2162520"/>
-              <a:ext cx="65520" cy="131760"/>
+              <a:ext cx="64800" cy="131040"/>
             </a:xfrm>
             <a:prstGeom prst="rect">
               <a:avLst/>
@@ -4609,7 +4836,7 @@
           <p:spPr>
             <a:xfrm>
               <a:off x="6841800" y="2116080"/>
-              <a:ext cx="131760" cy="65520"/>
+              <a:ext cx="131040" cy="64800"/>
             </a:xfrm>
             <a:custGeom>
               <a:avLst/>
@@ -4657,7 +4884,7 @@
         <p:spPr>
           <a:xfrm>
             <a:off x="1548000" y="3240360"/>
-            <a:ext cx="1618920" cy="296640"/>
+            <a:ext cx="1618200" cy="295920"/>
           </a:xfrm>
           <a:prstGeom prst="rect">
             <a:avLst/>
@@ -4674,7 +4901,7 @@
           <a:fontRef idx="minor"/>
         </p:style>
         <p:txBody>
-          <a:bodyPr lIns="90000" rIns="90000" tIns="45000" bIns="45000">
+          <a:bodyPr lIns="90000" rIns="90000" tIns="45000" bIns="45000" anchor="t">
             <a:noAutofit/>
           </a:bodyPr>
           <a:p>
@@ -4682,6 +4909,7 @@
               <a:lnSpc>
                 <a:spcPct val="100000"/>
               </a:lnSpc>
+              <a:buNone/>
             </a:pPr>
             <a:r>
               <a:rPr b="0" lang="pt-BR" sz="1200" spc="-1" strike="noStrike">
@@ -4708,7 +4936,7 @@
         <p:spPr>
           <a:xfrm>
             <a:off x="1404000" y="3637440"/>
-            <a:ext cx="1798920" cy="470160"/>
+            <a:ext cx="1798200" cy="469440"/>
           </a:xfrm>
           <a:prstGeom prst="rect">
             <a:avLst/>
@@ -4725,7 +4953,7 @@
           <a:fontRef idx="minor"/>
         </p:style>
         <p:txBody>
-          <a:bodyPr lIns="90000" rIns="90000" tIns="45000" bIns="45000">
+          <a:bodyPr lIns="90000" rIns="90000" tIns="45000" bIns="45000" anchor="t">
             <a:noAutofit/>
           </a:bodyPr>
           <a:p>
@@ -4733,6 +4961,7 @@
               <a:lnSpc>
                 <a:spcPct val="100000"/>
               </a:lnSpc>
+              <a:buNone/>
             </a:pPr>
             <a:r>
               <a:rPr b="0" lang="pt-BR" sz="2200" spc="-1" strike="noStrike">
@@ -4759,7 +4988,7 @@
         <p:spPr>
           <a:xfrm>
             <a:off x="1548000" y="4094640"/>
-            <a:ext cx="1618920" cy="296640"/>
+            <a:ext cx="1618200" cy="295920"/>
           </a:xfrm>
           <a:prstGeom prst="rect">
             <a:avLst/>
@@ -4776,7 +5005,7 @@
           <a:fontRef idx="minor"/>
         </p:style>
         <p:txBody>
-          <a:bodyPr lIns="90000" rIns="90000" tIns="45000" bIns="45000">
+          <a:bodyPr lIns="90000" rIns="90000" tIns="45000" bIns="45000" anchor="t">
             <a:noAutofit/>
           </a:bodyPr>
           <a:p>
@@ -4784,6 +5013,7 @@
               <a:lnSpc>
                 <a:spcPct val="100000"/>
               </a:lnSpc>
+              <a:buNone/>
             </a:pPr>
             <a:r>
               <a:rPr b="0" lang="pt-BR" sz="1200" spc="-1" strike="noStrike">
@@ -4809,10 +5039,10 @@
         </p:nvGrpSpPr>
         <p:grpSpPr>
           <a:xfrm>
-            <a:off x="2017800" y="4136760"/>
-            <a:ext cx="131760" cy="178920"/>
-            <a:chOff x="2017800" y="4136760"/>
-            <a:chExt cx="131760" cy="178920"/>
+            <a:off x="2017800" y="4136040"/>
+            <a:ext cx="131040" cy="178920"/>
+            <a:chOff x="2017800" y="4136040"/>
+            <a:chExt cx="131040" cy="178920"/>
           </a:xfrm>
         </p:grpSpPr>
         <p:sp>
@@ -4823,8 +5053,8 @@
           </p:nvSpPr>
           <p:spPr>
             <a:xfrm flipV="1">
-              <a:off x="2051280" y="4136760"/>
-              <a:ext cx="65520" cy="131760"/>
+              <a:off x="2051280" y="4136040"/>
+              <a:ext cx="64800" cy="131040"/>
             </a:xfrm>
             <a:prstGeom prst="rect">
               <a:avLst/>
@@ -4854,7 +5084,7 @@
           <p:spPr>
             <a:xfrm>
               <a:off x="2017800" y="4250160"/>
-              <a:ext cx="131760" cy="65520"/>
+              <a:ext cx="131040" cy="64800"/>
             </a:xfrm>
             <a:custGeom>
               <a:avLst/>
@@ -4902,7 +5132,7 @@
         <p:spPr>
           <a:xfrm>
             <a:off x="3600000" y="3132000"/>
-            <a:ext cx="2052000" cy="504000"/>
+            <a:ext cx="2051280" cy="503280"/>
           </a:xfrm>
           <a:prstGeom prst="rect">
             <a:avLst/>
@@ -4919,7 +5149,7 @@
           <a:fontRef idx="minor"/>
         </p:style>
         <p:txBody>
-          <a:bodyPr lIns="90000" rIns="90000" tIns="45000" bIns="45000">
+          <a:bodyPr lIns="90000" rIns="90000" tIns="45000" bIns="45000" anchor="t">
             <a:noAutofit/>
           </a:bodyPr>
           <a:p>
@@ -4927,6 +5157,7 @@
               <a:lnSpc>
                 <a:spcPct val="100000"/>
               </a:lnSpc>
+              <a:buNone/>
             </a:pPr>
             <a:r>
               <a:rPr b="0" lang="pt-BR" sz="1200" spc="-1" strike="noStrike">
@@ -4947,6 +5178,7 @@
               <a:lnSpc>
                 <a:spcPct val="100000"/>
               </a:lnSpc>
+              <a:buNone/>
             </a:pPr>
             <a:r>
               <a:rPr b="0" lang="pt-BR" sz="1200" spc="-1" strike="noStrike">
@@ -4973,7 +5205,7 @@
         <p:spPr>
           <a:xfrm>
             <a:off x="3744000" y="3565440"/>
-            <a:ext cx="1798920" cy="470160"/>
+            <a:ext cx="1798200" cy="469440"/>
           </a:xfrm>
           <a:prstGeom prst="rect">
             <a:avLst/>
@@ -4990,7 +5222,7 @@
           <a:fontRef idx="minor"/>
         </p:style>
         <p:txBody>
-          <a:bodyPr lIns="90000" rIns="90000" tIns="45000" bIns="45000">
+          <a:bodyPr lIns="90000" rIns="90000" tIns="45000" bIns="45000" anchor="t">
             <a:noAutofit/>
           </a:bodyPr>
           <a:p>
@@ -4998,6 +5230,7 @@
               <a:lnSpc>
                 <a:spcPct val="100000"/>
               </a:lnSpc>
+              <a:buNone/>
             </a:pPr>
             <a:r>
               <a:rPr b="0" lang="pt-BR" sz="2200" spc="-1" strike="noStrike">
@@ -5024,7 +5257,7 @@
         <p:spPr>
           <a:xfrm>
             <a:off x="3888000" y="4022640"/>
-            <a:ext cx="1618920" cy="296640"/>
+            <a:ext cx="1618200" cy="295920"/>
           </a:xfrm>
           <a:prstGeom prst="rect">
             <a:avLst/>
@@ -5041,7 +5274,7 @@
           <a:fontRef idx="minor"/>
         </p:style>
         <p:txBody>
-          <a:bodyPr lIns="90000" rIns="90000" tIns="45000" bIns="45000">
+          <a:bodyPr lIns="90000" rIns="90000" tIns="45000" bIns="45000" anchor="t">
             <a:noAutofit/>
           </a:bodyPr>
           <a:p>
@@ -5049,6 +5282,7 @@
               <a:lnSpc>
                 <a:spcPct val="100000"/>
               </a:lnSpc>
+              <a:buNone/>
             </a:pPr>
             <a:r>
               <a:rPr b="0" lang="pt-BR" sz="1200" spc="-1" strike="noStrike">
@@ -5075,9 +5309,9 @@
         <p:grpSpPr>
           <a:xfrm>
             <a:off x="4285800" y="4065840"/>
-            <a:ext cx="131760" cy="178200"/>
+            <a:ext cx="131040" cy="177480"/>
             <a:chOff x="4285800" y="4065840"/>
-            <a:chExt cx="131760" cy="178200"/>
+            <a:chExt cx="131040" cy="177480"/>
           </a:xfrm>
         </p:grpSpPr>
         <p:sp>
@@ -5089,7 +5323,7 @@
           <p:spPr>
             <a:xfrm>
               <a:off x="4319280" y="4112280"/>
-              <a:ext cx="65520" cy="131760"/>
+              <a:ext cx="64800" cy="131040"/>
             </a:xfrm>
             <a:prstGeom prst="rect">
               <a:avLst/>
@@ -5119,7 +5353,7 @@
           <p:spPr>
             <a:xfrm>
               <a:off x="4285800" y="4065840"/>
-              <a:ext cx="131760" cy="65520"/>
+              <a:ext cx="131040" cy="64800"/>
             </a:xfrm>
             <a:custGeom>
               <a:avLst/>
@@ -5255,7 +5489,7 @@
         <p:spPr>
           <a:xfrm>
             <a:off x="3420000" y="180000"/>
-            <a:ext cx="2338920" cy="505440"/>
+            <a:ext cx="2338200" cy="504720"/>
           </a:xfrm>
           <a:prstGeom prst="rect">
             <a:avLst/>
@@ -5272,7 +5506,7 @@
           <a:fontRef idx="minor"/>
         </p:style>
         <p:txBody>
-          <a:bodyPr lIns="90000" rIns="90000" tIns="45000" bIns="45000">
+          <a:bodyPr lIns="90000" rIns="90000" tIns="45000" bIns="45000" anchor="t">
             <a:noAutofit/>
           </a:bodyPr>
           <a:p>
@@ -5280,6 +5514,7 @@
               <a:lnSpc>
                 <a:spcPct val="100000"/>
               </a:lnSpc>
+              <a:buNone/>
             </a:pPr>
             <a:r>
               <a:rPr b="0" lang="pt-BR" sz="2400" spc="-1" strike="noStrike">
@@ -5306,7 +5541,7 @@
         <p:spPr>
           <a:xfrm>
             <a:off x="324360" y="1980000"/>
-            <a:ext cx="1618920" cy="504000"/>
+            <a:ext cx="1618200" cy="503280"/>
           </a:xfrm>
           <a:prstGeom prst="rect">
             <a:avLst/>
@@ -5323,7 +5558,7 @@
           <a:fontRef idx="minor"/>
         </p:style>
         <p:txBody>
-          <a:bodyPr lIns="90000" rIns="90000" tIns="45000" bIns="45000">
+          <a:bodyPr lIns="90000" rIns="90000" tIns="45000" bIns="45000" anchor="t">
             <a:noAutofit/>
           </a:bodyPr>
           <a:p>
@@ -5331,6 +5566,7 @@
               <a:lnSpc>
                 <a:spcPct val="100000"/>
               </a:lnSpc>
+              <a:buNone/>
             </a:pPr>
             <a:r>
               <a:rPr b="0" lang="pt-BR" sz="1200" spc="-1" strike="noStrike">
@@ -5357,7 +5593,7 @@
         <p:spPr>
           <a:xfrm>
             <a:off x="324360" y="2485080"/>
-            <a:ext cx="1618920" cy="470160"/>
+            <a:ext cx="1618200" cy="469440"/>
           </a:xfrm>
           <a:prstGeom prst="rect">
             <a:avLst/>
@@ -5374,7 +5610,7 @@
           <a:fontRef idx="minor"/>
         </p:style>
         <p:txBody>
-          <a:bodyPr lIns="90000" rIns="90000" tIns="45000" bIns="45000">
+          <a:bodyPr lIns="90000" rIns="90000" tIns="45000" bIns="45000" anchor="t">
             <a:noAutofit/>
           </a:bodyPr>
           <a:p>
@@ -5382,6 +5618,7 @@
               <a:lnSpc>
                 <a:spcPct val="100000"/>
               </a:lnSpc>
+              <a:buNone/>
             </a:pPr>
             <a:r>
               <a:rPr b="0" lang="pt-BR" sz="2200" spc="-1" strike="noStrike">
@@ -5408,7 +5645,7 @@
         <p:spPr>
           <a:xfrm>
             <a:off x="324360" y="2942280"/>
-            <a:ext cx="1618920" cy="296640"/>
+            <a:ext cx="1618200" cy="295920"/>
           </a:xfrm>
           <a:prstGeom prst="rect">
             <a:avLst/>
@@ -5425,7 +5662,7 @@
           <a:fontRef idx="minor"/>
         </p:style>
         <p:txBody>
-          <a:bodyPr lIns="90000" rIns="90000" tIns="45000" bIns="45000">
+          <a:bodyPr lIns="90000" rIns="90000" tIns="45000" bIns="45000" anchor="t">
             <a:noAutofit/>
           </a:bodyPr>
           <a:p>
@@ -5433,6 +5670,7 @@
               <a:lnSpc>
                 <a:spcPct val="100000"/>
               </a:lnSpc>
+              <a:buNone/>
             </a:pPr>
             <a:r>
               <a:rPr b="0" lang="pt-BR" sz="1200" spc="-1" strike="noStrike">
@@ -5459,9 +5697,9 @@
         <p:grpSpPr>
           <a:xfrm>
             <a:off x="722160" y="2985480"/>
-            <a:ext cx="131760" cy="178200"/>
+            <a:ext cx="131040" cy="177480"/>
             <a:chOff x="722160" y="2985480"/>
-            <a:chExt cx="131760" cy="178200"/>
+            <a:chExt cx="131040" cy="177480"/>
           </a:xfrm>
         </p:grpSpPr>
         <p:sp>
@@ -5473,7 +5711,7 @@
           <p:spPr>
             <a:xfrm>
               <a:off x="755640" y="3031920"/>
-              <a:ext cx="65520" cy="131760"/>
+              <a:ext cx="64800" cy="131040"/>
             </a:xfrm>
             <a:prstGeom prst="rect">
               <a:avLst/>
@@ -5503,7 +5741,7 @@
           <p:spPr>
             <a:xfrm>
               <a:off x="722160" y="2985480"/>
-              <a:ext cx="131760" cy="65520"/>
+              <a:ext cx="131040" cy="64800"/>
             </a:xfrm>
             <a:custGeom>
               <a:avLst/>
@@ -5551,7 +5789,7 @@
         <p:spPr>
           <a:xfrm>
             <a:off x="2124360" y="2196000"/>
-            <a:ext cx="1618920" cy="296640"/>
+            <a:ext cx="1618200" cy="295920"/>
           </a:xfrm>
           <a:prstGeom prst="rect">
             <a:avLst/>
@@ -5568,7 +5806,7 @@
           <a:fontRef idx="minor"/>
         </p:style>
         <p:txBody>
-          <a:bodyPr lIns="90000" rIns="90000" tIns="45000" bIns="45000">
+          <a:bodyPr lIns="90000" rIns="90000" tIns="45000" bIns="45000" anchor="t">
             <a:noAutofit/>
           </a:bodyPr>
           <a:p>
@@ -5576,6 +5814,7 @@
               <a:lnSpc>
                 <a:spcPct val="100000"/>
               </a:lnSpc>
+              <a:buNone/>
             </a:pPr>
             <a:r>
               <a:rPr b="0" lang="pt-BR" sz="1200" spc="-1" strike="noStrike">
@@ -5602,7 +5841,7 @@
         <p:spPr>
           <a:xfrm>
             <a:off x="1980360" y="2485080"/>
-            <a:ext cx="1798920" cy="470160"/>
+            <a:ext cx="1798200" cy="469440"/>
           </a:xfrm>
           <a:prstGeom prst="rect">
             <a:avLst/>
@@ -5619,7 +5858,7 @@
           <a:fontRef idx="minor"/>
         </p:style>
         <p:txBody>
-          <a:bodyPr lIns="90000" rIns="90000" tIns="45000" bIns="45000">
+          <a:bodyPr lIns="90000" rIns="90000" tIns="45000" bIns="45000" anchor="t">
             <a:noAutofit/>
           </a:bodyPr>
           <a:p>
@@ -5627,6 +5866,7 @@
               <a:lnSpc>
                 <a:spcPct val="100000"/>
               </a:lnSpc>
+              <a:buNone/>
             </a:pPr>
             <a:r>
               <a:rPr b="0" lang="pt-BR" sz="2200" spc="-1" strike="noStrike">
@@ -5653,7 +5893,7 @@
         <p:spPr>
           <a:xfrm>
             <a:off x="2124360" y="2942280"/>
-            <a:ext cx="1618920" cy="296640"/>
+            <a:ext cx="1618200" cy="295920"/>
           </a:xfrm>
           <a:prstGeom prst="rect">
             <a:avLst/>
@@ -5670,7 +5910,7 @@
           <a:fontRef idx="minor"/>
         </p:style>
         <p:txBody>
-          <a:bodyPr lIns="90000" rIns="90000" tIns="45000" bIns="45000">
+          <a:bodyPr lIns="90000" rIns="90000" tIns="45000" bIns="45000" anchor="t">
             <a:noAutofit/>
           </a:bodyPr>
           <a:p>
@@ -5678,6 +5918,7 @@
               <a:lnSpc>
                 <a:spcPct val="100000"/>
               </a:lnSpc>
+              <a:buNone/>
             </a:pPr>
             <a:r>
               <a:rPr b="0" lang="pt-BR" sz="1200" spc="-1" strike="noStrike">
@@ -5704,9 +5945,9 @@
         <p:grpSpPr>
           <a:xfrm>
             <a:off x="2522160" y="2985480"/>
-            <a:ext cx="131760" cy="178200"/>
+            <a:ext cx="131040" cy="177480"/>
             <a:chOff x="2522160" y="2985480"/>
-            <a:chExt cx="131760" cy="178200"/>
+            <a:chExt cx="131040" cy="177480"/>
           </a:xfrm>
         </p:grpSpPr>
         <p:sp>
@@ -5718,7 +5959,7 @@
           <p:spPr>
             <a:xfrm>
               <a:off x="2555640" y="3031920"/>
-              <a:ext cx="65520" cy="131760"/>
+              <a:ext cx="64800" cy="131040"/>
             </a:xfrm>
             <a:prstGeom prst="rect">
               <a:avLst/>
@@ -5748,7 +5989,7 @@
           <p:spPr>
             <a:xfrm>
               <a:off x="2522160" y="2985480"/>
-              <a:ext cx="131760" cy="65520"/>
+              <a:ext cx="131040" cy="64800"/>
             </a:xfrm>
             <a:custGeom>
               <a:avLst/>
@@ -5796,7 +6037,7 @@
         <p:spPr>
           <a:xfrm>
             <a:off x="5364360" y="2098080"/>
-            <a:ext cx="1618920" cy="504000"/>
+            <a:ext cx="1618200" cy="503280"/>
           </a:xfrm>
           <a:prstGeom prst="rect">
             <a:avLst/>
@@ -5813,7 +6054,7 @@
           <a:fontRef idx="minor"/>
         </p:style>
         <p:txBody>
-          <a:bodyPr lIns="90000" rIns="90000" tIns="45000" bIns="45000">
+          <a:bodyPr lIns="90000" rIns="90000" tIns="45000" bIns="45000" anchor="t">
             <a:noAutofit/>
           </a:bodyPr>
           <a:p>
@@ -5821,6 +6062,7 @@
               <a:lnSpc>
                 <a:spcPct val="100000"/>
               </a:lnSpc>
+              <a:buNone/>
             </a:pPr>
             <a:r>
               <a:rPr b="0" lang="pt-BR" sz="1200" spc="-1" strike="noStrike">
@@ -5847,7 +6089,7 @@
         <p:spPr>
           <a:xfrm>
             <a:off x="5364360" y="2603160"/>
-            <a:ext cx="1618920" cy="470160"/>
+            <a:ext cx="1618200" cy="469440"/>
           </a:xfrm>
           <a:prstGeom prst="rect">
             <a:avLst/>
@@ -5864,7 +6106,7 @@
           <a:fontRef idx="minor"/>
         </p:style>
         <p:txBody>
-          <a:bodyPr lIns="90000" rIns="90000" tIns="45000" bIns="45000">
+          <a:bodyPr lIns="90000" rIns="90000" tIns="45000" bIns="45000" anchor="t">
             <a:noAutofit/>
           </a:bodyPr>
           <a:p>
@@ -5872,6 +6114,7 @@
               <a:lnSpc>
                 <a:spcPct val="100000"/>
               </a:lnSpc>
+              <a:buNone/>
             </a:pPr>
             <a:r>
               <a:rPr b="0" lang="pt-BR" sz="2200" spc="-1" strike="noStrike">
@@ -5898,7 +6141,7 @@
         <p:spPr>
           <a:xfrm>
             <a:off x="5364360" y="3060360"/>
-            <a:ext cx="1618920" cy="296640"/>
+            <a:ext cx="1618200" cy="295920"/>
           </a:xfrm>
           <a:prstGeom prst="rect">
             <a:avLst/>
@@ -5915,7 +6158,7 @@
           <a:fontRef idx="minor"/>
         </p:style>
         <p:txBody>
-          <a:bodyPr lIns="90000" rIns="90000" tIns="45000" bIns="45000">
+          <a:bodyPr lIns="90000" rIns="90000" tIns="45000" bIns="45000" anchor="t">
             <a:noAutofit/>
           </a:bodyPr>
           <a:p>
@@ -5923,6 +6166,7 @@
               <a:lnSpc>
                 <a:spcPct val="100000"/>
               </a:lnSpc>
+              <a:buNone/>
             </a:pPr>
             <a:r>
               <a:rPr b="0" lang="pt-BR" sz="1200" spc="-1" strike="noStrike">
@@ -5949,9 +6193,9 @@
         <p:grpSpPr>
           <a:xfrm>
             <a:off x="5762160" y="3103560"/>
-            <a:ext cx="131760" cy="178200"/>
+            <a:ext cx="131040" cy="177480"/>
             <a:chOff x="5762160" y="3103560"/>
-            <a:chExt cx="131760" cy="178200"/>
+            <a:chExt cx="131040" cy="177480"/>
           </a:xfrm>
         </p:grpSpPr>
         <p:sp>
@@ -5963,7 +6207,7 @@
           <p:spPr>
             <a:xfrm>
               <a:off x="5795640" y="3150000"/>
-              <a:ext cx="65520" cy="131760"/>
+              <a:ext cx="64800" cy="131040"/>
             </a:xfrm>
             <a:prstGeom prst="rect">
               <a:avLst/>
@@ -5993,7 +6237,7 @@
           <p:spPr>
             <a:xfrm>
               <a:off x="5762160" y="3103560"/>
-              <a:ext cx="131760" cy="65520"/>
+              <a:ext cx="131040" cy="64800"/>
             </a:xfrm>
             <a:custGeom>
               <a:avLst/>
@@ -6041,7 +6285,7 @@
         <p:spPr>
           <a:xfrm>
             <a:off x="7164360" y="2098080"/>
-            <a:ext cx="1618920" cy="504000"/>
+            <a:ext cx="1618200" cy="503280"/>
           </a:xfrm>
           <a:prstGeom prst="rect">
             <a:avLst/>
@@ -6058,7 +6302,7 @@
           <a:fontRef idx="minor"/>
         </p:style>
         <p:txBody>
-          <a:bodyPr lIns="90000" rIns="90000" tIns="45000" bIns="45000">
+          <a:bodyPr lIns="90000" rIns="90000" tIns="45000" bIns="45000" anchor="t">
             <a:noAutofit/>
           </a:bodyPr>
           <a:p>
@@ -6066,6 +6310,7 @@
               <a:lnSpc>
                 <a:spcPct val="100000"/>
               </a:lnSpc>
+              <a:buNone/>
             </a:pPr>
             <a:r>
               <a:rPr b="0" lang="pt-BR" sz="1200" spc="-1" strike="noStrike">
@@ -6092,7 +6337,7 @@
         <p:spPr>
           <a:xfrm>
             <a:off x="7020360" y="2603160"/>
-            <a:ext cx="1798920" cy="470160"/>
+            <a:ext cx="1798200" cy="469440"/>
           </a:xfrm>
           <a:prstGeom prst="rect">
             <a:avLst/>
@@ -6109,7 +6354,7 @@
           <a:fontRef idx="minor"/>
         </p:style>
         <p:txBody>
-          <a:bodyPr lIns="90000" rIns="90000" tIns="45000" bIns="45000">
+          <a:bodyPr lIns="90000" rIns="90000" tIns="45000" bIns="45000" anchor="t">
             <a:noAutofit/>
           </a:bodyPr>
           <a:p>
@@ -6117,6 +6362,7 @@
               <a:lnSpc>
                 <a:spcPct val="100000"/>
               </a:lnSpc>
+              <a:buNone/>
             </a:pPr>
             <a:r>
               <a:rPr b="0" lang="pt-BR" sz="2200" spc="-1" strike="noStrike">
@@ -6143,7 +6389,7 @@
         <p:spPr>
           <a:xfrm>
             <a:off x="7164360" y="3060360"/>
-            <a:ext cx="1618920" cy="296640"/>
+            <a:ext cx="1618200" cy="295920"/>
           </a:xfrm>
           <a:prstGeom prst="rect">
             <a:avLst/>
@@ -6160,7 +6406,7 @@
           <a:fontRef idx="minor"/>
         </p:style>
         <p:txBody>
-          <a:bodyPr lIns="90000" rIns="90000" tIns="45000" bIns="45000">
+          <a:bodyPr lIns="90000" rIns="90000" tIns="45000" bIns="45000" anchor="t">
             <a:noAutofit/>
           </a:bodyPr>
           <a:p>
@@ -6168,6 +6414,7 @@
               <a:lnSpc>
                 <a:spcPct val="100000"/>
               </a:lnSpc>
+              <a:buNone/>
             </a:pPr>
             <a:r>
               <a:rPr b="0" lang="pt-BR" sz="1200" spc="-1" strike="noStrike">
@@ -6194,9 +6441,9 @@
         <p:grpSpPr>
           <a:xfrm>
             <a:off x="7562160" y="3103560"/>
-            <a:ext cx="131760" cy="178200"/>
+            <a:ext cx="131040" cy="177480"/>
             <a:chOff x="7562160" y="3103560"/>
-            <a:chExt cx="131760" cy="178200"/>
+            <a:chExt cx="131040" cy="177480"/>
           </a:xfrm>
         </p:grpSpPr>
         <p:sp>
@@ -6208,7 +6455,7 @@
           <p:spPr>
             <a:xfrm>
               <a:off x="7595640" y="3150000"/>
-              <a:ext cx="65520" cy="131760"/>
+              <a:ext cx="64800" cy="131040"/>
             </a:xfrm>
             <a:prstGeom prst="rect">
               <a:avLst/>
@@ -6238,7 +6485,7 @@
           <p:spPr>
             <a:xfrm>
               <a:off x="7562160" y="3103560"/>
-              <a:ext cx="131760" cy="65520"/>
+              <a:ext cx="131040" cy="64800"/>
             </a:xfrm>
             <a:custGeom>
               <a:avLst/>
@@ -6286,7 +6533,7 @@
         <p:spPr>
           <a:xfrm>
             <a:off x="792360" y="3636000"/>
-            <a:ext cx="1618920" cy="296640"/>
+            <a:ext cx="1618200" cy="295920"/>
           </a:xfrm>
           <a:prstGeom prst="rect">
             <a:avLst/>
@@ -6303,7 +6550,7 @@
           <a:fontRef idx="minor"/>
         </p:style>
         <p:txBody>
-          <a:bodyPr lIns="90000" rIns="90000" tIns="45000" bIns="45000">
+          <a:bodyPr lIns="90000" rIns="90000" tIns="45000" bIns="45000" anchor="t">
             <a:noAutofit/>
           </a:bodyPr>
           <a:p>
@@ -6311,6 +6558,7 @@
               <a:lnSpc>
                 <a:spcPct val="100000"/>
               </a:lnSpc>
+              <a:buNone/>
             </a:pPr>
             <a:r>
               <a:rPr b="0" lang="pt-BR" sz="1200" spc="-1" strike="noStrike">
@@ -6337,7 +6585,7 @@
         <p:spPr>
           <a:xfrm>
             <a:off x="648360" y="3961080"/>
-            <a:ext cx="1798920" cy="470160"/>
+            <a:ext cx="1798200" cy="469440"/>
           </a:xfrm>
           <a:prstGeom prst="rect">
             <a:avLst/>
@@ -6354,7 +6602,7 @@
           <a:fontRef idx="minor"/>
         </p:style>
         <p:txBody>
-          <a:bodyPr lIns="90000" rIns="90000" tIns="45000" bIns="45000">
+          <a:bodyPr lIns="90000" rIns="90000" tIns="45000" bIns="45000" anchor="t">
             <a:noAutofit/>
           </a:bodyPr>
           <a:p>
@@ -6362,6 +6610,7 @@
               <a:lnSpc>
                 <a:spcPct val="100000"/>
               </a:lnSpc>
+              <a:buNone/>
             </a:pPr>
             <a:r>
               <a:rPr b="0" lang="pt-BR" sz="2200" spc="-1" strike="noStrike">
@@ -6388,7 +6637,7 @@
         <p:spPr>
           <a:xfrm>
             <a:off x="792360" y="4418280"/>
-            <a:ext cx="1618920" cy="296640"/>
+            <a:ext cx="1618200" cy="295920"/>
           </a:xfrm>
           <a:prstGeom prst="rect">
             <a:avLst/>
@@ -6405,7 +6654,7 @@
           <a:fontRef idx="minor"/>
         </p:style>
         <p:txBody>
-          <a:bodyPr lIns="90000" rIns="90000" tIns="45000" bIns="45000">
+          <a:bodyPr lIns="90000" rIns="90000" tIns="45000" bIns="45000" anchor="t">
             <a:noAutofit/>
           </a:bodyPr>
           <a:p>
@@ -6413,6 +6662,7 @@
               <a:lnSpc>
                 <a:spcPct val="100000"/>
               </a:lnSpc>
+              <a:buNone/>
             </a:pPr>
             <a:r>
               <a:rPr b="0" lang="pt-BR" sz="1200" spc="-1" strike="noStrike">
@@ -6438,10 +6688,10 @@
         </p:nvGrpSpPr>
         <p:grpSpPr>
           <a:xfrm>
-            <a:off x="1262160" y="4460400"/>
-            <a:ext cx="131760" cy="178920"/>
-            <a:chOff x="1262160" y="4460400"/>
-            <a:chExt cx="131760" cy="178920"/>
+            <a:off x="1262160" y="4459680"/>
+            <a:ext cx="131040" cy="178920"/>
+            <a:chOff x="1262160" y="4459680"/>
+            <a:chExt cx="131040" cy="178920"/>
           </a:xfrm>
         </p:grpSpPr>
         <p:sp>
@@ -6452,8 +6702,8 @@
           </p:nvSpPr>
           <p:spPr>
             <a:xfrm flipV="1">
-              <a:off x="1295640" y="4460400"/>
-              <a:ext cx="65520" cy="131760"/>
+              <a:off x="1295640" y="4459680"/>
+              <a:ext cx="64800" cy="131040"/>
             </a:xfrm>
             <a:prstGeom prst="rect">
               <a:avLst/>
@@ -6483,7 +6733,7 @@
           <p:spPr>
             <a:xfrm>
               <a:off x="1262160" y="4573800"/>
-              <a:ext cx="131760" cy="65520"/>
+              <a:ext cx="131040" cy="64800"/>
             </a:xfrm>
             <a:custGeom>
               <a:avLst/>
@@ -6531,7 +6781,7 @@
         <p:spPr>
           <a:xfrm>
             <a:off x="3132360" y="3456000"/>
-            <a:ext cx="1618920" cy="504000"/>
+            <a:ext cx="1618200" cy="503280"/>
           </a:xfrm>
           <a:prstGeom prst="rect">
             <a:avLst/>
@@ -6548,7 +6798,7 @@
           <a:fontRef idx="minor"/>
         </p:style>
         <p:txBody>
-          <a:bodyPr lIns="90000" rIns="90000" tIns="45000" bIns="45000">
+          <a:bodyPr lIns="90000" rIns="90000" tIns="45000" bIns="45000" anchor="t">
             <a:noAutofit/>
           </a:bodyPr>
           <a:p>
@@ -6556,6 +6806,7 @@
               <a:lnSpc>
                 <a:spcPct val="100000"/>
               </a:lnSpc>
+              <a:buNone/>
             </a:pPr>
             <a:r>
               <a:rPr b="0" lang="pt-BR" sz="1200" spc="-1" strike="noStrike">
@@ -6576,6 +6827,7 @@
               <a:lnSpc>
                 <a:spcPct val="100000"/>
               </a:lnSpc>
+              <a:buNone/>
             </a:pPr>
             <a:r>
               <a:rPr b="0" lang="pt-BR" sz="1200" spc="-1" strike="noStrike">
@@ -6602,7 +6854,7 @@
         <p:spPr>
           <a:xfrm>
             <a:off x="2988360" y="3961080"/>
-            <a:ext cx="1798920" cy="470160"/>
+            <a:ext cx="1798200" cy="469440"/>
           </a:xfrm>
           <a:prstGeom prst="rect">
             <a:avLst/>
@@ -6619,7 +6871,7 @@
           <a:fontRef idx="minor"/>
         </p:style>
         <p:txBody>
-          <a:bodyPr lIns="90000" rIns="90000" tIns="45000" bIns="45000">
+          <a:bodyPr lIns="90000" rIns="90000" tIns="45000" bIns="45000" anchor="t">
             <a:noAutofit/>
           </a:bodyPr>
           <a:p>
@@ -6627,6 +6879,7 @@
               <a:lnSpc>
                 <a:spcPct val="100000"/>
               </a:lnSpc>
+              <a:buNone/>
             </a:pPr>
             <a:r>
               <a:rPr b="0" lang="pt-BR" sz="2200" spc="-1" strike="noStrike">
@@ -6653,7 +6906,7 @@
         <p:spPr>
           <a:xfrm>
             <a:off x="3132360" y="4418280"/>
-            <a:ext cx="1618920" cy="296640"/>
+            <a:ext cx="1618200" cy="295920"/>
           </a:xfrm>
           <a:prstGeom prst="rect">
             <a:avLst/>
@@ -6670,7 +6923,7 @@
           <a:fontRef idx="minor"/>
         </p:style>
         <p:txBody>
-          <a:bodyPr lIns="90000" rIns="90000" tIns="45000" bIns="45000">
+          <a:bodyPr lIns="90000" rIns="90000" tIns="45000" bIns="45000" anchor="t">
             <a:noAutofit/>
           </a:bodyPr>
           <a:p>
@@ -6678,6 +6931,7 @@
               <a:lnSpc>
                 <a:spcPct val="100000"/>
               </a:lnSpc>
+              <a:buNone/>
             </a:pPr>
             <a:r>
               <a:rPr b="0" lang="pt-BR" sz="1200" spc="-1" strike="noStrike">
@@ -6704,9 +6958,9 @@
         <p:grpSpPr>
           <a:xfrm>
             <a:off x="3530160" y="4461480"/>
-            <a:ext cx="131760" cy="178200"/>
+            <a:ext cx="131040" cy="177480"/>
             <a:chOff x="3530160" y="4461480"/>
-            <a:chExt cx="131760" cy="178200"/>
+            <a:chExt cx="131040" cy="177480"/>
           </a:xfrm>
         </p:grpSpPr>
         <p:sp>
@@ -6718,7 +6972,7 @@
           <p:spPr>
             <a:xfrm>
               <a:off x="3563640" y="4507920"/>
-              <a:ext cx="65520" cy="131760"/>
+              <a:ext cx="64800" cy="131040"/>
             </a:xfrm>
             <a:prstGeom prst="rect">
               <a:avLst/>
@@ -6748,7 +7002,7 @@
           <p:spPr>
             <a:xfrm>
               <a:off x="3530160" y="4461480"/>
-              <a:ext cx="131760" cy="65520"/>
+              <a:ext cx="131040" cy="64800"/>
             </a:xfrm>
             <a:custGeom>
               <a:avLst/>
@@ -6854,7 +7108,7 @@
         <p:spPr>
           <a:xfrm>
             <a:off x="5544360" y="1080000"/>
-            <a:ext cx="3239280" cy="1619280"/>
+            <a:ext cx="3238560" cy="1618560"/>
           </a:xfrm>
           <a:prstGeom prst="rect">
             <a:avLst/>
@@ -6871,7 +7125,7 @@
           <a:fontRef idx="minor"/>
         </p:style>
         <p:txBody>
-          <a:bodyPr lIns="90000" rIns="90000" tIns="45000" bIns="45000">
+          <a:bodyPr lIns="90000" rIns="90000" tIns="45000" bIns="45000" anchor="t">
             <a:noAutofit/>
           </a:bodyPr>
           <a:p>
@@ -6879,6 +7133,7 @@
               <a:lnSpc>
                 <a:spcPct val="100000"/>
               </a:lnSpc>
+              <a:buNone/>
             </a:pPr>
             <a:r>
               <a:rPr b="0" lang="pt-BR" sz="900" spc="-1" strike="noStrike">
@@ -6905,7 +7160,7 @@
         <p:spPr>
           <a:xfrm>
             <a:off x="396000" y="720000"/>
-            <a:ext cx="3563640" cy="899640"/>
+            <a:ext cx="3562920" cy="898920"/>
           </a:xfrm>
           <a:prstGeom prst="rect">
             <a:avLst/>
@@ -6922,7 +7177,7 @@
           <a:fontRef idx="minor"/>
         </p:style>
         <p:txBody>
-          <a:bodyPr lIns="90000" rIns="90000" tIns="45000" bIns="45000">
+          <a:bodyPr lIns="90000" rIns="90000" tIns="45000" bIns="45000" anchor="t">
             <a:noAutofit/>
           </a:bodyPr>
           <a:p>
@@ -6930,6 +7185,7 @@
               <a:lnSpc>
                 <a:spcPct val="100000"/>
               </a:lnSpc>
+              <a:buNone/>
             </a:pPr>
             <a:r>
               <a:rPr b="0" lang="pt-BR" sz="900" spc="-1" strike="noStrike">
@@ -6986,7 +7242,7 @@
         <p:spPr>
           <a:xfrm>
             <a:off x="3420000" y="180000"/>
-            <a:ext cx="2338920" cy="505440"/>
+            <a:ext cx="2338200" cy="504720"/>
           </a:xfrm>
           <a:prstGeom prst="rect">
             <a:avLst/>
@@ -7003,7 +7259,7 @@
           <a:fontRef idx="minor"/>
         </p:style>
         <p:txBody>
-          <a:bodyPr lIns="90000" rIns="90000" tIns="45000" bIns="45000">
+          <a:bodyPr lIns="90000" rIns="90000" tIns="45000" bIns="45000" anchor="t">
             <a:noAutofit/>
           </a:bodyPr>
           <a:p>
@@ -7011,6 +7267,7 @@
               <a:lnSpc>
                 <a:spcPct val="100000"/>
               </a:lnSpc>
+              <a:buNone/>
             </a:pPr>
             <a:r>
               <a:rPr b="0" lang="pt-BR" sz="2400" spc="-1" strike="noStrike">
@@ -7037,7 +7294,7 @@
         <p:spPr>
           <a:xfrm>
             <a:off x="4356360" y="1224360"/>
-            <a:ext cx="1618920" cy="504000"/>
+            <a:ext cx="1618200" cy="503280"/>
           </a:xfrm>
           <a:prstGeom prst="rect">
             <a:avLst/>
@@ -7054,7 +7311,7 @@
           <a:fontRef idx="minor"/>
         </p:style>
         <p:txBody>
-          <a:bodyPr lIns="90000" rIns="90000" tIns="45000" bIns="45000">
+          <a:bodyPr lIns="90000" rIns="90000" tIns="45000" bIns="45000" anchor="t">
             <a:noAutofit/>
           </a:bodyPr>
           <a:p>
@@ -7062,6 +7319,7 @@
               <a:lnSpc>
                 <a:spcPct val="100000"/>
               </a:lnSpc>
+              <a:buNone/>
             </a:pPr>
             <a:r>
               <a:rPr b="0" lang="pt-BR" sz="1200" spc="-1" strike="noStrike">
@@ -7088,7 +7346,7 @@
         <p:spPr>
           <a:xfrm>
             <a:off x="4356360" y="1729440"/>
-            <a:ext cx="1618920" cy="470160"/>
+            <a:ext cx="1618200" cy="469440"/>
           </a:xfrm>
           <a:prstGeom prst="rect">
             <a:avLst/>
@@ -7105,7 +7363,7 @@
           <a:fontRef idx="minor"/>
         </p:style>
         <p:txBody>
-          <a:bodyPr lIns="90000" rIns="90000" tIns="45000" bIns="45000">
+          <a:bodyPr lIns="90000" rIns="90000" tIns="45000" bIns="45000" anchor="t">
             <a:noAutofit/>
           </a:bodyPr>
           <a:p>
@@ -7113,6 +7371,7 @@
               <a:lnSpc>
                 <a:spcPct val="100000"/>
               </a:lnSpc>
+              <a:buNone/>
             </a:pPr>
             <a:r>
               <a:rPr b="0" lang="pt-BR" sz="2200" spc="-1" strike="noStrike">
@@ -7139,7 +7398,7 @@
         <p:spPr>
           <a:xfrm>
             <a:off x="4356360" y="2186640"/>
-            <a:ext cx="1618920" cy="296640"/>
+            <a:ext cx="1618200" cy="295920"/>
           </a:xfrm>
           <a:prstGeom prst="rect">
             <a:avLst/>
@@ -7156,7 +7415,7 @@
           <a:fontRef idx="minor"/>
         </p:style>
         <p:txBody>
-          <a:bodyPr lIns="90000" rIns="90000" tIns="45000" bIns="45000">
+          <a:bodyPr lIns="90000" rIns="90000" tIns="45000" bIns="45000" anchor="t">
             <a:noAutofit/>
           </a:bodyPr>
           <a:p>
@@ -7164,6 +7423,7 @@
               <a:lnSpc>
                 <a:spcPct val="100000"/>
               </a:lnSpc>
+              <a:buNone/>
             </a:pPr>
             <a:r>
               <a:rPr b="0" lang="pt-BR" sz="1200" spc="-1" strike="noStrike">
@@ -7190,9 +7450,9 @@
         <p:grpSpPr>
           <a:xfrm>
             <a:off x="4754160" y="2229840"/>
-            <a:ext cx="131760" cy="178200"/>
+            <a:ext cx="131040" cy="177480"/>
             <a:chOff x="4754160" y="2229840"/>
-            <a:chExt cx="131760" cy="178200"/>
+            <a:chExt cx="131040" cy="177480"/>
           </a:xfrm>
         </p:grpSpPr>
         <p:sp>
@@ -7204,7 +7464,7 @@
           <p:spPr>
             <a:xfrm>
               <a:off x="4787640" y="2276280"/>
-              <a:ext cx="65520" cy="131760"/>
+              <a:ext cx="64800" cy="131040"/>
             </a:xfrm>
             <a:prstGeom prst="rect">
               <a:avLst/>
@@ -7234,7 +7494,7 @@
           <p:spPr>
             <a:xfrm>
               <a:off x="4754160" y="2229840"/>
-              <a:ext cx="131760" cy="65520"/>
+              <a:ext cx="131040" cy="64800"/>
             </a:xfrm>
             <a:custGeom>
               <a:avLst/>
@@ -7282,7 +7542,7 @@
         <p:spPr>
           <a:xfrm>
             <a:off x="6156360" y="1440360"/>
-            <a:ext cx="1618920" cy="296640"/>
+            <a:ext cx="1618200" cy="295920"/>
           </a:xfrm>
           <a:prstGeom prst="rect">
             <a:avLst/>
@@ -7299,7 +7559,7 @@
           <a:fontRef idx="minor"/>
         </p:style>
         <p:txBody>
-          <a:bodyPr lIns="90000" rIns="90000" tIns="45000" bIns="45000">
+          <a:bodyPr lIns="90000" rIns="90000" tIns="45000" bIns="45000" anchor="t">
             <a:noAutofit/>
           </a:bodyPr>
           <a:p>
@@ -7307,6 +7567,7 @@
               <a:lnSpc>
                 <a:spcPct val="100000"/>
               </a:lnSpc>
+              <a:buNone/>
             </a:pPr>
             <a:r>
               <a:rPr b="0" lang="pt-BR" sz="1200" spc="-1" strike="noStrike">
@@ -7333,7 +7594,7 @@
         <p:spPr>
           <a:xfrm>
             <a:off x="6012360" y="1729440"/>
-            <a:ext cx="1798920" cy="470160"/>
+            <a:ext cx="1798200" cy="469440"/>
           </a:xfrm>
           <a:prstGeom prst="rect">
             <a:avLst/>
@@ -7350,7 +7611,7 @@
           <a:fontRef idx="minor"/>
         </p:style>
         <p:txBody>
-          <a:bodyPr lIns="90000" rIns="90000" tIns="45000" bIns="45000">
+          <a:bodyPr lIns="90000" rIns="90000" tIns="45000" bIns="45000" anchor="t">
             <a:noAutofit/>
           </a:bodyPr>
           <a:p>
@@ -7358,6 +7619,7 @@
               <a:lnSpc>
                 <a:spcPct val="100000"/>
               </a:lnSpc>
+              <a:buNone/>
             </a:pPr>
             <a:r>
               <a:rPr b="0" lang="pt-BR" sz="2200" spc="-1" strike="noStrike">
@@ -7384,7 +7646,7 @@
         <p:spPr>
           <a:xfrm>
             <a:off x="6156360" y="2186640"/>
-            <a:ext cx="1618920" cy="296640"/>
+            <a:ext cx="1618200" cy="295920"/>
           </a:xfrm>
           <a:prstGeom prst="rect">
             <a:avLst/>
@@ -7401,7 +7663,7 @@
           <a:fontRef idx="minor"/>
         </p:style>
         <p:txBody>
-          <a:bodyPr lIns="90000" rIns="90000" tIns="45000" bIns="45000">
+          <a:bodyPr lIns="90000" rIns="90000" tIns="45000" bIns="45000" anchor="t">
             <a:noAutofit/>
           </a:bodyPr>
           <a:p>
@@ -7409,6 +7671,7 @@
               <a:lnSpc>
                 <a:spcPct val="100000"/>
               </a:lnSpc>
+              <a:buNone/>
             </a:pPr>
             <a:r>
               <a:rPr b="0" lang="pt-BR" sz="1200" spc="-1" strike="noStrike">
@@ -7435,9 +7698,9 @@
         <p:grpSpPr>
           <a:xfrm>
             <a:off x="6554160" y="2229840"/>
-            <a:ext cx="131760" cy="178200"/>
+            <a:ext cx="131040" cy="177480"/>
             <a:chOff x="6554160" y="2229840"/>
-            <a:chExt cx="131760" cy="178200"/>
+            <a:chExt cx="131040" cy="177480"/>
           </a:xfrm>
         </p:grpSpPr>
         <p:sp>
@@ -7449,7 +7712,7 @@
           <p:spPr>
             <a:xfrm>
               <a:off x="6587640" y="2276280"/>
-              <a:ext cx="65520" cy="131760"/>
+              <a:ext cx="64800" cy="131040"/>
             </a:xfrm>
             <a:prstGeom prst="rect">
               <a:avLst/>
@@ -7479,7 +7742,7 @@
           <p:spPr>
             <a:xfrm>
               <a:off x="6554160" y="2229840"/>
-              <a:ext cx="131760" cy="65520"/>
+              <a:ext cx="131040" cy="64800"/>
             </a:xfrm>
             <a:custGeom>
               <a:avLst/>
@@ -7527,7 +7790,7 @@
         <p:spPr>
           <a:xfrm>
             <a:off x="4824360" y="2880360"/>
-            <a:ext cx="1618920" cy="296640"/>
+            <a:ext cx="1618200" cy="295920"/>
           </a:xfrm>
           <a:prstGeom prst="rect">
             <a:avLst/>
@@ -7544,7 +7807,7 @@
           <a:fontRef idx="minor"/>
         </p:style>
         <p:txBody>
-          <a:bodyPr lIns="90000" rIns="90000" tIns="45000" bIns="45000">
+          <a:bodyPr lIns="90000" rIns="90000" tIns="45000" bIns="45000" anchor="t">
             <a:noAutofit/>
           </a:bodyPr>
           <a:p>
@@ -7552,6 +7815,7 @@
               <a:lnSpc>
                 <a:spcPct val="100000"/>
               </a:lnSpc>
+              <a:buNone/>
             </a:pPr>
             <a:r>
               <a:rPr b="0" lang="pt-BR" sz="1200" spc="-1" strike="noStrike">
@@ -7578,7 +7842,7 @@
         <p:spPr>
           <a:xfrm>
             <a:off x="4680360" y="3313440"/>
-            <a:ext cx="1798920" cy="470160"/>
+            <a:ext cx="1798200" cy="469440"/>
           </a:xfrm>
           <a:prstGeom prst="rect">
             <a:avLst/>
@@ -7595,7 +7859,7 @@
           <a:fontRef idx="minor"/>
         </p:style>
         <p:txBody>
-          <a:bodyPr lIns="90000" rIns="90000" tIns="45000" bIns="45000">
+          <a:bodyPr lIns="90000" rIns="90000" tIns="45000" bIns="45000" anchor="t">
             <a:noAutofit/>
           </a:bodyPr>
           <a:p>
@@ -7603,6 +7867,7 @@
               <a:lnSpc>
                 <a:spcPct val="100000"/>
               </a:lnSpc>
+              <a:buNone/>
             </a:pPr>
             <a:r>
               <a:rPr b="0" lang="pt-BR" sz="2200" spc="-1" strike="noStrike">
@@ -7629,7 +7894,7 @@
         <p:spPr>
           <a:xfrm>
             <a:off x="4824360" y="3770640"/>
-            <a:ext cx="1618920" cy="296640"/>
+            <a:ext cx="1618200" cy="295920"/>
           </a:xfrm>
           <a:prstGeom prst="rect">
             <a:avLst/>
@@ -7646,7 +7911,7 @@
           <a:fontRef idx="minor"/>
         </p:style>
         <p:txBody>
-          <a:bodyPr lIns="90000" rIns="90000" tIns="45000" bIns="45000">
+          <a:bodyPr lIns="90000" rIns="90000" tIns="45000" bIns="45000" anchor="t">
             <a:noAutofit/>
           </a:bodyPr>
           <a:p>
@@ -7654,6 +7919,7 @@
               <a:lnSpc>
                 <a:spcPct val="100000"/>
               </a:lnSpc>
+              <a:buNone/>
             </a:pPr>
             <a:r>
               <a:rPr b="0" lang="pt-BR" sz="1200" spc="-1" strike="noStrike">
@@ -7679,10 +7945,10 @@
         </p:nvGrpSpPr>
         <p:grpSpPr>
           <a:xfrm>
-            <a:off x="5294160" y="3812760"/>
-            <a:ext cx="131760" cy="178920"/>
-            <a:chOff x="5294160" y="3812760"/>
-            <a:chExt cx="131760" cy="178920"/>
+            <a:off x="5294160" y="3812040"/>
+            <a:ext cx="131040" cy="178920"/>
+            <a:chOff x="5294160" y="3812040"/>
+            <a:chExt cx="131040" cy="178920"/>
           </a:xfrm>
         </p:grpSpPr>
         <p:sp>
@@ -7693,8 +7959,8 @@
           </p:nvSpPr>
           <p:spPr>
             <a:xfrm flipV="1">
-              <a:off x="5327640" y="3812760"/>
-              <a:ext cx="65520" cy="131760"/>
+              <a:off x="5327640" y="3812040"/>
+              <a:ext cx="64800" cy="131040"/>
             </a:xfrm>
             <a:prstGeom prst="rect">
               <a:avLst/>
@@ -7724,7 +7990,7 @@
           <p:spPr>
             <a:xfrm>
               <a:off x="5294160" y="3926160"/>
-              <a:ext cx="131760" cy="65520"/>
+              <a:ext cx="131040" cy="64800"/>
             </a:xfrm>
             <a:custGeom>
               <a:avLst/>
@@ -7772,7 +8038,7 @@
         <p:spPr>
           <a:xfrm>
             <a:off x="6840000" y="2880000"/>
-            <a:ext cx="2015640" cy="504000"/>
+            <a:ext cx="2014920" cy="503280"/>
           </a:xfrm>
           <a:prstGeom prst="rect">
             <a:avLst/>
@@ -7789,7 +8055,7 @@
           <a:fontRef idx="minor"/>
         </p:style>
         <p:txBody>
-          <a:bodyPr lIns="90000" rIns="90000" tIns="45000" bIns="45000">
+          <a:bodyPr lIns="90000" rIns="90000" tIns="45000" bIns="45000" anchor="t">
             <a:noAutofit/>
           </a:bodyPr>
           <a:p>
@@ -7797,6 +8063,7 @@
               <a:lnSpc>
                 <a:spcPct val="100000"/>
               </a:lnSpc>
+              <a:buNone/>
             </a:pPr>
             <a:r>
               <a:rPr b="0" lang="pt-BR" sz="1200" spc="-1" strike="noStrike">
@@ -7817,6 +8084,7 @@
               <a:lnSpc>
                 <a:spcPct val="100000"/>
               </a:lnSpc>
+              <a:buNone/>
             </a:pPr>
             <a:r>
               <a:rPr b="0" lang="pt-BR" sz="1200" spc="-1" strike="noStrike">
@@ -7843,7 +8111,7 @@
         <p:spPr>
           <a:xfrm>
             <a:off x="7020360" y="3313440"/>
-            <a:ext cx="1798920" cy="470160"/>
+            <a:ext cx="1798200" cy="469440"/>
           </a:xfrm>
           <a:prstGeom prst="rect">
             <a:avLst/>
@@ -7860,7 +8128,7 @@
           <a:fontRef idx="minor"/>
         </p:style>
         <p:txBody>
-          <a:bodyPr lIns="90000" rIns="90000" tIns="45000" bIns="45000">
+          <a:bodyPr lIns="90000" rIns="90000" tIns="45000" bIns="45000" anchor="t">
             <a:noAutofit/>
           </a:bodyPr>
           <a:p>
@@ -7868,6 +8136,7 @@
               <a:lnSpc>
                 <a:spcPct val="100000"/>
               </a:lnSpc>
+              <a:buNone/>
             </a:pPr>
             <a:r>
               <a:rPr b="0" lang="pt-BR" sz="2200" spc="-1" strike="noStrike">
@@ -7894,7 +8163,7 @@
         <p:spPr>
           <a:xfrm>
             <a:off x="7164360" y="3770640"/>
-            <a:ext cx="1618920" cy="296640"/>
+            <a:ext cx="1618200" cy="295920"/>
           </a:xfrm>
           <a:prstGeom prst="rect">
             <a:avLst/>
@@ -7911,7 +8180,7 @@
           <a:fontRef idx="minor"/>
         </p:style>
         <p:txBody>
-          <a:bodyPr lIns="90000" rIns="90000" tIns="45000" bIns="45000">
+          <a:bodyPr lIns="90000" rIns="90000" tIns="45000" bIns="45000" anchor="t">
             <a:noAutofit/>
           </a:bodyPr>
           <a:p>
@@ -7919,6 +8188,7 @@
               <a:lnSpc>
                 <a:spcPct val="100000"/>
               </a:lnSpc>
+              <a:buNone/>
             </a:pPr>
             <a:r>
               <a:rPr b="0" lang="pt-BR" sz="1200" spc="-1" strike="noStrike">
@@ -7945,9 +8215,9 @@
         <p:grpSpPr>
           <a:xfrm>
             <a:off x="7562160" y="3813840"/>
-            <a:ext cx="131760" cy="178200"/>
+            <a:ext cx="131040" cy="177480"/>
             <a:chOff x="7562160" y="3813840"/>
-            <a:chExt cx="131760" cy="178200"/>
+            <a:chExt cx="131040" cy="177480"/>
           </a:xfrm>
         </p:grpSpPr>
         <p:sp>
@@ -7959,7 +8229,7 @@
           <p:spPr>
             <a:xfrm>
               <a:off x="7595640" y="3860280"/>
-              <a:ext cx="65520" cy="131760"/>
+              <a:ext cx="64800" cy="131040"/>
             </a:xfrm>
             <a:prstGeom prst="rect">
               <a:avLst/>
@@ -7989,7 +8259,7 @@
           <p:spPr>
             <a:xfrm>
               <a:off x="7562160" y="3813840"/>
-              <a:ext cx="131760" cy="65520"/>
+              <a:ext cx="131040" cy="64800"/>
             </a:xfrm>
             <a:custGeom>
               <a:avLst/>
@@ -8095,7 +8365,7 @@
         <p:spPr>
           <a:xfrm>
             <a:off x="575640" y="1260000"/>
-            <a:ext cx="3383640" cy="1619280"/>
+            <a:ext cx="3382920" cy="1618560"/>
           </a:xfrm>
           <a:prstGeom prst="rect">
             <a:avLst/>
@@ -8112,7 +8382,7 @@
           <a:fontRef idx="minor"/>
         </p:style>
         <p:txBody>
-          <a:bodyPr lIns="90000" rIns="90000" tIns="45000" bIns="45000">
+          <a:bodyPr lIns="90000" rIns="90000" tIns="45000" bIns="45000" anchor="t">
             <a:noAutofit/>
           </a:bodyPr>
           <a:p>
@@ -8120,6 +8390,7 @@
               <a:lnSpc>
                 <a:spcPct val="100000"/>
               </a:lnSpc>
+              <a:buNone/>
             </a:pPr>
             <a:r>
               <a:rPr b="0" lang="pt-BR" sz="1200" spc="-1" strike="noStrike">
@@ -8130,6 +8401,788 @@
                 <a:ea typeface="DejaVu Sans"/>
               </a:rPr>
               <a:t>Mesmo com as quedas de 12% no número de usuários entrando na plataforma, e de 5% no valor total vendido para os produtos de consignado, tivemos um aumento significativo de 20% sobre o valor total vendido. Pois tivemos um aumento de 15 p.p. sobre a taxa de conversão. Além da introdução de um novo produto no fluxo (empréstimos com garantia sobre veículos) que obteve R$ 12 Mil em vendas logo no seu primeiro mês.</a:t>
+            </a:r>
+            <a:endParaRPr b="0" lang="pt-BR" sz="1200" spc="-1" strike="noStrike">
+              <a:latin typeface="Arial"/>
+            </a:endParaRPr>
+          </a:p>
+        </p:txBody>
+      </p:sp>
+    </p:spTree>
+  </p:cSld>
+  <mc:AlternateContent>
+    <mc:Choice Requires="p14">
+      <p:transition spd="slow" p14:dur="2000"/>
+    </mc:Choice>
+    <mc:Fallback>
+      <p:transition spd="slow"/>
+    </mc:Fallback>
+  </mc:AlternateContent>
+</p:sld>
+</file>
+
+<file path=ppt/slides/slide5.xml><?xml version="1.0" encoding="utf-8"?>
+<p:sld xmlns:a="http://schemas.openxmlformats.org/drawingml/2006/main" xmlns:p="http://schemas.openxmlformats.org/presentationml/2006/main" xmlns:r="http://schemas.openxmlformats.org/officeDocument/2006/relationships" xmlns:p14="http://schemas.microsoft.com/office/powerpoint/2010/main" xmlns:p15="http://schemas.microsoft.com/office/powerpoint/2012/main" xmlns:mc="http://schemas.openxmlformats.org/markup-compatibility/2006">
+  <p:cSld>
+    <p:spTree>
+      <p:nvGrpSpPr>
+        <p:cNvPr id="1" name=""/>
+        <p:cNvGrpSpPr/>
+        <p:nvPr/>
+      </p:nvGrpSpPr>
+      <p:grpSpPr>
+        <a:xfrm>
+          <a:off x="0" y="0"/>
+          <a:ext cx="0" cy="0"/>
+          <a:chOff x="0" y="0"/>
+          <a:chExt cx="0" cy="0"/>
+        </a:xfrm>
+      </p:grpSpPr>
+      <p:sp>
+        <p:nvSpPr>
+          <p:cNvPr id="184" name=""/>
+          <p:cNvSpPr/>
+          <p:nvPr/>
+        </p:nvSpPr>
+        <p:spPr>
+          <a:xfrm>
+            <a:off x="2700000" y="2015280"/>
+            <a:ext cx="3600000" cy="504720"/>
+          </a:xfrm>
+          <a:prstGeom prst="rect">
+            <a:avLst/>
+          </a:prstGeom>
+          <a:noFill/>
+          <a:ln w="0">
+            <a:noFill/>
+          </a:ln>
+        </p:spPr>
+        <p:style>
+          <a:lnRef idx="0"/>
+          <a:fillRef idx="0"/>
+          <a:effectRef idx="0"/>
+          <a:fontRef idx="minor"/>
+        </p:style>
+        <p:txBody>
+          <a:bodyPr lIns="90000" rIns="90000" tIns="45000" bIns="45000" anchor="t">
+            <a:noAutofit/>
+          </a:bodyPr>
+          <a:p>
+            <a:pPr algn="ctr">
+              <a:lnSpc>
+                <a:spcPct val="100000"/>
+              </a:lnSpc>
+              <a:buNone/>
+            </a:pPr>
+            <a:r>
+              <a:rPr b="0" lang="pt-BR" sz="2400" spc="-1" strike="noStrike">
+                <a:solidFill>
+                  <a:srgbClr val="222222"/>
+                </a:solidFill>
+                <a:latin typeface="Nunito Sans Black"/>
+                <a:ea typeface="DejaVu Sans"/>
+              </a:rPr>
+              <a:t>REFORMULAÇÃO</a:t>
+            </a:r>
+            <a:endParaRPr b="0" lang="pt-BR" sz="2400" spc="-1" strike="noStrike">
+              <a:latin typeface="Arial"/>
+            </a:endParaRPr>
+          </a:p>
+        </p:txBody>
+      </p:sp>
+      <p:sp>
+        <p:nvSpPr>
+          <p:cNvPr id="185" name=""/>
+          <p:cNvSpPr/>
+          <p:nvPr/>
+        </p:nvSpPr>
+        <p:spPr>
+          <a:xfrm>
+            <a:off x="360000" y="180000"/>
+            <a:ext cx="8280000" cy="1080000"/>
+          </a:xfrm>
+          <a:prstGeom prst="rect">
+            <a:avLst/>
+          </a:prstGeom>
+          <a:solidFill>
+            <a:srgbClr val="2d84e1"/>
+          </a:solidFill>
+          <a:ln w="0">
+            <a:solidFill>
+              <a:srgbClr val="3465a4"/>
+            </a:solidFill>
+          </a:ln>
+        </p:spPr>
+        <p:style>
+          <a:lnRef idx="0"/>
+          <a:fillRef idx="0"/>
+          <a:effectRef idx="0"/>
+          <a:fontRef idx="minor"/>
+        </p:style>
+      </p:sp>
+      <p:sp>
+        <p:nvSpPr>
+          <p:cNvPr id="186" name=""/>
+          <p:cNvSpPr/>
+          <p:nvPr/>
+        </p:nvSpPr>
+        <p:spPr>
+          <a:xfrm>
+            <a:off x="360000" y="3420000"/>
+            <a:ext cx="8280000" cy="1080000"/>
+          </a:xfrm>
+          <a:prstGeom prst="rect">
+            <a:avLst/>
+          </a:prstGeom>
+          <a:solidFill>
+            <a:srgbClr val="2d84e1"/>
+          </a:solidFill>
+          <a:ln w="0">
+            <a:solidFill>
+              <a:srgbClr val="3465a4"/>
+            </a:solidFill>
+          </a:ln>
+        </p:spPr>
+        <p:style>
+          <a:lnRef idx="0"/>
+          <a:fillRef idx="0"/>
+          <a:effectRef idx="0"/>
+          <a:fontRef idx="minor"/>
+        </p:style>
+      </p:sp>
+    </p:spTree>
+  </p:cSld>
+  <mc:AlternateContent>
+    <mc:Choice Requires="p14">
+      <p:transition spd="slow" p14:dur="2000"/>
+    </mc:Choice>
+    <mc:Fallback>
+      <p:transition spd="slow"/>
+    </mc:Fallback>
+  </mc:AlternateContent>
+</p:sld>
+</file>
+
+<file path=ppt/slides/slide6.xml><?xml version="1.0" encoding="utf-8"?>
+<p:sld xmlns:a="http://schemas.openxmlformats.org/drawingml/2006/main" xmlns:p="http://schemas.openxmlformats.org/presentationml/2006/main" xmlns:r="http://schemas.openxmlformats.org/officeDocument/2006/relationships" xmlns:p14="http://schemas.microsoft.com/office/powerpoint/2010/main" xmlns:p15="http://schemas.microsoft.com/office/powerpoint/2012/main" xmlns:mc="http://schemas.openxmlformats.org/markup-compatibility/2006">
+  <p:cSld>
+    <p:spTree>
+      <p:nvGrpSpPr>
+        <p:cNvPr id="1" name=""/>
+        <p:cNvGrpSpPr/>
+        <p:nvPr/>
+      </p:nvGrpSpPr>
+      <p:grpSpPr>
+        <a:xfrm>
+          <a:off x="0" y="0"/>
+          <a:ext cx="0" cy="0"/>
+          <a:chOff x="0" y="0"/>
+          <a:chExt cx="0" cy="0"/>
+        </a:xfrm>
+      </p:grpSpPr>
+      <p:sp>
+        <p:nvSpPr>
+          <p:cNvPr id="187" name=""/>
+          <p:cNvSpPr/>
+          <p:nvPr/>
+        </p:nvSpPr>
+        <p:spPr>
+          <a:xfrm>
+            <a:off x="3420000" y="180000"/>
+            <a:ext cx="2338200" cy="504720"/>
+          </a:xfrm>
+          <a:prstGeom prst="rect">
+            <a:avLst/>
+          </a:prstGeom>
+          <a:noFill/>
+          <a:ln w="0">
+            <a:noFill/>
+          </a:ln>
+        </p:spPr>
+        <p:style>
+          <a:lnRef idx="0"/>
+          <a:fillRef idx="0"/>
+          <a:effectRef idx="0"/>
+          <a:fontRef idx="minor"/>
+        </p:style>
+        <p:txBody>
+          <a:bodyPr lIns="90000" rIns="90000" tIns="45000" bIns="45000" anchor="t">
+            <a:noAutofit/>
+          </a:bodyPr>
+          <a:p>
+            <a:pPr algn="ctr">
+              <a:lnSpc>
+                <a:spcPct val="100000"/>
+              </a:lnSpc>
+              <a:buNone/>
+            </a:pPr>
+            <a:r>
+              <a:rPr b="0" lang="pt-BR" sz="2400" spc="-1" strike="noStrike">
+                <a:solidFill>
+                  <a:srgbClr val="222222"/>
+                </a:solidFill>
+                <a:latin typeface="Nunito Sans Black"/>
+                <a:ea typeface="DejaVu Sans"/>
+              </a:rPr>
+              <a:t>VENDAS</a:t>
+            </a:r>
+            <a:endParaRPr b="0" lang="pt-BR" sz="2400" spc="-1" strike="noStrike">
+              <a:latin typeface="Arial"/>
+            </a:endParaRPr>
+          </a:p>
+        </p:txBody>
+      </p:sp>
+      <p:sp>
+        <p:nvSpPr>
+          <p:cNvPr id="188" name=""/>
+          <p:cNvSpPr/>
+          <p:nvPr/>
+        </p:nvSpPr>
+        <p:spPr>
+          <a:xfrm>
+            <a:off x="6121800" y="2701800"/>
+            <a:ext cx="1618200" cy="503280"/>
+          </a:xfrm>
+          <a:prstGeom prst="rect">
+            <a:avLst/>
+          </a:prstGeom>
+          <a:noFill/>
+          <a:ln w="0">
+            <a:noFill/>
+          </a:ln>
+        </p:spPr>
+        <p:style>
+          <a:lnRef idx="0"/>
+          <a:fillRef idx="0"/>
+          <a:effectRef idx="0"/>
+          <a:fontRef idx="minor"/>
+        </p:style>
+        <p:txBody>
+          <a:bodyPr lIns="90000" rIns="90000" tIns="45000" bIns="45000" anchor="t">
+            <a:noAutofit/>
+          </a:bodyPr>
+          <a:p>
+            <a:pPr algn="ctr">
+              <a:lnSpc>
+                <a:spcPct val="100000"/>
+              </a:lnSpc>
+              <a:buNone/>
+            </a:pPr>
+            <a:r>
+              <a:rPr b="0" lang="pt-BR" sz="1200" spc="-1" strike="noStrike">
+                <a:solidFill>
+                  <a:srgbClr val="222222"/>
+                </a:solidFill>
+                <a:latin typeface="Nunito Sans"/>
+                <a:ea typeface="DejaVu Sans"/>
+              </a:rPr>
+              <a:t>Número de propostas vendidas</a:t>
+            </a:r>
+            <a:endParaRPr b="0" lang="pt-BR" sz="1200" spc="-1" strike="noStrike">
+              <a:latin typeface="Arial"/>
+            </a:endParaRPr>
+          </a:p>
+        </p:txBody>
+      </p:sp>
+      <p:sp>
+        <p:nvSpPr>
+          <p:cNvPr id="189" name=""/>
+          <p:cNvSpPr/>
+          <p:nvPr/>
+        </p:nvSpPr>
+        <p:spPr>
+          <a:xfrm>
+            <a:off x="6121800" y="3206880"/>
+            <a:ext cx="1618200" cy="469440"/>
+          </a:xfrm>
+          <a:prstGeom prst="rect">
+            <a:avLst/>
+          </a:prstGeom>
+          <a:noFill/>
+          <a:ln w="0">
+            <a:noFill/>
+          </a:ln>
+        </p:spPr>
+        <p:style>
+          <a:lnRef idx="0"/>
+          <a:fillRef idx="0"/>
+          <a:effectRef idx="0"/>
+          <a:fontRef idx="minor"/>
+        </p:style>
+        <p:txBody>
+          <a:bodyPr lIns="90000" rIns="90000" tIns="45000" bIns="45000" anchor="t">
+            <a:noAutofit/>
+          </a:bodyPr>
+          <a:p>
+            <a:pPr algn="ctr">
+              <a:lnSpc>
+                <a:spcPct val="100000"/>
+              </a:lnSpc>
+              <a:buNone/>
+            </a:pPr>
+            <a:r>
+              <a:rPr b="0" lang="pt-BR" sz="2200" spc="-1" strike="noStrike">
+                <a:solidFill>
+                  <a:srgbClr val="222222"/>
+                </a:solidFill>
+                <a:latin typeface="Nunito Sans Black"/>
+                <a:ea typeface="DejaVu Sans"/>
+              </a:rPr>
+              <a:t>1.500</a:t>
+            </a:r>
+            <a:endParaRPr b="0" lang="pt-BR" sz="2200" spc="-1" strike="noStrike">
+              <a:latin typeface="Arial"/>
+            </a:endParaRPr>
+          </a:p>
+        </p:txBody>
+      </p:sp>
+      <p:sp>
+        <p:nvSpPr>
+          <p:cNvPr id="190" name=""/>
+          <p:cNvSpPr/>
+          <p:nvPr/>
+        </p:nvSpPr>
+        <p:spPr>
+          <a:xfrm>
+            <a:off x="6121800" y="3664080"/>
+            <a:ext cx="1618200" cy="295920"/>
+          </a:xfrm>
+          <a:prstGeom prst="rect">
+            <a:avLst/>
+          </a:prstGeom>
+          <a:noFill/>
+          <a:ln w="0">
+            <a:noFill/>
+          </a:ln>
+        </p:spPr>
+        <p:style>
+          <a:lnRef idx="0"/>
+          <a:fillRef idx="0"/>
+          <a:effectRef idx="0"/>
+          <a:fontRef idx="minor"/>
+        </p:style>
+        <p:txBody>
+          <a:bodyPr lIns="90000" rIns="90000" tIns="45000" bIns="45000" anchor="t">
+            <a:noAutofit/>
+          </a:bodyPr>
+          <a:p>
+            <a:pPr algn="ctr">
+              <a:lnSpc>
+                <a:spcPct val="100000"/>
+              </a:lnSpc>
+              <a:buNone/>
+            </a:pPr>
+            <a:r>
+              <a:rPr b="0" lang="pt-BR" sz="1200" spc="-1" strike="noStrike">
+                <a:solidFill>
+                  <a:srgbClr val="222222"/>
+                </a:solidFill>
+                <a:latin typeface="Nunito Sans"/>
+                <a:ea typeface="DejaVu Sans"/>
+              </a:rPr>
+              <a:t>15%</a:t>
+            </a:r>
+            <a:endParaRPr b="0" lang="pt-BR" sz="1200" spc="-1" strike="noStrike">
+              <a:latin typeface="Arial"/>
+            </a:endParaRPr>
+          </a:p>
+        </p:txBody>
+      </p:sp>
+      <p:grpSp>
+        <p:nvGrpSpPr>
+          <p:cNvPr id="191" name=""/>
+          <p:cNvGrpSpPr/>
+          <p:nvPr/>
+        </p:nvGrpSpPr>
+        <p:grpSpPr>
+          <a:xfrm>
+            <a:off x="6519600" y="3707280"/>
+            <a:ext cx="131040" cy="177480"/>
+            <a:chOff x="6519600" y="3707280"/>
+            <a:chExt cx="131040" cy="177480"/>
+          </a:xfrm>
+        </p:grpSpPr>
+        <p:sp>
+          <p:nvSpPr>
+            <p:cNvPr id="192" name=""/>
+            <p:cNvSpPr/>
+            <p:nvPr/>
+          </p:nvSpPr>
+          <p:spPr>
+            <a:xfrm>
+              <a:off x="6553080" y="3753720"/>
+              <a:ext cx="64800" cy="131040"/>
+            </a:xfrm>
+            <a:prstGeom prst="rect">
+              <a:avLst/>
+            </a:prstGeom>
+            <a:solidFill>
+              <a:srgbClr val="81d41a"/>
+            </a:solidFill>
+            <a:ln w="0">
+              <a:solidFill>
+                <a:srgbClr val="5eb91e"/>
+              </a:solidFill>
+            </a:ln>
+          </p:spPr>
+          <p:style>
+            <a:lnRef idx="0"/>
+            <a:fillRef idx="0"/>
+            <a:effectRef idx="0"/>
+            <a:fontRef idx="minor"/>
+          </p:style>
+        </p:sp>
+        <p:sp>
+          <p:nvSpPr>
+            <p:cNvPr id="193" name=""/>
+            <p:cNvSpPr/>
+            <p:nvPr/>
+          </p:nvSpPr>
+          <p:spPr>
+            <a:xfrm>
+              <a:off x="6519600" y="3707280"/>
+              <a:ext cx="131040" cy="64800"/>
+            </a:xfrm>
+            <a:custGeom>
+              <a:avLst/>
+              <a:gdLst/>
+              <a:ahLst/>
+              <a:rect l="l" t="t" r="r" b="b"/>
+              <a:pathLst>
+                <a:path w="371" h="187">
+                  <a:moveTo>
+                    <a:pt x="185" y="0"/>
+                  </a:moveTo>
+                  <a:lnTo>
+                    <a:pt x="370" y="186"/>
+                  </a:lnTo>
+                  <a:lnTo>
+                    <a:pt x="0" y="186"/>
+                  </a:lnTo>
+                  <a:lnTo>
+                    <a:pt x="185" y="0"/>
+                  </a:lnTo>
+                </a:path>
+              </a:pathLst>
+            </a:custGeom>
+            <a:solidFill>
+              <a:srgbClr val="81d41a"/>
+            </a:solidFill>
+            <a:ln w="0">
+              <a:noFill/>
+            </a:ln>
+          </p:spPr>
+          <p:style>
+            <a:lnRef idx="0"/>
+            <a:fillRef idx="0"/>
+            <a:effectRef idx="0"/>
+            <a:fontRef idx="minor"/>
+          </p:style>
+        </p:sp>
+      </p:grpSp>
+      <p:sp>
+        <p:nvSpPr>
+          <p:cNvPr id="194" name=""/>
+          <p:cNvSpPr/>
+          <p:nvPr/>
+        </p:nvSpPr>
+        <p:spPr>
+          <a:xfrm>
+            <a:off x="6156360" y="1440360"/>
+            <a:ext cx="1618200" cy="295920"/>
+          </a:xfrm>
+          <a:prstGeom prst="rect">
+            <a:avLst/>
+          </a:prstGeom>
+          <a:noFill/>
+          <a:ln w="0">
+            <a:noFill/>
+          </a:ln>
+        </p:spPr>
+        <p:style>
+          <a:lnRef idx="0"/>
+          <a:fillRef idx="0"/>
+          <a:effectRef idx="0"/>
+          <a:fontRef idx="minor"/>
+        </p:style>
+        <p:txBody>
+          <a:bodyPr lIns="90000" rIns="90000" tIns="45000" bIns="45000" anchor="t">
+            <a:noAutofit/>
+          </a:bodyPr>
+          <a:p>
+            <a:pPr algn="ctr">
+              <a:lnSpc>
+                <a:spcPct val="100000"/>
+              </a:lnSpc>
+              <a:buNone/>
+            </a:pPr>
+            <a:r>
+              <a:rPr b="0" lang="pt-BR" sz="1200" spc="-1" strike="noStrike">
+                <a:solidFill>
+                  <a:srgbClr val="222222"/>
+                </a:solidFill>
+                <a:latin typeface="Nunito Sans"/>
+                <a:ea typeface="DejaVu Sans"/>
+              </a:rPr>
+              <a:t>Valor total vendido</a:t>
+            </a:r>
+            <a:endParaRPr b="0" lang="pt-BR" sz="1200" spc="-1" strike="noStrike">
+              <a:latin typeface="Arial"/>
+            </a:endParaRPr>
+          </a:p>
+        </p:txBody>
+      </p:sp>
+      <p:sp>
+        <p:nvSpPr>
+          <p:cNvPr id="195" name=""/>
+          <p:cNvSpPr/>
+          <p:nvPr/>
+        </p:nvSpPr>
+        <p:spPr>
+          <a:xfrm>
+            <a:off x="6012360" y="1729440"/>
+            <a:ext cx="1798200" cy="469440"/>
+          </a:xfrm>
+          <a:prstGeom prst="rect">
+            <a:avLst/>
+          </a:prstGeom>
+          <a:noFill/>
+          <a:ln w="0">
+            <a:noFill/>
+          </a:ln>
+        </p:spPr>
+        <p:style>
+          <a:lnRef idx="0"/>
+          <a:fillRef idx="0"/>
+          <a:effectRef idx="0"/>
+          <a:fontRef idx="minor"/>
+        </p:style>
+        <p:txBody>
+          <a:bodyPr lIns="90000" rIns="90000" tIns="45000" bIns="45000" anchor="t">
+            <a:noAutofit/>
+          </a:bodyPr>
+          <a:p>
+            <a:pPr algn="ctr">
+              <a:lnSpc>
+                <a:spcPct val="100000"/>
+              </a:lnSpc>
+              <a:buNone/>
+            </a:pPr>
+            <a:r>
+              <a:rPr b="0" lang="pt-BR" sz="2200" spc="-1" strike="noStrike">
+                <a:solidFill>
+                  <a:srgbClr val="222222"/>
+                </a:solidFill>
+                <a:latin typeface="Nunito Sans Black"/>
+                <a:ea typeface="DejaVu Sans"/>
+              </a:rPr>
+              <a:t>R$ 20 Mil</a:t>
+            </a:r>
+            <a:endParaRPr b="0" lang="pt-BR" sz="2200" spc="-1" strike="noStrike">
+              <a:latin typeface="Arial"/>
+            </a:endParaRPr>
+          </a:p>
+        </p:txBody>
+      </p:sp>
+      <p:sp>
+        <p:nvSpPr>
+          <p:cNvPr id="196" name=""/>
+          <p:cNvSpPr/>
+          <p:nvPr/>
+        </p:nvSpPr>
+        <p:spPr>
+          <a:xfrm>
+            <a:off x="6156360" y="2186640"/>
+            <a:ext cx="1618200" cy="295920"/>
+          </a:xfrm>
+          <a:prstGeom prst="rect">
+            <a:avLst/>
+          </a:prstGeom>
+          <a:noFill/>
+          <a:ln w="0">
+            <a:noFill/>
+          </a:ln>
+        </p:spPr>
+        <p:style>
+          <a:lnRef idx="0"/>
+          <a:fillRef idx="0"/>
+          <a:effectRef idx="0"/>
+          <a:fontRef idx="minor"/>
+        </p:style>
+        <p:txBody>
+          <a:bodyPr lIns="90000" rIns="90000" tIns="45000" bIns="45000" anchor="t">
+            <a:noAutofit/>
+          </a:bodyPr>
+          <a:p>
+            <a:pPr algn="ctr">
+              <a:lnSpc>
+                <a:spcPct val="100000"/>
+              </a:lnSpc>
+              <a:buNone/>
+            </a:pPr>
+            <a:r>
+              <a:rPr b="0" lang="pt-BR" sz="1200" spc="-1" strike="noStrike">
+                <a:solidFill>
+                  <a:srgbClr val="222222"/>
+                </a:solidFill>
+                <a:latin typeface="Nunito Sans"/>
+                <a:ea typeface="DejaVu Sans"/>
+              </a:rPr>
+              <a:t>20%</a:t>
+            </a:r>
+            <a:endParaRPr b="0" lang="pt-BR" sz="1200" spc="-1" strike="noStrike">
+              <a:latin typeface="Arial"/>
+            </a:endParaRPr>
+          </a:p>
+        </p:txBody>
+      </p:sp>
+      <p:grpSp>
+        <p:nvGrpSpPr>
+          <p:cNvPr id="197" name=""/>
+          <p:cNvGrpSpPr/>
+          <p:nvPr/>
+        </p:nvGrpSpPr>
+        <p:grpSpPr>
+          <a:xfrm>
+            <a:off x="6554160" y="2229840"/>
+            <a:ext cx="131040" cy="177480"/>
+            <a:chOff x="6554160" y="2229840"/>
+            <a:chExt cx="131040" cy="177480"/>
+          </a:xfrm>
+        </p:grpSpPr>
+        <p:sp>
+          <p:nvSpPr>
+            <p:cNvPr id="198" name=""/>
+            <p:cNvSpPr/>
+            <p:nvPr/>
+          </p:nvSpPr>
+          <p:spPr>
+            <a:xfrm>
+              <a:off x="6587640" y="2276280"/>
+              <a:ext cx="64800" cy="131040"/>
+            </a:xfrm>
+            <a:prstGeom prst="rect">
+              <a:avLst/>
+            </a:prstGeom>
+            <a:solidFill>
+              <a:srgbClr val="81d41a"/>
+            </a:solidFill>
+            <a:ln w="0">
+              <a:solidFill>
+                <a:srgbClr val="5eb91e"/>
+              </a:solidFill>
+            </a:ln>
+          </p:spPr>
+          <p:style>
+            <a:lnRef idx="0"/>
+            <a:fillRef idx="0"/>
+            <a:effectRef idx="0"/>
+            <a:fontRef idx="minor"/>
+          </p:style>
+        </p:sp>
+        <p:sp>
+          <p:nvSpPr>
+            <p:cNvPr id="199" name=""/>
+            <p:cNvSpPr/>
+            <p:nvPr/>
+          </p:nvSpPr>
+          <p:spPr>
+            <a:xfrm>
+              <a:off x="6554160" y="2229840"/>
+              <a:ext cx="131040" cy="64800"/>
+            </a:xfrm>
+            <a:custGeom>
+              <a:avLst/>
+              <a:gdLst/>
+              <a:ahLst/>
+              <a:rect l="l" t="t" r="r" b="b"/>
+              <a:pathLst>
+                <a:path w="371" h="187">
+                  <a:moveTo>
+                    <a:pt x="185" y="0"/>
+                  </a:moveTo>
+                  <a:lnTo>
+                    <a:pt x="370" y="186"/>
+                  </a:lnTo>
+                  <a:lnTo>
+                    <a:pt x="0" y="186"/>
+                  </a:lnTo>
+                  <a:lnTo>
+                    <a:pt x="185" y="0"/>
+                  </a:lnTo>
+                </a:path>
+              </a:pathLst>
+            </a:custGeom>
+            <a:solidFill>
+              <a:srgbClr val="81d41a"/>
+            </a:solidFill>
+            <a:ln w="0">
+              <a:noFill/>
+            </a:ln>
+          </p:spPr>
+          <p:style>
+            <a:lnRef idx="0"/>
+            <a:fillRef idx="0"/>
+            <a:effectRef idx="0"/>
+            <a:fontRef idx="minor"/>
+          </p:style>
+        </p:sp>
+      </p:grpSp>
+      <p:sp>
+        <p:nvSpPr>
+          <p:cNvPr id="200" name=""/>
+          <p:cNvSpPr/>
+          <p:nvPr/>
+        </p:nvSpPr>
+        <p:spPr>
+          <a:xfrm>
+            <a:off x="575640" y="1260000"/>
+            <a:ext cx="3382920" cy="2880000"/>
+          </a:xfrm>
+          <a:prstGeom prst="rect">
+            <a:avLst/>
+          </a:prstGeom>
+          <a:noFill/>
+          <a:ln w="0">
+            <a:noFill/>
+          </a:ln>
+        </p:spPr>
+        <p:style>
+          <a:lnRef idx="0"/>
+          <a:fillRef idx="0"/>
+          <a:effectRef idx="0"/>
+          <a:fontRef idx="minor"/>
+        </p:style>
+        <p:txBody>
+          <a:bodyPr lIns="90000" rIns="90000" tIns="45000" bIns="45000" anchor="t">
+            <a:noAutofit/>
+          </a:bodyPr>
+          <a:p>
+            <a:pPr>
+              <a:lnSpc>
+                <a:spcPct val="100000"/>
+              </a:lnSpc>
+              <a:buNone/>
+            </a:pPr>
+            <a:r>
+              <a:rPr b="0" lang="pt-BR" sz="1200" spc="-1" strike="noStrike">
+                <a:solidFill>
+                  <a:srgbClr val="222222"/>
+                </a:solidFill>
+                <a:latin typeface="Nunito Sans"/>
+                <a:ea typeface="DejaVu Sans"/>
+              </a:rPr>
+              <a:t>Em outubro, conseguimos </a:t>
+            </a:r>
+            <a:r>
+              <a:rPr b="1" lang="pt-BR" sz="1200" spc="-1" strike="noStrike">
+                <a:solidFill>
+                  <a:srgbClr val="222222"/>
+                </a:solidFill>
+                <a:latin typeface="Nunito Sans"/>
+                <a:ea typeface="DejaVu Sans"/>
+              </a:rPr>
+              <a:t>aumentar as nossas vendas em 20%</a:t>
             </a:r>
             <a:endParaRPr b="0" lang="pt-BR" sz="1200" spc="-1" strike="noStrike">
               <a:latin typeface="Arial"/>

</xml_diff>

<commit_message>
Add more content to post
</commit_message>
<xml_diff>
--- a/posts/2023/2023-01-20-storytelling/report-exemplo.pptx
+++ b/posts/2023/2023-01-20-storytelling/report-exemplo.pptx
@@ -11,7 +11,8 @@
     <p:sldId id="259" r:id="rId5"/>
     <p:sldId id="260" r:id="rId6"/>
     <p:sldId id="261" r:id="rId7"/>
-    <p:sldId id="262" r:id="rId8"/>
+    <p:sldId id="264" r:id="rId8"/>
+    <p:sldId id="262" r:id="rId9"/>
   </p:sldIdLst>
   <p:sldSz cx="9144000" cy="5145088"/>
   <p:notesSz cx="7559675" cy="10691813"/>
@@ -110,6 +111,11 @@
       </a:defRPr>
     </a:lvl9pPr>
   </p:defaultTextStyle>
+  <p:extLst>
+    <p:ext uri="{EFAFB233-063F-42B5-8137-9DF3F51BA10A}">
+      <p15:sldGuideLst xmlns:p15="http://schemas.microsoft.com/office/powerpoint/2012/main"/>
+    </p:ext>
+  </p:extLst>
 </p:presentation>
 </file>
 
@@ -8821,7 +8827,7 @@
         <p:spPr>
           <a:xfrm>
             <a:off x="4824360" y="2880360"/>
-            <a:ext cx="1618200" cy="295920"/>
+            <a:ext cx="1618200" cy="441720"/>
           </a:xfrm>
           <a:prstGeom prst="rect">
             <a:avLst/>
@@ -8856,7 +8862,7 @@
               <a:buNone/>
             </a:pPr>
             <a:r>
-              <a:rPr lang="pt-BR" sz="1200" b="0" strike="noStrike" spc="-1">
+              <a:rPr lang="pt-BR" sz="1200" b="0" strike="noStrike" spc="-1" dirty="0">
                 <a:solidFill>
                   <a:srgbClr val="222222"/>
                 </a:solidFill>
@@ -8865,7 +8871,7 @@
               </a:rPr>
               <a:t>Empréstimo Consignado</a:t>
             </a:r>
-            <a:endParaRPr lang="pt-BR" sz="1200" b="0" strike="noStrike" spc="-1">
+            <a:endParaRPr lang="pt-BR" sz="1200" b="0" strike="noStrike" spc="-1" dirty="0">
               <a:latin typeface="Arial"/>
             </a:endParaRPr>
           </a:p>
@@ -9138,7 +9144,7 @@
               <a:buNone/>
             </a:pPr>
             <a:r>
-              <a:rPr lang="pt-BR" sz="1200" b="0" strike="noStrike" spc="-1">
+              <a:rPr lang="pt-BR" sz="1200" b="0" strike="noStrike" spc="-1" dirty="0">
                 <a:solidFill>
                   <a:srgbClr val="222222"/>
                 </a:solidFill>
@@ -9147,7 +9153,7 @@
               </a:rPr>
               <a:t>Empréstimo com garantia</a:t>
             </a:r>
-            <a:endParaRPr lang="pt-BR" sz="1200" b="0" strike="noStrike" spc="-1">
+            <a:endParaRPr lang="pt-BR" sz="1200" b="0" strike="noStrike" spc="-1" dirty="0">
               <a:latin typeface="Arial"/>
             </a:endParaRPr>
           </a:p>
@@ -9159,7 +9165,7 @@
               <a:buNone/>
             </a:pPr>
             <a:r>
-              <a:rPr lang="pt-BR" sz="1200" b="0" strike="noStrike" spc="-1">
+              <a:rPr lang="pt-BR" sz="1200" b="0" strike="noStrike" spc="-1" dirty="0">
                 <a:solidFill>
                   <a:srgbClr val="222222"/>
                 </a:solidFill>
@@ -9168,7 +9174,7 @@
               </a:rPr>
               <a:t>sobre veículos</a:t>
             </a:r>
-            <a:endParaRPr lang="pt-BR" sz="1200" b="0" strike="noStrike" spc="-1">
+            <a:endParaRPr lang="pt-BR" sz="1200" b="0" strike="noStrike" spc="-1" dirty="0">
               <a:latin typeface="Arial"/>
             </a:endParaRPr>
           </a:p>
@@ -10432,8 +10438,8 @@
         </p:nvSpPr>
         <p:spPr>
           <a:xfrm>
-            <a:off x="2147175" y="166651"/>
-            <a:ext cx="4849647" cy="504720"/>
+            <a:off x="2107129" y="146628"/>
+            <a:ext cx="4929740" cy="504720"/>
           </a:xfrm>
           <a:prstGeom prst="rect">
             <a:avLst/>
@@ -10475,7 +10481,882 @@
                 <a:latin typeface="Nunito Sans Black"/>
                 <a:ea typeface="DejaVu Sans"/>
               </a:rPr>
-              <a:t>PORQUE VENDEMOS MAIS ?</a:t>
+              <a:t>ONDE VENDEMOS MAIS ?</a:t>
+            </a:r>
+            <a:endParaRPr lang="pt-BR" sz="2400" b="0" strike="noStrike" spc="-1" dirty="0">
+              <a:latin typeface="Arial"/>
+            </a:endParaRPr>
+          </a:p>
+        </p:txBody>
+      </p:sp>
+      <p:sp>
+        <p:nvSpPr>
+          <p:cNvPr id="200" name="Retângulo 199"/>
+          <p:cNvSpPr/>
+          <p:nvPr/>
+        </p:nvSpPr>
+        <p:spPr>
+          <a:xfrm>
+            <a:off x="1840873" y="1248124"/>
+            <a:ext cx="5641188" cy="1186241"/>
+          </a:xfrm>
+          <a:prstGeom prst="rect">
+            <a:avLst/>
+          </a:prstGeom>
+          <a:noFill/>
+          <a:ln w="0">
+            <a:noFill/>
+          </a:ln>
+        </p:spPr>
+        <p:style>
+          <a:lnRef idx="0">
+            <a:scrgbClr r="0" g="0" b="0"/>
+          </a:lnRef>
+          <a:fillRef idx="0">
+            <a:scrgbClr r="0" g="0" b="0"/>
+          </a:fillRef>
+          <a:effectRef idx="0">
+            <a:scrgbClr r="0" g="0" b="0"/>
+          </a:effectRef>
+          <a:fontRef idx="minor"/>
+        </p:style>
+        <p:txBody>
+          <a:bodyPr lIns="90000" tIns="45000" rIns="90000" bIns="45000" anchor="t">
+            <a:noAutofit/>
+          </a:bodyPr>
+          <a:lstStyle/>
+          <a:p>
+            <a:pPr>
+              <a:lnSpc>
+                <a:spcPct val="100000"/>
+              </a:lnSpc>
+              <a:buNone/>
+            </a:pPr>
+            <a:r>
+              <a:rPr lang="pt-BR" b="0" strike="noStrike" spc="-1" dirty="0">
+                <a:solidFill>
+                  <a:srgbClr val="222222"/>
+                </a:solidFill>
+                <a:latin typeface="Nunito Sans"/>
+                <a:ea typeface="DejaVu Sans"/>
+              </a:rPr>
+              <a:t>Apesar da </a:t>
+            </a:r>
+            <a:r>
+              <a:rPr lang="pt-BR" b="1" strike="noStrike" spc="-1" dirty="0">
+                <a:solidFill>
+                  <a:srgbClr val="222222"/>
+                </a:solidFill>
+                <a:latin typeface="Nunito Sans"/>
+                <a:ea typeface="DejaVu Sans"/>
+              </a:rPr>
+              <a:t>queda de 5%</a:t>
+            </a:r>
+            <a:r>
+              <a:rPr lang="pt-BR" b="0" strike="noStrike" spc="-1" dirty="0">
+                <a:solidFill>
+                  <a:srgbClr val="222222"/>
+                </a:solidFill>
+                <a:latin typeface="Nunito Sans"/>
+                <a:ea typeface="DejaVu Sans"/>
+              </a:rPr>
+              <a:t> nas vendas de empréstimo consignado, </a:t>
+            </a:r>
+            <a:r>
+              <a:rPr lang="pt-BR" spc="-1" dirty="0">
+                <a:solidFill>
+                  <a:srgbClr val="222222"/>
+                </a:solidFill>
+                <a:latin typeface="Nunito Sans"/>
+                <a:ea typeface="DejaVu Sans"/>
+              </a:rPr>
+              <a:t>c</a:t>
+            </a:r>
+            <a:r>
+              <a:rPr lang="pt-BR" b="0" strike="noStrike" spc="-1" dirty="0">
+                <a:solidFill>
+                  <a:srgbClr val="222222"/>
+                </a:solidFill>
+                <a:latin typeface="Nunito Sans"/>
+                <a:ea typeface="DejaVu Sans"/>
+              </a:rPr>
+              <a:t>onseguimos um </a:t>
+            </a:r>
+            <a:r>
+              <a:rPr lang="pt-BR" b="1" strike="noStrike" spc="-1" dirty="0">
+                <a:solidFill>
+                  <a:srgbClr val="222222"/>
+                </a:solidFill>
+                <a:latin typeface="Nunito Sans"/>
+                <a:ea typeface="DejaVu Sans"/>
+              </a:rPr>
+              <a:t>super resultado </a:t>
+            </a:r>
+            <a:r>
+              <a:rPr lang="pt-BR" b="0" strike="noStrike" spc="-1" dirty="0">
+                <a:solidFill>
+                  <a:srgbClr val="222222"/>
+                </a:solidFill>
+                <a:latin typeface="Nunito Sans"/>
+                <a:ea typeface="DejaVu Sans"/>
+              </a:rPr>
+              <a:t>com o novo produto, que, logo no primeiro mês, conseguiu gerar </a:t>
+            </a:r>
+            <a:r>
+              <a:rPr lang="pt-BR" b="1" strike="noStrike" spc="-1" dirty="0">
+                <a:solidFill>
+                  <a:srgbClr val="222222"/>
+                </a:solidFill>
+                <a:latin typeface="Nunito Sans"/>
+                <a:ea typeface="DejaVu Sans"/>
+              </a:rPr>
+              <a:t>R$12 Mil em vendas!</a:t>
+            </a:r>
+            <a:endParaRPr lang="pt-BR" b="1" strike="noStrike" spc="-1" dirty="0">
+              <a:latin typeface="Arial"/>
+            </a:endParaRPr>
+          </a:p>
+        </p:txBody>
+      </p:sp>
+      <p:sp>
+        <p:nvSpPr>
+          <p:cNvPr id="2" name="Retângulo 1">
+            <a:extLst>
+              <a:ext uri="{FF2B5EF4-FFF2-40B4-BE49-F238E27FC236}">
+                <a16:creationId xmlns:a16="http://schemas.microsoft.com/office/drawing/2014/main" id="{3A34E01C-5407-17D1-BDAB-F87E32242E5C}"/>
+              </a:ext>
+            </a:extLst>
+          </p:cNvPr>
+          <p:cNvSpPr/>
+          <p:nvPr/>
+        </p:nvSpPr>
+        <p:spPr>
+          <a:xfrm>
+            <a:off x="2556360" y="2883285"/>
+            <a:ext cx="1618200" cy="441720"/>
+          </a:xfrm>
+          <a:prstGeom prst="rect">
+            <a:avLst/>
+          </a:prstGeom>
+          <a:noFill/>
+          <a:ln w="0">
+            <a:noFill/>
+          </a:ln>
+        </p:spPr>
+        <p:style>
+          <a:lnRef idx="0">
+            <a:scrgbClr r="0" g="0" b="0"/>
+          </a:lnRef>
+          <a:fillRef idx="0">
+            <a:scrgbClr r="0" g="0" b="0"/>
+          </a:fillRef>
+          <a:effectRef idx="0">
+            <a:scrgbClr r="0" g="0" b="0"/>
+          </a:effectRef>
+          <a:fontRef idx="minor"/>
+        </p:style>
+        <p:txBody>
+          <a:bodyPr lIns="90000" tIns="45000" rIns="90000" bIns="45000" anchor="t">
+            <a:noAutofit/>
+          </a:bodyPr>
+          <a:lstStyle/>
+          <a:p>
+            <a:pPr algn="ctr">
+              <a:lnSpc>
+                <a:spcPct val="100000"/>
+              </a:lnSpc>
+              <a:buNone/>
+            </a:pPr>
+            <a:r>
+              <a:rPr lang="pt-BR" sz="1200" b="0" strike="noStrike" spc="-1" dirty="0">
+                <a:solidFill>
+                  <a:srgbClr val="222222"/>
+                </a:solidFill>
+                <a:latin typeface="Nunito Sans"/>
+                <a:ea typeface="DejaVu Sans"/>
+              </a:rPr>
+              <a:t>Empréstimo Consignado</a:t>
+            </a:r>
+            <a:endParaRPr lang="pt-BR" sz="1200" b="0" strike="noStrike" spc="-1" dirty="0">
+              <a:latin typeface="Arial"/>
+            </a:endParaRPr>
+          </a:p>
+        </p:txBody>
+      </p:sp>
+      <p:sp>
+        <p:nvSpPr>
+          <p:cNvPr id="3" name="Retângulo 2">
+            <a:extLst>
+              <a:ext uri="{FF2B5EF4-FFF2-40B4-BE49-F238E27FC236}">
+                <a16:creationId xmlns:a16="http://schemas.microsoft.com/office/drawing/2014/main" id="{9E1BF561-BD71-641B-6F64-706E1C8854B2}"/>
+              </a:ext>
+            </a:extLst>
+          </p:cNvPr>
+          <p:cNvSpPr/>
+          <p:nvPr/>
+        </p:nvSpPr>
+        <p:spPr>
+          <a:xfrm>
+            <a:off x="2412360" y="3316365"/>
+            <a:ext cx="1798200" cy="469440"/>
+          </a:xfrm>
+          <a:prstGeom prst="rect">
+            <a:avLst/>
+          </a:prstGeom>
+          <a:noFill/>
+          <a:ln w="0">
+            <a:noFill/>
+          </a:ln>
+        </p:spPr>
+        <p:style>
+          <a:lnRef idx="0">
+            <a:scrgbClr r="0" g="0" b="0"/>
+          </a:lnRef>
+          <a:fillRef idx="0">
+            <a:scrgbClr r="0" g="0" b="0"/>
+          </a:fillRef>
+          <a:effectRef idx="0">
+            <a:scrgbClr r="0" g="0" b="0"/>
+          </a:effectRef>
+          <a:fontRef idx="minor"/>
+        </p:style>
+        <p:txBody>
+          <a:bodyPr lIns="90000" tIns="45000" rIns="90000" bIns="45000" anchor="t">
+            <a:noAutofit/>
+          </a:bodyPr>
+          <a:lstStyle/>
+          <a:p>
+            <a:pPr algn="ctr">
+              <a:lnSpc>
+                <a:spcPct val="100000"/>
+              </a:lnSpc>
+              <a:buNone/>
+            </a:pPr>
+            <a:r>
+              <a:rPr lang="pt-BR" sz="2200" b="0" strike="noStrike" spc="-1">
+                <a:solidFill>
+                  <a:srgbClr val="222222"/>
+                </a:solidFill>
+                <a:latin typeface="Nunito Sans Black"/>
+                <a:ea typeface="DejaVu Sans"/>
+              </a:rPr>
+              <a:t>R$ 8 Mil</a:t>
+            </a:r>
+            <a:endParaRPr lang="pt-BR" sz="2200" b="0" strike="noStrike" spc="-1">
+              <a:latin typeface="Arial"/>
+            </a:endParaRPr>
+          </a:p>
+        </p:txBody>
+      </p:sp>
+      <p:sp>
+        <p:nvSpPr>
+          <p:cNvPr id="4" name="Retângulo 3">
+            <a:extLst>
+              <a:ext uri="{FF2B5EF4-FFF2-40B4-BE49-F238E27FC236}">
+                <a16:creationId xmlns:a16="http://schemas.microsoft.com/office/drawing/2014/main" id="{F273B5CD-DF45-8792-5D30-7D6467E3CC13}"/>
+              </a:ext>
+            </a:extLst>
+          </p:cNvPr>
+          <p:cNvSpPr/>
+          <p:nvPr/>
+        </p:nvSpPr>
+        <p:spPr>
+          <a:xfrm>
+            <a:off x="2556360" y="3773565"/>
+            <a:ext cx="1618200" cy="295920"/>
+          </a:xfrm>
+          <a:prstGeom prst="rect">
+            <a:avLst/>
+          </a:prstGeom>
+          <a:noFill/>
+          <a:ln w="0">
+            <a:noFill/>
+          </a:ln>
+        </p:spPr>
+        <p:style>
+          <a:lnRef idx="0">
+            <a:scrgbClr r="0" g="0" b="0"/>
+          </a:lnRef>
+          <a:fillRef idx="0">
+            <a:scrgbClr r="0" g="0" b="0"/>
+          </a:fillRef>
+          <a:effectRef idx="0">
+            <a:scrgbClr r="0" g="0" b="0"/>
+          </a:effectRef>
+          <a:fontRef idx="minor"/>
+        </p:style>
+        <p:txBody>
+          <a:bodyPr lIns="90000" tIns="45000" rIns="90000" bIns="45000" anchor="t">
+            <a:noAutofit/>
+          </a:bodyPr>
+          <a:lstStyle/>
+          <a:p>
+            <a:pPr algn="ctr">
+              <a:lnSpc>
+                <a:spcPct val="100000"/>
+              </a:lnSpc>
+              <a:buNone/>
+            </a:pPr>
+            <a:r>
+              <a:rPr lang="pt-BR" sz="1200" b="0" strike="noStrike" spc="-1">
+                <a:solidFill>
+                  <a:srgbClr val="222222"/>
+                </a:solidFill>
+                <a:latin typeface="Nunito Sans"/>
+                <a:ea typeface="DejaVu Sans"/>
+              </a:rPr>
+              <a:t>5%</a:t>
+            </a:r>
+            <a:endParaRPr lang="pt-BR" sz="1200" b="0" strike="noStrike" spc="-1">
+              <a:latin typeface="Arial"/>
+            </a:endParaRPr>
+          </a:p>
+        </p:txBody>
+      </p:sp>
+      <p:grpSp>
+        <p:nvGrpSpPr>
+          <p:cNvPr id="5" name="Agrupar 4">
+            <a:extLst>
+              <a:ext uri="{FF2B5EF4-FFF2-40B4-BE49-F238E27FC236}">
+                <a16:creationId xmlns:a16="http://schemas.microsoft.com/office/drawing/2014/main" id="{C28424BC-01C7-DC24-3CC1-49CF49654CFE}"/>
+              </a:ext>
+            </a:extLst>
+          </p:cNvPr>
+          <p:cNvGrpSpPr/>
+          <p:nvPr/>
+        </p:nvGrpSpPr>
+        <p:grpSpPr>
+          <a:xfrm>
+            <a:off x="3026160" y="3814965"/>
+            <a:ext cx="131040" cy="178920"/>
+            <a:chOff x="5294160" y="3812040"/>
+            <a:chExt cx="131040" cy="178920"/>
+          </a:xfrm>
+        </p:grpSpPr>
+        <p:sp>
+          <p:nvSpPr>
+            <p:cNvPr id="6" name="Retângulo 5">
+              <a:extLst>
+                <a:ext uri="{FF2B5EF4-FFF2-40B4-BE49-F238E27FC236}">
+                  <a16:creationId xmlns:a16="http://schemas.microsoft.com/office/drawing/2014/main" id="{981889C7-834F-D654-2F6A-11E2866A9081}"/>
+                </a:ext>
+              </a:extLst>
+            </p:cNvPr>
+            <p:cNvSpPr/>
+            <p:nvPr/>
+          </p:nvSpPr>
+          <p:spPr>
+            <a:xfrm flipV="1">
+              <a:off x="5327640" y="3812040"/>
+              <a:ext cx="64800" cy="131040"/>
+            </a:xfrm>
+            <a:prstGeom prst="rect">
+              <a:avLst/>
+            </a:prstGeom>
+            <a:solidFill>
+              <a:srgbClr val="FC2626"/>
+            </a:solidFill>
+            <a:ln w="0">
+              <a:solidFill>
+                <a:srgbClr val="FC2626"/>
+              </a:solidFill>
+            </a:ln>
+          </p:spPr>
+          <p:style>
+            <a:lnRef idx="0">
+              <a:scrgbClr r="0" g="0" b="0"/>
+            </a:lnRef>
+            <a:fillRef idx="0">
+              <a:scrgbClr r="0" g="0" b="0"/>
+            </a:fillRef>
+            <a:effectRef idx="0">
+              <a:scrgbClr r="0" g="0" b="0"/>
+            </a:effectRef>
+            <a:fontRef idx="minor"/>
+          </p:style>
+        </p:sp>
+        <p:sp>
+          <p:nvSpPr>
+            <p:cNvPr id="7" name="Forma Livre: Forma 6">
+              <a:extLst>
+                <a:ext uri="{FF2B5EF4-FFF2-40B4-BE49-F238E27FC236}">
+                  <a16:creationId xmlns:a16="http://schemas.microsoft.com/office/drawing/2014/main" id="{FCCB9431-9F94-F134-BD22-61A3C691DB74}"/>
+                </a:ext>
+              </a:extLst>
+            </p:cNvPr>
+            <p:cNvSpPr/>
+            <p:nvPr/>
+          </p:nvSpPr>
+          <p:spPr>
+            <a:xfrm>
+              <a:off x="5294160" y="3926160"/>
+              <a:ext cx="131040" cy="64800"/>
+            </a:xfrm>
+            <a:custGeom>
+              <a:avLst/>
+              <a:gdLst/>
+              <a:ahLst/>
+              <a:cxnLst/>
+              <a:rect l="l" t="t" r="r" b="b"/>
+              <a:pathLst>
+                <a:path w="371" h="187">
+                  <a:moveTo>
+                    <a:pt x="185" y="186"/>
+                  </a:moveTo>
+                  <a:lnTo>
+                    <a:pt x="370" y="0"/>
+                  </a:lnTo>
+                  <a:lnTo>
+                    <a:pt x="0" y="0"/>
+                  </a:lnTo>
+                  <a:lnTo>
+                    <a:pt x="185" y="186"/>
+                  </a:lnTo>
+                </a:path>
+              </a:pathLst>
+            </a:custGeom>
+            <a:solidFill>
+              <a:srgbClr val="FC2626"/>
+            </a:solidFill>
+            <a:ln w="0">
+              <a:noFill/>
+            </a:ln>
+          </p:spPr>
+          <p:style>
+            <a:lnRef idx="0">
+              <a:scrgbClr r="0" g="0" b="0"/>
+            </a:lnRef>
+            <a:fillRef idx="0">
+              <a:scrgbClr r="0" g="0" b="0"/>
+            </a:fillRef>
+            <a:effectRef idx="0">
+              <a:scrgbClr r="0" g="0" b="0"/>
+            </a:effectRef>
+            <a:fontRef idx="minor"/>
+          </p:style>
+        </p:sp>
+      </p:grpSp>
+      <p:sp>
+        <p:nvSpPr>
+          <p:cNvPr id="8" name="Retângulo 7">
+            <a:extLst>
+              <a:ext uri="{FF2B5EF4-FFF2-40B4-BE49-F238E27FC236}">
+                <a16:creationId xmlns:a16="http://schemas.microsoft.com/office/drawing/2014/main" id="{22AA0A38-6539-E8CC-C008-F5E73773B9B7}"/>
+              </a:ext>
+            </a:extLst>
+          </p:cNvPr>
+          <p:cNvSpPr/>
+          <p:nvPr/>
+        </p:nvSpPr>
+        <p:spPr>
+          <a:xfrm>
+            <a:off x="4572000" y="2882925"/>
+            <a:ext cx="2014920" cy="503280"/>
+          </a:xfrm>
+          <a:prstGeom prst="rect">
+            <a:avLst/>
+          </a:prstGeom>
+          <a:noFill/>
+          <a:ln w="0">
+            <a:noFill/>
+          </a:ln>
+        </p:spPr>
+        <p:style>
+          <a:lnRef idx="0">
+            <a:scrgbClr r="0" g="0" b="0"/>
+          </a:lnRef>
+          <a:fillRef idx="0">
+            <a:scrgbClr r="0" g="0" b="0"/>
+          </a:fillRef>
+          <a:effectRef idx="0">
+            <a:scrgbClr r="0" g="0" b="0"/>
+          </a:effectRef>
+          <a:fontRef idx="minor"/>
+        </p:style>
+        <p:txBody>
+          <a:bodyPr lIns="90000" tIns="45000" rIns="90000" bIns="45000" anchor="t">
+            <a:noAutofit/>
+          </a:bodyPr>
+          <a:lstStyle/>
+          <a:p>
+            <a:pPr algn="ctr">
+              <a:lnSpc>
+                <a:spcPct val="100000"/>
+              </a:lnSpc>
+              <a:buNone/>
+            </a:pPr>
+            <a:r>
+              <a:rPr lang="pt-BR" sz="1200" b="0" strike="noStrike" spc="-1" dirty="0">
+                <a:solidFill>
+                  <a:srgbClr val="222222"/>
+                </a:solidFill>
+                <a:latin typeface="Nunito Sans"/>
+                <a:ea typeface="DejaVu Sans"/>
+              </a:rPr>
+              <a:t>Empréstimo com garantia</a:t>
+            </a:r>
+            <a:endParaRPr lang="pt-BR" sz="1200" b="0" strike="noStrike" spc="-1" dirty="0">
+              <a:latin typeface="Arial"/>
+            </a:endParaRPr>
+          </a:p>
+          <a:p>
+            <a:pPr algn="ctr">
+              <a:lnSpc>
+                <a:spcPct val="100000"/>
+              </a:lnSpc>
+              <a:buNone/>
+            </a:pPr>
+            <a:r>
+              <a:rPr lang="pt-BR" sz="1200" b="0" strike="noStrike" spc="-1" dirty="0">
+                <a:solidFill>
+                  <a:srgbClr val="222222"/>
+                </a:solidFill>
+                <a:latin typeface="Nunito Sans"/>
+                <a:ea typeface="DejaVu Sans"/>
+              </a:rPr>
+              <a:t>sobre veículos</a:t>
+            </a:r>
+            <a:endParaRPr lang="pt-BR" sz="1200" b="0" strike="noStrike" spc="-1" dirty="0">
+              <a:latin typeface="Arial"/>
+            </a:endParaRPr>
+          </a:p>
+        </p:txBody>
+      </p:sp>
+      <p:sp>
+        <p:nvSpPr>
+          <p:cNvPr id="9" name="Retângulo 8">
+            <a:extLst>
+              <a:ext uri="{FF2B5EF4-FFF2-40B4-BE49-F238E27FC236}">
+                <a16:creationId xmlns:a16="http://schemas.microsoft.com/office/drawing/2014/main" id="{71917E10-EF3E-E8F0-ABC0-30F08499EC21}"/>
+              </a:ext>
+            </a:extLst>
+          </p:cNvPr>
+          <p:cNvSpPr/>
+          <p:nvPr/>
+        </p:nvSpPr>
+        <p:spPr>
+          <a:xfrm>
+            <a:off x="4752360" y="3316365"/>
+            <a:ext cx="1798200" cy="469440"/>
+          </a:xfrm>
+          <a:prstGeom prst="rect">
+            <a:avLst/>
+          </a:prstGeom>
+          <a:noFill/>
+          <a:ln w="0">
+            <a:noFill/>
+          </a:ln>
+        </p:spPr>
+        <p:style>
+          <a:lnRef idx="0">
+            <a:scrgbClr r="0" g="0" b="0"/>
+          </a:lnRef>
+          <a:fillRef idx="0">
+            <a:scrgbClr r="0" g="0" b="0"/>
+          </a:fillRef>
+          <a:effectRef idx="0">
+            <a:scrgbClr r="0" g="0" b="0"/>
+          </a:effectRef>
+          <a:fontRef idx="minor"/>
+        </p:style>
+        <p:txBody>
+          <a:bodyPr lIns="90000" tIns="45000" rIns="90000" bIns="45000" anchor="t">
+            <a:noAutofit/>
+          </a:bodyPr>
+          <a:lstStyle/>
+          <a:p>
+            <a:pPr algn="ctr">
+              <a:lnSpc>
+                <a:spcPct val="100000"/>
+              </a:lnSpc>
+              <a:buNone/>
+            </a:pPr>
+            <a:r>
+              <a:rPr lang="pt-BR" sz="2200" b="0" strike="noStrike" spc="-1">
+                <a:solidFill>
+                  <a:srgbClr val="222222"/>
+                </a:solidFill>
+                <a:latin typeface="Nunito Sans Black"/>
+                <a:ea typeface="DejaVu Sans"/>
+              </a:rPr>
+              <a:t>R$ 12 Mil</a:t>
+            </a:r>
+            <a:endParaRPr lang="pt-BR" sz="2200" b="0" strike="noStrike" spc="-1">
+              <a:latin typeface="Arial"/>
+            </a:endParaRPr>
+          </a:p>
+        </p:txBody>
+      </p:sp>
+      <p:sp>
+        <p:nvSpPr>
+          <p:cNvPr id="10" name="Retângulo 9">
+            <a:extLst>
+              <a:ext uri="{FF2B5EF4-FFF2-40B4-BE49-F238E27FC236}">
+                <a16:creationId xmlns:a16="http://schemas.microsoft.com/office/drawing/2014/main" id="{D41CDD62-D4FD-1A8E-C926-B194D6BE6591}"/>
+              </a:ext>
+            </a:extLst>
+          </p:cNvPr>
+          <p:cNvSpPr/>
+          <p:nvPr/>
+        </p:nvSpPr>
+        <p:spPr>
+          <a:xfrm>
+            <a:off x="4896360" y="3773565"/>
+            <a:ext cx="1618200" cy="295920"/>
+          </a:xfrm>
+          <a:prstGeom prst="rect">
+            <a:avLst/>
+          </a:prstGeom>
+          <a:noFill/>
+          <a:ln w="0">
+            <a:noFill/>
+          </a:ln>
+        </p:spPr>
+        <p:style>
+          <a:lnRef idx="0">
+            <a:scrgbClr r="0" g="0" b="0"/>
+          </a:lnRef>
+          <a:fillRef idx="0">
+            <a:scrgbClr r="0" g="0" b="0"/>
+          </a:fillRef>
+          <a:effectRef idx="0">
+            <a:scrgbClr r="0" g="0" b="0"/>
+          </a:effectRef>
+          <a:fontRef idx="minor"/>
+        </p:style>
+        <p:txBody>
+          <a:bodyPr lIns="90000" tIns="45000" rIns="90000" bIns="45000" anchor="t">
+            <a:noAutofit/>
+          </a:bodyPr>
+          <a:lstStyle/>
+          <a:p>
+            <a:pPr algn="ctr">
+              <a:lnSpc>
+                <a:spcPct val="100000"/>
+              </a:lnSpc>
+              <a:buNone/>
+            </a:pPr>
+            <a:r>
+              <a:rPr lang="pt-BR" sz="1200" b="0" strike="noStrike" spc="-1">
+                <a:solidFill>
+                  <a:srgbClr val="222222"/>
+                </a:solidFill>
+                <a:latin typeface="Nunito Sans"/>
+                <a:ea typeface="DejaVu Sans"/>
+              </a:rPr>
+              <a:t>100%</a:t>
+            </a:r>
+            <a:endParaRPr lang="pt-BR" sz="1200" b="0" strike="noStrike" spc="-1">
+              <a:latin typeface="Arial"/>
+            </a:endParaRPr>
+          </a:p>
+        </p:txBody>
+      </p:sp>
+      <p:grpSp>
+        <p:nvGrpSpPr>
+          <p:cNvPr id="11" name="Agrupar 10">
+            <a:extLst>
+              <a:ext uri="{FF2B5EF4-FFF2-40B4-BE49-F238E27FC236}">
+                <a16:creationId xmlns:a16="http://schemas.microsoft.com/office/drawing/2014/main" id="{57BB3857-2C84-C108-9094-9EAA058273E7}"/>
+              </a:ext>
+            </a:extLst>
+          </p:cNvPr>
+          <p:cNvGrpSpPr/>
+          <p:nvPr/>
+        </p:nvGrpSpPr>
+        <p:grpSpPr>
+          <a:xfrm>
+            <a:off x="5294160" y="3816765"/>
+            <a:ext cx="131040" cy="177480"/>
+            <a:chOff x="7562160" y="3813840"/>
+            <a:chExt cx="131040" cy="177480"/>
+          </a:xfrm>
+        </p:grpSpPr>
+        <p:sp>
+          <p:nvSpPr>
+            <p:cNvPr id="12" name="Retângulo 11">
+              <a:extLst>
+                <a:ext uri="{FF2B5EF4-FFF2-40B4-BE49-F238E27FC236}">
+                  <a16:creationId xmlns:a16="http://schemas.microsoft.com/office/drawing/2014/main" id="{5501DFED-21FD-BA59-7BDB-1075B5A77356}"/>
+                </a:ext>
+              </a:extLst>
+            </p:cNvPr>
+            <p:cNvSpPr/>
+            <p:nvPr/>
+          </p:nvSpPr>
+          <p:spPr>
+            <a:xfrm>
+              <a:off x="7595640" y="3860280"/>
+              <a:ext cx="64800" cy="131040"/>
+            </a:xfrm>
+            <a:prstGeom prst="rect">
+              <a:avLst/>
+            </a:prstGeom>
+            <a:solidFill>
+              <a:srgbClr val="81D41A"/>
+            </a:solidFill>
+            <a:ln w="0">
+              <a:solidFill>
+                <a:srgbClr val="5EB91E"/>
+              </a:solidFill>
+            </a:ln>
+          </p:spPr>
+          <p:style>
+            <a:lnRef idx="0">
+              <a:scrgbClr r="0" g="0" b="0"/>
+            </a:lnRef>
+            <a:fillRef idx="0">
+              <a:scrgbClr r="0" g="0" b="0"/>
+            </a:fillRef>
+            <a:effectRef idx="0">
+              <a:scrgbClr r="0" g="0" b="0"/>
+            </a:effectRef>
+            <a:fontRef idx="minor"/>
+          </p:style>
+        </p:sp>
+        <p:sp>
+          <p:nvSpPr>
+            <p:cNvPr id="13" name="Forma Livre: Forma 12">
+              <a:extLst>
+                <a:ext uri="{FF2B5EF4-FFF2-40B4-BE49-F238E27FC236}">
+                  <a16:creationId xmlns:a16="http://schemas.microsoft.com/office/drawing/2014/main" id="{451E5425-5589-65D2-1CD0-4173030FE0C3}"/>
+                </a:ext>
+              </a:extLst>
+            </p:cNvPr>
+            <p:cNvSpPr/>
+            <p:nvPr/>
+          </p:nvSpPr>
+          <p:spPr>
+            <a:xfrm>
+              <a:off x="7562160" y="3813840"/>
+              <a:ext cx="131040" cy="64800"/>
+            </a:xfrm>
+            <a:custGeom>
+              <a:avLst/>
+              <a:gdLst/>
+              <a:ahLst/>
+              <a:cxnLst/>
+              <a:rect l="l" t="t" r="r" b="b"/>
+              <a:pathLst>
+                <a:path w="371" h="187">
+                  <a:moveTo>
+                    <a:pt x="185" y="0"/>
+                  </a:moveTo>
+                  <a:lnTo>
+                    <a:pt x="370" y="186"/>
+                  </a:lnTo>
+                  <a:lnTo>
+                    <a:pt x="0" y="186"/>
+                  </a:lnTo>
+                  <a:lnTo>
+                    <a:pt x="185" y="0"/>
+                  </a:lnTo>
+                </a:path>
+              </a:pathLst>
+            </a:custGeom>
+            <a:solidFill>
+              <a:srgbClr val="81D41A"/>
+            </a:solidFill>
+            <a:ln w="0">
+              <a:noFill/>
+            </a:ln>
+          </p:spPr>
+          <p:style>
+            <a:lnRef idx="0">
+              <a:scrgbClr r="0" g="0" b="0"/>
+            </a:lnRef>
+            <a:fillRef idx="0">
+              <a:scrgbClr r="0" g="0" b="0"/>
+            </a:fillRef>
+            <a:effectRef idx="0">
+              <a:scrgbClr r="0" g="0" b="0"/>
+            </a:effectRef>
+            <a:fontRef idx="minor"/>
+          </p:style>
+        </p:sp>
+      </p:grpSp>
+    </p:spTree>
+    <p:extLst>
+      <p:ext uri="{BB962C8B-B14F-4D97-AF65-F5344CB8AC3E}">
+        <p14:creationId xmlns:p14="http://schemas.microsoft.com/office/powerpoint/2010/main" val="119162538"/>
+      </p:ext>
+    </p:extLst>
+  </p:cSld>
+  <p:clrMapOvr>
+    <a:masterClrMapping/>
+  </p:clrMapOvr>
+</p:sld>
+</file>
+
+<file path=ppt/slides/slide8.xml><?xml version="1.0" encoding="utf-8"?>
+<p:sld xmlns:a="http://schemas.openxmlformats.org/drawingml/2006/main" xmlns:r="http://schemas.openxmlformats.org/officeDocument/2006/relationships" xmlns:p="http://schemas.openxmlformats.org/presentationml/2006/main">
+  <p:cSld>
+    <p:spTree>
+      <p:nvGrpSpPr>
+        <p:cNvPr id="1" name=""/>
+        <p:cNvGrpSpPr/>
+        <p:nvPr/>
+      </p:nvGrpSpPr>
+      <p:grpSpPr>
+        <a:xfrm>
+          <a:off x="0" y="0"/>
+          <a:ext cx="0" cy="0"/>
+          <a:chOff x="0" y="0"/>
+          <a:chExt cx="0" cy="0"/>
+        </a:xfrm>
+      </p:grpSpPr>
+      <p:sp>
+        <p:nvSpPr>
+          <p:cNvPr id="187" name="Retângulo 186"/>
+          <p:cNvSpPr/>
+          <p:nvPr/>
+        </p:nvSpPr>
+        <p:spPr>
+          <a:xfrm>
+            <a:off x="2147175" y="166651"/>
+            <a:ext cx="4849647" cy="504720"/>
+          </a:xfrm>
+          <a:prstGeom prst="rect">
+            <a:avLst/>
+          </a:prstGeom>
+          <a:noFill/>
+          <a:ln w="0">
+            <a:noFill/>
+          </a:ln>
+        </p:spPr>
+        <p:style>
+          <a:lnRef idx="0">
+            <a:scrgbClr r="0" g="0" b="0"/>
+          </a:lnRef>
+          <a:fillRef idx="0">
+            <a:scrgbClr r="0" g="0" b="0"/>
+          </a:fillRef>
+          <a:effectRef idx="0">
+            <a:scrgbClr r="0" g="0" b="0"/>
+          </a:effectRef>
+          <a:fontRef idx="minor"/>
+        </p:style>
+        <p:txBody>
+          <a:bodyPr lIns="90000" tIns="45000" rIns="90000" bIns="45000" anchor="t">
+            <a:noAutofit/>
+          </a:bodyPr>
+          <a:lstStyle/>
+          <a:p>
+            <a:pPr algn="ctr">
+              <a:lnSpc>
+                <a:spcPct val="100000"/>
+              </a:lnSpc>
+              <a:buNone/>
+            </a:pPr>
+            <a:r>
+              <a:rPr lang="pt-BR" sz="2400" b="0" strike="noStrike" spc="-1" dirty="0">
+                <a:solidFill>
+                  <a:srgbClr val="222222"/>
+                </a:solidFill>
+                <a:latin typeface="Nunito Sans Black"/>
+                <a:ea typeface="DejaVu Sans"/>
+              </a:rPr>
+              <a:t>POR QUE VENDEMOS MAIS ?</a:t>
             </a:r>
             <a:endParaRPr lang="pt-BR" sz="2400" b="0" strike="noStrike" spc="-1" dirty="0">
               <a:latin typeface="Arial"/>

</xml_diff>

<commit_message>
More content to post
</commit_message>
<xml_diff>
--- a/posts/2023/2023-01-20-storytelling/report-exemplo.pptx
+++ b/posts/2023/2023-01-20-storytelling/report-exemplo.pptx
@@ -11372,8 +11372,8 @@
         </p:nvSpPr>
         <p:spPr>
           <a:xfrm>
-            <a:off x="1304769" y="1477337"/>
-            <a:ext cx="4234153" cy="1901362"/>
+            <a:off x="3403563" y="1329606"/>
+            <a:ext cx="4234153" cy="659140"/>
           </a:xfrm>
           <a:prstGeom prst="rect">
             <a:avLst/>
@@ -11400,101 +11400,66 @@
             <a:noAutofit/>
           </a:bodyPr>
           <a:lstStyle/>
-          <a:p>
-            <a:pPr marL="285750" indent="-285750">
-              <a:lnSpc>
-                <a:spcPct val="100000"/>
-              </a:lnSpc>
-              <a:buFont typeface="Arial" panose="020B0604020202020204" pitchFamily="34" charset="0"/>
-              <a:buChar char="•"/>
-            </a:pPr>
-            <a:r>
-              <a:rPr lang="en-US" sz="1600" spc="-1" dirty="0" err="1">
-                <a:solidFill>
-                  <a:srgbClr val="222222"/>
-                </a:solidFill>
-                <a:latin typeface="Nunito Sans" pitchFamily="2" charset="0"/>
-              </a:rPr>
-              <a:t>Melhoria</a:t>
-            </a:r>
-            <a:r>
-              <a:rPr lang="en-US" sz="1600" spc="-1" dirty="0">
-                <a:solidFill>
-                  <a:srgbClr val="222222"/>
-                </a:solidFill>
-                <a:latin typeface="Nunito Sans" pitchFamily="2" charset="0"/>
-              </a:rPr>
-              <a:t> </a:t>
-            </a:r>
-            <a:r>
-              <a:rPr lang="en-US" sz="1600" spc="-1" dirty="0" err="1">
-                <a:solidFill>
-                  <a:srgbClr val="222222"/>
-                </a:solidFill>
-                <a:latin typeface="Nunito Sans" pitchFamily="2" charset="0"/>
-              </a:rPr>
-              <a:t>importante</a:t>
-            </a:r>
-            <a:r>
-              <a:rPr lang="en-US" sz="1600" spc="-1" dirty="0">
-                <a:solidFill>
-                  <a:srgbClr val="222222"/>
-                </a:solidFill>
-                <a:latin typeface="Nunito Sans" pitchFamily="2" charset="0"/>
-              </a:rPr>
-              <a:t> </a:t>
-            </a:r>
-            <a:r>
-              <a:rPr lang="en-US" sz="1600" spc="-1" dirty="0" err="1">
-                <a:solidFill>
-                  <a:srgbClr val="222222"/>
-                </a:solidFill>
-                <a:latin typeface="Nunito Sans" pitchFamily="2" charset="0"/>
-              </a:rPr>
-              <a:t>na</a:t>
-            </a:r>
-            <a:r>
-              <a:rPr lang="en-US" sz="1600" spc="-1" dirty="0">
-                <a:solidFill>
-                  <a:srgbClr val="222222"/>
-                </a:solidFill>
-                <a:latin typeface="Nunito Sans" pitchFamily="2" charset="0"/>
-              </a:rPr>
-              <a:t> API </a:t>
-            </a:r>
-            <a:r>
-              <a:rPr lang="pt-BR" sz="1600" b="0" strike="noStrike" spc="-1" dirty="0">
-                <a:solidFill>
-                  <a:srgbClr val="222222"/>
-                </a:solidFill>
-                <a:latin typeface="Nunito Sans" pitchFamily="2" charset="0"/>
-                <a:ea typeface="DejaVu Sans"/>
-              </a:rPr>
-              <a:t>utilizada no fluxo de vendas;</a:t>
-            </a:r>
-          </a:p>
           <a:p>
             <a:pPr>
               <a:lnSpc>
                 <a:spcPct val="100000"/>
               </a:lnSpc>
             </a:pPr>
-            <a:endParaRPr lang="pt-BR" sz="1600" b="0" strike="noStrike" spc="-1" dirty="0">
-              <a:solidFill>
-                <a:srgbClr val="222222"/>
-              </a:solidFill>
-              <a:latin typeface="Nunito Sans" pitchFamily="2" charset="0"/>
-              <a:ea typeface="DejaVu Sans"/>
-            </a:endParaRPr>
-          </a:p>
-          <a:p>
-            <a:pPr marL="285750" indent="-285750">
-              <a:lnSpc>
-                <a:spcPct val="100000"/>
-              </a:lnSpc>
-              <a:buFont typeface="Arial" panose="020B0604020202020204" pitchFamily="34" charset="0"/>
-              <a:buChar char="•"/>
-            </a:pPr>
+            <a:r>
+              <a:rPr lang="en-US" sz="1600" spc="-1" dirty="0" err="1">
+                <a:solidFill>
+                  <a:srgbClr val="222222"/>
+                </a:solidFill>
+                <a:latin typeface="Nunito Sans" pitchFamily="2" charset="0"/>
+              </a:rPr>
+              <a:t>Melhoria</a:t>
+            </a:r>
+            <a:r>
+              <a:rPr lang="en-US" sz="1600" spc="-1" dirty="0">
+                <a:solidFill>
+                  <a:srgbClr val="222222"/>
+                </a:solidFill>
+                <a:latin typeface="Nunito Sans" pitchFamily="2" charset="0"/>
+              </a:rPr>
+              <a:t> </a:t>
+            </a:r>
+            <a:r>
+              <a:rPr lang="en-US" sz="1600" spc="-1" dirty="0" err="1">
+                <a:solidFill>
+                  <a:srgbClr val="222222"/>
+                </a:solidFill>
+                <a:latin typeface="Nunito Sans" pitchFamily="2" charset="0"/>
+              </a:rPr>
+              <a:t>importante</a:t>
+            </a:r>
+            <a:r>
+              <a:rPr lang="en-US" sz="1600" spc="-1" dirty="0">
+                <a:solidFill>
+                  <a:srgbClr val="222222"/>
+                </a:solidFill>
+                <a:latin typeface="Nunito Sans" pitchFamily="2" charset="0"/>
+              </a:rPr>
+              <a:t> </a:t>
+            </a:r>
+            <a:r>
+              <a:rPr lang="en-US" sz="1600" spc="-1" dirty="0" err="1">
+                <a:solidFill>
+                  <a:srgbClr val="222222"/>
+                </a:solidFill>
+                <a:latin typeface="Nunito Sans" pitchFamily="2" charset="0"/>
+              </a:rPr>
+              <a:t>na</a:t>
+            </a:r>
+            <a:r>
+              <a:rPr lang="en-US" sz="1600" spc="-1" dirty="0">
+                <a:solidFill>
+                  <a:srgbClr val="222222"/>
+                </a:solidFill>
+                <a:latin typeface="Nunito Sans" pitchFamily="2" charset="0"/>
+              </a:rPr>
+              <a:t> API </a:t>
+            </a:r>
             <a:r>
               <a:rPr lang="pt-BR" sz="1600" b="0" strike="noStrike" spc="-1" dirty="0">
                 <a:solidFill>
@@ -11503,14 +11468,8 @@
                 <a:latin typeface="Nunito Sans" pitchFamily="2" charset="0"/>
                 <a:ea typeface="DejaVu Sans"/>
               </a:rPr>
-              <a:t>Aumento significativo da taxa de conversão;</a:t>
-            </a:r>
-            <a:endParaRPr lang="pt-BR" sz="1600" b="0" strike="noStrike" spc="-1" dirty="0">
-              <a:solidFill>
-                <a:srgbClr val="222222"/>
-              </a:solidFill>
-              <a:latin typeface="Nunito Sans" pitchFamily="2" charset="0"/>
-            </a:endParaRPr>
+              <a:t>utilizada no fluxo de vendas;</a:t>
+            </a:r>
           </a:p>
         </p:txBody>
       </p:sp>
@@ -11528,7 +11487,7 @@
         </p:nvSpPr>
         <p:spPr>
           <a:xfrm>
-            <a:off x="6112236" y="2783965"/>
+            <a:off x="1609508" y="3220386"/>
             <a:ext cx="1618200" cy="503280"/>
           </a:xfrm>
           <a:prstGeom prst="rect">
@@ -11593,7 +11552,7 @@
         </p:nvSpPr>
         <p:spPr>
           <a:xfrm>
-            <a:off x="6112236" y="3289045"/>
+            <a:off x="1609508" y="3725466"/>
             <a:ext cx="1618200" cy="469440"/>
           </a:xfrm>
           <a:prstGeom prst="rect">
@@ -11658,7 +11617,7 @@
         </p:nvSpPr>
         <p:spPr>
           <a:xfrm>
-            <a:off x="6112236" y="3746245"/>
+            <a:off x="1609508" y="4182666"/>
             <a:ext cx="1618200" cy="295920"/>
           </a:xfrm>
           <a:prstGeom prst="rect">
@@ -11723,7 +11682,7 @@
         </p:nvGrpSpPr>
         <p:grpSpPr>
           <a:xfrm>
-            <a:off x="6510036" y="3789445"/>
+            <a:off x="2007308" y="4225866"/>
             <a:ext cx="131040" cy="177480"/>
             <a:chOff x="5762160" y="3103560"/>
             <a:chExt cx="131040" cy="177480"/>
@@ -11846,7 +11805,7 @@
         </p:nvSpPr>
         <p:spPr>
           <a:xfrm>
-            <a:off x="6112236" y="1225697"/>
+            <a:off x="1609508" y="1329606"/>
             <a:ext cx="1618200" cy="503280"/>
           </a:xfrm>
           <a:prstGeom prst="rect">
@@ -11911,7 +11870,7 @@
         </p:nvSpPr>
         <p:spPr>
           <a:xfrm>
-            <a:off x="5968236" y="1730777"/>
+            <a:off x="1465508" y="1834686"/>
             <a:ext cx="1798200" cy="469440"/>
           </a:xfrm>
           <a:prstGeom prst="rect">
@@ -11976,7 +11935,7 @@
         </p:nvSpPr>
         <p:spPr>
           <a:xfrm>
-            <a:off x="6112236" y="2187977"/>
+            <a:off x="1609508" y="2291886"/>
             <a:ext cx="1618200" cy="295920"/>
           </a:xfrm>
           <a:prstGeom prst="rect">
@@ -12041,7 +12000,7 @@
         </p:nvGrpSpPr>
         <p:grpSpPr>
           <a:xfrm>
-            <a:off x="6510036" y="2231177"/>
+            <a:off x="2007308" y="2335086"/>
             <a:ext cx="131040" cy="177480"/>
             <a:chOff x="7562160" y="3103560"/>
             <a:chExt cx="131040" cy="177480"/>
@@ -12150,6 +12109,58 @@
           </p:style>
         </p:sp>
       </p:grpSp>
+      <p:sp>
+        <p:nvSpPr>
+          <p:cNvPr id="15" name="CaixaDeTexto 14">
+            <a:extLst>
+              <a:ext uri="{FF2B5EF4-FFF2-40B4-BE49-F238E27FC236}">
+                <a16:creationId xmlns:a16="http://schemas.microsoft.com/office/drawing/2014/main" id="{902C53BC-9C4F-4240-3E82-85BD9A1B3414}"/>
+              </a:ext>
+            </a:extLst>
+          </p:cNvPr>
+          <p:cNvSpPr txBox="1"/>
+          <p:nvPr/>
+        </p:nvSpPr>
+        <p:spPr>
+          <a:xfrm>
+            <a:off x="3403563" y="3220386"/>
+            <a:ext cx="4572000" cy="646331"/>
+          </a:xfrm>
+          <a:prstGeom prst="rect">
+            <a:avLst/>
+          </a:prstGeom>
+          <a:noFill/>
+        </p:spPr>
+        <p:txBody>
+          <a:bodyPr wrap="square">
+            <a:spAutoFit/>
+          </a:bodyPr>
+          <a:lstStyle/>
+          <a:p>
+            <a:pPr>
+              <a:lnSpc>
+                <a:spcPct val="100000"/>
+              </a:lnSpc>
+            </a:pPr>
+            <a:r>
+              <a:rPr lang="pt-BR" sz="1800" b="0" strike="noStrike" spc="-1" dirty="0">
+                <a:solidFill>
+                  <a:srgbClr val="222222"/>
+                </a:solidFill>
+                <a:latin typeface="Nunito Sans" pitchFamily="2" charset="0"/>
+                <a:ea typeface="DejaVu Sans"/>
+              </a:rPr>
+              <a:t>Aumento significativo da taxa de conversão;</a:t>
+            </a:r>
+            <a:endParaRPr lang="pt-BR" sz="1800" b="0" strike="noStrike" spc="-1" dirty="0">
+              <a:solidFill>
+                <a:srgbClr val="222222"/>
+              </a:solidFill>
+              <a:latin typeface="Nunito Sans" pitchFamily="2" charset="0"/>
+            </a:endParaRPr>
+          </a:p>
+        </p:txBody>
+      </p:sp>
     </p:spTree>
     <p:extLst>
       <p:ext uri="{BB962C8B-B14F-4D97-AF65-F5344CB8AC3E}">

</xml_diff>